<commit_message>
Fleshed out more of the agenda
</commit_message>
<xml_diff>
--- a/docs/SMAP Materials Unbranded.pptx
+++ b/docs/SMAP Materials Unbranded.pptx
@@ -7,9 +7,34 @@
   <p:sldIdLst>
     <p:sldId id="256" r:id="rId2"/>
     <p:sldId id="257" r:id="rId3"/>
-    <p:sldId id="258" r:id="rId4"/>
-    <p:sldId id="259" r:id="rId5"/>
-    <p:sldId id="260" r:id="rId6"/>
+    <p:sldId id="261" r:id="rId4"/>
+    <p:sldId id="262" r:id="rId5"/>
+    <p:sldId id="263" r:id="rId6"/>
+    <p:sldId id="264" r:id="rId7"/>
+    <p:sldId id="265" r:id="rId8"/>
+    <p:sldId id="278" r:id="rId9"/>
+    <p:sldId id="266" r:id="rId10"/>
+    <p:sldId id="267" r:id="rId11"/>
+    <p:sldId id="268" r:id="rId12"/>
+    <p:sldId id="258" r:id="rId13"/>
+    <p:sldId id="270" r:id="rId14"/>
+    <p:sldId id="271" r:id="rId15"/>
+    <p:sldId id="279" r:id="rId16"/>
+    <p:sldId id="272" r:id="rId17"/>
+    <p:sldId id="273" r:id="rId18"/>
+    <p:sldId id="274" r:id="rId19"/>
+    <p:sldId id="269" r:id="rId20"/>
+    <p:sldId id="280" r:id="rId21"/>
+    <p:sldId id="275" r:id="rId22"/>
+    <p:sldId id="276" r:id="rId23"/>
+    <p:sldId id="277" r:id="rId24"/>
+    <p:sldId id="259" r:id="rId25"/>
+    <p:sldId id="281" r:id="rId26"/>
+    <p:sldId id="282" r:id="rId27"/>
+    <p:sldId id="283" r:id="rId28"/>
+    <p:sldId id="260" r:id="rId29"/>
+    <p:sldId id="284" r:id="rId30"/>
+    <p:sldId id="285" r:id="rId31"/>
   </p:sldIdLst>
   <p:sldSz cx="12192000" cy="6858000"/>
   <p:notesSz cx="6858000" cy="9144000"/>
@@ -108,6 +133,11 @@
       </a:defRPr>
     </a:lvl9pPr>
   </p:defaultTextStyle>
+  <p:extLst>
+    <p:ext uri="{EFAFB233-063F-42B5-8137-9DF3F51BA10A}">
+      <p15:sldGuideLst xmlns:p15="http://schemas.microsoft.com/office/powerpoint/2012/main"/>
+    </p:ext>
+  </p:extLst>
 </p:presentation>
 </file>
 
@@ -161,7 +191,7 @@
           <a:noFill/>
           <a:extLst>
             <a:ext uri="{909E8E84-426E-40dd-AFC4-6F175D3DCCD1}">
-              <a14:hiddenFill xmlns:a14="http://schemas.microsoft.com/office/drawing/2010/main" xmlns="">
+              <a14:hiddenFill xmlns="" xmlns:a14="http://schemas.microsoft.com/office/drawing/2010/main">
                 <a:solidFill>
                   <a:srgbClr val="FFFFFF"/>
                 </a:solidFill>
@@ -221,7 +251,7 @@
             </a:ln>
             <a:extLst>
               <a:ext uri="{91240B29-F687-4f45-9708-019B960494DF}">
-                <a14:hiddenLine xmlns:a14="http://schemas.microsoft.com/office/drawing/2010/main" xmlns="" w="9525">
+                <a14:hiddenLine xmlns="" xmlns:a14="http://schemas.microsoft.com/office/drawing/2010/main" w="9525">
                   <a:solidFill>
                     <a:srgbClr val="000000"/>
                   </a:solidFill>
@@ -311,7 +341,7 @@
             </a:ln>
             <a:extLst>
               <a:ext uri="{91240B29-F687-4f45-9708-019B960494DF}">
-                <a14:hiddenLine xmlns:a14="http://schemas.microsoft.com/office/drawing/2010/main" xmlns="" w="9525">
+                <a14:hiddenLine xmlns="" xmlns:a14="http://schemas.microsoft.com/office/drawing/2010/main" w="9525">
                   <a:solidFill>
                     <a:srgbClr val="000000"/>
                   </a:solidFill>
@@ -401,7 +431,7 @@
             </a:ln>
             <a:extLst>
               <a:ext uri="{91240B29-F687-4f45-9708-019B960494DF}">
-                <a14:hiddenLine xmlns:a14="http://schemas.microsoft.com/office/drawing/2010/main" xmlns="" w="9525">
+                <a14:hiddenLine xmlns="" xmlns:a14="http://schemas.microsoft.com/office/drawing/2010/main" w="9525">
                   <a:solidFill>
                     <a:srgbClr val="000000"/>
                   </a:solidFill>
@@ -435,7 +465,7 @@
             </a:ln>
             <a:extLst>
               <a:ext uri="{91240B29-F687-4f45-9708-019B960494DF}">
-                <a14:hiddenLine xmlns:a14="http://schemas.microsoft.com/office/drawing/2010/main" xmlns="" w="9525">
+                <a14:hiddenLine xmlns="" xmlns:a14="http://schemas.microsoft.com/office/drawing/2010/main" w="9525">
                   <a:solidFill>
                     <a:srgbClr val="000000"/>
                   </a:solidFill>
@@ -525,7 +555,7 @@
             </a:ln>
             <a:extLst>
               <a:ext uri="{91240B29-F687-4f45-9708-019B960494DF}">
-                <a14:hiddenLine xmlns:a14="http://schemas.microsoft.com/office/drawing/2010/main" xmlns="" w="9525">
+                <a14:hiddenLine xmlns="" xmlns:a14="http://schemas.microsoft.com/office/drawing/2010/main" w="9525">
                   <a:solidFill>
                     <a:srgbClr val="000000"/>
                   </a:solidFill>
@@ -587,7 +617,7 @@
             </a:ln>
             <a:extLst>
               <a:ext uri="{91240B29-F687-4f45-9708-019B960494DF}">
-                <a14:hiddenLine xmlns:a14="http://schemas.microsoft.com/office/drawing/2010/main" xmlns="" w="9525">
+                <a14:hiddenLine xmlns="" xmlns:a14="http://schemas.microsoft.com/office/drawing/2010/main" w="9525">
                   <a:solidFill>
                     <a:srgbClr val="000000"/>
                   </a:solidFill>
@@ -649,7 +679,7 @@
             </a:ln>
             <a:extLst>
               <a:ext uri="{91240B29-F687-4f45-9708-019B960494DF}">
-                <a14:hiddenLine xmlns:a14="http://schemas.microsoft.com/office/drawing/2010/main" xmlns="" w="9525">
+                <a14:hiddenLine xmlns="" xmlns:a14="http://schemas.microsoft.com/office/drawing/2010/main" w="9525">
                   <a:solidFill>
                     <a:srgbClr val="000000"/>
                   </a:solidFill>
@@ -739,7 +769,7 @@
             </a:ln>
             <a:extLst>
               <a:ext uri="{91240B29-F687-4f45-9708-019B960494DF}">
-                <a14:hiddenLine xmlns:a14="http://schemas.microsoft.com/office/drawing/2010/main" xmlns="" w="9525">
+                <a14:hiddenLine xmlns="" xmlns:a14="http://schemas.microsoft.com/office/drawing/2010/main" w="9525">
                   <a:solidFill>
                     <a:srgbClr val="000000"/>
                   </a:solidFill>
@@ -801,7 +831,7 @@
             </a:ln>
             <a:extLst>
               <a:ext uri="{91240B29-F687-4f45-9708-019B960494DF}">
-                <a14:hiddenLine xmlns:a14="http://schemas.microsoft.com/office/drawing/2010/main" xmlns="" w="9525">
+                <a14:hiddenLine xmlns="" xmlns:a14="http://schemas.microsoft.com/office/drawing/2010/main" w="9525">
                   <a:solidFill>
                     <a:srgbClr val="000000"/>
                   </a:solidFill>
@@ -863,7 +893,7 @@
             </a:ln>
             <a:extLst>
               <a:ext uri="{91240B29-F687-4f45-9708-019B960494DF}">
-                <a14:hiddenLine xmlns:a14="http://schemas.microsoft.com/office/drawing/2010/main" xmlns="" w="9525">
+                <a14:hiddenLine xmlns="" xmlns:a14="http://schemas.microsoft.com/office/drawing/2010/main" w="9525">
                   <a:solidFill>
                     <a:srgbClr val="000000"/>
                   </a:solidFill>
@@ -953,7 +983,7 @@
             </a:ln>
             <a:extLst>
               <a:ext uri="{91240B29-F687-4f45-9708-019B960494DF}">
-                <a14:hiddenLine xmlns:a14="http://schemas.microsoft.com/office/drawing/2010/main" xmlns="" w="9525">
+                <a14:hiddenLine xmlns="" xmlns:a14="http://schemas.microsoft.com/office/drawing/2010/main" w="9525">
                   <a:solidFill>
                     <a:srgbClr val="000000"/>
                   </a:solidFill>
@@ -1043,7 +1073,7 @@
             </a:ln>
             <a:extLst>
               <a:ext uri="{91240B29-F687-4f45-9708-019B960494DF}">
-                <a14:hiddenLine xmlns:a14="http://schemas.microsoft.com/office/drawing/2010/main" xmlns="" w="9525">
+                <a14:hiddenLine xmlns="" xmlns:a14="http://schemas.microsoft.com/office/drawing/2010/main" w="9525">
                   <a:solidFill>
                     <a:srgbClr val="000000"/>
                   </a:solidFill>
@@ -1105,7 +1135,7 @@
             </a:ln>
             <a:extLst>
               <a:ext uri="{91240B29-F687-4f45-9708-019B960494DF}">
-                <a14:hiddenLine xmlns:a14="http://schemas.microsoft.com/office/drawing/2010/main" xmlns="" w="9525">
+                <a14:hiddenLine xmlns="" xmlns:a14="http://schemas.microsoft.com/office/drawing/2010/main" w="9525">
                   <a:solidFill>
                     <a:srgbClr val="000000"/>
                   </a:solidFill>
@@ -1215,7 +1245,7 @@
             </a:ln>
             <a:extLst>
               <a:ext uri="{91240B29-F687-4f45-9708-019B960494DF}">
-                <a14:hiddenLine xmlns:a14="http://schemas.microsoft.com/office/drawing/2010/main" xmlns="" w="9525">
+                <a14:hiddenLine xmlns="" xmlns:a14="http://schemas.microsoft.com/office/drawing/2010/main" w="9525">
                   <a:solidFill>
                     <a:srgbClr val="000000"/>
                   </a:solidFill>
@@ -1277,7 +1307,7 @@
             </a:ln>
             <a:extLst>
               <a:ext uri="{91240B29-F687-4f45-9708-019B960494DF}">
-                <a14:hiddenLine xmlns:a14="http://schemas.microsoft.com/office/drawing/2010/main" xmlns="" w="9525">
+                <a14:hiddenLine xmlns="" xmlns:a14="http://schemas.microsoft.com/office/drawing/2010/main" w="9525">
                   <a:solidFill>
                     <a:srgbClr val="000000"/>
                   </a:solidFill>
@@ -1367,7 +1397,7 @@
             </a:ln>
             <a:extLst>
               <a:ext uri="{91240B29-F687-4f45-9708-019B960494DF}">
-                <a14:hiddenLine xmlns:a14="http://schemas.microsoft.com/office/drawing/2010/main" xmlns="" w="9525">
+                <a14:hiddenLine xmlns="" xmlns:a14="http://schemas.microsoft.com/office/drawing/2010/main" w="9525">
                   <a:solidFill>
                     <a:srgbClr val="000000"/>
                   </a:solidFill>
@@ -1457,7 +1487,7 @@
             </a:ln>
             <a:extLst>
               <a:ext uri="{91240B29-F687-4f45-9708-019B960494DF}">
-                <a14:hiddenLine xmlns:a14="http://schemas.microsoft.com/office/drawing/2010/main" xmlns="" w="9525">
+                <a14:hiddenLine xmlns="" xmlns:a14="http://schemas.microsoft.com/office/drawing/2010/main" w="9525">
                   <a:solidFill>
                     <a:srgbClr val="000000"/>
                   </a:solidFill>
@@ -1519,7 +1549,7 @@
             </a:ln>
             <a:extLst>
               <a:ext uri="{91240B29-F687-4f45-9708-019B960494DF}">
-                <a14:hiddenLine xmlns:a14="http://schemas.microsoft.com/office/drawing/2010/main" xmlns="" w="9525">
+                <a14:hiddenLine xmlns="" xmlns:a14="http://schemas.microsoft.com/office/drawing/2010/main" w="9525">
                   <a:solidFill>
                     <a:srgbClr val="000000"/>
                   </a:solidFill>
@@ -1609,7 +1639,7 @@
             </a:ln>
             <a:extLst>
               <a:ext uri="{91240B29-F687-4f45-9708-019B960494DF}">
-                <a14:hiddenLine xmlns:a14="http://schemas.microsoft.com/office/drawing/2010/main" xmlns="" w="9525">
+                <a14:hiddenLine xmlns="" xmlns:a14="http://schemas.microsoft.com/office/drawing/2010/main" w="9525">
                   <a:solidFill>
                     <a:srgbClr val="000000"/>
                   </a:solidFill>
@@ -1699,7 +1729,7 @@
             </a:ln>
             <a:extLst>
               <a:ext uri="{91240B29-F687-4f45-9708-019B960494DF}">
-                <a14:hiddenLine xmlns:a14="http://schemas.microsoft.com/office/drawing/2010/main" xmlns="" w="9525">
+                <a14:hiddenLine xmlns="" xmlns:a14="http://schemas.microsoft.com/office/drawing/2010/main" w="9525">
                   <a:solidFill>
                     <a:srgbClr val="000000"/>
                   </a:solidFill>
@@ -1755,7 +1785,7 @@
             </a:ln>
             <a:extLst>
               <a:ext uri="{91240B29-F687-4f45-9708-019B960494DF}">
-                <a14:hiddenLine xmlns:a14="http://schemas.microsoft.com/office/drawing/2010/main" xmlns="" w="9525">
+                <a14:hiddenLine xmlns="" xmlns:a14="http://schemas.microsoft.com/office/drawing/2010/main" w="9525">
                   <a:solidFill>
                     <a:srgbClr val="000000"/>
                   </a:solidFill>
@@ -1845,7 +1875,7 @@
             </a:ln>
             <a:extLst>
               <a:ext uri="{91240B29-F687-4f45-9708-019B960494DF}">
-                <a14:hiddenLine xmlns:a14="http://schemas.microsoft.com/office/drawing/2010/main" xmlns="" w="9525">
+                <a14:hiddenLine xmlns="" xmlns:a14="http://schemas.microsoft.com/office/drawing/2010/main" w="9525">
                   <a:solidFill>
                     <a:srgbClr val="000000"/>
                   </a:solidFill>
@@ -1901,7 +1931,7 @@
             </a:ln>
             <a:extLst>
               <a:ext uri="{91240B29-F687-4f45-9708-019B960494DF}">
-                <a14:hiddenLine xmlns:a14="http://schemas.microsoft.com/office/drawing/2010/main" xmlns="" w="9525">
+                <a14:hiddenLine xmlns="" xmlns:a14="http://schemas.microsoft.com/office/drawing/2010/main" w="9525">
                   <a:solidFill>
                     <a:srgbClr val="000000"/>
                   </a:solidFill>
@@ -1991,7 +2021,7 @@
             </a:ln>
             <a:extLst>
               <a:ext uri="{91240B29-F687-4f45-9708-019B960494DF}">
-                <a14:hiddenLine xmlns:a14="http://schemas.microsoft.com/office/drawing/2010/main" xmlns="" w="9525">
+                <a14:hiddenLine xmlns="" xmlns:a14="http://schemas.microsoft.com/office/drawing/2010/main" w="9525">
                   <a:solidFill>
                     <a:srgbClr val="000000"/>
                   </a:solidFill>
@@ -2059,7 +2089,7 @@
             </a:ln>
             <a:extLst>
               <a:ext uri="{91240B29-F687-4f45-9708-019B960494DF}">
-                <a14:hiddenLine xmlns:a14="http://schemas.microsoft.com/office/drawing/2010/main" xmlns="" w="9525">
+                <a14:hiddenLine xmlns="" xmlns:a14="http://schemas.microsoft.com/office/drawing/2010/main" w="9525">
                   <a:solidFill>
                     <a:srgbClr val="000000"/>
                   </a:solidFill>
@@ -2149,7 +2179,7 @@
             </a:ln>
             <a:extLst>
               <a:ext uri="{91240B29-F687-4f45-9708-019B960494DF}">
-                <a14:hiddenLine xmlns:a14="http://schemas.microsoft.com/office/drawing/2010/main" xmlns="" w="9525">
+                <a14:hiddenLine xmlns="" xmlns:a14="http://schemas.microsoft.com/office/drawing/2010/main" w="9525">
                   <a:solidFill>
                     <a:srgbClr val="000000"/>
                   </a:solidFill>
@@ -2217,7 +2247,7 @@
             </a:ln>
             <a:extLst>
               <a:ext uri="{91240B29-F687-4f45-9708-019B960494DF}">
-                <a14:hiddenLine xmlns:a14="http://schemas.microsoft.com/office/drawing/2010/main" xmlns="" w="9525">
+                <a14:hiddenLine xmlns="" xmlns:a14="http://schemas.microsoft.com/office/drawing/2010/main" w="9525">
                   <a:solidFill>
                     <a:srgbClr val="000000"/>
                   </a:solidFill>
@@ -2307,7 +2337,7 @@
             </a:ln>
             <a:extLst>
               <a:ext uri="{91240B29-F687-4f45-9708-019B960494DF}">
-                <a14:hiddenLine xmlns:a14="http://schemas.microsoft.com/office/drawing/2010/main" xmlns="" w="9525">
+                <a14:hiddenLine xmlns="" xmlns:a14="http://schemas.microsoft.com/office/drawing/2010/main" w="9525">
                   <a:solidFill>
                     <a:srgbClr val="000000"/>
                   </a:solidFill>
@@ -2341,7 +2371,7 @@
             </a:ln>
             <a:extLst>
               <a:ext uri="{91240B29-F687-4f45-9708-019B960494DF}">
-                <a14:hiddenLine xmlns:a14="http://schemas.microsoft.com/office/drawing/2010/main" xmlns="" w="9525">
+                <a14:hiddenLine xmlns="" xmlns:a14="http://schemas.microsoft.com/office/drawing/2010/main" w="9525">
                   <a:solidFill>
                     <a:srgbClr val="000000"/>
                   </a:solidFill>
@@ -2431,7 +2461,7 @@
             </a:ln>
             <a:extLst>
               <a:ext uri="{91240B29-F687-4f45-9708-019B960494DF}">
-                <a14:hiddenLine xmlns:a14="http://schemas.microsoft.com/office/drawing/2010/main" xmlns="" w="9525">
+                <a14:hiddenLine xmlns="" xmlns:a14="http://schemas.microsoft.com/office/drawing/2010/main" w="9525">
                   <a:solidFill>
                     <a:srgbClr val="000000"/>
                   </a:solidFill>
@@ -2493,7 +2523,7 @@
             </a:ln>
             <a:extLst>
               <a:ext uri="{91240B29-F687-4f45-9708-019B960494DF}">
-                <a14:hiddenLine xmlns:a14="http://schemas.microsoft.com/office/drawing/2010/main" xmlns="" w="9525">
+                <a14:hiddenLine xmlns="" xmlns:a14="http://schemas.microsoft.com/office/drawing/2010/main" w="9525">
                   <a:solidFill>
                     <a:srgbClr val="000000"/>
                   </a:solidFill>
@@ -2555,7 +2585,7 @@
             </a:ln>
             <a:extLst>
               <a:ext uri="{91240B29-F687-4f45-9708-019B960494DF}">
-                <a14:hiddenLine xmlns:a14="http://schemas.microsoft.com/office/drawing/2010/main" xmlns="" w="9525">
+                <a14:hiddenLine xmlns="" xmlns:a14="http://schemas.microsoft.com/office/drawing/2010/main" w="9525">
                   <a:solidFill>
                     <a:srgbClr val="000000"/>
                   </a:solidFill>
@@ -2645,7 +2675,7 @@
             </a:ln>
             <a:extLst>
               <a:ext uri="{91240B29-F687-4f45-9708-019B960494DF}">
-                <a14:hiddenLine xmlns:a14="http://schemas.microsoft.com/office/drawing/2010/main" xmlns="" w="9525">
+                <a14:hiddenLine xmlns="" xmlns:a14="http://schemas.microsoft.com/office/drawing/2010/main" w="9525">
                   <a:solidFill>
                     <a:srgbClr val="000000"/>
                   </a:solidFill>
@@ -2713,7 +2743,7 @@
             </a:ln>
             <a:extLst>
               <a:ext uri="{91240B29-F687-4f45-9708-019B960494DF}">
-                <a14:hiddenLine xmlns:a14="http://schemas.microsoft.com/office/drawing/2010/main" xmlns="" w="9525">
+                <a14:hiddenLine xmlns="" xmlns:a14="http://schemas.microsoft.com/office/drawing/2010/main" w="9525">
                   <a:solidFill>
                     <a:srgbClr val="000000"/>
                   </a:solidFill>
@@ -2775,7 +2805,7 @@
             </a:ln>
             <a:extLst>
               <a:ext uri="{91240B29-F687-4f45-9708-019B960494DF}">
-                <a14:hiddenLine xmlns:a14="http://schemas.microsoft.com/office/drawing/2010/main" xmlns="" w="9525">
+                <a14:hiddenLine xmlns="" xmlns:a14="http://schemas.microsoft.com/office/drawing/2010/main" w="9525">
                   <a:solidFill>
                     <a:srgbClr val="000000"/>
                   </a:solidFill>
@@ -2865,7 +2895,7 @@
             </a:ln>
             <a:extLst>
               <a:ext uri="{91240B29-F687-4f45-9708-019B960494DF}">
-                <a14:hiddenLine xmlns:a14="http://schemas.microsoft.com/office/drawing/2010/main" xmlns="" w="9525">
+                <a14:hiddenLine xmlns="" xmlns:a14="http://schemas.microsoft.com/office/drawing/2010/main" w="9525">
                   <a:solidFill>
                     <a:srgbClr val="000000"/>
                   </a:solidFill>
@@ -2927,7 +2957,7 @@
             </a:ln>
             <a:extLst>
               <a:ext uri="{91240B29-F687-4f45-9708-019B960494DF}">
-                <a14:hiddenLine xmlns:a14="http://schemas.microsoft.com/office/drawing/2010/main" xmlns="" w="9525">
+                <a14:hiddenLine xmlns="" xmlns:a14="http://schemas.microsoft.com/office/drawing/2010/main" w="9525">
                   <a:solidFill>
                     <a:srgbClr val="000000"/>
                   </a:solidFill>
@@ -3017,7 +3047,7 @@
             </a:ln>
             <a:extLst>
               <a:ext uri="{91240B29-F687-4f45-9708-019B960494DF}">
-                <a14:hiddenLine xmlns:a14="http://schemas.microsoft.com/office/drawing/2010/main" xmlns="" w="9525">
+                <a14:hiddenLine xmlns="" xmlns:a14="http://schemas.microsoft.com/office/drawing/2010/main" w="9525">
                   <a:solidFill>
                     <a:srgbClr val="000000"/>
                   </a:solidFill>
@@ -3079,7 +3109,7 @@
             </a:ln>
             <a:extLst>
               <a:ext uri="{91240B29-F687-4f45-9708-019B960494DF}">
-                <a14:hiddenLine xmlns:a14="http://schemas.microsoft.com/office/drawing/2010/main" xmlns="" w="9525">
+                <a14:hiddenLine xmlns="" xmlns:a14="http://schemas.microsoft.com/office/drawing/2010/main" w="9525">
                   <a:solidFill>
                     <a:srgbClr val="000000"/>
                   </a:solidFill>
@@ -3169,7 +3199,7 @@
             </a:ln>
             <a:extLst>
               <a:ext uri="{91240B29-F687-4f45-9708-019B960494DF}">
-                <a14:hiddenLine xmlns:a14="http://schemas.microsoft.com/office/drawing/2010/main" xmlns="" w="9525">
+                <a14:hiddenLine xmlns="" xmlns:a14="http://schemas.microsoft.com/office/drawing/2010/main" w="9525">
                   <a:solidFill>
                     <a:srgbClr val="000000"/>
                   </a:solidFill>
@@ -3203,7 +3233,7 @@
             </a:ln>
             <a:extLst>
               <a:ext uri="{91240B29-F687-4f45-9708-019B960494DF}">
-                <a14:hiddenLine xmlns:a14="http://schemas.microsoft.com/office/drawing/2010/main" xmlns="" w="9525">
+                <a14:hiddenLine xmlns="" xmlns:a14="http://schemas.microsoft.com/office/drawing/2010/main" w="9525">
                   <a:solidFill>
                     <a:srgbClr val="000000"/>
                   </a:solidFill>
@@ -3268,7 +3298,7 @@
             </a:ln>
             <a:extLst>
               <a:ext uri="{91240B29-F687-4f45-9708-019B960494DF}">
-                <a14:hiddenLine xmlns:a14="http://schemas.microsoft.com/office/drawing/2010/main" xmlns="" w="9525">
+                <a14:hiddenLine xmlns="" xmlns:a14="http://schemas.microsoft.com/office/drawing/2010/main" w="9525">
                   <a:solidFill>
                     <a:srgbClr val="000000"/>
                   </a:solidFill>
@@ -3358,7 +3388,7 @@
             </a:ln>
             <a:extLst>
               <a:ext uri="{91240B29-F687-4f45-9708-019B960494DF}">
-                <a14:hiddenLine xmlns:a14="http://schemas.microsoft.com/office/drawing/2010/main" xmlns="" w="9525">
+                <a14:hiddenLine xmlns="" xmlns:a14="http://schemas.microsoft.com/office/drawing/2010/main" w="9525">
                   <a:solidFill>
                     <a:srgbClr val="000000"/>
                   </a:solidFill>
@@ -3420,7 +3450,7 @@
             </a:ln>
             <a:extLst>
               <a:ext uri="{91240B29-F687-4f45-9708-019B960494DF}">
-                <a14:hiddenLine xmlns:a14="http://schemas.microsoft.com/office/drawing/2010/main" xmlns="" w="9525">
+                <a14:hiddenLine xmlns="" xmlns:a14="http://schemas.microsoft.com/office/drawing/2010/main" w="9525">
                   <a:solidFill>
                     <a:srgbClr val="000000"/>
                   </a:solidFill>
@@ -3510,7 +3540,7 @@
             </a:ln>
             <a:extLst>
               <a:ext uri="{91240B29-F687-4f45-9708-019B960494DF}">
-                <a14:hiddenLine xmlns:a14="http://schemas.microsoft.com/office/drawing/2010/main" xmlns="" w="9525">
+                <a14:hiddenLine xmlns="" xmlns:a14="http://schemas.microsoft.com/office/drawing/2010/main" w="9525">
                   <a:solidFill>
                     <a:srgbClr val="000000"/>
                   </a:solidFill>
@@ -3600,7 +3630,7 @@
             </a:ln>
             <a:extLst>
               <a:ext uri="{91240B29-F687-4f45-9708-019B960494DF}">
-                <a14:hiddenLine xmlns:a14="http://schemas.microsoft.com/office/drawing/2010/main" xmlns="" w="9525">
+                <a14:hiddenLine xmlns="" xmlns:a14="http://schemas.microsoft.com/office/drawing/2010/main" w="9525">
                   <a:solidFill>
                     <a:srgbClr val="000000"/>
                   </a:solidFill>
@@ -3665,7 +3695,7 @@
             </a:ln>
             <a:extLst>
               <a:ext uri="{91240B29-F687-4f45-9708-019B960494DF}">
-                <a14:hiddenLine xmlns:a14="http://schemas.microsoft.com/office/drawing/2010/main" xmlns="" w="9525">
+                <a14:hiddenLine xmlns="" xmlns:a14="http://schemas.microsoft.com/office/drawing/2010/main" w="9525">
                   <a:solidFill>
                     <a:srgbClr val="000000"/>
                   </a:solidFill>
@@ -3727,7 +3757,7 @@
             </a:ln>
             <a:extLst>
               <a:ext uri="{91240B29-F687-4f45-9708-019B960494DF}">
-                <a14:hiddenLine xmlns:a14="http://schemas.microsoft.com/office/drawing/2010/main" xmlns="" w="9525">
+                <a14:hiddenLine xmlns="" xmlns:a14="http://schemas.microsoft.com/office/drawing/2010/main" w="9525">
                   <a:solidFill>
                     <a:srgbClr val="000000"/>
                   </a:solidFill>
@@ -3817,7 +3847,7 @@
             </a:ln>
             <a:extLst>
               <a:ext uri="{91240B29-F687-4f45-9708-019B960494DF}">
-                <a14:hiddenLine xmlns:a14="http://schemas.microsoft.com/office/drawing/2010/main" xmlns="" w="9525">
+                <a14:hiddenLine xmlns="" xmlns:a14="http://schemas.microsoft.com/office/drawing/2010/main" w="9525">
                   <a:solidFill>
                     <a:srgbClr val="000000"/>
                   </a:solidFill>
@@ -3907,7 +3937,7 @@
             </a:ln>
             <a:extLst>
               <a:ext uri="{91240B29-F687-4f45-9708-019B960494DF}">
-                <a14:hiddenLine xmlns:a14="http://schemas.microsoft.com/office/drawing/2010/main" xmlns="" w="9525">
+                <a14:hiddenLine xmlns="" xmlns:a14="http://schemas.microsoft.com/office/drawing/2010/main" w="9525">
                   <a:solidFill>
                     <a:srgbClr val="000000"/>
                   </a:solidFill>
@@ -3969,7 +3999,7 @@
             </a:ln>
             <a:extLst>
               <a:ext uri="{91240B29-F687-4f45-9708-019B960494DF}">
-                <a14:hiddenLine xmlns:a14="http://schemas.microsoft.com/office/drawing/2010/main" xmlns="" w="9525">
+                <a14:hiddenLine xmlns="" xmlns:a14="http://schemas.microsoft.com/office/drawing/2010/main" w="9525">
                   <a:solidFill>
                     <a:srgbClr val="000000"/>
                   </a:solidFill>
@@ -4089,7 +4119,7 @@
             </a:ln>
             <a:extLst>
               <a:ext uri="{91240B29-F687-4f45-9708-019B960494DF}">
-                <a14:hiddenLine xmlns:a14="http://schemas.microsoft.com/office/drawing/2010/main" xmlns="" w="9525">
+                <a14:hiddenLine xmlns="" xmlns:a14="http://schemas.microsoft.com/office/drawing/2010/main" w="9525">
                   <a:solidFill>
                     <a:srgbClr val="000000"/>
                   </a:solidFill>
@@ -4157,7 +4187,7 @@
             </a:ln>
             <a:extLst>
               <a:ext uri="{91240B29-F687-4f45-9708-019B960494DF}">
-                <a14:hiddenLine xmlns:a14="http://schemas.microsoft.com/office/drawing/2010/main" xmlns="" w="9525">
+                <a14:hiddenLine xmlns="" xmlns:a14="http://schemas.microsoft.com/office/drawing/2010/main" w="9525">
                   <a:solidFill>
                     <a:srgbClr val="000000"/>
                   </a:solidFill>
@@ -4247,7 +4277,7 @@
             </a:ln>
             <a:extLst>
               <a:ext uri="{91240B29-F687-4f45-9708-019B960494DF}">
-                <a14:hiddenLine xmlns:a14="http://schemas.microsoft.com/office/drawing/2010/main" xmlns="" w="9525">
+                <a14:hiddenLine xmlns="" xmlns:a14="http://schemas.microsoft.com/office/drawing/2010/main" w="9525">
                   <a:solidFill>
                     <a:srgbClr val="000000"/>
                   </a:solidFill>
@@ -4387,7 +4417,7 @@
           <a:p>
             <a:fld id="{48A87A34-81AB-432B-8DAE-1953F412C126}" type="datetimeFigureOut">
               <a:rPr lang="en-US" dirty="0"/>
-              <a:t>7/5/2019</a:t>
+              <a:t>7/8/2019</a:t>
             </a:fld>
             <a:endParaRPr lang="en-US" dirty="0"/>
           </a:p>
@@ -4649,7 +4679,7 @@
           <a:p>
             <a:fld id="{48A87A34-81AB-432B-8DAE-1953F412C126}" type="datetimeFigureOut">
               <a:rPr lang="en-US" dirty="0"/>
-              <a:t>7/5/2019</a:t>
+              <a:t>7/8/2019</a:t>
             </a:fld>
             <a:endParaRPr lang="en-US" dirty="0"/>
           </a:p>
@@ -4840,7 +4870,7 @@
           <a:p>
             <a:fld id="{48A87A34-81AB-432B-8DAE-1953F412C126}" type="datetimeFigureOut">
               <a:rPr lang="en-US" dirty="0"/>
-              <a:t>7/5/2019</a:t>
+              <a:t>7/8/2019</a:t>
             </a:fld>
             <a:endParaRPr lang="en-US" dirty="0"/>
           </a:p>
@@ -5098,7 +5128,7 @@
           <a:p>
             <a:fld id="{48A87A34-81AB-432B-8DAE-1953F412C126}" type="datetimeFigureOut">
               <a:rPr lang="en-US" dirty="0"/>
-              <a:t>7/5/2019</a:t>
+              <a:t>7/8/2019</a:t>
             </a:fld>
             <a:endParaRPr lang="en-US" dirty="0"/>
           </a:p>
@@ -5527,7 +5557,7 @@
           <a:p>
             <a:fld id="{48A87A34-81AB-432B-8DAE-1953F412C126}" type="datetimeFigureOut">
               <a:rPr lang="en-US" dirty="0"/>
-              <a:t>7/5/2019</a:t>
+              <a:t>7/8/2019</a:t>
             </a:fld>
             <a:endParaRPr lang="en-US" dirty="0"/>
           </a:p>
@@ -6068,7 +6098,7 @@
           <a:p>
             <a:fld id="{48A87A34-81AB-432B-8DAE-1953F412C126}" type="datetimeFigureOut">
               <a:rPr lang="en-US" dirty="0"/>
-              <a:t>7/5/2019</a:t>
+              <a:t>7/8/2019</a:t>
             </a:fld>
             <a:endParaRPr lang="en-US" dirty="0"/>
           </a:p>
@@ -6783,7 +6813,7 @@
           <a:p>
             <a:fld id="{48A87A34-81AB-432B-8DAE-1953F412C126}" type="datetimeFigureOut">
               <a:rPr lang="en-US" dirty="0"/>
-              <a:t>7/5/2019</a:t>
+              <a:t>7/8/2019</a:t>
             </a:fld>
             <a:endParaRPr lang="en-US" dirty="0"/>
           </a:p>
@@ -6948,7 +6978,7 @@
           <a:p>
             <a:fld id="{48A87A34-81AB-432B-8DAE-1953F412C126}" type="datetimeFigureOut">
               <a:rPr lang="en-US" dirty="0"/>
-              <a:t>7/5/2019</a:t>
+              <a:t>7/8/2019</a:t>
             </a:fld>
             <a:endParaRPr lang="en-US" dirty="0"/>
           </a:p>
@@ -7123,7 +7153,7 @@
           <a:p>
             <a:fld id="{48A87A34-81AB-432B-8DAE-1953F412C126}" type="datetimeFigureOut">
               <a:rPr lang="en-US" dirty="0"/>
-              <a:t>7/5/2019</a:t>
+              <a:t>7/8/2019</a:t>
             </a:fld>
             <a:endParaRPr lang="en-US" dirty="0"/>
           </a:p>
@@ -7288,7 +7318,7 @@
           <a:p>
             <a:fld id="{48A87A34-81AB-432B-8DAE-1953F412C126}" type="datetimeFigureOut">
               <a:rPr lang="en-US" dirty="0"/>
-              <a:t>7/5/2019</a:t>
+              <a:t>7/8/2019</a:t>
             </a:fld>
             <a:endParaRPr lang="en-US" dirty="0"/>
           </a:p>
@@ -7533,7 +7563,7 @@
           <a:p>
             <a:fld id="{48A87A34-81AB-432B-8DAE-1953F412C126}" type="datetimeFigureOut">
               <a:rPr lang="en-US" dirty="0"/>
-              <a:t>7/5/2019</a:t>
+              <a:t>7/8/2019</a:t>
             </a:fld>
             <a:endParaRPr lang="en-US" dirty="0"/>
           </a:p>
@@ -7760,7 +7790,7 @@
           <a:p>
             <a:fld id="{48A87A34-81AB-432B-8DAE-1953F412C126}" type="datetimeFigureOut">
               <a:rPr lang="en-US" dirty="0"/>
-              <a:t>7/5/2019</a:t>
+              <a:t>7/8/2019</a:t>
             </a:fld>
             <a:endParaRPr lang="en-US" dirty="0"/>
           </a:p>
@@ -8136,7 +8166,7 @@
           <a:p>
             <a:fld id="{48A87A34-81AB-432B-8DAE-1953F412C126}" type="datetimeFigureOut">
               <a:rPr lang="en-US" dirty="0"/>
-              <a:t>7/5/2019</a:t>
+              <a:t>7/8/2019</a:t>
             </a:fld>
             <a:endParaRPr lang="en-US" dirty="0"/>
           </a:p>
@@ -8249,7 +8279,7 @@
           <a:p>
             <a:fld id="{48A87A34-81AB-432B-8DAE-1953F412C126}" type="datetimeFigureOut">
               <a:rPr lang="en-US" dirty="0"/>
-              <a:t>7/5/2019</a:t>
+              <a:t>7/8/2019</a:t>
             </a:fld>
             <a:endParaRPr lang="en-US" dirty="0"/>
           </a:p>
@@ -8339,7 +8369,7 @@
           <a:p>
             <a:fld id="{48A87A34-81AB-432B-8DAE-1953F412C126}" type="datetimeFigureOut">
               <a:rPr lang="en-US" dirty="0"/>
-              <a:t>7/5/2019</a:t>
+              <a:t>7/8/2019</a:t>
             </a:fld>
             <a:endParaRPr lang="en-US" dirty="0"/>
           </a:p>
@@ -8583,7 +8613,7 @@
           <a:p>
             <a:fld id="{48A87A34-81AB-432B-8DAE-1953F412C126}" type="datetimeFigureOut">
               <a:rPr lang="en-US" dirty="0"/>
-              <a:t>7/5/2019</a:t>
+              <a:t>7/8/2019</a:t>
             </a:fld>
             <a:endParaRPr lang="en-US" dirty="0"/>
           </a:p>
@@ -8858,7 +8888,7 @@
           <a:p>
             <a:fld id="{48A87A34-81AB-432B-8DAE-1953F412C126}" type="datetimeFigureOut">
               <a:rPr lang="en-US" dirty="0"/>
-              <a:t>7/5/2019</a:t>
+              <a:t>7/8/2019</a:t>
             </a:fld>
             <a:endParaRPr lang="en-US" dirty="0"/>
           </a:p>
@@ -8969,7 +8999,7 @@
           <a:noFill/>
           <a:extLst>
             <a:ext uri="{909E8E84-426E-40dd-AFC4-6F175D3DCCD1}">
-              <a14:hiddenFill xmlns:a14="http://schemas.microsoft.com/office/drawing/2010/main" xmlns="">
+              <a14:hiddenFill xmlns="" xmlns:a14="http://schemas.microsoft.com/office/drawing/2010/main">
                 <a:solidFill>
                   <a:srgbClr val="FFFFFF"/>
                 </a:solidFill>
@@ -9043,7 +9073,7 @@
               </a:ln>
               <a:extLst>
                 <a:ext uri="{91240B29-F687-4f45-9708-019B960494DF}">
-                  <a14:hiddenLine xmlns:a14="http://schemas.microsoft.com/office/drawing/2010/main" xmlns="" w="9525">
+                  <a14:hiddenLine xmlns="" xmlns:a14="http://schemas.microsoft.com/office/drawing/2010/main" w="9525">
                     <a:solidFill>
                       <a:srgbClr val="000000"/>
                     </a:solidFill>
@@ -9133,7 +9163,7 @@
               </a:ln>
               <a:extLst>
                 <a:ext uri="{91240B29-F687-4f45-9708-019B960494DF}">
-                  <a14:hiddenLine xmlns:a14="http://schemas.microsoft.com/office/drawing/2010/main" xmlns="" w="9525">
+                  <a14:hiddenLine xmlns="" xmlns:a14="http://schemas.microsoft.com/office/drawing/2010/main" w="9525">
                     <a:solidFill>
                       <a:srgbClr val="000000"/>
                     </a:solidFill>
@@ -9223,7 +9253,7 @@
               </a:ln>
               <a:extLst>
                 <a:ext uri="{91240B29-F687-4f45-9708-019B960494DF}">
-                  <a14:hiddenLine xmlns:a14="http://schemas.microsoft.com/office/drawing/2010/main" xmlns="" w="9525">
+                  <a14:hiddenLine xmlns="" xmlns:a14="http://schemas.microsoft.com/office/drawing/2010/main" w="9525">
                     <a:solidFill>
                       <a:srgbClr val="000000"/>
                     </a:solidFill>
@@ -9285,7 +9315,7 @@
               </a:ln>
               <a:extLst>
                 <a:ext uri="{91240B29-F687-4f45-9708-019B960494DF}">
-                  <a14:hiddenLine xmlns:a14="http://schemas.microsoft.com/office/drawing/2010/main" xmlns="" w="9525">
+                  <a14:hiddenLine xmlns="" xmlns:a14="http://schemas.microsoft.com/office/drawing/2010/main" w="9525">
                     <a:solidFill>
                       <a:srgbClr val="000000"/>
                     </a:solidFill>
@@ -9375,7 +9405,7 @@
               </a:ln>
               <a:extLst>
                 <a:ext uri="{91240B29-F687-4f45-9708-019B960494DF}">
-                  <a14:hiddenLine xmlns:a14="http://schemas.microsoft.com/office/drawing/2010/main" xmlns="" w="9525">
+                  <a14:hiddenLine xmlns="" xmlns:a14="http://schemas.microsoft.com/office/drawing/2010/main" w="9525">
                     <a:solidFill>
                       <a:srgbClr val="000000"/>
                     </a:solidFill>
@@ -9437,7 +9467,7 @@
               </a:ln>
               <a:extLst>
                 <a:ext uri="{91240B29-F687-4f45-9708-019B960494DF}">
-                  <a14:hiddenLine xmlns:a14="http://schemas.microsoft.com/office/drawing/2010/main" xmlns="" w="9525">
+                  <a14:hiddenLine xmlns="" xmlns:a14="http://schemas.microsoft.com/office/drawing/2010/main" w="9525">
                     <a:solidFill>
                       <a:srgbClr val="000000"/>
                     </a:solidFill>
@@ -9499,7 +9529,7 @@
               </a:ln>
               <a:extLst>
                 <a:ext uri="{91240B29-F687-4f45-9708-019B960494DF}">
-                  <a14:hiddenLine xmlns:a14="http://schemas.microsoft.com/office/drawing/2010/main" xmlns="" w="9525">
+                  <a14:hiddenLine xmlns="" xmlns:a14="http://schemas.microsoft.com/office/drawing/2010/main" w="9525">
                     <a:solidFill>
                       <a:srgbClr val="000000"/>
                     </a:solidFill>
@@ -9589,7 +9619,7 @@
               </a:ln>
               <a:extLst>
                 <a:ext uri="{91240B29-F687-4f45-9708-019B960494DF}">
-                  <a14:hiddenLine xmlns:a14="http://schemas.microsoft.com/office/drawing/2010/main" xmlns="" w="9525">
+                  <a14:hiddenLine xmlns="" xmlns:a14="http://schemas.microsoft.com/office/drawing/2010/main" w="9525">
                     <a:solidFill>
                       <a:srgbClr val="000000"/>
                     </a:solidFill>
@@ -9679,7 +9709,7 @@
               </a:ln>
               <a:extLst>
                 <a:ext uri="{91240B29-F687-4f45-9708-019B960494DF}">
-                  <a14:hiddenLine xmlns:a14="http://schemas.microsoft.com/office/drawing/2010/main" xmlns="" w="9525">
+                  <a14:hiddenLine xmlns="" xmlns:a14="http://schemas.microsoft.com/office/drawing/2010/main" w="9525">
                     <a:solidFill>
                       <a:srgbClr val="000000"/>
                     </a:solidFill>
@@ -9741,7 +9771,7 @@
               </a:ln>
               <a:extLst>
                 <a:ext uri="{91240B29-F687-4f45-9708-019B960494DF}">
-                  <a14:hiddenLine xmlns:a14="http://schemas.microsoft.com/office/drawing/2010/main" xmlns="" w="9525">
+                  <a14:hiddenLine xmlns="" xmlns:a14="http://schemas.microsoft.com/office/drawing/2010/main" w="9525">
                     <a:solidFill>
                       <a:srgbClr val="000000"/>
                     </a:solidFill>
@@ -9851,7 +9881,7 @@
               </a:ln>
               <a:extLst>
                 <a:ext uri="{91240B29-F687-4f45-9708-019B960494DF}">
-                  <a14:hiddenLine xmlns:a14="http://schemas.microsoft.com/office/drawing/2010/main" xmlns="" w="9525">
+                  <a14:hiddenLine xmlns="" xmlns:a14="http://schemas.microsoft.com/office/drawing/2010/main" w="9525">
                     <a:solidFill>
                       <a:srgbClr val="000000"/>
                     </a:solidFill>
@@ -9935,7 +9965,7 @@
               </a:ln>
               <a:extLst>
                 <a:ext uri="{91240B29-F687-4f45-9708-019B960494DF}">
-                  <a14:hiddenLine xmlns:a14="http://schemas.microsoft.com/office/drawing/2010/main" xmlns="" w="9525">
+                  <a14:hiddenLine xmlns="" xmlns:a14="http://schemas.microsoft.com/office/drawing/2010/main" w="9525">
                     <a:solidFill>
                       <a:srgbClr val="000000"/>
                     </a:solidFill>
@@ -9997,7 +10027,7 @@
               </a:ln>
               <a:extLst>
                 <a:ext uri="{91240B29-F687-4f45-9708-019B960494DF}">
-                  <a14:hiddenLine xmlns:a14="http://schemas.microsoft.com/office/drawing/2010/main" xmlns="" w="9525">
+                  <a14:hiddenLine xmlns="" xmlns:a14="http://schemas.microsoft.com/office/drawing/2010/main" w="9525">
                     <a:solidFill>
                       <a:srgbClr val="000000"/>
                     </a:solidFill>
@@ -10059,7 +10089,7 @@
               </a:ln>
               <a:extLst>
                 <a:ext uri="{91240B29-F687-4f45-9708-019B960494DF}">
-                  <a14:hiddenLine xmlns:a14="http://schemas.microsoft.com/office/drawing/2010/main" xmlns="" w="9525">
+                  <a14:hiddenLine xmlns="" xmlns:a14="http://schemas.microsoft.com/office/drawing/2010/main" w="9525">
                     <a:solidFill>
                       <a:srgbClr val="000000"/>
                     </a:solidFill>
@@ -10149,7 +10179,7 @@
               </a:ln>
               <a:extLst>
                 <a:ext uri="{91240B29-F687-4f45-9708-019B960494DF}">
-                  <a14:hiddenLine xmlns:a14="http://schemas.microsoft.com/office/drawing/2010/main" xmlns="" w="9525">
+                  <a14:hiddenLine xmlns="" xmlns:a14="http://schemas.microsoft.com/office/drawing/2010/main" w="9525">
                     <a:solidFill>
                       <a:srgbClr val="000000"/>
                     </a:solidFill>
@@ -10183,7 +10213,7 @@
               </a:ln>
               <a:extLst>
                 <a:ext uri="{91240B29-F687-4f45-9708-019B960494DF}">
-                  <a14:hiddenLine xmlns:a14="http://schemas.microsoft.com/office/drawing/2010/main" xmlns="" w="9525">
+                  <a14:hiddenLine xmlns="" xmlns:a14="http://schemas.microsoft.com/office/drawing/2010/main" w="9525">
                     <a:solidFill>
                       <a:srgbClr val="000000"/>
                     </a:solidFill>
@@ -10248,7 +10278,7 @@
               </a:ln>
               <a:extLst>
                 <a:ext uri="{91240B29-F687-4f45-9708-019B960494DF}">
-                  <a14:hiddenLine xmlns:a14="http://schemas.microsoft.com/office/drawing/2010/main" xmlns="" w="9525">
+                  <a14:hiddenLine xmlns="" xmlns:a14="http://schemas.microsoft.com/office/drawing/2010/main" w="9525">
                     <a:solidFill>
                       <a:srgbClr val="000000"/>
                     </a:solidFill>
@@ -10338,7 +10368,7 @@
               </a:ln>
               <a:extLst>
                 <a:ext uri="{91240B29-F687-4f45-9708-019B960494DF}">
-                  <a14:hiddenLine xmlns:a14="http://schemas.microsoft.com/office/drawing/2010/main" xmlns="" w="9525">
+                  <a14:hiddenLine xmlns="" xmlns:a14="http://schemas.microsoft.com/office/drawing/2010/main" w="9525">
                     <a:solidFill>
                       <a:srgbClr val="000000"/>
                     </a:solidFill>
@@ -10400,7 +10430,7 @@
               </a:ln>
               <a:extLst>
                 <a:ext uri="{91240B29-F687-4f45-9708-019B960494DF}">
-                  <a14:hiddenLine xmlns:a14="http://schemas.microsoft.com/office/drawing/2010/main" xmlns="" w="9525">
+                  <a14:hiddenLine xmlns="" xmlns:a14="http://schemas.microsoft.com/office/drawing/2010/main" w="9525">
                     <a:solidFill>
                       <a:srgbClr val="000000"/>
                     </a:solidFill>
@@ -10490,7 +10520,7 @@
               </a:ln>
               <a:extLst>
                 <a:ext uri="{91240B29-F687-4f45-9708-019B960494DF}">
-                  <a14:hiddenLine xmlns:a14="http://schemas.microsoft.com/office/drawing/2010/main" xmlns="" w="9525">
+                  <a14:hiddenLine xmlns="" xmlns:a14="http://schemas.microsoft.com/office/drawing/2010/main" w="9525">
                     <a:solidFill>
                       <a:srgbClr val="000000"/>
                     </a:solidFill>
@@ -10555,7 +10585,7 @@
               </a:ln>
               <a:extLst>
                 <a:ext uri="{91240B29-F687-4f45-9708-019B960494DF}">
-                  <a14:hiddenLine xmlns:a14="http://schemas.microsoft.com/office/drawing/2010/main" xmlns="" w="9525">
+                  <a14:hiddenLine xmlns="" xmlns:a14="http://schemas.microsoft.com/office/drawing/2010/main" w="9525">
                     <a:solidFill>
                       <a:srgbClr val="000000"/>
                     </a:solidFill>
@@ -10617,7 +10647,7 @@
               </a:ln>
               <a:extLst>
                 <a:ext uri="{91240B29-F687-4f45-9708-019B960494DF}">
-                  <a14:hiddenLine xmlns:a14="http://schemas.microsoft.com/office/drawing/2010/main" xmlns="" w="9525">
+                  <a14:hiddenLine xmlns="" xmlns:a14="http://schemas.microsoft.com/office/drawing/2010/main" w="9525">
                     <a:solidFill>
                       <a:srgbClr val="000000"/>
                     </a:solidFill>
@@ -10707,7 +10737,7 @@
               </a:ln>
               <a:extLst>
                 <a:ext uri="{91240B29-F687-4f45-9708-019B960494DF}">
-                  <a14:hiddenLine xmlns:a14="http://schemas.microsoft.com/office/drawing/2010/main" xmlns="" w="9525">
+                  <a14:hiddenLine xmlns="" xmlns:a14="http://schemas.microsoft.com/office/drawing/2010/main" w="9525">
                     <a:solidFill>
                       <a:srgbClr val="000000"/>
                     </a:solidFill>
@@ -10797,7 +10827,7 @@
               </a:ln>
               <a:extLst>
                 <a:ext uri="{91240B29-F687-4f45-9708-019B960494DF}">
-                  <a14:hiddenLine xmlns:a14="http://schemas.microsoft.com/office/drawing/2010/main" xmlns="" w="9525">
+                  <a14:hiddenLine xmlns="" xmlns:a14="http://schemas.microsoft.com/office/drawing/2010/main" w="9525">
                     <a:solidFill>
                       <a:srgbClr val="000000"/>
                     </a:solidFill>
@@ -10862,7 +10892,7 @@
               </a:ln>
               <a:extLst>
                 <a:ext uri="{91240B29-F687-4f45-9708-019B960494DF}">
-                  <a14:hiddenLine xmlns:a14="http://schemas.microsoft.com/office/drawing/2010/main" xmlns="" w="9525">
+                  <a14:hiddenLine xmlns="" xmlns:a14="http://schemas.microsoft.com/office/drawing/2010/main" w="9525">
                     <a:solidFill>
                       <a:srgbClr val="000000"/>
                     </a:solidFill>
@@ -10982,7 +11012,7 @@
               </a:ln>
               <a:extLst>
                 <a:ext uri="{91240B29-F687-4f45-9708-019B960494DF}">
-                  <a14:hiddenLine xmlns:a14="http://schemas.microsoft.com/office/drawing/2010/main" xmlns="" w="9525">
+                  <a14:hiddenLine xmlns="" xmlns:a14="http://schemas.microsoft.com/office/drawing/2010/main" w="9525">
                     <a:solidFill>
                       <a:srgbClr val="000000"/>
                     </a:solidFill>
@@ -11080,7 +11110,7 @@
               </a:ln>
               <a:extLst>
                 <a:ext uri="{91240B29-F687-4f45-9708-019B960494DF}">
-                  <a14:hiddenLine xmlns:a14="http://schemas.microsoft.com/office/drawing/2010/main" xmlns="" w="9525">
+                  <a14:hiddenLine xmlns="" xmlns:a14="http://schemas.microsoft.com/office/drawing/2010/main" w="9525">
                     <a:solidFill>
                       <a:srgbClr val="000000"/>
                     </a:solidFill>
@@ -11195,7 +11225,7 @@
               </a:ln>
               <a:extLst>
                 <a:ext uri="{91240B29-F687-4f45-9708-019B960494DF}">
-                  <a14:hiddenLine xmlns:a14="http://schemas.microsoft.com/office/drawing/2010/main" xmlns="" w="9525">
+                  <a14:hiddenLine xmlns="" xmlns:a14="http://schemas.microsoft.com/office/drawing/2010/main" w="9525">
                     <a:solidFill>
                       <a:srgbClr val="000000"/>
                     </a:solidFill>
@@ -11285,7 +11315,7 @@
               </a:ln>
               <a:extLst>
                 <a:ext uri="{91240B29-F687-4f45-9708-019B960494DF}">
-                  <a14:hiddenLine xmlns:a14="http://schemas.microsoft.com/office/drawing/2010/main" xmlns="" w="9525">
+                  <a14:hiddenLine xmlns="" xmlns:a14="http://schemas.microsoft.com/office/drawing/2010/main" w="9525">
                     <a:solidFill>
                       <a:srgbClr val="000000"/>
                     </a:solidFill>
@@ -11350,7 +11380,7 @@
               </a:ln>
               <a:extLst>
                 <a:ext uri="{91240B29-F687-4f45-9708-019B960494DF}">
-                  <a14:hiddenLine xmlns:a14="http://schemas.microsoft.com/office/drawing/2010/main" xmlns="" w="9525">
+                  <a14:hiddenLine xmlns="" xmlns:a14="http://schemas.microsoft.com/office/drawing/2010/main" w="9525">
                     <a:solidFill>
                       <a:srgbClr val="000000"/>
                     </a:solidFill>
@@ -11440,7 +11470,7 @@
               </a:ln>
               <a:extLst>
                 <a:ext uri="{91240B29-F687-4f45-9708-019B960494DF}">
-                  <a14:hiddenLine xmlns:a14="http://schemas.microsoft.com/office/drawing/2010/main" xmlns="" w="9525">
+                  <a14:hiddenLine xmlns="" xmlns:a14="http://schemas.microsoft.com/office/drawing/2010/main" w="9525">
                     <a:solidFill>
                       <a:srgbClr val="000000"/>
                     </a:solidFill>
@@ -11508,7 +11538,7 @@
               </a:ln>
               <a:extLst>
                 <a:ext uri="{91240B29-F687-4f45-9708-019B960494DF}">
-                  <a14:hiddenLine xmlns:a14="http://schemas.microsoft.com/office/drawing/2010/main" xmlns="" w="9525">
+                  <a14:hiddenLine xmlns="" xmlns:a14="http://schemas.microsoft.com/office/drawing/2010/main" w="9525">
                     <a:solidFill>
                       <a:srgbClr val="000000"/>
                     </a:solidFill>
@@ -11598,7 +11628,7 @@
               </a:ln>
               <a:extLst>
                 <a:ext uri="{91240B29-F687-4f45-9708-019B960494DF}">
-                  <a14:hiddenLine xmlns:a14="http://schemas.microsoft.com/office/drawing/2010/main" xmlns="" w="9525">
+                  <a14:hiddenLine xmlns="" xmlns:a14="http://schemas.microsoft.com/office/drawing/2010/main" w="9525">
                     <a:solidFill>
                       <a:srgbClr val="000000"/>
                     </a:solidFill>
@@ -11666,7 +11696,7 @@
               </a:ln>
               <a:extLst>
                 <a:ext uri="{91240B29-F687-4f45-9708-019B960494DF}">
-                  <a14:hiddenLine xmlns:a14="http://schemas.microsoft.com/office/drawing/2010/main" xmlns="" w="9525">
+                  <a14:hiddenLine xmlns="" xmlns:a14="http://schemas.microsoft.com/office/drawing/2010/main" w="9525">
                     <a:solidFill>
                       <a:srgbClr val="000000"/>
                     </a:solidFill>
@@ -11756,7 +11786,7 @@
               </a:ln>
               <a:extLst>
                 <a:ext uri="{91240B29-F687-4f45-9708-019B960494DF}">
-                  <a14:hiddenLine xmlns:a14="http://schemas.microsoft.com/office/drawing/2010/main" xmlns="" w="9525">
+                  <a14:hiddenLine xmlns="" xmlns:a14="http://schemas.microsoft.com/office/drawing/2010/main" w="9525">
                     <a:solidFill>
                       <a:srgbClr val="000000"/>
                     </a:solidFill>
@@ -11790,7 +11820,7 @@
               </a:ln>
               <a:extLst>
                 <a:ext uri="{91240B29-F687-4f45-9708-019B960494DF}">
-                  <a14:hiddenLine xmlns:a14="http://schemas.microsoft.com/office/drawing/2010/main" xmlns="" w="9525">
+                  <a14:hiddenLine xmlns="" xmlns:a14="http://schemas.microsoft.com/office/drawing/2010/main" w="9525">
                     <a:solidFill>
                       <a:srgbClr val="000000"/>
                     </a:solidFill>
@@ -11931,7 +11961,7 @@
             <a:fld id="{48A87A34-81AB-432B-8DAE-1953F412C126}" type="datetimeFigureOut">
               <a:rPr lang="en-US" dirty="0"/>
               <a:pPr/>
-              <a:t>7/5/2019</a:t>
+              <a:t>7/8/2019</a:t>
             </a:fld>
             <a:endParaRPr lang="en-US" dirty="0"/>
           </a:p>
@@ -12424,6 +12454,901 @@
 </p:sld>
 </file>
 
+<file path=ppt/slides/slide10.xml><?xml version="1.0" encoding="utf-8"?>
+<p:sld xmlns:a="http://schemas.openxmlformats.org/drawingml/2006/main" xmlns:r="http://schemas.openxmlformats.org/officeDocument/2006/relationships" xmlns:p="http://schemas.openxmlformats.org/presentationml/2006/main">
+  <p:cSld>
+    <p:spTree>
+      <p:nvGrpSpPr>
+        <p:cNvPr id="1" name=""/>
+        <p:cNvGrpSpPr/>
+        <p:nvPr/>
+      </p:nvGrpSpPr>
+      <p:grpSpPr>
+        <a:xfrm>
+          <a:off x="0" y="0"/>
+          <a:ext cx="0" cy="0"/>
+          <a:chOff x="0" y="0"/>
+          <a:chExt cx="0" cy="0"/>
+        </a:xfrm>
+      </p:grpSpPr>
+      <p:sp>
+        <p:nvSpPr>
+          <p:cNvPr id="2" name="Title 1"/>
+          <p:cNvSpPr>
+            <a:spLocks noGrp="1"/>
+          </p:cNvSpPr>
+          <p:nvPr>
+            <p:ph type="title"/>
+          </p:nvPr>
+        </p:nvSpPr>
+        <p:spPr/>
+        <p:txBody>
+          <a:bodyPr/>
+          <a:lstStyle/>
+          <a:p>
+            <a:r>
+              <a:rPr lang="en-US" dirty="0" err="1" smtClean="0"/>
+              <a:t>cIRCUITS</a:t>
+            </a:r>
+            <a:endParaRPr lang="en-US" dirty="0"/>
+          </a:p>
+        </p:txBody>
+      </p:sp>
+      <p:sp>
+        <p:nvSpPr>
+          <p:cNvPr id="3" name="Content Placeholder 2"/>
+          <p:cNvSpPr>
+            <a:spLocks noGrp="1"/>
+          </p:cNvSpPr>
+          <p:nvPr>
+            <p:ph idx="1"/>
+          </p:nvPr>
+        </p:nvSpPr>
+        <p:spPr/>
+        <p:txBody>
+          <a:bodyPr/>
+          <a:lstStyle/>
+          <a:p>
+            <a:r>
+              <a:rPr lang="en-US" dirty="0" smtClean="0"/>
+              <a:t>What is a circuit</a:t>
+            </a:r>
+          </a:p>
+          <a:p>
+            <a:r>
+              <a:rPr lang="en-US" dirty="0" smtClean="0"/>
+              <a:t>Electrics / Electronics using Raspberry Pi</a:t>
+            </a:r>
+          </a:p>
+          <a:p>
+            <a:r>
+              <a:rPr lang="en-US" dirty="0" smtClean="0"/>
+              <a:t>How to read circuit diagrams</a:t>
+            </a:r>
+          </a:p>
+          <a:p>
+            <a:endParaRPr lang="en-US" dirty="0"/>
+          </a:p>
+        </p:txBody>
+      </p:sp>
+    </p:spTree>
+    <p:extLst>
+      <p:ext uri="{BB962C8B-B14F-4D97-AF65-F5344CB8AC3E}">
+        <p14:creationId xmlns:p14="http://schemas.microsoft.com/office/powerpoint/2010/main" val="4205968302"/>
+      </p:ext>
+    </p:extLst>
+  </p:cSld>
+  <p:clrMapOvr>
+    <a:masterClrMapping/>
+  </p:clrMapOvr>
+</p:sld>
+</file>
+
+<file path=ppt/slides/slide11.xml><?xml version="1.0" encoding="utf-8"?>
+<p:sld xmlns:a="http://schemas.openxmlformats.org/drawingml/2006/main" xmlns:r="http://schemas.openxmlformats.org/officeDocument/2006/relationships" xmlns:p="http://schemas.openxmlformats.org/presentationml/2006/main">
+  <p:cSld>
+    <p:spTree>
+      <p:nvGrpSpPr>
+        <p:cNvPr id="1" name=""/>
+        <p:cNvGrpSpPr/>
+        <p:nvPr/>
+      </p:nvGrpSpPr>
+      <p:grpSpPr>
+        <a:xfrm>
+          <a:off x="0" y="0"/>
+          <a:ext cx="0" cy="0"/>
+          <a:chOff x="0" y="0"/>
+          <a:chExt cx="0" cy="0"/>
+        </a:xfrm>
+      </p:grpSpPr>
+      <p:sp>
+        <p:nvSpPr>
+          <p:cNvPr id="2" name="Title 1"/>
+          <p:cNvSpPr>
+            <a:spLocks noGrp="1"/>
+          </p:cNvSpPr>
+          <p:nvPr>
+            <p:ph type="title"/>
+          </p:nvPr>
+        </p:nvSpPr>
+        <p:spPr/>
+        <p:txBody>
+          <a:bodyPr/>
+          <a:lstStyle/>
+          <a:p>
+            <a:r>
+              <a:rPr lang="en-US" dirty="0" smtClean="0"/>
+              <a:t>Raspberry Pi circuit</a:t>
+            </a:r>
+            <a:endParaRPr lang="en-US" dirty="0"/>
+          </a:p>
+        </p:txBody>
+      </p:sp>
+      <p:sp>
+        <p:nvSpPr>
+          <p:cNvPr id="3" name="Content Placeholder 2"/>
+          <p:cNvSpPr>
+            <a:spLocks noGrp="1"/>
+          </p:cNvSpPr>
+          <p:nvPr>
+            <p:ph idx="1"/>
+          </p:nvPr>
+        </p:nvSpPr>
+        <p:spPr/>
+        <p:txBody>
+          <a:bodyPr/>
+          <a:lstStyle/>
+          <a:p>
+            <a:r>
+              <a:rPr lang="en-US" dirty="0" smtClean="0"/>
+              <a:t>Build the Raspberry Pi Circuit</a:t>
+            </a:r>
+            <a:endParaRPr lang="en-US" dirty="0"/>
+          </a:p>
+        </p:txBody>
+      </p:sp>
+    </p:spTree>
+    <p:extLst>
+      <p:ext uri="{BB962C8B-B14F-4D97-AF65-F5344CB8AC3E}">
+        <p14:creationId xmlns:p14="http://schemas.microsoft.com/office/powerpoint/2010/main" val="3169014870"/>
+      </p:ext>
+    </p:extLst>
+  </p:cSld>
+  <p:clrMapOvr>
+    <a:masterClrMapping/>
+  </p:clrMapOvr>
+</p:sld>
+</file>
+
+<file path=ppt/slides/slide12.xml><?xml version="1.0" encoding="utf-8"?>
+<p:sld xmlns:a="http://schemas.openxmlformats.org/drawingml/2006/main" xmlns:r="http://schemas.openxmlformats.org/officeDocument/2006/relationships" xmlns:p="http://schemas.openxmlformats.org/presentationml/2006/main">
+  <p:cSld>
+    <p:spTree>
+      <p:nvGrpSpPr>
+        <p:cNvPr id="1" name=""/>
+        <p:cNvGrpSpPr/>
+        <p:nvPr/>
+      </p:nvGrpSpPr>
+      <p:grpSpPr>
+        <a:xfrm>
+          <a:off x="0" y="0"/>
+          <a:ext cx="0" cy="0"/>
+          <a:chOff x="0" y="0"/>
+          <a:chExt cx="0" cy="0"/>
+        </a:xfrm>
+      </p:grpSpPr>
+      <p:sp>
+        <p:nvSpPr>
+          <p:cNvPr id="2" name="Title 1"/>
+          <p:cNvSpPr>
+            <a:spLocks noGrp="1"/>
+          </p:cNvSpPr>
+          <p:nvPr>
+            <p:ph type="title"/>
+          </p:nvPr>
+        </p:nvSpPr>
+        <p:spPr/>
+        <p:txBody>
+          <a:bodyPr/>
+          <a:lstStyle/>
+          <a:p>
+            <a:r>
+              <a:rPr lang="en-US" dirty="0" smtClean="0"/>
+              <a:t>Day 2: let’s code!</a:t>
+            </a:r>
+            <a:endParaRPr lang="en-GB" dirty="0"/>
+          </a:p>
+        </p:txBody>
+      </p:sp>
+      <p:sp>
+        <p:nvSpPr>
+          <p:cNvPr id="3" name="Content Placeholder 2"/>
+          <p:cNvSpPr>
+            <a:spLocks noGrp="1"/>
+          </p:cNvSpPr>
+          <p:nvPr>
+            <p:ph idx="1"/>
+          </p:nvPr>
+        </p:nvSpPr>
+        <p:spPr/>
+        <p:txBody>
+          <a:bodyPr>
+            <a:normAutofit/>
+          </a:bodyPr>
+          <a:lstStyle/>
+          <a:p>
+            <a:r>
+              <a:rPr lang="en-US" dirty="0"/>
+              <a:t>Programming Basics</a:t>
+            </a:r>
+          </a:p>
+          <a:p>
+            <a:pPr lvl="1"/>
+            <a:r>
+              <a:rPr lang="en-US" dirty="0"/>
+              <a:t>Functions</a:t>
+            </a:r>
+          </a:p>
+          <a:p>
+            <a:pPr lvl="1"/>
+            <a:r>
+              <a:rPr lang="en-US" dirty="0"/>
+              <a:t>Comments</a:t>
+            </a:r>
+          </a:p>
+          <a:p>
+            <a:pPr lvl="1"/>
+            <a:r>
+              <a:rPr lang="en-US" dirty="0"/>
+              <a:t>Variables</a:t>
+            </a:r>
+          </a:p>
+          <a:p>
+            <a:pPr lvl="1"/>
+            <a:r>
+              <a:rPr lang="en-US" dirty="0" smtClean="0"/>
+              <a:t>Error Handling </a:t>
+            </a:r>
+            <a:endParaRPr lang="en-US" dirty="0"/>
+          </a:p>
+          <a:p>
+            <a:r>
+              <a:rPr lang="en-US" dirty="0" smtClean="0"/>
+              <a:t>Create </a:t>
+            </a:r>
+            <a:r>
+              <a:rPr lang="en-US" dirty="0"/>
+              <a:t>Email To Thom functionality</a:t>
+            </a:r>
+          </a:p>
+          <a:p>
+            <a:r>
+              <a:rPr lang="en-US" dirty="0"/>
+              <a:t>Send Email by Raspberry Pi</a:t>
+            </a:r>
+          </a:p>
+          <a:p>
+            <a:endParaRPr lang="en-GB" dirty="0"/>
+          </a:p>
+        </p:txBody>
+      </p:sp>
+    </p:spTree>
+    <p:extLst>
+      <p:ext uri="{BB962C8B-B14F-4D97-AF65-F5344CB8AC3E}">
+        <p14:creationId xmlns:p14="http://schemas.microsoft.com/office/powerpoint/2010/main" val="1097960428"/>
+      </p:ext>
+    </p:extLst>
+  </p:cSld>
+  <p:clrMapOvr>
+    <a:masterClrMapping/>
+  </p:clrMapOvr>
+</p:sld>
+</file>
+
+<file path=ppt/slides/slide13.xml><?xml version="1.0" encoding="utf-8"?>
+<p:sld xmlns:a="http://schemas.openxmlformats.org/drawingml/2006/main" xmlns:r="http://schemas.openxmlformats.org/officeDocument/2006/relationships" xmlns:p="http://schemas.openxmlformats.org/presentationml/2006/main">
+  <p:cSld>
+    <p:spTree>
+      <p:nvGrpSpPr>
+        <p:cNvPr id="1" name=""/>
+        <p:cNvGrpSpPr/>
+        <p:nvPr/>
+      </p:nvGrpSpPr>
+      <p:grpSpPr>
+        <a:xfrm>
+          <a:off x="0" y="0"/>
+          <a:ext cx="0" cy="0"/>
+          <a:chOff x="0" y="0"/>
+          <a:chExt cx="0" cy="0"/>
+        </a:xfrm>
+      </p:grpSpPr>
+      <p:sp>
+        <p:nvSpPr>
+          <p:cNvPr id="2" name="Title 1"/>
+          <p:cNvSpPr>
+            <a:spLocks noGrp="1"/>
+          </p:cNvSpPr>
+          <p:nvPr>
+            <p:ph type="title"/>
+          </p:nvPr>
+        </p:nvSpPr>
+        <p:spPr/>
+        <p:txBody>
+          <a:bodyPr/>
+          <a:lstStyle/>
+          <a:p>
+            <a:r>
+              <a:rPr lang="en-US" dirty="0" smtClean="0"/>
+              <a:t>Recap</a:t>
+            </a:r>
+            <a:endParaRPr lang="en-US" dirty="0"/>
+          </a:p>
+        </p:txBody>
+      </p:sp>
+      <p:sp>
+        <p:nvSpPr>
+          <p:cNvPr id="3" name="Content Placeholder 2"/>
+          <p:cNvSpPr>
+            <a:spLocks noGrp="1"/>
+          </p:cNvSpPr>
+          <p:nvPr>
+            <p:ph idx="1"/>
+          </p:nvPr>
+        </p:nvSpPr>
+        <p:spPr/>
+        <p:txBody>
+          <a:bodyPr/>
+          <a:lstStyle/>
+          <a:p>
+            <a:r>
+              <a:rPr lang="en-US" dirty="0" smtClean="0"/>
+              <a:t>Especially hello world</a:t>
+            </a:r>
+          </a:p>
+          <a:p>
+            <a:endParaRPr lang="en-US" dirty="0"/>
+          </a:p>
+        </p:txBody>
+      </p:sp>
+    </p:spTree>
+    <p:extLst>
+      <p:ext uri="{BB962C8B-B14F-4D97-AF65-F5344CB8AC3E}">
+        <p14:creationId xmlns:p14="http://schemas.microsoft.com/office/powerpoint/2010/main" val="2180251118"/>
+      </p:ext>
+    </p:extLst>
+  </p:cSld>
+  <p:clrMapOvr>
+    <a:masterClrMapping/>
+  </p:clrMapOvr>
+</p:sld>
+</file>
+
+<file path=ppt/slides/slide14.xml><?xml version="1.0" encoding="utf-8"?>
+<p:sld xmlns:a="http://schemas.openxmlformats.org/drawingml/2006/main" xmlns:r="http://schemas.openxmlformats.org/officeDocument/2006/relationships" xmlns:p="http://schemas.openxmlformats.org/presentationml/2006/main">
+  <p:cSld>
+    <p:spTree>
+      <p:nvGrpSpPr>
+        <p:cNvPr id="1" name=""/>
+        <p:cNvGrpSpPr/>
+        <p:nvPr/>
+      </p:nvGrpSpPr>
+      <p:grpSpPr>
+        <a:xfrm>
+          <a:off x="0" y="0"/>
+          <a:ext cx="0" cy="0"/>
+          <a:chOff x="0" y="0"/>
+          <a:chExt cx="0" cy="0"/>
+        </a:xfrm>
+      </p:grpSpPr>
+      <p:sp>
+        <p:nvSpPr>
+          <p:cNvPr id="2" name="Title 1"/>
+          <p:cNvSpPr>
+            <a:spLocks noGrp="1"/>
+          </p:cNvSpPr>
+          <p:nvPr>
+            <p:ph type="title"/>
+          </p:nvPr>
+        </p:nvSpPr>
+        <p:spPr/>
+        <p:txBody>
+          <a:bodyPr/>
+          <a:lstStyle/>
+          <a:p>
+            <a:r>
+              <a:rPr lang="en-US" dirty="0" smtClean="0"/>
+              <a:t>Programming Concepts</a:t>
+            </a:r>
+            <a:endParaRPr lang="en-US" dirty="0"/>
+          </a:p>
+        </p:txBody>
+      </p:sp>
+      <p:sp>
+        <p:nvSpPr>
+          <p:cNvPr id="3" name="Content Placeholder 2"/>
+          <p:cNvSpPr>
+            <a:spLocks noGrp="1"/>
+          </p:cNvSpPr>
+          <p:nvPr>
+            <p:ph idx="1"/>
+          </p:nvPr>
+        </p:nvSpPr>
+        <p:spPr/>
+        <p:txBody>
+          <a:bodyPr/>
+          <a:lstStyle/>
+          <a:p>
+            <a:r>
+              <a:rPr lang="en-US" dirty="0" smtClean="0"/>
+              <a:t>Keywords</a:t>
+            </a:r>
+          </a:p>
+          <a:p>
+            <a:r>
+              <a:rPr lang="en-US" dirty="0" smtClean="0"/>
+              <a:t>Strings / Numbers</a:t>
+            </a:r>
+          </a:p>
+          <a:p>
+            <a:r>
+              <a:rPr lang="en-US" dirty="0" smtClean="0"/>
+              <a:t>Variables</a:t>
+            </a:r>
+          </a:p>
+          <a:p>
+            <a:r>
+              <a:rPr lang="en-US" dirty="0" smtClean="0"/>
+              <a:t>Comments</a:t>
+            </a:r>
+            <a:endParaRPr lang="en-US" dirty="0"/>
+          </a:p>
+        </p:txBody>
+      </p:sp>
+    </p:spTree>
+    <p:extLst>
+      <p:ext uri="{BB962C8B-B14F-4D97-AF65-F5344CB8AC3E}">
+        <p14:creationId xmlns:p14="http://schemas.microsoft.com/office/powerpoint/2010/main" val="2686902082"/>
+      </p:ext>
+    </p:extLst>
+  </p:cSld>
+  <p:clrMapOvr>
+    <a:masterClrMapping/>
+  </p:clrMapOvr>
+</p:sld>
+</file>
+
+<file path=ppt/slides/slide15.xml><?xml version="1.0" encoding="utf-8"?>
+<p:sld xmlns:a="http://schemas.openxmlformats.org/drawingml/2006/main" xmlns:r="http://schemas.openxmlformats.org/officeDocument/2006/relationships" xmlns:p="http://schemas.openxmlformats.org/presentationml/2006/main">
+  <p:cSld>
+    <p:spTree>
+      <p:nvGrpSpPr>
+        <p:cNvPr id="1" name=""/>
+        <p:cNvGrpSpPr/>
+        <p:nvPr/>
+      </p:nvGrpSpPr>
+      <p:grpSpPr>
+        <a:xfrm>
+          <a:off x="0" y="0"/>
+          <a:ext cx="0" cy="0"/>
+          <a:chOff x="0" y="0"/>
+          <a:chExt cx="0" cy="0"/>
+        </a:xfrm>
+      </p:grpSpPr>
+      <p:sp>
+        <p:nvSpPr>
+          <p:cNvPr id="2" name="Title 1"/>
+          <p:cNvSpPr>
+            <a:spLocks noGrp="1"/>
+          </p:cNvSpPr>
+          <p:nvPr>
+            <p:ph type="title"/>
+          </p:nvPr>
+        </p:nvSpPr>
+        <p:spPr/>
+        <p:txBody>
+          <a:bodyPr>
+            <a:normAutofit/>
+          </a:bodyPr>
+          <a:lstStyle/>
+          <a:p>
+            <a:r>
+              <a:rPr lang="en-US" dirty="0" smtClean="0"/>
+              <a:t>Break</a:t>
+            </a:r>
+            <a:endParaRPr lang="en-US" dirty="0"/>
+          </a:p>
+        </p:txBody>
+      </p:sp>
+      <p:sp>
+        <p:nvSpPr>
+          <p:cNvPr id="3" name="Content Placeholder 2"/>
+          <p:cNvSpPr>
+            <a:spLocks noGrp="1"/>
+          </p:cNvSpPr>
+          <p:nvPr>
+            <p:ph idx="1"/>
+          </p:nvPr>
+        </p:nvSpPr>
+        <p:spPr/>
+        <p:txBody>
+          <a:bodyPr/>
+          <a:lstStyle/>
+          <a:p>
+            <a:endParaRPr lang="en-US"/>
+          </a:p>
+        </p:txBody>
+      </p:sp>
+    </p:spTree>
+    <p:extLst>
+      <p:ext uri="{BB962C8B-B14F-4D97-AF65-F5344CB8AC3E}">
+        <p14:creationId xmlns:p14="http://schemas.microsoft.com/office/powerpoint/2010/main" val="3920042752"/>
+      </p:ext>
+    </p:extLst>
+  </p:cSld>
+  <p:clrMapOvr>
+    <a:masterClrMapping/>
+  </p:clrMapOvr>
+</p:sld>
+</file>
+
+<file path=ppt/slides/slide16.xml><?xml version="1.0" encoding="utf-8"?>
+<p:sld xmlns:a="http://schemas.openxmlformats.org/drawingml/2006/main" xmlns:r="http://schemas.openxmlformats.org/officeDocument/2006/relationships" xmlns:p="http://schemas.openxmlformats.org/presentationml/2006/main">
+  <p:cSld>
+    <p:spTree>
+      <p:nvGrpSpPr>
+        <p:cNvPr id="1" name=""/>
+        <p:cNvGrpSpPr/>
+        <p:nvPr/>
+      </p:nvGrpSpPr>
+      <p:grpSpPr>
+        <a:xfrm>
+          <a:off x="0" y="0"/>
+          <a:ext cx="0" cy="0"/>
+          <a:chOff x="0" y="0"/>
+          <a:chExt cx="0" cy="0"/>
+        </a:xfrm>
+      </p:grpSpPr>
+      <p:sp>
+        <p:nvSpPr>
+          <p:cNvPr id="2" name="Title 1"/>
+          <p:cNvSpPr>
+            <a:spLocks noGrp="1"/>
+          </p:cNvSpPr>
+          <p:nvPr>
+            <p:ph type="title"/>
+          </p:nvPr>
+        </p:nvSpPr>
+        <p:spPr/>
+        <p:txBody>
+          <a:bodyPr/>
+          <a:lstStyle/>
+          <a:p>
+            <a:r>
+              <a:rPr lang="en-US" dirty="0" smtClean="0"/>
+              <a:t>Programming concepts</a:t>
+            </a:r>
+            <a:endParaRPr lang="en-US" dirty="0"/>
+          </a:p>
+        </p:txBody>
+      </p:sp>
+      <p:sp>
+        <p:nvSpPr>
+          <p:cNvPr id="3" name="Content Placeholder 2"/>
+          <p:cNvSpPr>
+            <a:spLocks noGrp="1"/>
+          </p:cNvSpPr>
+          <p:nvPr>
+            <p:ph idx="1"/>
+          </p:nvPr>
+        </p:nvSpPr>
+        <p:spPr/>
+        <p:txBody>
+          <a:bodyPr/>
+          <a:lstStyle/>
+          <a:p>
+            <a:r>
+              <a:rPr lang="en-US" dirty="0" smtClean="0"/>
+              <a:t>Functions</a:t>
+            </a:r>
+          </a:p>
+          <a:p>
+            <a:pPr lvl="1"/>
+            <a:r>
+              <a:rPr lang="en-US" dirty="0" smtClean="0"/>
+              <a:t>Writing functions</a:t>
+            </a:r>
+          </a:p>
+          <a:p>
+            <a:pPr lvl="1"/>
+            <a:r>
+              <a:rPr lang="en-US" dirty="0" smtClean="0"/>
+              <a:t>Calling functions</a:t>
+            </a:r>
+          </a:p>
+          <a:p>
+            <a:pPr lvl="1"/>
+            <a:r>
+              <a:rPr lang="en-US" dirty="0" smtClean="0"/>
+              <a:t>Passing parameters to functions</a:t>
+            </a:r>
+          </a:p>
+          <a:p>
+            <a:pPr lvl="1"/>
+            <a:r>
+              <a:rPr lang="en-US" dirty="0" smtClean="0"/>
+              <a:t>Returning values from functions</a:t>
+            </a:r>
+            <a:endParaRPr lang="en-US" dirty="0"/>
+          </a:p>
+        </p:txBody>
+      </p:sp>
+    </p:spTree>
+    <p:extLst>
+      <p:ext uri="{BB962C8B-B14F-4D97-AF65-F5344CB8AC3E}">
+        <p14:creationId xmlns:p14="http://schemas.microsoft.com/office/powerpoint/2010/main" val="3221242589"/>
+      </p:ext>
+    </p:extLst>
+  </p:cSld>
+  <p:clrMapOvr>
+    <a:masterClrMapping/>
+  </p:clrMapOvr>
+</p:sld>
+</file>
+
+<file path=ppt/slides/slide17.xml><?xml version="1.0" encoding="utf-8"?>
+<p:sld xmlns:a="http://schemas.openxmlformats.org/drawingml/2006/main" xmlns:r="http://schemas.openxmlformats.org/officeDocument/2006/relationships" xmlns:p="http://schemas.openxmlformats.org/presentationml/2006/main">
+  <p:cSld>
+    <p:spTree>
+      <p:nvGrpSpPr>
+        <p:cNvPr id="1" name=""/>
+        <p:cNvGrpSpPr/>
+        <p:nvPr/>
+      </p:nvGrpSpPr>
+      <p:grpSpPr>
+        <a:xfrm>
+          <a:off x="0" y="0"/>
+          <a:ext cx="0" cy="0"/>
+          <a:chOff x="0" y="0"/>
+          <a:chExt cx="0" cy="0"/>
+        </a:xfrm>
+      </p:grpSpPr>
+      <p:sp>
+        <p:nvSpPr>
+          <p:cNvPr id="2" name="Title 1"/>
+          <p:cNvSpPr>
+            <a:spLocks noGrp="1"/>
+          </p:cNvSpPr>
+          <p:nvPr>
+            <p:ph type="title"/>
+          </p:nvPr>
+        </p:nvSpPr>
+        <p:spPr/>
+        <p:txBody>
+          <a:bodyPr/>
+          <a:lstStyle/>
+          <a:p>
+            <a:r>
+              <a:rPr lang="en-US" dirty="0" smtClean="0"/>
+              <a:t>Program – Hello [name]</a:t>
+            </a:r>
+            <a:endParaRPr lang="en-US" dirty="0"/>
+          </a:p>
+        </p:txBody>
+      </p:sp>
+      <p:sp>
+        <p:nvSpPr>
+          <p:cNvPr id="3" name="Content Placeholder 2"/>
+          <p:cNvSpPr>
+            <a:spLocks noGrp="1"/>
+          </p:cNvSpPr>
+          <p:nvPr>
+            <p:ph idx="1"/>
+          </p:nvPr>
+        </p:nvSpPr>
+        <p:spPr/>
+        <p:txBody>
+          <a:bodyPr/>
+          <a:lstStyle/>
+          <a:p>
+            <a:endParaRPr lang="en-US" dirty="0"/>
+          </a:p>
+        </p:txBody>
+      </p:sp>
+    </p:spTree>
+    <p:extLst>
+      <p:ext uri="{BB962C8B-B14F-4D97-AF65-F5344CB8AC3E}">
+        <p14:creationId xmlns:p14="http://schemas.microsoft.com/office/powerpoint/2010/main" val="4174675986"/>
+      </p:ext>
+    </p:extLst>
+  </p:cSld>
+  <p:clrMapOvr>
+    <a:masterClrMapping/>
+  </p:clrMapOvr>
+</p:sld>
+</file>
+
+<file path=ppt/slides/slide18.xml><?xml version="1.0" encoding="utf-8"?>
+<p:sld xmlns:a="http://schemas.openxmlformats.org/drawingml/2006/main" xmlns:r="http://schemas.openxmlformats.org/officeDocument/2006/relationships" xmlns:p="http://schemas.openxmlformats.org/presentationml/2006/main">
+  <p:cSld>
+    <p:spTree>
+      <p:nvGrpSpPr>
+        <p:cNvPr id="1" name=""/>
+        <p:cNvGrpSpPr/>
+        <p:nvPr/>
+      </p:nvGrpSpPr>
+      <p:grpSpPr>
+        <a:xfrm>
+          <a:off x="0" y="0"/>
+          <a:ext cx="0" cy="0"/>
+          <a:chOff x="0" y="0"/>
+          <a:chExt cx="0" cy="0"/>
+        </a:xfrm>
+      </p:grpSpPr>
+      <p:sp>
+        <p:nvSpPr>
+          <p:cNvPr id="2" name="Title 1"/>
+          <p:cNvSpPr>
+            <a:spLocks noGrp="1"/>
+          </p:cNvSpPr>
+          <p:nvPr>
+            <p:ph type="title"/>
+          </p:nvPr>
+        </p:nvSpPr>
+        <p:spPr/>
+        <p:txBody>
+          <a:bodyPr/>
+          <a:lstStyle/>
+          <a:p>
+            <a:r>
+              <a:rPr lang="en-US" dirty="0" smtClean="0"/>
+              <a:t>Importing libraries</a:t>
+            </a:r>
+            <a:endParaRPr lang="en-US" dirty="0"/>
+          </a:p>
+        </p:txBody>
+      </p:sp>
+      <p:sp>
+        <p:nvSpPr>
+          <p:cNvPr id="3" name="Content Placeholder 2"/>
+          <p:cNvSpPr>
+            <a:spLocks noGrp="1"/>
+          </p:cNvSpPr>
+          <p:nvPr>
+            <p:ph idx="1"/>
+          </p:nvPr>
+        </p:nvSpPr>
+        <p:spPr/>
+        <p:txBody>
+          <a:bodyPr/>
+          <a:lstStyle/>
+          <a:p>
+            <a:r>
+              <a:rPr lang="en-US" dirty="0" smtClean="0"/>
+              <a:t>Why?</a:t>
+            </a:r>
+          </a:p>
+          <a:p>
+            <a:r>
+              <a:rPr lang="en-US" dirty="0" smtClean="0"/>
+              <a:t>Where is this code?</a:t>
+            </a:r>
+          </a:p>
+          <a:p>
+            <a:r>
+              <a:rPr lang="en-US" dirty="0" smtClean="0"/>
+              <a:t>Can you build your own?</a:t>
+            </a:r>
+            <a:endParaRPr lang="en-US" dirty="0"/>
+          </a:p>
+        </p:txBody>
+      </p:sp>
+    </p:spTree>
+    <p:extLst>
+      <p:ext uri="{BB962C8B-B14F-4D97-AF65-F5344CB8AC3E}">
+        <p14:creationId xmlns:p14="http://schemas.microsoft.com/office/powerpoint/2010/main" val="1877813157"/>
+      </p:ext>
+    </p:extLst>
+  </p:cSld>
+  <p:clrMapOvr>
+    <a:masterClrMapping/>
+  </p:clrMapOvr>
+</p:sld>
+</file>
+
+<file path=ppt/slides/slide19.xml><?xml version="1.0" encoding="utf-8"?>
+<p:sld xmlns:a="http://schemas.openxmlformats.org/drawingml/2006/main" xmlns:r="http://schemas.openxmlformats.org/officeDocument/2006/relationships" xmlns:p="http://schemas.openxmlformats.org/presentationml/2006/main">
+  <p:cSld>
+    <p:spTree>
+      <p:nvGrpSpPr>
+        <p:cNvPr id="1" name=""/>
+        <p:cNvGrpSpPr/>
+        <p:nvPr/>
+      </p:nvGrpSpPr>
+      <p:grpSpPr>
+        <a:xfrm>
+          <a:off x="0" y="0"/>
+          <a:ext cx="0" cy="0"/>
+          <a:chOff x="0" y="0"/>
+          <a:chExt cx="0" cy="0"/>
+        </a:xfrm>
+      </p:grpSpPr>
+      <p:sp>
+        <p:nvSpPr>
+          <p:cNvPr id="2" name="Title 1"/>
+          <p:cNvSpPr>
+            <a:spLocks noGrp="1"/>
+          </p:cNvSpPr>
+          <p:nvPr>
+            <p:ph type="title"/>
+          </p:nvPr>
+        </p:nvSpPr>
+        <p:spPr/>
+        <p:txBody>
+          <a:bodyPr/>
+          <a:lstStyle/>
+          <a:p>
+            <a:r>
+              <a:rPr lang="en-US" dirty="0" smtClean="0"/>
+              <a:t>Raspberry Pi Software</a:t>
+            </a:r>
+            <a:endParaRPr lang="en-US" dirty="0"/>
+          </a:p>
+        </p:txBody>
+      </p:sp>
+      <p:sp>
+        <p:nvSpPr>
+          <p:cNvPr id="3" name="Content Placeholder 2"/>
+          <p:cNvSpPr>
+            <a:spLocks noGrp="1"/>
+          </p:cNvSpPr>
+          <p:nvPr>
+            <p:ph idx="1"/>
+          </p:nvPr>
+        </p:nvSpPr>
+        <p:spPr/>
+        <p:txBody>
+          <a:bodyPr/>
+          <a:lstStyle/>
+          <a:p>
+            <a:r>
+              <a:rPr lang="en-US" dirty="0" smtClean="0"/>
+              <a:t>Copy source code</a:t>
+            </a:r>
+          </a:p>
+          <a:p>
+            <a:r>
+              <a:rPr lang="en-US" dirty="0" smtClean="0"/>
+              <a:t>Run it</a:t>
+            </a:r>
+          </a:p>
+          <a:p>
+            <a:r>
+              <a:rPr lang="en-US" dirty="0" smtClean="0"/>
+              <a:t>Explain it</a:t>
+            </a:r>
+          </a:p>
+          <a:p>
+            <a:r>
+              <a:rPr lang="en-US" dirty="0" smtClean="0"/>
+              <a:t>Change – leave light on for 5 seconds after pushing button</a:t>
+            </a:r>
+            <a:endParaRPr lang="en-US" dirty="0"/>
+          </a:p>
+        </p:txBody>
+      </p:sp>
+    </p:spTree>
+    <p:extLst>
+      <p:ext uri="{BB962C8B-B14F-4D97-AF65-F5344CB8AC3E}">
+        <p14:creationId xmlns:p14="http://schemas.microsoft.com/office/powerpoint/2010/main" val="2634014740"/>
+      </p:ext>
+    </p:extLst>
+  </p:cSld>
+  <p:clrMapOvr>
+    <a:masterClrMapping/>
+  </p:clrMapOvr>
+</p:sld>
+</file>
+
 <file path=ppt/slides/slide2.xml><?xml version="1.0" encoding="utf-8"?>
 <p:sld xmlns:a="http://schemas.openxmlformats.org/drawingml/2006/main" xmlns:r="http://schemas.openxmlformats.org/officeDocument/2006/relationships" xmlns:p="http://schemas.openxmlformats.org/presentationml/2006/main">
   <p:cSld>
@@ -12556,13 +13481,13 @@
           </a:p>
           <a:p>
             <a:r>
-              <a:rPr lang="en-US" dirty="0"/>
+              <a:rPr lang="en-US" dirty="0" smtClean="0"/>
               <a:t>“Hello World!”</a:t>
             </a:r>
           </a:p>
           <a:p>
             <a:r>
-              <a:rPr lang="en-US" dirty="0"/>
+              <a:rPr lang="en-US" dirty="0" smtClean="0"/>
               <a:t>Wiring up the Raspberry Pi</a:t>
             </a:r>
           </a:p>
@@ -12578,6 +13503,953 @@
     <p:extLst>
       <p:ext uri="{BB962C8B-B14F-4D97-AF65-F5344CB8AC3E}">
         <p14:creationId xmlns:p14="http://schemas.microsoft.com/office/powerpoint/2010/main" val="1058106917"/>
+      </p:ext>
+    </p:extLst>
+  </p:cSld>
+  <p:clrMapOvr>
+    <a:masterClrMapping/>
+  </p:clrMapOvr>
+</p:sld>
+</file>
+
+<file path=ppt/slides/slide20.xml><?xml version="1.0" encoding="utf-8"?>
+<p:sld xmlns:a="http://schemas.openxmlformats.org/drawingml/2006/main" xmlns:r="http://schemas.openxmlformats.org/officeDocument/2006/relationships" xmlns:p="http://schemas.openxmlformats.org/presentationml/2006/main">
+  <p:cSld>
+    <p:spTree>
+      <p:nvGrpSpPr>
+        <p:cNvPr id="1" name=""/>
+        <p:cNvGrpSpPr/>
+        <p:nvPr/>
+      </p:nvGrpSpPr>
+      <p:grpSpPr>
+        <a:xfrm>
+          <a:off x="0" y="0"/>
+          <a:ext cx="0" cy="0"/>
+          <a:chOff x="0" y="0"/>
+          <a:chExt cx="0" cy="0"/>
+        </a:xfrm>
+      </p:grpSpPr>
+      <p:sp>
+        <p:nvSpPr>
+          <p:cNvPr id="2" name="Title 1"/>
+          <p:cNvSpPr>
+            <a:spLocks noGrp="1"/>
+          </p:cNvSpPr>
+          <p:nvPr>
+            <p:ph type="title"/>
+          </p:nvPr>
+        </p:nvSpPr>
+        <p:spPr/>
+        <p:txBody>
+          <a:bodyPr/>
+          <a:lstStyle/>
+          <a:p>
+            <a:r>
+              <a:rPr lang="en-US" dirty="0" smtClean="0"/>
+              <a:t>Break</a:t>
+            </a:r>
+            <a:endParaRPr lang="en-US" dirty="0"/>
+          </a:p>
+        </p:txBody>
+      </p:sp>
+      <p:sp>
+        <p:nvSpPr>
+          <p:cNvPr id="3" name="Content Placeholder 2"/>
+          <p:cNvSpPr>
+            <a:spLocks noGrp="1"/>
+          </p:cNvSpPr>
+          <p:nvPr>
+            <p:ph idx="1"/>
+          </p:nvPr>
+        </p:nvSpPr>
+        <p:spPr/>
+        <p:txBody>
+          <a:bodyPr/>
+          <a:lstStyle/>
+          <a:p>
+            <a:endParaRPr lang="en-US"/>
+          </a:p>
+        </p:txBody>
+      </p:sp>
+    </p:spTree>
+    <p:extLst>
+      <p:ext uri="{BB962C8B-B14F-4D97-AF65-F5344CB8AC3E}">
+        <p14:creationId xmlns:p14="http://schemas.microsoft.com/office/powerpoint/2010/main" val="367889435"/>
+      </p:ext>
+    </p:extLst>
+  </p:cSld>
+  <p:clrMapOvr>
+    <a:masterClrMapping/>
+  </p:clrMapOvr>
+</p:sld>
+</file>
+
+<file path=ppt/slides/slide21.xml><?xml version="1.0" encoding="utf-8"?>
+<p:sld xmlns:a="http://schemas.openxmlformats.org/drawingml/2006/main" xmlns:r="http://schemas.openxmlformats.org/officeDocument/2006/relationships" xmlns:p="http://schemas.openxmlformats.org/presentationml/2006/main">
+  <p:cSld>
+    <p:spTree>
+      <p:nvGrpSpPr>
+        <p:cNvPr id="1" name=""/>
+        <p:cNvGrpSpPr/>
+        <p:nvPr/>
+      </p:nvGrpSpPr>
+      <p:grpSpPr>
+        <a:xfrm>
+          <a:off x="0" y="0"/>
+          <a:ext cx="0" cy="0"/>
+          <a:chOff x="0" y="0"/>
+          <a:chExt cx="0" cy="0"/>
+        </a:xfrm>
+      </p:grpSpPr>
+      <p:sp>
+        <p:nvSpPr>
+          <p:cNvPr id="2" name="Title 1"/>
+          <p:cNvSpPr>
+            <a:spLocks noGrp="1"/>
+          </p:cNvSpPr>
+          <p:nvPr>
+            <p:ph type="title"/>
+          </p:nvPr>
+        </p:nvSpPr>
+        <p:spPr/>
+        <p:txBody>
+          <a:bodyPr/>
+          <a:lstStyle/>
+          <a:p>
+            <a:r>
+              <a:rPr lang="en-US" dirty="0" smtClean="0"/>
+              <a:t>Send an email</a:t>
+            </a:r>
+            <a:endParaRPr lang="en-US" dirty="0"/>
+          </a:p>
+        </p:txBody>
+      </p:sp>
+      <p:sp>
+        <p:nvSpPr>
+          <p:cNvPr id="3" name="Content Placeholder 2"/>
+          <p:cNvSpPr>
+            <a:spLocks noGrp="1"/>
+          </p:cNvSpPr>
+          <p:nvPr>
+            <p:ph idx="1"/>
+          </p:nvPr>
+        </p:nvSpPr>
+        <p:spPr/>
+        <p:txBody>
+          <a:bodyPr/>
+          <a:lstStyle/>
+          <a:p>
+            <a:r>
+              <a:rPr lang="en-US" dirty="0" smtClean="0"/>
+              <a:t>Basic send email code</a:t>
+            </a:r>
+          </a:p>
+          <a:p>
+            <a:pPr lvl="1"/>
+            <a:r>
+              <a:rPr lang="en-US" dirty="0" smtClean="0"/>
+              <a:t>To: </a:t>
+            </a:r>
+            <a:r>
+              <a:rPr lang="en-US" dirty="0" smtClean="0">
+                <a:hlinkClick r:id="rId2"/>
+              </a:rPr>
+              <a:t>Thom.Christensen@Schroders.com</a:t>
+            </a:r>
+            <a:endParaRPr lang="en-US" dirty="0" smtClean="0"/>
+          </a:p>
+          <a:p>
+            <a:pPr lvl="1"/>
+            <a:r>
+              <a:rPr lang="en-US" dirty="0" smtClean="0"/>
+              <a:t>Subject: Sending a test email from my raspberry pi</a:t>
+            </a:r>
+          </a:p>
+          <a:p>
+            <a:pPr lvl="1"/>
+            <a:r>
+              <a:rPr lang="en-US" dirty="0" smtClean="0"/>
+              <a:t>Body: Make something up :-)</a:t>
+            </a:r>
+          </a:p>
+          <a:p>
+            <a:r>
+              <a:rPr lang="en-US" dirty="0" smtClean="0"/>
+              <a:t>Not in a function (Sami’s example)</a:t>
+            </a:r>
+          </a:p>
+          <a:p>
+            <a:r>
+              <a:rPr lang="en-US" dirty="0" smtClean="0"/>
+              <a:t>Test it</a:t>
+            </a:r>
+          </a:p>
+          <a:p>
+            <a:r>
+              <a:rPr lang="en-US" dirty="0" smtClean="0"/>
+              <a:t>Put it in a function &amp; test</a:t>
+            </a:r>
+            <a:endParaRPr lang="en-US" dirty="0"/>
+          </a:p>
+        </p:txBody>
+      </p:sp>
+    </p:spTree>
+    <p:extLst>
+      <p:ext uri="{BB962C8B-B14F-4D97-AF65-F5344CB8AC3E}">
+        <p14:creationId xmlns:p14="http://schemas.microsoft.com/office/powerpoint/2010/main" val="2500281021"/>
+      </p:ext>
+    </p:extLst>
+  </p:cSld>
+  <p:clrMapOvr>
+    <a:masterClrMapping/>
+  </p:clrMapOvr>
+</p:sld>
+</file>
+
+<file path=ppt/slides/slide22.xml><?xml version="1.0" encoding="utf-8"?>
+<p:sld xmlns:a="http://schemas.openxmlformats.org/drawingml/2006/main" xmlns:r="http://schemas.openxmlformats.org/officeDocument/2006/relationships" xmlns:p="http://schemas.openxmlformats.org/presentationml/2006/main">
+  <p:cSld>
+    <p:spTree>
+      <p:nvGrpSpPr>
+        <p:cNvPr id="1" name=""/>
+        <p:cNvGrpSpPr/>
+        <p:nvPr/>
+      </p:nvGrpSpPr>
+      <p:grpSpPr>
+        <a:xfrm>
+          <a:off x="0" y="0"/>
+          <a:ext cx="0" cy="0"/>
+          <a:chOff x="0" y="0"/>
+          <a:chExt cx="0" cy="0"/>
+        </a:xfrm>
+      </p:grpSpPr>
+      <p:sp>
+        <p:nvSpPr>
+          <p:cNvPr id="2" name="Title 1"/>
+          <p:cNvSpPr>
+            <a:spLocks noGrp="1"/>
+          </p:cNvSpPr>
+          <p:nvPr>
+            <p:ph type="title"/>
+          </p:nvPr>
+        </p:nvSpPr>
+        <p:spPr/>
+        <p:txBody>
+          <a:bodyPr/>
+          <a:lstStyle/>
+          <a:p>
+            <a:r>
+              <a:rPr lang="en-US" dirty="0" smtClean="0"/>
+              <a:t>Build a class</a:t>
+            </a:r>
+            <a:endParaRPr lang="en-US" dirty="0"/>
+          </a:p>
+        </p:txBody>
+      </p:sp>
+      <p:sp>
+        <p:nvSpPr>
+          <p:cNvPr id="3" name="Content Placeholder 2"/>
+          <p:cNvSpPr>
+            <a:spLocks noGrp="1"/>
+          </p:cNvSpPr>
+          <p:nvPr>
+            <p:ph idx="1"/>
+          </p:nvPr>
+        </p:nvSpPr>
+        <p:spPr/>
+        <p:txBody>
+          <a:bodyPr/>
+          <a:lstStyle/>
+          <a:p>
+            <a:r>
+              <a:rPr lang="en-US" dirty="0" smtClean="0"/>
+              <a:t>What is a class</a:t>
+            </a:r>
+          </a:p>
+          <a:p>
+            <a:r>
+              <a:rPr lang="en-US" dirty="0" smtClean="0"/>
+              <a:t>Why?</a:t>
+            </a:r>
+          </a:p>
+          <a:p>
+            <a:r>
+              <a:rPr lang="en-US" dirty="0" smtClean="0"/>
+              <a:t>How?</a:t>
+            </a:r>
+            <a:endParaRPr lang="en-US" dirty="0"/>
+          </a:p>
+        </p:txBody>
+      </p:sp>
+    </p:spTree>
+    <p:extLst>
+      <p:ext uri="{BB962C8B-B14F-4D97-AF65-F5344CB8AC3E}">
+        <p14:creationId xmlns:p14="http://schemas.microsoft.com/office/powerpoint/2010/main" val="2967063638"/>
+      </p:ext>
+    </p:extLst>
+  </p:cSld>
+  <p:clrMapOvr>
+    <a:masterClrMapping/>
+  </p:clrMapOvr>
+</p:sld>
+</file>
+
+<file path=ppt/slides/slide23.xml><?xml version="1.0" encoding="utf-8"?>
+<p:sld xmlns:a="http://schemas.openxmlformats.org/drawingml/2006/main" xmlns:r="http://schemas.openxmlformats.org/officeDocument/2006/relationships" xmlns:p="http://schemas.openxmlformats.org/presentationml/2006/main">
+  <p:cSld>
+    <p:spTree>
+      <p:nvGrpSpPr>
+        <p:cNvPr id="1" name=""/>
+        <p:cNvGrpSpPr/>
+        <p:nvPr/>
+      </p:nvGrpSpPr>
+      <p:grpSpPr>
+        <a:xfrm>
+          <a:off x="0" y="0"/>
+          <a:ext cx="0" cy="0"/>
+          <a:chOff x="0" y="0"/>
+          <a:chExt cx="0" cy="0"/>
+        </a:xfrm>
+      </p:grpSpPr>
+      <p:sp>
+        <p:nvSpPr>
+          <p:cNvPr id="2" name="Title 1"/>
+          <p:cNvSpPr>
+            <a:spLocks noGrp="1"/>
+          </p:cNvSpPr>
+          <p:nvPr>
+            <p:ph type="title"/>
+          </p:nvPr>
+        </p:nvSpPr>
+        <p:spPr/>
+        <p:txBody>
+          <a:bodyPr/>
+          <a:lstStyle/>
+          <a:p>
+            <a:r>
+              <a:rPr lang="en-US" dirty="0" smtClean="0"/>
+              <a:t>Enhanced send an email</a:t>
+            </a:r>
+            <a:endParaRPr lang="en-US" dirty="0"/>
+          </a:p>
+        </p:txBody>
+      </p:sp>
+      <p:sp>
+        <p:nvSpPr>
+          <p:cNvPr id="3" name="Content Placeholder 2"/>
+          <p:cNvSpPr>
+            <a:spLocks noGrp="1"/>
+          </p:cNvSpPr>
+          <p:nvPr>
+            <p:ph idx="1"/>
+          </p:nvPr>
+        </p:nvSpPr>
+        <p:spPr/>
+        <p:txBody>
+          <a:bodyPr/>
+          <a:lstStyle/>
+          <a:p>
+            <a:r>
+              <a:rPr lang="en-US" dirty="0" smtClean="0"/>
+              <a:t>Take email function and put it in a class</a:t>
+            </a:r>
+          </a:p>
+          <a:p>
+            <a:r>
+              <a:rPr lang="en-US" dirty="0" smtClean="0"/>
+              <a:t>Import into push button, and turn on light and send the email when button is pressed</a:t>
+            </a:r>
+          </a:p>
+          <a:p>
+            <a:r>
+              <a:rPr lang="en-US" dirty="0" smtClean="0"/>
+              <a:t>Count the number of times the button is pressed</a:t>
+            </a:r>
+          </a:p>
+          <a:p>
+            <a:r>
+              <a:rPr lang="en-US" dirty="0" smtClean="0"/>
+              <a:t>Save the number of times the button is pressed between reboots</a:t>
+            </a:r>
+            <a:endParaRPr lang="en-US" dirty="0"/>
+          </a:p>
+        </p:txBody>
+      </p:sp>
+    </p:spTree>
+    <p:extLst>
+      <p:ext uri="{BB962C8B-B14F-4D97-AF65-F5344CB8AC3E}">
+        <p14:creationId xmlns:p14="http://schemas.microsoft.com/office/powerpoint/2010/main" val="3997814917"/>
+      </p:ext>
+    </p:extLst>
+  </p:cSld>
+  <p:clrMapOvr>
+    <a:masterClrMapping/>
+  </p:clrMapOvr>
+</p:sld>
+</file>
+
+<file path=ppt/slides/slide24.xml><?xml version="1.0" encoding="utf-8"?>
+<p:sld xmlns:a="http://schemas.openxmlformats.org/drawingml/2006/main" xmlns:r="http://schemas.openxmlformats.org/officeDocument/2006/relationships" xmlns:p="http://schemas.openxmlformats.org/presentationml/2006/main">
+  <p:cSld>
+    <p:spTree>
+      <p:nvGrpSpPr>
+        <p:cNvPr id="1" name=""/>
+        <p:cNvGrpSpPr/>
+        <p:nvPr/>
+      </p:nvGrpSpPr>
+      <p:grpSpPr>
+        <a:xfrm>
+          <a:off x="0" y="0"/>
+          <a:ext cx="0" cy="0"/>
+          <a:chOff x="0" y="0"/>
+          <a:chExt cx="0" cy="0"/>
+        </a:xfrm>
+      </p:grpSpPr>
+      <p:sp>
+        <p:nvSpPr>
+          <p:cNvPr id="2" name="Title 1"/>
+          <p:cNvSpPr>
+            <a:spLocks noGrp="1"/>
+          </p:cNvSpPr>
+          <p:nvPr>
+            <p:ph type="title"/>
+          </p:nvPr>
+        </p:nvSpPr>
+        <p:spPr/>
+        <p:txBody>
+          <a:bodyPr/>
+          <a:lstStyle/>
+          <a:p>
+            <a:r>
+              <a:rPr lang="en-US" dirty="0" smtClean="0"/>
+              <a:t>Day 3: working with the business</a:t>
+            </a:r>
+            <a:endParaRPr lang="en-GB" dirty="0"/>
+          </a:p>
+        </p:txBody>
+      </p:sp>
+      <p:sp>
+        <p:nvSpPr>
+          <p:cNvPr id="3" name="Content Placeholder 2"/>
+          <p:cNvSpPr>
+            <a:spLocks noGrp="1"/>
+          </p:cNvSpPr>
+          <p:nvPr>
+            <p:ph idx="1"/>
+          </p:nvPr>
+        </p:nvSpPr>
+        <p:spPr/>
+        <p:txBody>
+          <a:bodyPr/>
+          <a:lstStyle/>
+          <a:p>
+            <a:r>
+              <a:rPr lang="en-US" dirty="0"/>
+              <a:t>The basics of Service Management</a:t>
+            </a:r>
+          </a:p>
+          <a:p>
+            <a:r>
+              <a:rPr lang="en-US" dirty="0"/>
+              <a:t>Introduction to </a:t>
+            </a:r>
+            <a:r>
+              <a:rPr lang="en-US" dirty="0" err="1"/>
+              <a:t>ServiceNow</a:t>
+            </a:r>
+            <a:endParaRPr lang="en-US" dirty="0"/>
+          </a:p>
+          <a:p>
+            <a:r>
+              <a:rPr lang="en-US" dirty="0"/>
+              <a:t>Send Email to </a:t>
+            </a:r>
+            <a:r>
+              <a:rPr lang="en-US" dirty="0" err="1"/>
+              <a:t>ServiceNow</a:t>
+            </a:r>
+            <a:endParaRPr lang="en-US" dirty="0"/>
+          </a:p>
+          <a:p>
+            <a:r>
+              <a:rPr lang="en-US" dirty="0"/>
+              <a:t>Reporting on issues</a:t>
+            </a:r>
+          </a:p>
+          <a:p>
+            <a:r>
+              <a:rPr lang="en-US" dirty="0"/>
+              <a:t>Device Registration</a:t>
+            </a:r>
+          </a:p>
+          <a:p>
+            <a:r>
+              <a:rPr lang="en-US" dirty="0"/>
+              <a:t>Ticket validation / Preventing Spam</a:t>
+            </a:r>
+          </a:p>
+          <a:p>
+            <a:endParaRPr lang="en-US" dirty="0"/>
+          </a:p>
+          <a:p>
+            <a:endParaRPr lang="en-GB" dirty="0"/>
+          </a:p>
+        </p:txBody>
+      </p:sp>
+    </p:spTree>
+    <p:extLst>
+      <p:ext uri="{BB962C8B-B14F-4D97-AF65-F5344CB8AC3E}">
+        <p14:creationId xmlns:p14="http://schemas.microsoft.com/office/powerpoint/2010/main" val="138573571"/>
+      </p:ext>
+    </p:extLst>
+  </p:cSld>
+  <p:clrMapOvr>
+    <a:masterClrMapping/>
+  </p:clrMapOvr>
+</p:sld>
+</file>
+
+<file path=ppt/slides/slide25.xml><?xml version="1.0" encoding="utf-8"?>
+<p:sld xmlns:a="http://schemas.openxmlformats.org/drawingml/2006/main" xmlns:r="http://schemas.openxmlformats.org/officeDocument/2006/relationships" xmlns:p="http://schemas.openxmlformats.org/presentationml/2006/main">
+  <p:cSld>
+    <p:spTree>
+      <p:nvGrpSpPr>
+        <p:cNvPr id="1" name=""/>
+        <p:cNvGrpSpPr/>
+        <p:nvPr/>
+      </p:nvGrpSpPr>
+      <p:grpSpPr>
+        <a:xfrm>
+          <a:off x="0" y="0"/>
+          <a:ext cx="0" cy="0"/>
+          <a:chOff x="0" y="0"/>
+          <a:chExt cx="0" cy="0"/>
+        </a:xfrm>
+      </p:grpSpPr>
+      <p:sp>
+        <p:nvSpPr>
+          <p:cNvPr id="2" name="Title 1"/>
+          <p:cNvSpPr>
+            <a:spLocks noGrp="1"/>
+          </p:cNvSpPr>
+          <p:nvPr>
+            <p:ph type="title"/>
+          </p:nvPr>
+        </p:nvSpPr>
+        <p:spPr/>
+        <p:txBody>
+          <a:bodyPr/>
+          <a:lstStyle/>
+          <a:p>
+            <a:r>
+              <a:rPr lang="en-US" dirty="0" smtClean="0"/>
+              <a:t>Service Management</a:t>
+            </a:r>
+            <a:endParaRPr lang="en-US" dirty="0"/>
+          </a:p>
+        </p:txBody>
+      </p:sp>
+      <p:sp>
+        <p:nvSpPr>
+          <p:cNvPr id="3" name="Content Placeholder 2"/>
+          <p:cNvSpPr>
+            <a:spLocks noGrp="1"/>
+          </p:cNvSpPr>
+          <p:nvPr>
+            <p:ph idx="1"/>
+          </p:nvPr>
+        </p:nvSpPr>
+        <p:spPr/>
+        <p:txBody>
+          <a:bodyPr/>
+          <a:lstStyle/>
+          <a:p>
+            <a:r>
+              <a:rPr lang="en-US" dirty="0" smtClean="0"/>
+              <a:t>Why is this needed?</a:t>
+            </a:r>
+          </a:p>
+          <a:p>
+            <a:r>
+              <a:rPr lang="en-US" dirty="0" smtClean="0"/>
+              <a:t>What </a:t>
+            </a:r>
+            <a:r>
+              <a:rPr lang="en-US" dirty="0" err="1" smtClean="0"/>
+              <a:t>ServiceNow</a:t>
+            </a:r>
+            <a:r>
+              <a:rPr lang="en-US" dirty="0" smtClean="0"/>
+              <a:t> does</a:t>
+            </a:r>
+          </a:p>
+          <a:p>
+            <a:r>
+              <a:rPr lang="en-US" dirty="0" smtClean="0"/>
+              <a:t>Issue lifecycle</a:t>
+            </a:r>
+          </a:p>
+          <a:p>
+            <a:r>
+              <a:rPr lang="en-US" dirty="0" smtClean="0"/>
+              <a:t>Send an alert to </a:t>
+            </a:r>
+            <a:r>
+              <a:rPr lang="en-US" dirty="0" err="1" smtClean="0"/>
+              <a:t>ServiceNow</a:t>
+            </a:r>
+            <a:endParaRPr lang="en-US" dirty="0" smtClean="0"/>
+          </a:p>
+          <a:p>
+            <a:endParaRPr lang="en-US" dirty="0"/>
+          </a:p>
+        </p:txBody>
+      </p:sp>
+    </p:spTree>
+    <p:extLst>
+      <p:ext uri="{BB962C8B-B14F-4D97-AF65-F5344CB8AC3E}">
+        <p14:creationId xmlns:p14="http://schemas.microsoft.com/office/powerpoint/2010/main" val="1158526004"/>
+      </p:ext>
+    </p:extLst>
+  </p:cSld>
+  <p:clrMapOvr>
+    <a:masterClrMapping/>
+  </p:clrMapOvr>
+</p:sld>
+</file>
+
+<file path=ppt/slides/slide26.xml><?xml version="1.0" encoding="utf-8"?>
+<p:sld xmlns:a="http://schemas.openxmlformats.org/drawingml/2006/main" xmlns:r="http://schemas.openxmlformats.org/officeDocument/2006/relationships" xmlns:p="http://schemas.openxmlformats.org/presentationml/2006/main">
+  <p:cSld>
+    <p:spTree>
+      <p:nvGrpSpPr>
+        <p:cNvPr id="1" name=""/>
+        <p:cNvGrpSpPr/>
+        <p:nvPr/>
+      </p:nvGrpSpPr>
+      <p:grpSpPr>
+        <a:xfrm>
+          <a:off x="0" y="0"/>
+          <a:ext cx="0" cy="0"/>
+          <a:chOff x="0" y="0"/>
+          <a:chExt cx="0" cy="0"/>
+        </a:xfrm>
+      </p:grpSpPr>
+      <p:sp>
+        <p:nvSpPr>
+          <p:cNvPr id="2" name="Title 1"/>
+          <p:cNvSpPr>
+            <a:spLocks noGrp="1"/>
+          </p:cNvSpPr>
+          <p:nvPr>
+            <p:ph type="title"/>
+          </p:nvPr>
+        </p:nvSpPr>
+        <p:spPr/>
+        <p:txBody>
+          <a:bodyPr/>
+          <a:lstStyle/>
+          <a:p>
+            <a:r>
+              <a:rPr lang="en-US" dirty="0" smtClean="0"/>
+              <a:t>Identifying unique devices </a:t>
+            </a:r>
+            <a:endParaRPr lang="en-US" dirty="0"/>
+          </a:p>
+        </p:txBody>
+      </p:sp>
+      <p:sp>
+        <p:nvSpPr>
+          <p:cNvPr id="3" name="Content Placeholder 2"/>
+          <p:cNvSpPr>
+            <a:spLocks noGrp="1"/>
+          </p:cNvSpPr>
+          <p:nvPr>
+            <p:ph idx="1"/>
+          </p:nvPr>
+        </p:nvSpPr>
+        <p:spPr/>
+        <p:txBody>
+          <a:bodyPr/>
+          <a:lstStyle/>
+          <a:p>
+            <a:endParaRPr lang="en-US"/>
+          </a:p>
+        </p:txBody>
+      </p:sp>
+    </p:spTree>
+    <p:extLst>
+      <p:ext uri="{BB962C8B-B14F-4D97-AF65-F5344CB8AC3E}">
+        <p14:creationId xmlns:p14="http://schemas.microsoft.com/office/powerpoint/2010/main" val="2115797855"/>
+      </p:ext>
+    </p:extLst>
+  </p:cSld>
+  <p:clrMapOvr>
+    <a:masterClrMapping/>
+  </p:clrMapOvr>
+</p:sld>
+</file>
+
+<file path=ppt/slides/slide27.xml><?xml version="1.0" encoding="utf-8"?>
+<p:sld xmlns:a="http://schemas.openxmlformats.org/drawingml/2006/main" xmlns:r="http://schemas.openxmlformats.org/officeDocument/2006/relationships" xmlns:p="http://schemas.openxmlformats.org/presentationml/2006/main">
+  <p:cSld>
+    <p:spTree>
+      <p:nvGrpSpPr>
+        <p:cNvPr id="1" name=""/>
+        <p:cNvGrpSpPr/>
+        <p:nvPr/>
+      </p:nvGrpSpPr>
+      <p:grpSpPr>
+        <a:xfrm>
+          <a:off x="0" y="0"/>
+          <a:ext cx="0" cy="0"/>
+          <a:chOff x="0" y="0"/>
+          <a:chExt cx="0" cy="0"/>
+        </a:xfrm>
+      </p:grpSpPr>
+      <p:sp>
+        <p:nvSpPr>
+          <p:cNvPr id="2" name="Title 1"/>
+          <p:cNvSpPr>
+            <a:spLocks noGrp="1"/>
+          </p:cNvSpPr>
+          <p:nvPr>
+            <p:ph type="title"/>
+          </p:nvPr>
+        </p:nvSpPr>
+        <p:spPr/>
+        <p:txBody>
+          <a:bodyPr/>
+          <a:lstStyle/>
+          <a:p>
+            <a:r>
+              <a:rPr lang="en-US" dirty="0" smtClean="0"/>
+              <a:t>Checking if a service call is open</a:t>
+            </a:r>
+            <a:endParaRPr lang="en-US" dirty="0"/>
+          </a:p>
+        </p:txBody>
+      </p:sp>
+      <p:sp>
+        <p:nvSpPr>
+          <p:cNvPr id="3" name="Content Placeholder 2"/>
+          <p:cNvSpPr>
+            <a:spLocks noGrp="1"/>
+          </p:cNvSpPr>
+          <p:nvPr>
+            <p:ph idx="1"/>
+          </p:nvPr>
+        </p:nvSpPr>
+        <p:spPr/>
+        <p:txBody>
+          <a:bodyPr/>
+          <a:lstStyle/>
+          <a:p>
+            <a:endParaRPr lang="en-US" dirty="0"/>
+          </a:p>
+        </p:txBody>
+      </p:sp>
+    </p:spTree>
+    <p:extLst>
+      <p:ext uri="{BB962C8B-B14F-4D97-AF65-F5344CB8AC3E}">
+        <p14:creationId xmlns:p14="http://schemas.microsoft.com/office/powerpoint/2010/main" val="3955968203"/>
+      </p:ext>
+    </p:extLst>
+  </p:cSld>
+  <p:clrMapOvr>
+    <a:masterClrMapping/>
+  </p:clrMapOvr>
+</p:sld>
+</file>
+
+<file path=ppt/slides/slide28.xml><?xml version="1.0" encoding="utf-8"?>
+<p:sld xmlns:a="http://schemas.openxmlformats.org/drawingml/2006/main" xmlns:r="http://schemas.openxmlformats.org/officeDocument/2006/relationships" xmlns:p="http://schemas.openxmlformats.org/presentationml/2006/main">
+  <p:cSld>
+    <p:spTree>
+      <p:nvGrpSpPr>
+        <p:cNvPr id="1" name=""/>
+        <p:cNvGrpSpPr/>
+        <p:nvPr/>
+      </p:nvGrpSpPr>
+      <p:grpSpPr>
+        <a:xfrm>
+          <a:off x="0" y="0"/>
+          <a:ext cx="0" cy="0"/>
+          <a:chOff x="0" y="0"/>
+          <a:chExt cx="0" cy="0"/>
+        </a:xfrm>
+      </p:grpSpPr>
+      <p:sp>
+        <p:nvSpPr>
+          <p:cNvPr id="2" name="Title 1"/>
+          <p:cNvSpPr>
+            <a:spLocks noGrp="1"/>
+          </p:cNvSpPr>
+          <p:nvPr>
+            <p:ph type="title"/>
+          </p:nvPr>
+        </p:nvSpPr>
+        <p:spPr/>
+        <p:txBody>
+          <a:bodyPr/>
+          <a:lstStyle/>
+          <a:p>
+            <a:r>
+              <a:rPr lang="en-US" dirty="0" smtClean="0"/>
+              <a:t>Day 4: maturing the model</a:t>
+            </a:r>
+            <a:endParaRPr lang="en-GB" dirty="0"/>
+          </a:p>
+        </p:txBody>
+      </p:sp>
+      <p:sp>
+        <p:nvSpPr>
+          <p:cNvPr id="3" name="Content Placeholder 2"/>
+          <p:cNvSpPr>
+            <a:spLocks noGrp="1"/>
+          </p:cNvSpPr>
+          <p:nvPr>
+            <p:ph idx="1"/>
+          </p:nvPr>
+        </p:nvSpPr>
+        <p:spPr/>
+        <p:txBody>
+          <a:bodyPr>
+            <a:normAutofit fontScale="92500" lnSpcReduction="10000"/>
+          </a:bodyPr>
+          <a:lstStyle/>
+          <a:p>
+            <a:r>
+              <a:rPr lang="en-US" dirty="0"/>
+              <a:t>Using the Cloud to create </a:t>
+            </a:r>
+            <a:r>
+              <a:rPr lang="en-US" dirty="0" err="1"/>
+              <a:t>ServiceNow</a:t>
+            </a:r>
+            <a:r>
+              <a:rPr lang="en-US" dirty="0"/>
+              <a:t> tickets</a:t>
+            </a:r>
+          </a:p>
+          <a:p>
+            <a:r>
+              <a:rPr lang="en-US" dirty="0"/>
+              <a:t>Calling Azure from the Raspberry Pi</a:t>
+            </a:r>
+          </a:p>
+          <a:p>
+            <a:r>
+              <a:rPr lang="en-US" dirty="0"/>
+              <a:t>[SPACE FOR OVER RUN]</a:t>
+            </a:r>
+          </a:p>
+          <a:p>
+            <a:endParaRPr lang="en-US" dirty="0"/>
+          </a:p>
+          <a:p>
+            <a:r>
+              <a:rPr lang="en-US" dirty="0"/>
+              <a:t>Wrapping up</a:t>
+            </a:r>
+          </a:p>
+          <a:p>
+            <a:r>
+              <a:rPr lang="en-US" dirty="0"/>
+              <a:t>Other things you can do with a Raspberry Pi</a:t>
+            </a:r>
+          </a:p>
+          <a:p>
+            <a:r>
+              <a:rPr lang="en-US" dirty="0"/>
+              <a:t>Participant Feedback</a:t>
+            </a:r>
+          </a:p>
+          <a:p>
+            <a:endParaRPr lang="en-GB" dirty="0"/>
+          </a:p>
+        </p:txBody>
+      </p:sp>
+    </p:spTree>
+    <p:extLst>
+      <p:ext uri="{BB962C8B-B14F-4D97-AF65-F5344CB8AC3E}">
+        <p14:creationId xmlns:p14="http://schemas.microsoft.com/office/powerpoint/2010/main" val="1778859132"/>
+      </p:ext>
+    </p:extLst>
+  </p:cSld>
+  <p:clrMapOvr>
+    <a:masterClrMapping/>
+  </p:clrMapOvr>
+</p:sld>
+</file>
+
+<file path=ppt/slides/slide29.xml><?xml version="1.0" encoding="utf-8"?>
+<p:sld xmlns:a="http://schemas.openxmlformats.org/drawingml/2006/main" xmlns:r="http://schemas.openxmlformats.org/officeDocument/2006/relationships" xmlns:p="http://schemas.openxmlformats.org/presentationml/2006/main">
+  <p:cSld>
+    <p:spTree>
+      <p:nvGrpSpPr>
+        <p:cNvPr id="1" name=""/>
+        <p:cNvGrpSpPr/>
+        <p:nvPr/>
+      </p:nvGrpSpPr>
+      <p:grpSpPr>
+        <a:xfrm>
+          <a:off x="0" y="0"/>
+          <a:ext cx="0" cy="0"/>
+          <a:chOff x="0" y="0"/>
+          <a:chExt cx="0" cy="0"/>
+        </a:xfrm>
+      </p:grpSpPr>
+      <p:sp>
+        <p:nvSpPr>
+          <p:cNvPr id="2" name="Title 1"/>
+          <p:cNvSpPr>
+            <a:spLocks noGrp="1"/>
+          </p:cNvSpPr>
+          <p:nvPr>
+            <p:ph type="title"/>
+          </p:nvPr>
+        </p:nvSpPr>
+        <p:spPr/>
+        <p:txBody>
+          <a:bodyPr/>
+          <a:lstStyle/>
+          <a:p>
+            <a:r>
+              <a:rPr lang="en-US" dirty="0" smtClean="0"/>
+              <a:t>Azure stuff</a:t>
+            </a:r>
+            <a:endParaRPr lang="en-US" dirty="0"/>
+          </a:p>
+        </p:txBody>
+      </p:sp>
+      <p:sp>
+        <p:nvSpPr>
+          <p:cNvPr id="3" name="Content Placeholder 2"/>
+          <p:cNvSpPr>
+            <a:spLocks noGrp="1"/>
+          </p:cNvSpPr>
+          <p:nvPr>
+            <p:ph idx="1"/>
+          </p:nvPr>
+        </p:nvSpPr>
+        <p:spPr/>
+        <p:txBody>
+          <a:bodyPr/>
+          <a:lstStyle/>
+          <a:p>
+            <a:r>
+              <a:rPr lang="en-US" dirty="0" smtClean="0"/>
+              <a:t>Work with Josh/Vlad to write</a:t>
+            </a:r>
+            <a:endParaRPr lang="en-US" dirty="0"/>
+          </a:p>
+        </p:txBody>
+      </p:sp>
+    </p:spTree>
+    <p:extLst>
+      <p:ext uri="{BB962C8B-B14F-4D97-AF65-F5344CB8AC3E}">
+        <p14:creationId xmlns:p14="http://schemas.microsoft.com/office/powerpoint/2010/main" val="3358359096"/>
       </p:ext>
     </p:extLst>
   </p:cSld>
@@ -12621,9 +14493,9 @@
           <a:p>
             <a:r>
               <a:rPr lang="en-US" dirty="0" smtClean="0"/>
-              <a:t>Day 2: let’s code!</a:t>
-            </a:r>
-            <a:endParaRPr lang="en-GB" dirty="0"/>
+              <a:t>Ice breaker</a:t>
+            </a:r>
+            <a:endParaRPr lang="en-US" dirty="0"/>
           </a:p>
         </p:txBody>
       </p:sp>
@@ -12639,79 +14511,150 @@
         </p:nvSpPr>
         <p:spPr/>
         <p:txBody>
-          <a:bodyPr>
-            <a:normAutofit fontScale="92500" lnSpcReduction="20000"/>
-          </a:bodyPr>
+          <a:bodyPr/>
           <a:lstStyle/>
           <a:p>
             <a:r>
-              <a:rPr lang="en-US" dirty="0"/>
-              <a:t>Programming Basics</a:t>
-            </a:r>
-          </a:p>
-          <a:p>
-            <a:pPr lvl="1"/>
-            <a:r>
-              <a:rPr lang="en-US" dirty="0"/>
-              <a:t>Functions</a:t>
-            </a:r>
-          </a:p>
-          <a:p>
-            <a:pPr lvl="1"/>
-            <a:r>
-              <a:rPr lang="en-US" dirty="0"/>
-              <a:t>Comments</a:t>
-            </a:r>
-          </a:p>
-          <a:p>
-            <a:pPr lvl="1"/>
-            <a:r>
-              <a:rPr lang="en-US" dirty="0"/>
-              <a:t>Variables</a:t>
-            </a:r>
-          </a:p>
-          <a:p>
-            <a:pPr lvl="1"/>
-            <a:r>
-              <a:rPr lang="en-US" dirty="0"/>
-              <a:t>What’s an API</a:t>
-            </a:r>
-          </a:p>
-          <a:p>
-            <a:pPr lvl="1"/>
-            <a:r>
-              <a:rPr lang="en-US" dirty="0"/>
-              <a:t>Error Handling</a:t>
-            </a:r>
-          </a:p>
-          <a:p>
-            <a:pPr lvl="1"/>
-            <a:r>
-              <a:rPr lang="en-US" dirty="0"/>
-              <a:t>Testing(?)</a:t>
-            </a:r>
-          </a:p>
-          <a:p>
-            <a:r>
-              <a:rPr lang="en-US" dirty="0"/>
-              <a:t>Create Email To Thom functionality</a:t>
-            </a:r>
-          </a:p>
-          <a:p>
-            <a:r>
-              <a:rPr lang="en-US" dirty="0"/>
-              <a:t>Send Email by Raspberry Pi</a:t>
-            </a:r>
-          </a:p>
-          <a:p>
-            <a:endParaRPr lang="en-GB" dirty="0"/>
+              <a:rPr lang="en-US" dirty="0" smtClean="0"/>
+              <a:t>NAME TAGS</a:t>
+            </a:r>
+          </a:p>
+          <a:p>
+            <a:r>
+              <a:rPr lang="en-US" dirty="0" smtClean="0"/>
+              <a:t>CV Bingo – need fun-fact about each other</a:t>
+            </a:r>
+            <a:endParaRPr lang="en-US" dirty="0"/>
           </a:p>
         </p:txBody>
       </p:sp>
     </p:spTree>
     <p:extLst>
       <p:ext uri="{BB962C8B-B14F-4D97-AF65-F5344CB8AC3E}">
-        <p14:creationId xmlns:p14="http://schemas.microsoft.com/office/powerpoint/2010/main" val="1097960428"/>
+        <p14:creationId xmlns:p14="http://schemas.microsoft.com/office/powerpoint/2010/main" val="3551927864"/>
+      </p:ext>
+    </p:extLst>
+  </p:cSld>
+  <p:clrMapOvr>
+    <a:masterClrMapping/>
+  </p:clrMapOvr>
+</p:sld>
+</file>
+
+<file path=ppt/slides/slide30.xml><?xml version="1.0" encoding="utf-8"?>
+<p:sld xmlns:a="http://schemas.openxmlformats.org/drawingml/2006/main" xmlns:r="http://schemas.openxmlformats.org/officeDocument/2006/relationships" xmlns:p="http://schemas.openxmlformats.org/presentationml/2006/main">
+  <p:cSld>
+    <p:spTree>
+      <p:nvGrpSpPr>
+        <p:cNvPr id="1" name=""/>
+        <p:cNvGrpSpPr/>
+        <p:nvPr/>
+      </p:nvGrpSpPr>
+      <p:grpSpPr>
+        <a:xfrm>
+          <a:off x="0" y="0"/>
+          <a:ext cx="0" cy="0"/>
+          <a:chOff x="0" y="0"/>
+          <a:chExt cx="0" cy="0"/>
+        </a:xfrm>
+      </p:grpSpPr>
+      <p:sp>
+        <p:nvSpPr>
+          <p:cNvPr id="2" name="Title 1"/>
+          <p:cNvSpPr>
+            <a:spLocks noGrp="1"/>
+          </p:cNvSpPr>
+          <p:nvPr>
+            <p:ph type="title"/>
+          </p:nvPr>
+        </p:nvSpPr>
+        <p:spPr/>
+        <p:txBody>
+          <a:bodyPr/>
+          <a:lstStyle/>
+          <a:p>
+            <a:r>
+              <a:rPr lang="en-US" dirty="0" smtClean="0"/>
+              <a:t>Other projects</a:t>
+            </a:r>
+            <a:endParaRPr lang="en-US" dirty="0"/>
+          </a:p>
+        </p:txBody>
+      </p:sp>
+      <p:sp>
+        <p:nvSpPr>
+          <p:cNvPr id="3" name="Content Placeholder 2"/>
+          <p:cNvSpPr>
+            <a:spLocks noGrp="1"/>
+          </p:cNvSpPr>
+          <p:nvPr>
+            <p:ph idx="1"/>
+          </p:nvPr>
+        </p:nvSpPr>
+        <p:spPr/>
+        <p:txBody>
+          <a:bodyPr/>
+          <a:lstStyle/>
+          <a:p>
+            <a:r>
+              <a:rPr lang="en-US" dirty="0" smtClean="0"/>
+              <a:t>Link to </a:t>
+            </a:r>
+            <a:r>
+              <a:rPr lang="en-US" dirty="0" err="1" smtClean="0"/>
+              <a:t>Adafruit</a:t>
+            </a:r>
+            <a:endParaRPr lang="en-US" dirty="0" smtClean="0"/>
+          </a:p>
+          <a:p>
+            <a:r>
+              <a:rPr lang="en-US" dirty="0" smtClean="0"/>
+              <a:t>Alien Invasion</a:t>
+            </a:r>
+          </a:p>
+          <a:p>
+            <a:r>
+              <a:rPr lang="en-US" dirty="0" smtClean="0"/>
+              <a:t>Other ideas?</a:t>
+            </a:r>
+          </a:p>
+          <a:p>
+            <a:pPr lvl="1"/>
+            <a:r>
+              <a:rPr lang="en-US" dirty="0" err="1" smtClean="0"/>
+              <a:t>Rpi</a:t>
+            </a:r>
+            <a:r>
+              <a:rPr lang="en-US" dirty="0" smtClean="0"/>
+              <a:t> Media Center</a:t>
+            </a:r>
+          </a:p>
+          <a:p>
+            <a:pPr lvl="1"/>
+            <a:r>
+              <a:rPr lang="en-US" dirty="0" err="1" smtClean="0"/>
+              <a:t>Rpi</a:t>
+            </a:r>
+            <a:r>
+              <a:rPr lang="en-US" dirty="0" smtClean="0"/>
+              <a:t> </a:t>
+            </a:r>
+            <a:r>
+              <a:rPr lang="en-US" dirty="0" err="1" smtClean="0"/>
+              <a:t>Wifi</a:t>
+            </a:r>
+            <a:r>
+              <a:rPr lang="en-US" dirty="0" smtClean="0"/>
+              <a:t> Booster</a:t>
+            </a:r>
+            <a:endParaRPr lang="en-US" dirty="0"/>
+          </a:p>
+        </p:txBody>
+      </p:sp>
+    </p:spTree>
+    <p:extLst>
+      <p:ext uri="{BB962C8B-B14F-4D97-AF65-F5344CB8AC3E}">
+        <p14:creationId xmlns:p14="http://schemas.microsoft.com/office/powerpoint/2010/main" val="4038175424"/>
       </p:ext>
     </p:extLst>
   </p:cSld>
@@ -12755,9 +14698,9 @@
           <a:p>
             <a:r>
               <a:rPr lang="en-US" dirty="0" smtClean="0"/>
-              <a:t>Day 3: working with the business</a:t>
-            </a:r>
-            <a:endParaRPr lang="en-GB" dirty="0"/>
+              <a:t>Project outline</a:t>
+            </a:r>
+            <a:endParaRPr lang="en-US" dirty="0"/>
           </a:p>
         </p:txBody>
       </p:sp>
@@ -12777,62 +14720,29 @@
           <a:lstStyle/>
           <a:p>
             <a:r>
-              <a:rPr lang="en-US" dirty="0"/>
-              <a:t>The basics of Service Management</a:t>
-            </a:r>
-          </a:p>
-          <a:p>
-            <a:r>
-              <a:rPr lang="en-US" dirty="0"/>
-              <a:t>Introduction to </a:t>
-            </a:r>
-            <a:r>
-              <a:rPr lang="en-US" dirty="0" err="1"/>
-              <a:t>ServiceNow</a:t>
+              <a:rPr lang="en-US" dirty="0" smtClean="0"/>
+              <a:t>What will we be doing</a:t>
+            </a:r>
+          </a:p>
+          <a:p>
+            <a:r>
+              <a:rPr lang="en-US" dirty="0" smtClean="0"/>
+              <a:t>What will you get out of it</a:t>
+            </a:r>
+          </a:p>
+          <a:p>
+            <a:r>
+              <a:rPr lang="en-US" dirty="0" smtClean="0"/>
+              <a:t>What do you want out of it???</a:t>
             </a:r>
             <a:endParaRPr lang="en-US" dirty="0"/>
-          </a:p>
-          <a:p>
-            <a:r>
-              <a:rPr lang="en-US" dirty="0"/>
-              <a:t>Send Email to </a:t>
-            </a:r>
-            <a:r>
-              <a:rPr lang="en-US" dirty="0" err="1"/>
-              <a:t>ServiceNow</a:t>
-            </a:r>
-            <a:endParaRPr lang="en-US" dirty="0"/>
-          </a:p>
-          <a:p>
-            <a:r>
-              <a:rPr lang="en-US" dirty="0"/>
-              <a:t>Reporting on issues</a:t>
-            </a:r>
-          </a:p>
-          <a:p>
-            <a:r>
-              <a:rPr lang="en-US" dirty="0"/>
-              <a:t>Device Registration</a:t>
-            </a:r>
-          </a:p>
-          <a:p>
-            <a:r>
-              <a:rPr lang="en-US" dirty="0"/>
-              <a:t>Ticket validation / Preventing Spam</a:t>
-            </a:r>
-          </a:p>
-          <a:p>
-            <a:endParaRPr lang="en-US" dirty="0"/>
-          </a:p>
-          <a:p>
-            <a:endParaRPr lang="en-GB" dirty="0"/>
           </a:p>
         </p:txBody>
       </p:sp>
     </p:spTree>
     <p:extLst>
       <p:ext uri="{BB962C8B-B14F-4D97-AF65-F5344CB8AC3E}">
-        <p14:creationId xmlns:p14="http://schemas.microsoft.com/office/powerpoint/2010/main" val="138573571"/>
+        <p14:creationId xmlns:p14="http://schemas.microsoft.com/office/powerpoint/2010/main" val="241811975"/>
       </p:ext>
     </p:extLst>
   </p:cSld>
@@ -12876,9 +14786,9 @@
           <a:p>
             <a:r>
               <a:rPr lang="en-US" dirty="0" smtClean="0"/>
-              <a:t>Day 4: maturing the model</a:t>
-            </a:r>
-            <a:endParaRPr lang="en-GB" dirty="0"/>
+              <a:t>Case Study / Scenario / Background</a:t>
+            </a:r>
+            <a:endParaRPr lang="en-US" dirty="0"/>
           </a:p>
         </p:txBody>
       </p:sp>
@@ -12894,66 +14804,388 @@
         </p:nvSpPr>
         <p:spPr/>
         <p:txBody>
-          <a:bodyPr>
-            <a:normAutofit fontScale="92500" lnSpcReduction="10000"/>
-          </a:bodyPr>
+          <a:bodyPr/>
           <a:lstStyle/>
           <a:p>
             <a:r>
-              <a:rPr lang="en-US" dirty="0"/>
-              <a:t>Using the Cloud to create </a:t>
-            </a:r>
-            <a:r>
-              <a:rPr lang="en-US" dirty="0" err="1"/>
-              <a:t>ServiceNow</a:t>
-            </a:r>
-            <a:r>
-              <a:rPr lang="en-US" dirty="0"/>
-              <a:t> tickets</a:t>
-            </a:r>
-          </a:p>
-          <a:p>
-            <a:r>
-              <a:rPr lang="en-US" dirty="0"/>
-              <a:t>Calling Azure from the Raspberry Pi</a:t>
-            </a:r>
-          </a:p>
-          <a:p>
-            <a:r>
-              <a:rPr lang="en-US" dirty="0"/>
-              <a:t>[SPACE FOR OVER RUN]</a:t>
+              <a:rPr lang="en-US" dirty="0" smtClean="0"/>
+              <a:t>Here’s the situation</a:t>
+            </a:r>
+          </a:p>
+          <a:p>
+            <a:r>
+              <a:rPr lang="en-US" dirty="0" smtClean="0"/>
+              <a:t>Let’s have Thom act it out</a:t>
             </a:r>
           </a:p>
           <a:p>
             <a:endParaRPr lang="en-US" dirty="0"/>
-          </a:p>
-          <a:p>
-            <a:r>
-              <a:rPr lang="en-US" dirty="0"/>
-              <a:t>Wrapping up</a:t>
-            </a:r>
-          </a:p>
-          <a:p>
-            <a:r>
-              <a:rPr lang="en-US" dirty="0"/>
-              <a:t>Other things you can do with a Raspberry Pi</a:t>
-            </a:r>
-          </a:p>
-          <a:p>
-            <a:r>
-              <a:rPr lang="en-US" dirty="0"/>
-              <a:t>Participant Feedback</a:t>
-            </a:r>
-          </a:p>
-          <a:p>
-            <a:endParaRPr lang="en-GB" dirty="0"/>
           </a:p>
         </p:txBody>
       </p:sp>
     </p:spTree>
     <p:extLst>
       <p:ext uri="{BB962C8B-B14F-4D97-AF65-F5344CB8AC3E}">
-        <p14:creationId xmlns:p14="http://schemas.microsoft.com/office/powerpoint/2010/main" val="1778859132"/>
+        <p14:creationId xmlns:p14="http://schemas.microsoft.com/office/powerpoint/2010/main" val="3060739340"/>
+      </p:ext>
+    </p:extLst>
+  </p:cSld>
+  <p:clrMapOvr>
+    <a:masterClrMapping/>
+  </p:clrMapOvr>
+</p:sld>
+</file>
+
+<file path=ppt/slides/slide6.xml><?xml version="1.0" encoding="utf-8"?>
+<p:sld xmlns:a="http://schemas.openxmlformats.org/drawingml/2006/main" xmlns:r="http://schemas.openxmlformats.org/officeDocument/2006/relationships" xmlns:p="http://schemas.openxmlformats.org/presentationml/2006/main">
+  <p:cSld>
+    <p:spTree>
+      <p:nvGrpSpPr>
+        <p:cNvPr id="1" name=""/>
+        <p:cNvGrpSpPr/>
+        <p:nvPr/>
+      </p:nvGrpSpPr>
+      <p:grpSpPr>
+        <a:xfrm>
+          <a:off x="0" y="0"/>
+          <a:ext cx="0" cy="0"/>
+          <a:chOff x="0" y="0"/>
+          <a:chExt cx="0" cy="0"/>
+        </a:xfrm>
+      </p:grpSpPr>
+      <p:sp>
+        <p:nvSpPr>
+          <p:cNvPr id="2" name="Title 1"/>
+          <p:cNvSpPr>
+            <a:spLocks noGrp="1"/>
+          </p:cNvSpPr>
+          <p:nvPr>
+            <p:ph type="title"/>
+          </p:nvPr>
+        </p:nvSpPr>
+        <p:spPr/>
+        <p:txBody>
+          <a:bodyPr/>
+          <a:lstStyle/>
+          <a:p>
+            <a:r>
+              <a:rPr lang="en-US" dirty="0" smtClean="0"/>
+              <a:t>Technology Overview</a:t>
+            </a:r>
+            <a:endParaRPr lang="en-US" dirty="0"/>
+          </a:p>
+        </p:txBody>
+      </p:sp>
+      <p:sp>
+        <p:nvSpPr>
+          <p:cNvPr id="3" name="Content Placeholder 2"/>
+          <p:cNvSpPr>
+            <a:spLocks noGrp="1"/>
+          </p:cNvSpPr>
+          <p:nvPr>
+            <p:ph idx="1"/>
+          </p:nvPr>
+        </p:nvSpPr>
+        <p:spPr/>
+        <p:txBody>
+          <a:bodyPr/>
+          <a:lstStyle/>
+          <a:p>
+            <a:endParaRPr lang="en-US"/>
+          </a:p>
+        </p:txBody>
+      </p:sp>
+    </p:spTree>
+    <p:extLst>
+      <p:ext uri="{BB962C8B-B14F-4D97-AF65-F5344CB8AC3E}">
+        <p14:creationId xmlns:p14="http://schemas.microsoft.com/office/powerpoint/2010/main" val="3794471099"/>
+      </p:ext>
+    </p:extLst>
+  </p:cSld>
+  <p:clrMapOvr>
+    <a:masterClrMapping/>
+  </p:clrMapOvr>
+</p:sld>
+</file>
+
+<file path=ppt/slides/slide7.xml><?xml version="1.0" encoding="utf-8"?>
+<p:sld xmlns:a="http://schemas.openxmlformats.org/drawingml/2006/main" xmlns:r="http://schemas.openxmlformats.org/officeDocument/2006/relationships" xmlns:p="http://schemas.openxmlformats.org/presentationml/2006/main">
+  <p:cSld>
+    <p:spTree>
+      <p:nvGrpSpPr>
+        <p:cNvPr id="1" name=""/>
+        <p:cNvGrpSpPr/>
+        <p:nvPr/>
+      </p:nvGrpSpPr>
+      <p:grpSpPr>
+        <a:xfrm>
+          <a:off x="0" y="0"/>
+          <a:ext cx="0" cy="0"/>
+          <a:chOff x="0" y="0"/>
+          <a:chExt cx="0" cy="0"/>
+        </a:xfrm>
+      </p:grpSpPr>
+      <p:sp>
+        <p:nvSpPr>
+          <p:cNvPr id="2" name="Title 1"/>
+          <p:cNvSpPr>
+            <a:spLocks noGrp="1"/>
+          </p:cNvSpPr>
+          <p:nvPr>
+            <p:ph type="title"/>
+          </p:nvPr>
+        </p:nvSpPr>
+        <p:spPr/>
+        <p:txBody>
+          <a:bodyPr/>
+          <a:lstStyle/>
+          <a:p>
+            <a:r>
+              <a:rPr lang="en-US" dirty="0" smtClean="0"/>
+              <a:t>Raspberry pi Intro</a:t>
+            </a:r>
+            <a:endParaRPr lang="en-US" dirty="0"/>
+          </a:p>
+        </p:txBody>
+      </p:sp>
+      <p:sp>
+        <p:nvSpPr>
+          <p:cNvPr id="3" name="Content Placeholder 2"/>
+          <p:cNvSpPr>
+            <a:spLocks noGrp="1"/>
+          </p:cNvSpPr>
+          <p:nvPr>
+            <p:ph idx="1"/>
+          </p:nvPr>
+        </p:nvSpPr>
+        <p:spPr/>
+        <p:txBody>
+          <a:bodyPr/>
+          <a:lstStyle/>
+          <a:p>
+            <a:r>
+              <a:rPr lang="en-US" dirty="0" smtClean="0"/>
+              <a:t>Plug in</a:t>
+            </a:r>
+          </a:p>
+          <a:p>
+            <a:r>
+              <a:rPr lang="en-US" dirty="0" smtClean="0"/>
+              <a:t>Console</a:t>
+            </a:r>
+          </a:p>
+          <a:p>
+            <a:r>
+              <a:rPr lang="en-US" dirty="0" smtClean="0"/>
+              <a:t>Blah </a:t>
+            </a:r>
+            <a:r>
+              <a:rPr lang="en-US" dirty="0" err="1" smtClean="0"/>
+              <a:t>blah</a:t>
+            </a:r>
+            <a:r>
+              <a:rPr lang="en-US" dirty="0" smtClean="0"/>
+              <a:t> </a:t>
+            </a:r>
+            <a:r>
+              <a:rPr lang="en-US" dirty="0" err="1" smtClean="0"/>
+              <a:t>blah</a:t>
+            </a:r>
+            <a:endParaRPr lang="en-US" dirty="0" smtClean="0"/>
+          </a:p>
+          <a:p>
+            <a:r>
+              <a:rPr lang="en-US" dirty="0" smtClean="0"/>
+              <a:t>Clone the repo</a:t>
+            </a:r>
+          </a:p>
+          <a:p>
+            <a:endParaRPr lang="en-US" dirty="0"/>
+          </a:p>
+        </p:txBody>
+      </p:sp>
+    </p:spTree>
+    <p:extLst>
+      <p:ext uri="{BB962C8B-B14F-4D97-AF65-F5344CB8AC3E}">
+        <p14:creationId xmlns:p14="http://schemas.microsoft.com/office/powerpoint/2010/main" val="2044859461"/>
+      </p:ext>
+    </p:extLst>
+  </p:cSld>
+  <p:clrMapOvr>
+    <a:masterClrMapping/>
+  </p:clrMapOvr>
+</p:sld>
+</file>
+
+<file path=ppt/slides/slide8.xml><?xml version="1.0" encoding="utf-8"?>
+<p:sld xmlns:a="http://schemas.openxmlformats.org/drawingml/2006/main" xmlns:r="http://schemas.openxmlformats.org/officeDocument/2006/relationships" xmlns:p="http://schemas.openxmlformats.org/presentationml/2006/main">
+  <p:cSld>
+    <p:spTree>
+      <p:nvGrpSpPr>
+        <p:cNvPr id="1" name=""/>
+        <p:cNvGrpSpPr/>
+        <p:nvPr/>
+      </p:nvGrpSpPr>
+      <p:grpSpPr>
+        <a:xfrm>
+          <a:off x="0" y="0"/>
+          <a:ext cx="0" cy="0"/>
+          <a:chOff x="0" y="0"/>
+          <a:chExt cx="0" cy="0"/>
+        </a:xfrm>
+      </p:grpSpPr>
+      <p:sp>
+        <p:nvSpPr>
+          <p:cNvPr id="2" name="Title 1"/>
+          <p:cNvSpPr>
+            <a:spLocks noGrp="1"/>
+          </p:cNvSpPr>
+          <p:nvPr>
+            <p:ph type="title"/>
+          </p:nvPr>
+        </p:nvSpPr>
+        <p:spPr/>
+        <p:txBody>
+          <a:bodyPr/>
+          <a:lstStyle/>
+          <a:p>
+            <a:r>
+              <a:rPr lang="en-US" dirty="0" smtClean="0"/>
+              <a:t>Break</a:t>
+            </a:r>
+            <a:endParaRPr lang="en-US" dirty="0"/>
+          </a:p>
+        </p:txBody>
+      </p:sp>
+      <p:sp>
+        <p:nvSpPr>
+          <p:cNvPr id="3" name="Content Placeholder 2"/>
+          <p:cNvSpPr>
+            <a:spLocks noGrp="1"/>
+          </p:cNvSpPr>
+          <p:nvPr>
+            <p:ph idx="1"/>
+          </p:nvPr>
+        </p:nvSpPr>
+        <p:spPr/>
+        <p:txBody>
+          <a:bodyPr/>
+          <a:lstStyle/>
+          <a:p>
+            <a:endParaRPr lang="en-US"/>
+          </a:p>
+        </p:txBody>
+      </p:sp>
+    </p:spTree>
+    <p:extLst>
+      <p:ext uri="{BB962C8B-B14F-4D97-AF65-F5344CB8AC3E}">
+        <p14:creationId xmlns:p14="http://schemas.microsoft.com/office/powerpoint/2010/main" val="446194975"/>
+      </p:ext>
+    </p:extLst>
+  </p:cSld>
+  <p:clrMapOvr>
+    <a:masterClrMapping/>
+  </p:clrMapOvr>
+</p:sld>
+</file>
+
+<file path=ppt/slides/slide9.xml><?xml version="1.0" encoding="utf-8"?>
+<p:sld xmlns:a="http://schemas.openxmlformats.org/drawingml/2006/main" xmlns:r="http://schemas.openxmlformats.org/officeDocument/2006/relationships" xmlns:p="http://schemas.openxmlformats.org/presentationml/2006/main">
+  <p:cSld>
+    <p:spTree>
+      <p:nvGrpSpPr>
+        <p:cNvPr id="1" name=""/>
+        <p:cNvGrpSpPr/>
+        <p:nvPr/>
+      </p:nvGrpSpPr>
+      <p:grpSpPr>
+        <a:xfrm>
+          <a:off x="0" y="0"/>
+          <a:ext cx="0" cy="0"/>
+          <a:chOff x="0" y="0"/>
+          <a:chExt cx="0" cy="0"/>
+        </a:xfrm>
+      </p:grpSpPr>
+      <p:sp>
+        <p:nvSpPr>
+          <p:cNvPr id="2" name="Title 1"/>
+          <p:cNvSpPr>
+            <a:spLocks noGrp="1"/>
+          </p:cNvSpPr>
+          <p:nvPr>
+            <p:ph type="title"/>
+          </p:nvPr>
+        </p:nvSpPr>
+        <p:spPr/>
+        <p:txBody>
+          <a:bodyPr/>
+          <a:lstStyle/>
+          <a:p>
+            <a:r>
+              <a:rPr lang="en-US" dirty="0" smtClean="0"/>
+              <a:t>Python</a:t>
+            </a:r>
+            <a:endParaRPr lang="en-US" dirty="0"/>
+          </a:p>
+        </p:txBody>
+      </p:sp>
+      <p:sp>
+        <p:nvSpPr>
+          <p:cNvPr id="3" name="Content Placeholder 2"/>
+          <p:cNvSpPr>
+            <a:spLocks noGrp="1"/>
+          </p:cNvSpPr>
+          <p:nvPr>
+            <p:ph idx="1"/>
+          </p:nvPr>
+        </p:nvSpPr>
+        <p:spPr/>
+        <p:txBody>
+          <a:bodyPr/>
+          <a:lstStyle/>
+          <a:p>
+            <a:r>
+              <a:rPr lang="en-US" dirty="0" smtClean="0"/>
+              <a:t>What is Python</a:t>
+            </a:r>
+          </a:p>
+          <a:p>
+            <a:r>
+              <a:rPr lang="en-US" dirty="0" smtClean="0"/>
+              <a:t>Opening the text editor</a:t>
+            </a:r>
+          </a:p>
+          <a:p>
+            <a:r>
+              <a:rPr lang="en-US" dirty="0" smtClean="0"/>
+              <a:t>Write hello world</a:t>
+            </a:r>
+          </a:p>
+          <a:p>
+            <a:pPr lvl="1"/>
+            <a:r>
+              <a:rPr lang="en-US" dirty="0" smtClean="0"/>
+              <a:t>Notice the different colors of the words. Why is that?</a:t>
+            </a:r>
+          </a:p>
+          <a:p>
+            <a:r>
+              <a:rPr lang="en-US" dirty="0" smtClean="0"/>
+              <a:t>Run it</a:t>
+            </a:r>
+          </a:p>
+          <a:p>
+            <a:pPr marL="0" indent="0">
+              <a:buNone/>
+            </a:pPr>
+            <a:endParaRPr lang="en-US" dirty="0"/>
+          </a:p>
+        </p:txBody>
+      </p:sp>
+    </p:spTree>
+    <p:extLst>
+      <p:ext uri="{BB962C8B-B14F-4D97-AF65-F5344CB8AC3E}">
+        <p14:creationId xmlns:p14="http://schemas.microsoft.com/office/powerpoint/2010/main" val="1824136748"/>
       </p:ext>
     </p:extLst>
   </p:cSld>

</xml_diff>

<commit_message>
Added detail to presentation
Azure section and Reporting section still need work. Any feedback welcome on other sections.
</commit_message>
<xml_diff>
--- a/docs/SMAP Materials Unbranded.pptx
+++ b/docs/SMAP Materials Unbranded.pptx
@@ -10,31 +10,31 @@
     <p:sldId id="261" r:id="rId4"/>
     <p:sldId id="262" r:id="rId5"/>
     <p:sldId id="263" r:id="rId6"/>
-    <p:sldId id="264" r:id="rId7"/>
-    <p:sldId id="265" r:id="rId8"/>
-    <p:sldId id="278" r:id="rId9"/>
+    <p:sldId id="287" r:id="rId7"/>
+    <p:sldId id="264" r:id="rId8"/>
+    <p:sldId id="265" r:id="rId9"/>
     <p:sldId id="266" r:id="rId10"/>
     <p:sldId id="267" r:id="rId11"/>
-    <p:sldId id="268" r:id="rId12"/>
-    <p:sldId id="258" r:id="rId13"/>
-    <p:sldId id="270" r:id="rId14"/>
-    <p:sldId id="271" r:id="rId15"/>
-    <p:sldId id="279" r:id="rId16"/>
+    <p:sldId id="286" r:id="rId12"/>
+    <p:sldId id="268" r:id="rId13"/>
+    <p:sldId id="258" r:id="rId14"/>
+    <p:sldId id="270" r:id="rId15"/>
+    <p:sldId id="271" r:id="rId16"/>
     <p:sldId id="272" r:id="rId17"/>
-    <p:sldId id="273" r:id="rId18"/>
-    <p:sldId id="274" r:id="rId19"/>
-    <p:sldId id="269" r:id="rId20"/>
-    <p:sldId id="280" r:id="rId21"/>
-    <p:sldId id="275" r:id="rId22"/>
-    <p:sldId id="276" r:id="rId23"/>
-    <p:sldId id="277" r:id="rId24"/>
-    <p:sldId id="259" r:id="rId25"/>
-    <p:sldId id="281" r:id="rId26"/>
-    <p:sldId id="282" r:id="rId27"/>
-    <p:sldId id="283" r:id="rId28"/>
-    <p:sldId id="260" r:id="rId29"/>
-    <p:sldId id="284" r:id="rId30"/>
-    <p:sldId id="285" r:id="rId31"/>
+    <p:sldId id="274" r:id="rId18"/>
+    <p:sldId id="269" r:id="rId19"/>
+    <p:sldId id="275" r:id="rId20"/>
+    <p:sldId id="276" r:id="rId21"/>
+    <p:sldId id="277" r:id="rId22"/>
+    <p:sldId id="259" r:id="rId23"/>
+    <p:sldId id="281" r:id="rId24"/>
+    <p:sldId id="282" r:id="rId25"/>
+    <p:sldId id="283" r:id="rId26"/>
+    <p:sldId id="260" r:id="rId27"/>
+    <p:sldId id="284" r:id="rId28"/>
+    <p:sldId id="288" r:id="rId29"/>
+    <p:sldId id="285" r:id="rId30"/>
+    <p:sldId id="289" r:id="rId31"/>
   </p:sldIdLst>
   <p:sldSz cx="12192000" cy="6858000"/>
   <p:notesSz cx="6858000" cy="9144000"/>
@@ -4417,7 +4417,7 @@
           <a:p>
             <a:fld id="{48A87A34-81AB-432B-8DAE-1953F412C126}" type="datetimeFigureOut">
               <a:rPr lang="en-US" dirty="0"/>
-              <a:t>7/8/2019</a:t>
+              <a:t>7/10/2019</a:t>
             </a:fld>
             <a:endParaRPr lang="en-US" dirty="0"/>
           </a:p>
@@ -4679,7 +4679,7 @@
           <a:p>
             <a:fld id="{48A87A34-81AB-432B-8DAE-1953F412C126}" type="datetimeFigureOut">
               <a:rPr lang="en-US" dirty="0"/>
-              <a:t>7/8/2019</a:t>
+              <a:t>7/10/2019</a:t>
             </a:fld>
             <a:endParaRPr lang="en-US" dirty="0"/>
           </a:p>
@@ -4870,7 +4870,7 @@
           <a:p>
             <a:fld id="{48A87A34-81AB-432B-8DAE-1953F412C126}" type="datetimeFigureOut">
               <a:rPr lang="en-US" dirty="0"/>
-              <a:t>7/8/2019</a:t>
+              <a:t>7/10/2019</a:t>
             </a:fld>
             <a:endParaRPr lang="en-US" dirty="0"/>
           </a:p>
@@ -5128,7 +5128,7 @@
           <a:p>
             <a:fld id="{48A87A34-81AB-432B-8DAE-1953F412C126}" type="datetimeFigureOut">
               <a:rPr lang="en-US" dirty="0"/>
-              <a:t>7/8/2019</a:t>
+              <a:t>7/10/2019</a:t>
             </a:fld>
             <a:endParaRPr lang="en-US" dirty="0"/>
           </a:p>
@@ -5557,7 +5557,7 @@
           <a:p>
             <a:fld id="{48A87A34-81AB-432B-8DAE-1953F412C126}" type="datetimeFigureOut">
               <a:rPr lang="en-US" dirty="0"/>
-              <a:t>7/8/2019</a:t>
+              <a:t>7/10/2019</a:t>
             </a:fld>
             <a:endParaRPr lang="en-US" dirty="0"/>
           </a:p>
@@ -6098,7 +6098,7 @@
           <a:p>
             <a:fld id="{48A87A34-81AB-432B-8DAE-1953F412C126}" type="datetimeFigureOut">
               <a:rPr lang="en-US" dirty="0"/>
-              <a:t>7/8/2019</a:t>
+              <a:t>7/10/2019</a:t>
             </a:fld>
             <a:endParaRPr lang="en-US" dirty="0"/>
           </a:p>
@@ -6813,7 +6813,7 @@
           <a:p>
             <a:fld id="{48A87A34-81AB-432B-8DAE-1953F412C126}" type="datetimeFigureOut">
               <a:rPr lang="en-US" dirty="0"/>
-              <a:t>7/8/2019</a:t>
+              <a:t>7/10/2019</a:t>
             </a:fld>
             <a:endParaRPr lang="en-US" dirty="0"/>
           </a:p>
@@ -6978,7 +6978,7 @@
           <a:p>
             <a:fld id="{48A87A34-81AB-432B-8DAE-1953F412C126}" type="datetimeFigureOut">
               <a:rPr lang="en-US" dirty="0"/>
-              <a:t>7/8/2019</a:t>
+              <a:t>7/10/2019</a:t>
             </a:fld>
             <a:endParaRPr lang="en-US" dirty="0"/>
           </a:p>
@@ -7153,7 +7153,7 @@
           <a:p>
             <a:fld id="{48A87A34-81AB-432B-8DAE-1953F412C126}" type="datetimeFigureOut">
               <a:rPr lang="en-US" dirty="0"/>
-              <a:t>7/8/2019</a:t>
+              <a:t>7/10/2019</a:t>
             </a:fld>
             <a:endParaRPr lang="en-US" dirty="0"/>
           </a:p>
@@ -7318,7 +7318,7 @@
           <a:p>
             <a:fld id="{48A87A34-81AB-432B-8DAE-1953F412C126}" type="datetimeFigureOut">
               <a:rPr lang="en-US" dirty="0"/>
-              <a:t>7/8/2019</a:t>
+              <a:t>7/10/2019</a:t>
             </a:fld>
             <a:endParaRPr lang="en-US" dirty="0"/>
           </a:p>
@@ -7563,7 +7563,7 @@
           <a:p>
             <a:fld id="{48A87A34-81AB-432B-8DAE-1953F412C126}" type="datetimeFigureOut">
               <a:rPr lang="en-US" dirty="0"/>
-              <a:t>7/8/2019</a:t>
+              <a:t>7/10/2019</a:t>
             </a:fld>
             <a:endParaRPr lang="en-US" dirty="0"/>
           </a:p>
@@ -7790,7 +7790,7 @@
           <a:p>
             <a:fld id="{48A87A34-81AB-432B-8DAE-1953F412C126}" type="datetimeFigureOut">
               <a:rPr lang="en-US" dirty="0"/>
-              <a:t>7/8/2019</a:t>
+              <a:t>7/10/2019</a:t>
             </a:fld>
             <a:endParaRPr lang="en-US" dirty="0"/>
           </a:p>
@@ -8166,7 +8166,7 @@
           <a:p>
             <a:fld id="{48A87A34-81AB-432B-8DAE-1953F412C126}" type="datetimeFigureOut">
               <a:rPr lang="en-US" dirty="0"/>
-              <a:t>7/8/2019</a:t>
+              <a:t>7/10/2019</a:t>
             </a:fld>
             <a:endParaRPr lang="en-US" dirty="0"/>
           </a:p>
@@ -8279,7 +8279,7 @@
           <a:p>
             <a:fld id="{48A87A34-81AB-432B-8DAE-1953F412C126}" type="datetimeFigureOut">
               <a:rPr lang="en-US" dirty="0"/>
-              <a:t>7/8/2019</a:t>
+              <a:t>7/10/2019</a:t>
             </a:fld>
             <a:endParaRPr lang="en-US" dirty="0"/>
           </a:p>
@@ -8369,7 +8369,7 @@
           <a:p>
             <a:fld id="{48A87A34-81AB-432B-8DAE-1953F412C126}" type="datetimeFigureOut">
               <a:rPr lang="en-US" dirty="0"/>
-              <a:t>7/8/2019</a:t>
+              <a:t>7/10/2019</a:t>
             </a:fld>
             <a:endParaRPr lang="en-US" dirty="0"/>
           </a:p>
@@ -8613,7 +8613,7 @@
           <a:p>
             <a:fld id="{48A87A34-81AB-432B-8DAE-1953F412C126}" type="datetimeFigureOut">
               <a:rPr lang="en-US" dirty="0"/>
-              <a:t>7/8/2019</a:t>
+              <a:t>7/10/2019</a:t>
             </a:fld>
             <a:endParaRPr lang="en-US" dirty="0"/>
           </a:p>
@@ -8888,7 +8888,7 @@
           <a:p>
             <a:fld id="{48A87A34-81AB-432B-8DAE-1953F412C126}" type="datetimeFigureOut">
               <a:rPr lang="en-US" dirty="0"/>
-              <a:t>7/8/2019</a:t>
+              <a:t>7/10/2019</a:t>
             </a:fld>
             <a:endParaRPr lang="en-US" dirty="0"/>
           </a:p>
@@ -11961,7 +11961,7 @@
             <a:fld id="{48A87A34-81AB-432B-8DAE-1953F412C126}" type="datetimeFigureOut">
               <a:rPr lang="en-US" dirty="0"/>
               <a:pPr/>
-              <a:t>7/8/2019</a:t>
+              <a:t>7/10/2019</a:t>
             </a:fld>
             <a:endParaRPr lang="en-US" dirty="0"/>
           </a:p>
@@ -12488,7 +12488,11 @@
           <a:p>
             <a:r>
               <a:rPr lang="en-US" dirty="0" err="1" smtClean="0"/>
-              <a:t>cIRCUITS</a:t>
+              <a:t>cIRCUIT</a:t>
+            </a:r>
+            <a:r>
+              <a:rPr lang="en-US" dirty="0" smtClean="0"/>
+              <a:t> symbols</a:t>
             </a:r>
             <a:endParaRPr lang="en-US" dirty="0"/>
           </a:p>
@@ -12509,28 +12513,40 @@
           <a:bodyPr/>
           <a:lstStyle/>
           <a:p>
-            <a:r>
-              <a:rPr lang="en-US" dirty="0" smtClean="0"/>
-              <a:t>What is a circuit</a:t>
-            </a:r>
-          </a:p>
-          <a:p>
-            <a:r>
-              <a:rPr lang="en-US" dirty="0" smtClean="0"/>
-              <a:t>Electrics / Electronics using Raspberry Pi</a:t>
-            </a:r>
-          </a:p>
-          <a:p>
-            <a:r>
-              <a:rPr lang="en-US" dirty="0" smtClean="0"/>
-              <a:t>How to read circuit diagrams</a:t>
-            </a:r>
+            <a:pPr marL="0" indent="0">
+              <a:buNone/>
+            </a:pPr>
+            <a:endParaRPr lang="en-US" dirty="0" smtClean="0"/>
           </a:p>
           <a:p>
             <a:endParaRPr lang="en-US" dirty="0"/>
           </a:p>
         </p:txBody>
       </p:sp>
+      <p:pic>
+        <p:nvPicPr>
+          <p:cNvPr id="11" name="Picture 10"/>
+          <p:cNvPicPr>
+            <a:picLocks noChangeAspect="1"/>
+          </p:cNvPicPr>
+          <p:nvPr/>
+        </p:nvPicPr>
+        <p:blipFill>
+          <a:blip r:embed="rId2"/>
+          <a:stretch>
+            <a:fillRect/>
+          </a:stretch>
+        </p:blipFill>
+        <p:spPr>
+          <a:xfrm>
+            <a:off x="2758860" y="1698652"/>
+            <a:ext cx="6671101" cy="4643383"/>
+          </a:xfrm>
+          <a:prstGeom prst="rect">
+            <a:avLst/>
+          </a:prstGeom>
+        </p:spPr>
+      </p:pic>
     </p:spTree>
     <p:extLst>
       <p:ext uri="{BB962C8B-B14F-4D97-AF65-F5344CB8AC3E}">
@@ -12577,8 +12593,16 @@
           <a:lstStyle/>
           <a:p>
             <a:r>
+              <a:rPr lang="en-US" dirty="0" err="1" smtClean="0"/>
+              <a:t>cIRCUIT</a:t>
+            </a:r>
+            <a:r>
               <a:rPr lang="en-US" dirty="0" smtClean="0"/>
-              <a:t>Raspberry Pi circuit</a:t>
+              <a:t> </a:t>
+            </a:r>
+            <a:r>
+              <a:rPr lang="en-US" dirty="0" err="1" smtClean="0"/>
+              <a:t>diagramS</a:t>
             </a:r>
             <a:endParaRPr lang="en-US" dirty="0"/>
           </a:p>
@@ -12599,18 +12623,92 @@
           <a:bodyPr/>
           <a:lstStyle/>
           <a:p>
-            <a:r>
-              <a:rPr lang="en-US" dirty="0" smtClean="0"/>
-              <a:t>Build the Raspberry Pi Circuit</a:t>
-            </a:r>
+            <a:pPr marL="0" indent="0">
+              <a:buNone/>
+            </a:pPr>
+            <a:endParaRPr lang="en-US" dirty="0" smtClean="0"/>
+          </a:p>
+          <a:p>
             <a:endParaRPr lang="en-US" dirty="0"/>
           </a:p>
         </p:txBody>
       </p:sp>
+      <p:pic>
+        <p:nvPicPr>
+          <p:cNvPr id="5" name="Picture 4"/>
+          <p:cNvPicPr>
+            <a:picLocks noChangeAspect="1"/>
+          </p:cNvPicPr>
+          <p:nvPr/>
+        </p:nvPicPr>
+        <p:blipFill>
+          <a:blip r:embed="rId2"/>
+          <a:stretch>
+            <a:fillRect/>
+          </a:stretch>
+        </p:blipFill>
+        <p:spPr>
+          <a:xfrm>
+            <a:off x="1141412" y="1861839"/>
+            <a:ext cx="3907200" cy="1977326"/>
+          </a:xfrm>
+          <a:prstGeom prst="rect">
+            <a:avLst/>
+          </a:prstGeom>
+        </p:spPr>
+      </p:pic>
+      <p:pic>
+        <p:nvPicPr>
+          <p:cNvPr id="6" name="Picture 5"/>
+          <p:cNvPicPr>
+            <a:picLocks noChangeAspect="1"/>
+          </p:cNvPicPr>
+          <p:nvPr/>
+        </p:nvPicPr>
+        <p:blipFill>
+          <a:blip r:embed="rId3"/>
+          <a:stretch>
+            <a:fillRect/>
+          </a:stretch>
+        </p:blipFill>
+        <p:spPr>
+          <a:xfrm>
+            <a:off x="5691282" y="1861839"/>
+            <a:ext cx="3907200" cy="1977326"/>
+          </a:xfrm>
+          <a:prstGeom prst="rect">
+            <a:avLst/>
+          </a:prstGeom>
+        </p:spPr>
+      </p:pic>
+      <p:pic>
+        <p:nvPicPr>
+          <p:cNvPr id="7" name="Picture 6"/>
+          <p:cNvPicPr>
+            <a:picLocks noChangeAspect="1"/>
+          </p:cNvPicPr>
+          <p:nvPr/>
+        </p:nvPicPr>
+        <p:blipFill>
+          <a:blip r:embed="rId4"/>
+          <a:stretch>
+            <a:fillRect/>
+          </a:stretch>
+        </p:blipFill>
+        <p:spPr>
+          <a:xfrm>
+            <a:off x="3554571" y="4328000"/>
+            <a:ext cx="3907200" cy="2232823"/>
+          </a:xfrm>
+          <a:prstGeom prst="rect">
+            <a:avLst/>
+          </a:prstGeom>
+        </p:spPr>
+      </p:pic>
     </p:spTree>
     <p:extLst>
       <p:ext uri="{BB962C8B-B14F-4D97-AF65-F5344CB8AC3E}">
-        <p14:creationId xmlns:p14="http://schemas.microsoft.com/office/powerpoint/2010/main" val="3169014870"/>
+        <p14:creationId xmlns:p14="http://schemas.microsoft.com/office/powerpoint/2010/main" val="1384871489"/>
       </p:ext>
     </p:extLst>
   </p:cSld>
@@ -12654,15 +12752,15 @@
           <a:p>
             <a:r>
               <a:rPr lang="en-US" dirty="0" smtClean="0"/>
-              <a:t>Day 2: let’s code!</a:t>
-            </a:r>
-            <a:endParaRPr lang="en-GB" dirty="0"/>
-          </a:p>
-        </p:txBody>
-      </p:sp>
-      <p:sp>
-        <p:nvSpPr>
-          <p:cNvPr id="3" name="Content Placeholder 2"/>
+              <a:t>Raspberry Pi circuit</a:t>
+            </a:r>
+            <a:endParaRPr lang="en-US" dirty="0"/>
+          </a:p>
+        </p:txBody>
+      </p:sp>
+      <p:sp>
+        <p:nvSpPr>
+          <p:cNvPr id="8" name="Content Placeholder 2"/>
           <p:cNvSpPr>
             <a:spLocks noGrp="1"/>
           </p:cNvSpPr>
@@ -12670,72 +12768,38 @@
             <p:ph idx="1"/>
           </p:nvPr>
         </p:nvSpPr>
-        <p:spPr/>
-        <p:txBody>
-          <a:bodyPr>
-            <a:normAutofit/>
-          </a:bodyPr>
+        <p:spPr>
+          <a:xfrm>
+            <a:off x="1141412" y="2249487"/>
+            <a:ext cx="9905999" cy="3541714"/>
+          </a:xfrm>
+        </p:spPr>
+        <p:txBody>
+          <a:bodyPr/>
           <a:lstStyle/>
           <a:p>
             <a:r>
-              <a:rPr lang="en-US" dirty="0"/>
-              <a:t>Programming Basics</a:t>
-            </a:r>
-          </a:p>
-          <a:p>
-            <a:pPr lvl="1"/>
-            <a:r>
-              <a:rPr lang="en-US" dirty="0"/>
-              <a:t>Functions</a:t>
-            </a:r>
-          </a:p>
-          <a:p>
-            <a:pPr lvl="1"/>
-            <a:r>
-              <a:rPr lang="en-US" dirty="0"/>
-              <a:t>Comments</a:t>
-            </a:r>
-          </a:p>
-          <a:p>
-            <a:pPr lvl="1"/>
-            <a:r>
-              <a:rPr lang="en-US" dirty="0"/>
-              <a:t>Variables</a:t>
-            </a:r>
-          </a:p>
-          <a:p>
-            <a:pPr lvl="1"/>
-            <a:r>
               <a:rPr lang="en-US" dirty="0" smtClean="0"/>
-              <a:t>Error Handling </a:t>
-            </a:r>
-            <a:endParaRPr lang="en-US" dirty="0"/>
-          </a:p>
-          <a:p>
+              <a:t>What </a:t>
+            </a:r>
             <a:r>
               <a:rPr lang="en-US" dirty="0" smtClean="0"/>
-              <a:t>Create </a:t>
-            </a:r>
-            <a:r>
-              <a:rPr lang="en-US" dirty="0"/>
-              <a:t>Email To Thom functionality</a:t>
-            </a:r>
-          </a:p>
-          <a:p>
-            <a:r>
-              <a:rPr lang="en-US" dirty="0"/>
-              <a:t>Send Email by Raspberry Pi</a:t>
-            </a:r>
-          </a:p>
-          <a:p>
-            <a:endParaRPr lang="en-GB" dirty="0"/>
+              <a:t>will this look like? Draw the circuit diagram</a:t>
+            </a:r>
+          </a:p>
+          <a:p>
+            <a:r>
+              <a:rPr lang="en-US" dirty="0" smtClean="0"/>
+              <a:t>Now build it!</a:t>
+            </a:r>
+            <a:endParaRPr lang="en-US" dirty="0" smtClean="0"/>
           </a:p>
         </p:txBody>
       </p:sp>
     </p:spTree>
     <p:extLst>
       <p:ext uri="{BB962C8B-B14F-4D97-AF65-F5344CB8AC3E}">
-        <p14:creationId xmlns:p14="http://schemas.microsoft.com/office/powerpoint/2010/main" val="1097960428"/>
+        <p14:creationId xmlns:p14="http://schemas.microsoft.com/office/powerpoint/2010/main" val="3169014870"/>
       </p:ext>
     </p:extLst>
   </p:cSld>
@@ -12779,41 +12843,95 @@
           <a:p>
             <a:r>
               <a:rPr lang="en-US" dirty="0" smtClean="0"/>
+              <a:t>Day 2: let’s code!</a:t>
+            </a:r>
+            <a:endParaRPr lang="en-GB" dirty="0"/>
+          </a:p>
+        </p:txBody>
+      </p:sp>
+      <p:sp>
+        <p:nvSpPr>
+          <p:cNvPr id="3" name="Content Placeholder 2"/>
+          <p:cNvSpPr>
+            <a:spLocks noGrp="1"/>
+          </p:cNvSpPr>
+          <p:nvPr>
+            <p:ph idx="1"/>
+          </p:nvPr>
+        </p:nvSpPr>
+        <p:spPr/>
+        <p:txBody>
+          <a:bodyPr>
+            <a:normAutofit fontScale="92500" lnSpcReduction="10000"/>
+          </a:bodyPr>
+          <a:lstStyle/>
+          <a:p>
+            <a:r>
+              <a:rPr lang="en-US" dirty="0" smtClean="0"/>
               <a:t>Recap</a:t>
             </a:r>
+          </a:p>
+          <a:p>
+            <a:r>
+              <a:rPr lang="en-US" dirty="0" smtClean="0"/>
+              <a:t>Programming concepts</a:t>
+            </a:r>
             <a:endParaRPr lang="en-US" dirty="0"/>
           </a:p>
-        </p:txBody>
-      </p:sp>
-      <p:sp>
-        <p:nvSpPr>
-          <p:cNvPr id="3" name="Content Placeholder 2"/>
-          <p:cNvSpPr>
-            <a:spLocks noGrp="1"/>
-          </p:cNvSpPr>
-          <p:nvPr>
-            <p:ph idx="1"/>
-          </p:nvPr>
-        </p:nvSpPr>
-        <p:spPr/>
-        <p:txBody>
-          <a:bodyPr/>
-          <a:lstStyle/>
-          <a:p>
+          <a:p>
+            <a:pPr lvl="1"/>
+            <a:r>
+              <a:rPr lang="en-US" dirty="0"/>
+              <a:t>Functions</a:t>
+            </a:r>
+          </a:p>
+          <a:p>
+            <a:pPr lvl="1"/>
+            <a:r>
+              <a:rPr lang="en-US" dirty="0"/>
+              <a:t>Comments</a:t>
+            </a:r>
+          </a:p>
+          <a:p>
+            <a:pPr lvl="1"/>
+            <a:r>
+              <a:rPr lang="en-US" dirty="0"/>
+              <a:t>Variables</a:t>
+            </a:r>
+          </a:p>
+          <a:p>
+            <a:pPr lvl="1"/>
             <a:r>
               <a:rPr lang="en-US" dirty="0" smtClean="0"/>
-              <a:t>Especially hello world</a:t>
-            </a:r>
-          </a:p>
-          <a:p>
+              <a:t>Error Handling </a:t>
+            </a:r>
             <a:endParaRPr lang="en-US" dirty="0"/>
+          </a:p>
+          <a:p>
+            <a:r>
+              <a:rPr lang="en-US" dirty="0" smtClean="0"/>
+              <a:t>Create </a:t>
+            </a:r>
+            <a:r>
+              <a:rPr lang="en-US" dirty="0"/>
+              <a:t>Email To Thom functionality</a:t>
+            </a:r>
+          </a:p>
+          <a:p>
+            <a:r>
+              <a:rPr lang="en-US" dirty="0"/>
+              <a:t>Send Email by Raspberry Pi</a:t>
+            </a:r>
+          </a:p>
+          <a:p>
+            <a:endParaRPr lang="en-GB" dirty="0"/>
           </a:p>
         </p:txBody>
       </p:sp>
     </p:spTree>
     <p:extLst>
       <p:ext uri="{BB962C8B-B14F-4D97-AF65-F5344CB8AC3E}">
-        <p14:creationId xmlns:p14="http://schemas.microsoft.com/office/powerpoint/2010/main" val="2180251118"/>
+        <p14:creationId xmlns:p14="http://schemas.microsoft.com/office/powerpoint/2010/main" val="1097960428"/>
       </p:ext>
     </p:extLst>
   </p:cSld>
@@ -12857,7 +12975,7 @@
           <a:p>
             <a:r>
               <a:rPr lang="en-US" dirty="0" smtClean="0"/>
-              <a:t>Programming Concepts</a:t>
+              <a:t>Recap</a:t>
             </a:r>
             <a:endParaRPr lang="en-US" dirty="0"/>
           </a:p>
@@ -12878,27 +12996,12 @@
           <a:bodyPr/>
           <a:lstStyle/>
           <a:p>
+            <a:pPr marL="0" indent="0">
+              <a:buNone/>
+            </a:pPr>
             <a:r>
               <a:rPr lang="en-US" dirty="0" smtClean="0"/>
-              <a:t>Keywords</a:t>
-            </a:r>
-          </a:p>
-          <a:p>
-            <a:r>
-              <a:rPr lang="en-US" dirty="0" smtClean="0"/>
-              <a:t>Strings / Numbers</a:t>
-            </a:r>
-          </a:p>
-          <a:p>
-            <a:r>
-              <a:rPr lang="en-US" dirty="0" smtClean="0"/>
-              <a:t>Variables</a:t>
-            </a:r>
-          </a:p>
-          <a:p>
-            <a:r>
-              <a:rPr lang="en-US" dirty="0" smtClean="0"/>
-              <a:t>Comments</a:t>
+              <a:t>What did we cover yesterday?</a:t>
             </a:r>
             <a:endParaRPr lang="en-US" dirty="0"/>
           </a:p>
@@ -12907,7 +13010,7 @@
     </p:spTree>
     <p:extLst>
       <p:ext uri="{BB962C8B-B14F-4D97-AF65-F5344CB8AC3E}">
-        <p14:creationId xmlns:p14="http://schemas.microsoft.com/office/powerpoint/2010/main" val="2686902082"/>
+        <p14:creationId xmlns:p14="http://schemas.microsoft.com/office/powerpoint/2010/main" val="2180251118"/>
       </p:ext>
     </p:extLst>
   </p:cSld>
@@ -12946,42 +13049,69 @@
         </p:nvSpPr>
         <p:spPr/>
         <p:txBody>
-          <a:bodyPr>
-            <a:normAutofit/>
-          </a:bodyPr>
-          <a:lstStyle/>
-          <a:p>
-            <a:r>
-              <a:rPr lang="en-US" dirty="0" smtClean="0"/>
-              <a:t>Break</a:t>
-            </a:r>
-            <a:endParaRPr lang="en-US" dirty="0"/>
-          </a:p>
-        </p:txBody>
-      </p:sp>
-      <p:sp>
-        <p:nvSpPr>
-          <p:cNvPr id="3" name="Content Placeholder 2"/>
-          <p:cNvSpPr>
-            <a:spLocks noGrp="1"/>
-          </p:cNvSpPr>
-          <p:nvPr>
-            <p:ph idx="1"/>
-          </p:nvPr>
-        </p:nvSpPr>
-        <p:spPr/>
-        <p:txBody>
           <a:bodyPr/>
           <a:lstStyle/>
           <a:p>
-            <a:endParaRPr lang="en-US"/>
+            <a:r>
+              <a:rPr lang="en-US" dirty="0" smtClean="0"/>
+              <a:t>Programming basics</a:t>
+            </a:r>
+            <a:endParaRPr lang="en-US" dirty="0"/>
+          </a:p>
+        </p:txBody>
+      </p:sp>
+      <p:sp>
+        <p:nvSpPr>
+          <p:cNvPr id="3" name="Content Placeholder 2"/>
+          <p:cNvSpPr>
+            <a:spLocks noGrp="1"/>
+          </p:cNvSpPr>
+          <p:nvPr>
+            <p:ph idx="1"/>
+          </p:nvPr>
+        </p:nvSpPr>
+        <p:spPr/>
+        <p:txBody>
+          <a:bodyPr/>
+          <a:lstStyle/>
+          <a:p>
+            <a:r>
+              <a:rPr lang="en-US" dirty="0" smtClean="0"/>
+              <a:t>Keywords – which keyword have we already come across?</a:t>
+            </a:r>
+            <a:endParaRPr lang="en-US" dirty="0" smtClean="0"/>
+          </a:p>
+          <a:p>
+            <a:r>
+              <a:rPr lang="en-US" dirty="0" smtClean="0"/>
+              <a:t>Strings / </a:t>
+            </a:r>
+            <a:r>
+              <a:rPr lang="en-US" dirty="0" smtClean="0"/>
+              <a:t>Numbers – how can you tell the difference?</a:t>
+            </a:r>
+            <a:endParaRPr lang="en-US" dirty="0" smtClean="0"/>
+          </a:p>
+          <a:p>
+            <a:r>
+              <a:rPr lang="en-US" dirty="0" smtClean="0"/>
+              <a:t>Variables – why would you need these?</a:t>
+            </a:r>
+            <a:endParaRPr lang="en-US" dirty="0" smtClean="0"/>
+          </a:p>
+          <a:p>
+            <a:r>
+              <a:rPr lang="en-US" dirty="0" smtClean="0"/>
+              <a:t>Comments – why would you need these?</a:t>
+            </a:r>
+            <a:endParaRPr lang="en-US" dirty="0"/>
           </a:p>
         </p:txBody>
       </p:sp>
     </p:spTree>
     <p:extLst>
       <p:ext uri="{BB962C8B-B14F-4D97-AF65-F5344CB8AC3E}">
-        <p14:creationId xmlns:p14="http://schemas.microsoft.com/office/powerpoint/2010/main" val="3920042752"/>
+        <p14:creationId xmlns:p14="http://schemas.microsoft.com/office/powerpoint/2010/main" val="2686902082"/>
       </p:ext>
     </p:extLst>
   </p:cSld>
@@ -13025,7 +13155,7 @@
           <a:p>
             <a:r>
               <a:rPr lang="en-US" dirty="0" smtClean="0"/>
-              <a:t>Programming concepts</a:t>
+              <a:t>Programming functions</a:t>
             </a:r>
             <a:endParaRPr lang="en-US" dirty="0"/>
           </a:p>
@@ -13048,35 +13178,45 @@
           <a:p>
             <a:r>
               <a:rPr lang="en-US" dirty="0" smtClean="0"/>
-              <a:t>Functions</a:t>
-            </a:r>
-          </a:p>
-          <a:p>
-            <a:pPr lvl="1"/>
+              <a:t>How do you write a function?</a:t>
+            </a:r>
+            <a:endParaRPr lang="en-US" dirty="0" smtClean="0"/>
+          </a:p>
+          <a:p>
             <a:r>
               <a:rPr lang="en-US" dirty="0" smtClean="0"/>
-              <a:t>Writing functions</a:t>
-            </a:r>
-          </a:p>
-          <a:p>
-            <a:pPr lvl="1"/>
+              <a:t>How do you call a function?</a:t>
+            </a:r>
+            <a:endParaRPr lang="en-US" dirty="0" smtClean="0"/>
+          </a:p>
+          <a:p>
             <a:r>
               <a:rPr lang="en-US" dirty="0" smtClean="0"/>
-              <a:t>Calling functions</a:t>
-            </a:r>
-          </a:p>
-          <a:p>
-            <a:pPr lvl="1"/>
+              <a:t>How do you use parameters within functions? And why would you want to?</a:t>
+            </a:r>
+            <a:endParaRPr lang="en-US" dirty="0" smtClean="0"/>
+          </a:p>
+          <a:p>
             <a:r>
               <a:rPr lang="en-US" dirty="0" smtClean="0"/>
-              <a:t>Passing parameters to functions</a:t>
-            </a:r>
-          </a:p>
-          <a:p>
-            <a:pPr lvl="1"/>
+              <a:t>How do you return </a:t>
+            </a:r>
             <a:r>
               <a:rPr lang="en-US" dirty="0" smtClean="0"/>
-              <a:t>Returning values from functions</a:t>
+              <a:t>values from </a:t>
+            </a:r>
+            <a:r>
+              <a:rPr lang="en-US" dirty="0" smtClean="0"/>
+              <a:t>functions? And why would you want to?</a:t>
+            </a:r>
+          </a:p>
+          <a:p>
+            <a:pPr marL="0" indent="0">
+              <a:buNone/>
+            </a:pPr>
+            <a:r>
+              <a:rPr lang="en-US" dirty="0" smtClean="0"/>
+              <a:t>Q: What is the difference between a variable, a parameter and a value?</a:t>
             </a:r>
             <a:endParaRPr lang="en-US" dirty="0"/>
           </a:p>
@@ -13129,7 +13269,7 @@
           <a:p>
             <a:r>
               <a:rPr lang="en-US" dirty="0" smtClean="0"/>
-              <a:t>Program – Hello [name]</a:t>
+              <a:t>Importing libraries</a:t>
             </a:r>
             <a:endParaRPr lang="en-US" dirty="0"/>
           </a:p>
@@ -13150,6 +13290,34 @@
           <a:bodyPr/>
           <a:lstStyle/>
           <a:p>
+            <a:r>
+              <a:rPr lang="en-US" dirty="0" smtClean="0"/>
+              <a:t>What is a library?</a:t>
+            </a:r>
+          </a:p>
+          <a:p>
+            <a:r>
+              <a:rPr lang="en-US" dirty="0" smtClean="0"/>
+              <a:t>Why would you want to use one?</a:t>
+            </a:r>
+            <a:endParaRPr lang="en-US" dirty="0" smtClean="0"/>
+          </a:p>
+          <a:p>
+            <a:r>
+              <a:rPr lang="en-US" dirty="0" smtClean="0"/>
+              <a:t>Where is this </a:t>
+            </a:r>
+            <a:r>
+              <a:rPr lang="en-US" dirty="0" smtClean="0"/>
+              <a:t>code stored?</a:t>
+            </a:r>
+            <a:endParaRPr lang="en-US" dirty="0" smtClean="0"/>
+          </a:p>
+          <a:p>
+            <a:r>
+              <a:rPr lang="en-US" dirty="0" smtClean="0"/>
+              <a:t>Can you build your own?</a:t>
+            </a:r>
             <a:endParaRPr lang="en-US" dirty="0"/>
           </a:p>
         </p:txBody>
@@ -13157,7 +13325,7 @@
     </p:spTree>
     <p:extLst>
       <p:ext uri="{BB962C8B-B14F-4D97-AF65-F5344CB8AC3E}">
-        <p14:creationId xmlns:p14="http://schemas.microsoft.com/office/powerpoint/2010/main" val="4174675986"/>
+        <p14:creationId xmlns:p14="http://schemas.microsoft.com/office/powerpoint/2010/main" val="1877813157"/>
       </p:ext>
     </p:extLst>
   </p:cSld>
@@ -13201,7 +13369,7 @@
           <a:p>
             <a:r>
               <a:rPr lang="en-US" dirty="0" smtClean="0"/>
-              <a:t>Importing libraries</a:t>
+              <a:t>Raspberry Pi Software</a:t>
             </a:r>
             <a:endParaRPr lang="en-US" dirty="0"/>
           </a:p>
@@ -13222,21 +13390,73 @@
           <a:bodyPr/>
           <a:lstStyle/>
           <a:p>
+            <a:pPr marL="0" indent="0">
+              <a:buNone/>
+            </a:pPr>
             <a:r>
               <a:rPr lang="en-US" dirty="0" smtClean="0"/>
-              <a:t>Why?</a:t>
-            </a:r>
-          </a:p>
-          <a:p>
+              <a:t>1) Copy </a:t>
+            </a:r>
             <a:r>
               <a:rPr lang="en-US" dirty="0" smtClean="0"/>
-              <a:t>Where is this code?</a:t>
-            </a:r>
-          </a:p>
-          <a:p>
+              <a:t>source code</a:t>
+            </a:r>
+          </a:p>
+          <a:p>
+            <a:pPr marL="0" indent="0">
+              <a:buNone/>
+            </a:pPr>
             <a:r>
               <a:rPr lang="en-US" dirty="0" smtClean="0"/>
-              <a:t>Can you build your own?</a:t>
+              <a:t>2) Run the code</a:t>
+            </a:r>
+            <a:endParaRPr lang="en-US" dirty="0" smtClean="0"/>
+          </a:p>
+          <a:p>
+            <a:pPr marL="0" indent="0">
+              <a:buNone/>
+            </a:pPr>
+            <a:r>
+              <a:rPr lang="en-US" dirty="0" smtClean="0"/>
+              <a:t>3) Explain </a:t>
+            </a:r>
+            <a:r>
+              <a:rPr lang="en-US" dirty="0" smtClean="0"/>
+              <a:t>it</a:t>
+            </a:r>
+          </a:p>
+          <a:p>
+            <a:pPr marL="0" indent="0">
+              <a:buNone/>
+            </a:pPr>
+            <a:r>
+              <a:rPr lang="en-US" dirty="0" smtClean="0"/>
+              <a:t>4) Change the code so the </a:t>
+            </a:r>
+            <a:r>
+              <a:rPr lang="en-US" dirty="0" smtClean="0"/>
+              <a:t>light </a:t>
+            </a:r>
+            <a:r>
+              <a:rPr lang="en-US" dirty="0" smtClean="0"/>
+              <a:t>remains on </a:t>
+            </a:r>
+            <a:r>
+              <a:rPr lang="en-US" dirty="0" smtClean="0"/>
+              <a:t>for 5 seconds after pushing </a:t>
+            </a:r>
+            <a:r>
+              <a:rPr lang="en-US" dirty="0" smtClean="0"/>
+              <a:t>button</a:t>
+            </a:r>
+          </a:p>
+          <a:p>
+            <a:pPr marL="0" indent="0">
+              <a:buNone/>
+            </a:pPr>
+            <a:r>
+              <a:rPr lang="en-US" dirty="0" smtClean="0"/>
+              <a:t>5) Test it</a:t>
             </a:r>
             <a:endParaRPr lang="en-US" dirty="0"/>
           </a:p>
@@ -13245,7 +13465,7 @@
     </p:spTree>
     <p:extLst>
       <p:ext uri="{BB962C8B-B14F-4D97-AF65-F5344CB8AC3E}">
-        <p14:creationId xmlns:p14="http://schemas.microsoft.com/office/powerpoint/2010/main" val="1877813157"/>
+        <p14:creationId xmlns:p14="http://schemas.microsoft.com/office/powerpoint/2010/main" val="2634014740"/>
       </p:ext>
     </p:extLst>
   </p:cSld>
@@ -13289,7 +13509,7 @@
           <a:p>
             <a:r>
               <a:rPr lang="en-US" dirty="0" smtClean="0"/>
-              <a:t>Raspberry Pi Software</a:t>
+              <a:t>Send an email</a:t>
             </a:r>
             <a:endParaRPr lang="en-US" dirty="0"/>
           </a:p>
@@ -13312,25 +13532,61 @@
           <a:p>
             <a:r>
               <a:rPr lang="en-US" dirty="0" smtClean="0"/>
-              <a:t>Copy source code</a:t>
-            </a:r>
-          </a:p>
-          <a:p>
+              <a:t>Review and edit the code</a:t>
+            </a:r>
+            <a:endParaRPr lang="en-US" dirty="0" smtClean="0"/>
+          </a:p>
+          <a:p>
+            <a:pPr lvl="1"/>
             <a:r>
               <a:rPr lang="en-US" dirty="0" smtClean="0"/>
-              <a:t>Run it</a:t>
-            </a:r>
-          </a:p>
-          <a:p>
+              <a:t>To: </a:t>
+            </a:r>
+            <a:r>
+              <a:rPr lang="en-US" dirty="0" smtClean="0">
+                <a:hlinkClick r:id="rId2"/>
+              </a:rPr>
+              <a:t>Thom.Christensen@Schroders.com</a:t>
+            </a:r>
+            <a:endParaRPr lang="en-US" dirty="0" smtClean="0"/>
+          </a:p>
+          <a:p>
+            <a:pPr lvl="1"/>
             <a:r>
               <a:rPr lang="en-US" dirty="0" smtClean="0"/>
-              <a:t>Explain it</a:t>
-            </a:r>
-          </a:p>
-          <a:p>
+              <a:t>Subject: Sending a test email from my raspberry pi</a:t>
+            </a:r>
+          </a:p>
+          <a:p>
+            <a:pPr lvl="1"/>
             <a:r>
               <a:rPr lang="en-US" dirty="0" smtClean="0"/>
-              <a:t>Change – leave light on for 5 seconds after pushing button</a:t>
+              <a:t>Body: Make something </a:t>
+            </a:r>
+            <a:r>
+              <a:rPr lang="en-US" dirty="0" smtClean="0"/>
+              <a:t>up!</a:t>
+            </a:r>
+            <a:endParaRPr lang="en-US" dirty="0" smtClean="0"/>
+          </a:p>
+          <a:p>
+            <a:r>
+              <a:rPr lang="en-US" dirty="0" smtClean="0"/>
+              <a:t>Test it</a:t>
+            </a:r>
+            <a:endParaRPr lang="en-US" dirty="0" smtClean="0"/>
+          </a:p>
+          <a:p>
+            <a:r>
+              <a:rPr lang="en-US" dirty="0" smtClean="0"/>
+              <a:t>Embed the code into a function</a:t>
+            </a:r>
+            <a:endParaRPr lang="en-US" dirty="0" smtClean="0"/>
+          </a:p>
+          <a:p>
+            <a:r>
+              <a:rPr lang="en-US" dirty="0" smtClean="0"/>
+              <a:t>Test it</a:t>
             </a:r>
             <a:endParaRPr lang="en-US" dirty="0"/>
           </a:p>
@@ -13339,7 +13595,7 @@
     </p:spTree>
     <p:extLst>
       <p:ext uri="{BB962C8B-B14F-4D97-AF65-F5344CB8AC3E}">
-        <p14:creationId xmlns:p14="http://schemas.microsoft.com/office/powerpoint/2010/main" val="2634014740"/>
+        <p14:creationId xmlns:p14="http://schemas.microsoft.com/office/powerpoint/2010/main" val="2500281021"/>
       </p:ext>
     </p:extLst>
   </p:cSld>
@@ -13402,93 +13658,64 @@
         <p:spPr/>
         <p:txBody>
           <a:bodyPr>
-            <a:normAutofit fontScale="62500" lnSpcReduction="20000"/>
+            <a:normAutofit fontScale="85000" lnSpcReduction="20000"/>
           </a:bodyPr>
           <a:lstStyle/>
           <a:p>
             <a:r>
+              <a:rPr lang="en-US" dirty="0" smtClean="0"/>
+              <a:t>Introductions</a:t>
+            </a:r>
+            <a:endParaRPr lang="en-US" dirty="0"/>
+          </a:p>
+          <a:p>
+            <a:r>
               <a:rPr lang="en-US" dirty="0"/>
-              <a:t>Introduction to the team</a:t>
-            </a:r>
-          </a:p>
-          <a:p>
-            <a:r>
-              <a:rPr lang="en-US" dirty="0"/>
-              <a:t>Project Review</a:t>
-            </a:r>
-          </a:p>
-          <a:p>
-            <a:r>
-              <a:rPr lang="en-US" dirty="0"/>
-              <a:t>Business Context</a:t>
-            </a:r>
-          </a:p>
-          <a:p>
-            <a:r>
-              <a:rPr lang="en-US" dirty="0"/>
-              <a:t>Introducing the Raspberry Pi</a:t>
-            </a:r>
-          </a:p>
-          <a:p>
-            <a:pPr lvl="1"/>
-            <a:r>
-              <a:rPr lang="en-US" dirty="0"/>
-              <a:t>(Pre-</a:t>
-            </a:r>
-            <a:r>
-              <a:rPr lang="en-US" dirty="0" err="1"/>
-              <a:t>config</a:t>
-            </a:r>
-            <a:r>
-              <a:rPr lang="en-US" dirty="0"/>
-              <a:t> </a:t>
-            </a:r>
-            <a:r>
-              <a:rPr lang="en-US" dirty="0" err="1"/>
-              <a:t>wifi</a:t>
-            </a:r>
-            <a:r>
-              <a:rPr lang="en-US" dirty="0"/>
-              <a:t> and hostname)</a:t>
-            </a:r>
-          </a:p>
-          <a:p>
-            <a:pPr lvl="1"/>
-            <a:r>
-              <a:rPr lang="en-US" dirty="0"/>
-              <a:t>Basic Linux Command Line (?)</a:t>
-            </a:r>
-          </a:p>
-          <a:p>
-            <a:r>
-              <a:rPr lang="en-US" dirty="0"/>
-              <a:t>What is Python</a:t>
-            </a:r>
-          </a:p>
-          <a:p>
-            <a:r>
-              <a:rPr lang="en-US" dirty="0"/>
-              <a:t>Getting the source code (</a:t>
-            </a:r>
-            <a:r>
-              <a:rPr lang="en-US" dirty="0" err="1"/>
-              <a:t>Git</a:t>
-            </a:r>
-            <a:r>
-              <a:rPr lang="en-US" dirty="0"/>
-              <a:t>) (?)</a:t>
-            </a:r>
-          </a:p>
-          <a:p>
+              <a:t>Project o</a:t>
+            </a:r>
             <a:r>
               <a:rPr lang="en-US" dirty="0" smtClean="0"/>
-              <a:t>“Hello World!”</a:t>
-            </a:r>
+              <a:t>utline</a:t>
+            </a:r>
+            <a:endParaRPr lang="en-US" dirty="0"/>
           </a:p>
           <a:p>
             <a:r>
               <a:rPr lang="en-US" dirty="0" smtClean="0"/>
-              <a:t>Wiring up the Raspberry Pi</a:t>
+              <a:t>Business background</a:t>
+            </a:r>
+            <a:endParaRPr lang="en-US" dirty="0"/>
+          </a:p>
+          <a:p>
+            <a:r>
+              <a:rPr lang="en-US" dirty="0" smtClean="0"/>
+              <a:t>Technology overview</a:t>
+            </a:r>
+            <a:endParaRPr lang="en-US" dirty="0"/>
+          </a:p>
+          <a:p>
+            <a:r>
+              <a:rPr lang="en-US" dirty="0" smtClean="0"/>
+              <a:t>Intro to Raspberry Pi</a:t>
+            </a:r>
+            <a:endParaRPr lang="en-US" dirty="0"/>
+          </a:p>
+          <a:p>
+            <a:r>
+              <a:rPr lang="en-US" dirty="0" smtClean="0"/>
+              <a:t>Python</a:t>
+            </a:r>
+          </a:p>
+          <a:p>
+            <a:r>
+              <a:rPr lang="en-US" dirty="0" smtClean="0"/>
+              <a:t>Circuits</a:t>
+            </a:r>
+          </a:p>
+          <a:p>
+            <a:r>
+              <a:rPr lang="en-US" dirty="0" smtClean="0"/>
+              <a:t>Raspberry Pi circuit</a:t>
             </a:r>
           </a:p>
           <a:p>
@@ -13546,7 +13773,7 @@
           <a:p>
             <a:r>
               <a:rPr lang="en-US" dirty="0" smtClean="0"/>
-              <a:t>Break</a:t>
+              <a:t>Build a class</a:t>
             </a:r>
             <a:endParaRPr lang="en-US" dirty="0"/>
           </a:p>
@@ -13567,14 +13794,42 @@
           <a:bodyPr/>
           <a:lstStyle/>
           <a:p>
-            <a:endParaRPr lang="en-US"/>
+            <a:r>
+              <a:rPr lang="en-US" dirty="0" smtClean="0"/>
+              <a:t>What is a </a:t>
+            </a:r>
+            <a:r>
+              <a:rPr lang="en-US" dirty="0" smtClean="0"/>
+              <a:t>class?</a:t>
+            </a:r>
+            <a:endParaRPr lang="en-US" dirty="0" smtClean="0"/>
+          </a:p>
+          <a:p>
+            <a:r>
+              <a:rPr lang="en-US" dirty="0" smtClean="0"/>
+              <a:t>Why would we use classes?</a:t>
+            </a:r>
+            <a:endParaRPr lang="en-US" dirty="0" smtClean="0"/>
+          </a:p>
+          <a:p>
+            <a:r>
+              <a:rPr lang="en-US" dirty="0" smtClean="0"/>
+              <a:t>How would you use classes?</a:t>
+            </a:r>
+          </a:p>
+          <a:p>
+            <a:r>
+              <a:rPr lang="en-US" dirty="0" smtClean="0"/>
+              <a:t>What is Object Oriented Programming (OOP)?</a:t>
+            </a:r>
+            <a:endParaRPr lang="en-US" dirty="0"/>
           </a:p>
         </p:txBody>
       </p:sp>
     </p:spTree>
     <p:extLst>
       <p:ext uri="{BB962C8B-B14F-4D97-AF65-F5344CB8AC3E}">
-        <p14:creationId xmlns:p14="http://schemas.microsoft.com/office/powerpoint/2010/main" val="367889435"/>
+        <p14:creationId xmlns:p14="http://schemas.microsoft.com/office/powerpoint/2010/main" val="2967063638"/>
       </p:ext>
     </p:extLst>
   </p:cSld>
@@ -13618,7 +13873,7 @@
           <a:p>
             <a:r>
               <a:rPr lang="en-US" dirty="0" smtClean="0"/>
-              <a:t>Send an email</a:t>
+              <a:t>Enhanced send an email</a:t>
             </a:r>
             <a:endParaRPr lang="en-US" dirty="0"/>
           </a:p>
@@ -13641,53 +13896,37 @@
           <a:p>
             <a:r>
               <a:rPr lang="en-US" dirty="0" smtClean="0"/>
-              <a:t>Basic send email code</a:t>
-            </a:r>
-          </a:p>
-          <a:p>
-            <a:pPr lvl="1"/>
+              <a:t>Take </a:t>
+            </a:r>
             <a:r>
               <a:rPr lang="en-US" dirty="0" smtClean="0"/>
-              <a:t>To: </a:t>
-            </a:r>
-            <a:r>
-              <a:rPr lang="en-US" dirty="0" smtClean="0">
-                <a:hlinkClick r:id="rId2"/>
-              </a:rPr>
-              <a:t>Thom.Christensen@Schroders.com</a:t>
-            </a:r>
-            <a:endParaRPr lang="en-US" dirty="0" smtClean="0"/>
-          </a:p>
-          <a:p>
-            <a:pPr lvl="1"/>
+              <a:t>your email </a:t>
+            </a:r>
             <a:r>
               <a:rPr lang="en-US" dirty="0" smtClean="0"/>
-              <a:t>Subject: Sending a test email from my raspberry pi</a:t>
-            </a:r>
-          </a:p>
-          <a:p>
-            <a:pPr lvl="1"/>
+              <a:t>function and put it in a class</a:t>
+            </a:r>
+          </a:p>
+          <a:p>
             <a:r>
               <a:rPr lang="en-US" dirty="0" smtClean="0"/>
-              <a:t>Body: Make something up :-)</a:t>
-            </a:r>
-          </a:p>
-          <a:p>
+              <a:t>Add functionality to push button to turn </a:t>
+            </a:r>
             <a:r>
               <a:rPr lang="en-US" dirty="0" smtClean="0"/>
-              <a:t>Not in a function (Sami’s example)</a:t>
+              <a:t>on light and send the email when button is pressed</a:t>
             </a:r>
           </a:p>
           <a:p>
             <a:r>
               <a:rPr lang="en-US" dirty="0" smtClean="0"/>
-              <a:t>Test it</a:t>
+              <a:t>Count the number of times the button is pressed</a:t>
             </a:r>
           </a:p>
           <a:p>
             <a:r>
               <a:rPr lang="en-US" dirty="0" smtClean="0"/>
-              <a:t>Put it in a function &amp; test</a:t>
+              <a:t>Save the number of times the button is pressed between reboots</a:t>
             </a:r>
             <a:endParaRPr lang="en-US" dirty="0"/>
           </a:p>
@@ -13696,7 +13935,7 @@
     </p:spTree>
     <p:extLst>
       <p:ext uri="{BB962C8B-B14F-4D97-AF65-F5344CB8AC3E}">
-        <p14:creationId xmlns:p14="http://schemas.microsoft.com/office/powerpoint/2010/main" val="2500281021"/>
+        <p14:creationId xmlns:p14="http://schemas.microsoft.com/office/powerpoint/2010/main" val="3997814917"/>
       </p:ext>
     </p:extLst>
   </p:cSld>
@@ -13740,9 +13979,9 @@
           <a:p>
             <a:r>
               <a:rPr lang="en-US" dirty="0" smtClean="0"/>
-              <a:t>Build a class</a:t>
-            </a:r>
-            <a:endParaRPr lang="en-US" dirty="0"/>
+              <a:t>Day 3: working with the business</a:t>
+            </a:r>
+            <a:endParaRPr lang="en-GB" dirty="0"/>
           </a:p>
         </p:txBody>
       </p:sp>
@@ -13762,29 +14001,70 @@
           <a:lstStyle/>
           <a:p>
             <a:r>
+              <a:rPr lang="en-US" dirty="0"/>
+              <a:t>The basics of Service Management</a:t>
+            </a:r>
+          </a:p>
+          <a:p>
+            <a:r>
+              <a:rPr lang="en-US" dirty="0"/>
+              <a:t>Introduction to </a:t>
+            </a:r>
+            <a:r>
+              <a:rPr lang="en-US" dirty="0" err="1"/>
+              <a:t>ServiceNow</a:t>
+            </a:r>
+            <a:endParaRPr lang="en-US" dirty="0"/>
+          </a:p>
+          <a:p>
+            <a:r>
+              <a:rPr lang="en-US" dirty="0"/>
+              <a:t>Send </a:t>
+            </a:r>
+            <a:r>
               <a:rPr lang="en-US" dirty="0" smtClean="0"/>
-              <a:t>What is a class</a:t>
-            </a:r>
-          </a:p>
-          <a:p>
-            <a:r>
-              <a:rPr lang="en-US" dirty="0" smtClean="0"/>
-              <a:t>Why?</a:t>
-            </a:r>
-          </a:p>
-          <a:p>
-            <a:r>
-              <a:rPr lang="en-US" dirty="0" smtClean="0"/>
-              <a:t>How?</a:t>
+              <a:t>an alert </a:t>
+            </a:r>
+            <a:r>
+              <a:rPr lang="en-US" dirty="0"/>
+              <a:t>to </a:t>
+            </a:r>
+            <a:r>
+              <a:rPr lang="en-US" dirty="0" err="1"/>
+              <a:t>ServiceNow</a:t>
             </a:r>
             <a:endParaRPr lang="en-US" dirty="0"/>
+          </a:p>
+          <a:p>
+            <a:r>
+              <a:rPr lang="en-US" dirty="0"/>
+              <a:t>Reporting on issues</a:t>
+            </a:r>
+          </a:p>
+          <a:p>
+            <a:r>
+              <a:rPr lang="en-US" dirty="0"/>
+              <a:t>Device Registration</a:t>
+            </a:r>
+          </a:p>
+          <a:p>
+            <a:r>
+              <a:rPr lang="en-US" dirty="0"/>
+              <a:t>Ticket validation / Preventing Spam</a:t>
+            </a:r>
+          </a:p>
+          <a:p>
+            <a:endParaRPr lang="en-US" dirty="0"/>
+          </a:p>
+          <a:p>
+            <a:endParaRPr lang="en-GB" dirty="0"/>
           </a:p>
         </p:txBody>
       </p:sp>
     </p:spTree>
     <p:extLst>
       <p:ext uri="{BB962C8B-B14F-4D97-AF65-F5344CB8AC3E}">
-        <p14:creationId xmlns:p14="http://schemas.microsoft.com/office/powerpoint/2010/main" val="2967063638"/>
+        <p14:creationId xmlns:p14="http://schemas.microsoft.com/office/powerpoint/2010/main" val="138573571"/>
       </p:ext>
     </p:extLst>
   </p:cSld>
@@ -13828,7 +14108,7 @@
           <a:p>
             <a:r>
               <a:rPr lang="en-US" dirty="0" smtClean="0"/>
-              <a:t>Enhanced send an email</a:t>
+              <a:t>Service Management</a:t>
             </a:r>
             <a:endParaRPr lang="en-US" dirty="0"/>
           </a:p>
@@ -13851,26 +14131,63 @@
           <a:p>
             <a:r>
               <a:rPr lang="en-US" dirty="0" smtClean="0"/>
-              <a:t>Take email function and put it in a class</a:t>
+              <a:t>Why is this needed?</a:t>
             </a:r>
           </a:p>
           <a:p>
             <a:r>
               <a:rPr lang="en-US" dirty="0" smtClean="0"/>
-              <a:t>Import into push button, and turn on light and send the email when button is pressed</a:t>
-            </a:r>
-          </a:p>
-          <a:p>
+              <a:t>What </a:t>
+            </a:r>
             <a:r>
               <a:rPr lang="en-US" dirty="0" smtClean="0"/>
-              <a:t>Count the number of times the button is pressed</a:t>
-            </a:r>
-          </a:p>
-          <a:p>
+              <a:t>does </a:t>
+            </a:r>
+            <a:r>
+              <a:rPr lang="en-US" dirty="0" err="1" smtClean="0"/>
+              <a:t>ServiceNow</a:t>
+            </a:r>
             <a:r>
               <a:rPr lang="en-US" dirty="0" smtClean="0"/>
-              <a:t>Save the number of times the button is pressed between reboots</a:t>
-            </a:r>
+              <a:t> do?</a:t>
+            </a:r>
+            <a:endParaRPr lang="en-US" dirty="0" smtClean="0"/>
+          </a:p>
+          <a:p>
+            <a:r>
+              <a:rPr lang="en-US" dirty="0" smtClean="0"/>
+              <a:t>What is the i</a:t>
+            </a:r>
+            <a:r>
+              <a:rPr lang="en-US" dirty="0" smtClean="0"/>
+              <a:t>ssue lifecycle?</a:t>
+            </a:r>
+            <a:endParaRPr lang="en-US" dirty="0" smtClean="0"/>
+          </a:p>
+          <a:p>
+            <a:r>
+              <a:rPr lang="en-US" dirty="0" smtClean="0"/>
+              <a:t>How do we s</a:t>
+            </a:r>
+            <a:r>
+              <a:rPr lang="en-US" dirty="0" smtClean="0"/>
+              <a:t>end </a:t>
+            </a:r>
+            <a:r>
+              <a:rPr lang="en-US" dirty="0" smtClean="0"/>
+              <a:t>an alert to </a:t>
+            </a:r>
+            <a:r>
+              <a:rPr lang="en-US" dirty="0" err="1" smtClean="0"/>
+              <a:t>ServiceNow</a:t>
+            </a:r>
+            <a:r>
+              <a:rPr lang="en-US" dirty="0" smtClean="0"/>
+              <a:t>?</a:t>
+            </a:r>
+            <a:endParaRPr lang="en-US" dirty="0" smtClean="0"/>
+          </a:p>
+          <a:p>
             <a:endParaRPr lang="en-US" dirty="0"/>
           </a:p>
         </p:txBody>
@@ -13878,7 +14195,7 @@
     </p:spTree>
     <p:extLst>
       <p:ext uri="{BB962C8B-B14F-4D97-AF65-F5344CB8AC3E}">
-        <p14:creationId xmlns:p14="http://schemas.microsoft.com/office/powerpoint/2010/main" val="3997814917"/>
+        <p14:creationId xmlns:p14="http://schemas.microsoft.com/office/powerpoint/2010/main" val="1158526004"/>
       </p:ext>
     </p:extLst>
   </p:cSld>
@@ -13922,9 +14239,9 @@
           <a:p>
             <a:r>
               <a:rPr lang="en-US" dirty="0" smtClean="0"/>
-              <a:t>Day 3: working with the business</a:t>
-            </a:r>
-            <a:endParaRPr lang="en-GB" dirty="0"/>
+              <a:t>Identifying unique devices </a:t>
+            </a:r>
+            <a:endParaRPr lang="en-US" dirty="0"/>
           </a:p>
         </p:txBody>
       </p:sp>
@@ -13943,63 +14260,21 @@
           <a:bodyPr/>
           <a:lstStyle/>
           <a:p>
-            <a:r>
-              <a:rPr lang="en-US" dirty="0"/>
-              <a:t>The basics of Service Management</a:t>
-            </a:r>
-          </a:p>
-          <a:p>
-            <a:r>
-              <a:rPr lang="en-US" dirty="0"/>
-              <a:t>Introduction to </a:t>
-            </a:r>
-            <a:r>
-              <a:rPr lang="en-US" dirty="0" err="1"/>
-              <a:t>ServiceNow</a:t>
+            <a:pPr marL="0" indent="0">
+              <a:buNone/>
+            </a:pPr>
+            <a:r>
+              <a:rPr lang="en-US" dirty="0" smtClean="0"/>
+              <a:t>If we placed each device in a different location, how could we tell which button was pressed to trigger an alert?</a:t>
             </a:r>
             <a:endParaRPr lang="en-US" dirty="0"/>
-          </a:p>
-          <a:p>
-            <a:r>
-              <a:rPr lang="en-US" dirty="0"/>
-              <a:t>Send Email to </a:t>
-            </a:r>
-            <a:r>
-              <a:rPr lang="en-US" dirty="0" err="1"/>
-              <a:t>ServiceNow</a:t>
-            </a:r>
-            <a:endParaRPr lang="en-US" dirty="0"/>
-          </a:p>
-          <a:p>
-            <a:r>
-              <a:rPr lang="en-US" dirty="0"/>
-              <a:t>Reporting on issues</a:t>
-            </a:r>
-          </a:p>
-          <a:p>
-            <a:r>
-              <a:rPr lang="en-US" dirty="0"/>
-              <a:t>Device Registration</a:t>
-            </a:r>
-          </a:p>
-          <a:p>
-            <a:r>
-              <a:rPr lang="en-US" dirty="0"/>
-              <a:t>Ticket validation / Preventing Spam</a:t>
-            </a:r>
-          </a:p>
-          <a:p>
-            <a:endParaRPr lang="en-US" dirty="0"/>
-          </a:p>
-          <a:p>
-            <a:endParaRPr lang="en-GB" dirty="0"/>
           </a:p>
         </p:txBody>
       </p:sp>
     </p:spTree>
     <p:extLst>
       <p:ext uri="{BB962C8B-B14F-4D97-AF65-F5344CB8AC3E}">
-        <p14:creationId xmlns:p14="http://schemas.microsoft.com/office/powerpoint/2010/main" val="138573571"/>
+        <p14:creationId xmlns:p14="http://schemas.microsoft.com/office/powerpoint/2010/main" val="2115797855"/>
       </p:ext>
     </p:extLst>
   </p:cSld>
@@ -14043,7 +14318,7 @@
           <a:p>
             <a:r>
               <a:rPr lang="en-US" dirty="0" smtClean="0"/>
-              <a:t>Service Management</a:t>
+              <a:t>Repeated tickets</a:t>
             </a:r>
             <a:endParaRPr lang="en-US" dirty="0"/>
           </a:p>
@@ -14064,43 +14339,45 @@
           <a:bodyPr/>
           <a:lstStyle/>
           <a:p>
+            <a:pPr marL="0" indent="0">
+              <a:buNone/>
+            </a:pPr>
             <a:r>
               <a:rPr lang="en-US" dirty="0" smtClean="0"/>
-              <a:t>Why is this needed?</a:t>
-            </a:r>
-          </a:p>
-          <a:p>
+              <a:t>Scenario 1: One person notices the coffee machine is broken and presses the button. A second person does the same, and a third person. All within five minutes. Three</a:t>
+            </a:r>
             <a:r>
               <a:rPr lang="en-US" dirty="0" smtClean="0"/>
-              <a:t>What </a:t>
-            </a:r>
-            <a:r>
-              <a:rPr lang="en-US" dirty="0" err="1" smtClean="0"/>
-              <a:t>ServiceNow</a:t>
-            </a:r>
+              <a:t> tickets are raised for one incident. </a:t>
+            </a:r>
+          </a:p>
+          <a:p>
+            <a:pPr marL="0" indent="0">
+              <a:buNone/>
+            </a:pPr>
             <a:r>
               <a:rPr lang="en-US" dirty="0" smtClean="0"/>
-              <a:t> does</a:t>
-            </a:r>
-          </a:p>
-          <a:p>
+              <a:t>Scenario 2: One person notices the coffe</a:t>
+            </a:r>
             <a:r>
               <a:rPr lang="en-US" dirty="0" smtClean="0"/>
-              <a:t>Issue lifecycle</a:t>
-            </a:r>
-          </a:p>
-          <a:p>
+              <a:t>e machine is broken. They really want coffee. They press the button repeatedly twenty times. Twenty tickets are raised for one incident.</a:t>
+            </a:r>
+          </a:p>
+          <a:p>
+            <a:pPr marL="0" indent="0">
+              <a:buNone/>
+            </a:pPr>
             <a:r>
               <a:rPr lang="en-US" dirty="0" smtClean="0"/>
-              <a:t>Send an alert to </a:t>
-            </a:r>
-            <a:r>
-              <a:rPr lang="en-US" dirty="0" err="1" smtClean="0"/>
-              <a:t>ServiceNow</a:t>
-            </a:r>
-            <a:endParaRPr lang="en-US" dirty="0" smtClean="0"/>
-          </a:p>
-          <a:p>
+              <a:t>Q: How would we avoid these scenarios?</a:t>
+            </a:r>
+            <a:endParaRPr lang="en-US" dirty="0"/>
+          </a:p>
+          <a:p>
+            <a:pPr marL="0" indent="0">
+              <a:buNone/>
+            </a:pPr>
             <a:endParaRPr lang="en-US" dirty="0"/>
           </a:p>
         </p:txBody>
@@ -14108,7 +14385,7 @@
     </p:spTree>
     <p:extLst>
       <p:ext uri="{BB962C8B-B14F-4D97-AF65-F5344CB8AC3E}">
-        <p14:creationId xmlns:p14="http://schemas.microsoft.com/office/powerpoint/2010/main" val="1158526004"/>
+        <p14:creationId xmlns:p14="http://schemas.microsoft.com/office/powerpoint/2010/main" val="3955968203"/>
       </p:ext>
     </p:extLst>
   </p:cSld>
@@ -14152,35 +14429,80 @@
           <a:p>
             <a:r>
               <a:rPr lang="en-US" dirty="0" smtClean="0"/>
-              <a:t>Identifying unique devices </a:t>
+              <a:t>Day 4: maturing the model</a:t>
+            </a:r>
+            <a:endParaRPr lang="en-GB" dirty="0"/>
+          </a:p>
+        </p:txBody>
+      </p:sp>
+      <p:sp>
+        <p:nvSpPr>
+          <p:cNvPr id="3" name="Content Placeholder 2"/>
+          <p:cNvSpPr>
+            <a:spLocks noGrp="1"/>
+          </p:cNvSpPr>
+          <p:nvPr>
+            <p:ph idx="1"/>
+          </p:nvPr>
+        </p:nvSpPr>
+        <p:spPr/>
+        <p:txBody>
+          <a:bodyPr>
+            <a:normAutofit/>
+          </a:bodyPr>
+          <a:lstStyle/>
+          <a:p>
+            <a:r>
+              <a:rPr lang="en-US" dirty="0"/>
+              <a:t>Using the Cloud to create </a:t>
+            </a:r>
+            <a:r>
+              <a:rPr lang="en-US" dirty="0" err="1"/>
+              <a:t>ServiceNow</a:t>
+            </a:r>
+            <a:r>
+              <a:rPr lang="en-US" dirty="0"/>
+              <a:t> </a:t>
+            </a:r>
+            <a:r>
+              <a:rPr lang="en-US" dirty="0" smtClean="0"/>
+              <a:t>tickets</a:t>
+            </a:r>
+          </a:p>
+          <a:p>
+            <a:r>
+              <a:rPr lang="en-US" dirty="0" smtClean="0"/>
+              <a:t>Reporting</a:t>
             </a:r>
             <a:endParaRPr lang="en-US" dirty="0"/>
           </a:p>
-        </p:txBody>
-      </p:sp>
-      <p:sp>
-        <p:nvSpPr>
-          <p:cNvPr id="3" name="Content Placeholder 2"/>
-          <p:cNvSpPr>
-            <a:spLocks noGrp="1"/>
-          </p:cNvSpPr>
-          <p:nvPr>
-            <p:ph idx="1"/>
-          </p:nvPr>
-        </p:nvSpPr>
-        <p:spPr/>
-        <p:txBody>
-          <a:bodyPr/>
-          <a:lstStyle/>
-          <a:p>
-            <a:endParaRPr lang="en-US"/>
+          <a:p>
+            <a:r>
+              <a:rPr lang="en-US" dirty="0"/>
+              <a:t>Wrapping up</a:t>
+            </a:r>
+          </a:p>
+          <a:p>
+            <a:r>
+              <a:rPr lang="en-US" dirty="0"/>
+              <a:t>Other things you can do with a Raspberry Pi</a:t>
+            </a:r>
+          </a:p>
+          <a:p>
+            <a:r>
+              <a:rPr lang="en-US" dirty="0"/>
+              <a:t>Participant Feedback</a:t>
+            </a:r>
+          </a:p>
+          <a:p>
+            <a:endParaRPr lang="en-GB" dirty="0"/>
           </a:p>
         </p:txBody>
       </p:sp>
     </p:spTree>
     <p:extLst>
       <p:ext uri="{BB962C8B-B14F-4D97-AF65-F5344CB8AC3E}">
-        <p14:creationId xmlns:p14="http://schemas.microsoft.com/office/powerpoint/2010/main" val="2115797855"/>
+        <p14:creationId xmlns:p14="http://schemas.microsoft.com/office/powerpoint/2010/main" val="1778859132"/>
       </p:ext>
     </p:extLst>
   </p:cSld>
@@ -14224,7 +14546,7 @@
           <a:p>
             <a:r>
               <a:rPr lang="en-US" dirty="0" smtClean="0"/>
-              <a:t>Checking if a service call is open</a:t>
+              <a:t>Azure stuff</a:t>
             </a:r>
             <a:endParaRPr lang="en-US" dirty="0"/>
           </a:p>
@@ -14245,14 +14567,38 @@
           <a:bodyPr/>
           <a:lstStyle/>
           <a:p>
-            <a:endParaRPr lang="en-US" dirty="0"/>
+            <a:r>
+              <a:rPr lang="en-US" dirty="0" smtClean="0"/>
+              <a:t>What is the cloud?</a:t>
+            </a:r>
+          </a:p>
+          <a:p>
+            <a:r>
+              <a:rPr lang="en-US" dirty="0" smtClean="0"/>
+              <a:t>Why use it?</a:t>
+            </a:r>
+          </a:p>
+          <a:p>
+            <a:r>
+              <a:rPr lang="en-US" dirty="0" smtClean="0">
+                <a:solidFill>
+                  <a:srgbClr val="FF0000"/>
+                </a:solidFill>
+              </a:rPr>
+              <a:t>Work with Josh &amp; Vlad to write rest of content</a:t>
+            </a:r>
+            <a:endParaRPr lang="en-US" dirty="0">
+              <a:solidFill>
+                <a:srgbClr val="FF0000"/>
+              </a:solidFill>
+            </a:endParaRPr>
           </a:p>
         </p:txBody>
       </p:sp>
     </p:spTree>
     <p:extLst>
       <p:ext uri="{BB962C8B-B14F-4D97-AF65-F5344CB8AC3E}">
-        <p14:creationId xmlns:p14="http://schemas.microsoft.com/office/powerpoint/2010/main" val="3955968203"/>
+        <p14:creationId xmlns:p14="http://schemas.microsoft.com/office/powerpoint/2010/main" val="3358359096"/>
       </p:ext>
     </p:extLst>
   </p:cSld>
@@ -14296,7 +14642,7 @@
           <a:p>
             <a:r>
               <a:rPr lang="en-US" dirty="0" smtClean="0"/>
-              <a:t>Day 4: maturing the model</a:t>
+              <a:t>Reporting</a:t>
             </a:r>
             <a:endParaRPr lang="en-GB" dirty="0"/>
           </a:p>
@@ -14314,66 +14660,45 @@
         </p:nvSpPr>
         <p:spPr/>
         <p:txBody>
-          <a:bodyPr>
-            <a:normAutofit fontScale="92500" lnSpcReduction="10000"/>
-          </a:bodyPr>
+          <a:bodyPr/>
           <a:lstStyle/>
           <a:p>
             <a:r>
-              <a:rPr lang="en-US" dirty="0"/>
-              <a:t>Using the Cloud to create </a:t>
-            </a:r>
-            <a:r>
-              <a:rPr lang="en-US" dirty="0" err="1"/>
-              <a:t>ServiceNow</a:t>
-            </a:r>
-            <a:r>
-              <a:rPr lang="en-US" dirty="0"/>
-              <a:t> tickets</a:t>
-            </a:r>
-          </a:p>
-          <a:p>
-            <a:r>
-              <a:rPr lang="en-US" dirty="0"/>
-              <a:t>Calling Azure from the Raspberry Pi</a:t>
-            </a:r>
-          </a:p>
-          <a:p>
-            <a:r>
-              <a:rPr lang="en-US" dirty="0"/>
-              <a:t>[SPACE FOR OVER RUN]</a:t>
-            </a:r>
-          </a:p>
-          <a:p>
-            <a:endParaRPr lang="en-US" dirty="0"/>
-          </a:p>
-          <a:p>
-            <a:r>
-              <a:rPr lang="en-US" dirty="0"/>
-              <a:t>Wrapping up</a:t>
-            </a:r>
-          </a:p>
-          <a:p>
-            <a:r>
-              <a:rPr lang="en-US" dirty="0"/>
-              <a:t>Other things you can do with a Raspberry Pi</a:t>
-            </a:r>
-          </a:p>
-          <a:p>
-            <a:r>
-              <a:rPr lang="en-US" dirty="0"/>
-              <a:t>Participant Feedback</a:t>
-            </a:r>
-          </a:p>
-          <a:p>
-            <a:endParaRPr lang="en-GB" dirty="0"/>
+              <a:rPr lang="en-US" dirty="0" smtClean="0">
+                <a:solidFill>
+                  <a:srgbClr val="FF0000"/>
+                </a:solidFill>
+              </a:rPr>
+              <a:t>Work with </a:t>
+            </a:r>
+            <a:r>
+              <a:rPr lang="en-US" dirty="0" err="1" smtClean="0">
+                <a:solidFill>
+                  <a:srgbClr val="FF0000"/>
+                </a:solidFill>
+              </a:rPr>
+              <a:t>Kalpana</a:t>
+            </a:r>
+            <a:r>
+              <a:rPr lang="en-US" dirty="0" smtClean="0">
+                <a:solidFill>
+                  <a:srgbClr val="FF0000"/>
+                </a:solidFill>
+              </a:rPr>
+              <a:t> to write content</a:t>
+            </a:r>
+            <a:endParaRPr lang="en-GB" dirty="0">
+              <a:solidFill>
+                <a:srgbClr val="FF0000"/>
+              </a:solidFill>
+            </a:endParaRPr>
           </a:p>
         </p:txBody>
       </p:sp>
     </p:spTree>
     <p:extLst>
       <p:ext uri="{BB962C8B-B14F-4D97-AF65-F5344CB8AC3E}">
-        <p14:creationId xmlns:p14="http://schemas.microsoft.com/office/powerpoint/2010/main" val="1778859132"/>
+        <p14:creationId xmlns:p14="http://schemas.microsoft.com/office/powerpoint/2010/main" val="3197062606"/>
       </p:ext>
     </p:extLst>
   </p:cSld>
@@ -14417,7 +14742,7 @@
           <a:p>
             <a:r>
               <a:rPr lang="en-US" dirty="0" smtClean="0"/>
-              <a:t>Azure stuff</a:t>
+              <a:t>Other projects</a:t>
             </a:r>
             <a:endParaRPr lang="en-US" dirty="0"/>
           </a:p>
@@ -14440,16 +14765,66 @@
           <a:p>
             <a:r>
               <a:rPr lang="en-US" dirty="0" smtClean="0"/>
-              <a:t>Work with Josh/Vlad to write</a:t>
-            </a:r>
-            <a:endParaRPr lang="en-US" dirty="0"/>
+              <a:t>Alien </a:t>
+            </a:r>
+            <a:r>
+              <a:rPr lang="en-US" dirty="0" smtClean="0"/>
+              <a:t>Invasion</a:t>
+            </a:r>
+          </a:p>
+          <a:p>
+            <a:r>
+              <a:rPr lang="en-US" dirty="0" err="1" smtClean="0"/>
+              <a:t>Kodi</a:t>
+            </a:r>
+            <a:r>
+              <a:rPr lang="en-US" dirty="0" smtClean="0"/>
+              <a:t> Media Center</a:t>
+            </a:r>
+          </a:p>
+          <a:p>
+            <a:r>
+              <a:rPr lang="en-US" dirty="0" smtClean="0"/>
+              <a:t>Steam link – stream your PC games to your TV</a:t>
+            </a:r>
+          </a:p>
+          <a:p>
+            <a:r>
+              <a:rPr lang="en-US" dirty="0" smtClean="0"/>
+              <a:t>Alexa: Build your own Amazon Echo/ Google assistant</a:t>
+            </a:r>
+          </a:p>
+          <a:p>
+            <a:r>
+              <a:rPr lang="en-US" dirty="0" smtClean="0"/>
+              <a:t>Pi-hole – network wide ad-blocker</a:t>
+            </a:r>
+          </a:p>
+          <a:p>
+            <a:r>
+              <a:rPr lang="en-US" dirty="0" err="1"/>
+              <a:t>Adafruit</a:t>
+            </a:r>
+            <a:r>
+              <a:rPr lang="en-US"/>
+              <a:t> for </a:t>
+            </a:r>
+            <a:r>
+              <a:rPr lang="en-US"/>
+              <a:t>more </a:t>
+            </a:r>
+            <a:r>
+              <a:rPr lang="en-US" smtClean="0"/>
+              <a:t>accessories</a:t>
+            </a:r>
+            <a:endParaRPr lang="en-US"/>
           </a:p>
         </p:txBody>
       </p:sp>
     </p:spTree>
     <p:extLst>
       <p:ext uri="{BB962C8B-B14F-4D97-AF65-F5344CB8AC3E}">
-        <p14:creationId xmlns:p14="http://schemas.microsoft.com/office/powerpoint/2010/main" val="3358359096"/>
+        <p14:creationId xmlns:p14="http://schemas.microsoft.com/office/powerpoint/2010/main" val="4038175424"/>
       </p:ext>
     </p:extLst>
   </p:cSld>
@@ -14493,7 +14868,7 @@
           <a:p>
             <a:r>
               <a:rPr lang="en-US" dirty="0" smtClean="0"/>
-              <a:t>Ice breaker</a:t>
+              <a:t>introductions</a:t>
             </a:r>
             <a:endParaRPr lang="en-US" dirty="0"/>
           </a:p>
@@ -14516,15 +14891,23 @@
           <a:p>
             <a:r>
               <a:rPr lang="en-US" dirty="0" smtClean="0"/>
-              <a:t>NAME TAGS</a:t>
+              <a:t>Name tags</a:t>
             </a:r>
           </a:p>
           <a:p>
             <a:r>
               <a:rPr lang="en-US" dirty="0" smtClean="0"/>
-              <a:t>CV Bingo – need fun-fact about each other</a:t>
-            </a:r>
-            <a:endParaRPr lang="en-US" dirty="0"/>
+              <a:t>Icebreaker: Who is it? </a:t>
+            </a:r>
+          </a:p>
+          <a:p>
+            <a:pPr marL="0" indent="0">
+              <a:buNone/>
+            </a:pPr>
+            <a:r>
+              <a:rPr lang="en-US" dirty="0" smtClean="0"/>
+              <a:t>Everyone write a fun fact about themselves onto a slip of paper and put it into the hat. Each slip will be drawn one by one and the aim is to guess who is the person behind the fact. Once a person’s fact has been read aloud, they will pick the next fact from the hat.</a:t>
+            </a:r>
           </a:p>
         </p:txBody>
       </p:sp>
@@ -14575,9 +14958,9 @@
           <a:p>
             <a:r>
               <a:rPr lang="en-US" dirty="0" smtClean="0"/>
-              <a:t>Other projects</a:t>
-            </a:r>
-            <a:endParaRPr lang="en-US" dirty="0"/>
+              <a:t>Thank you</a:t>
+            </a:r>
+            <a:endParaRPr lang="en-GB" dirty="0"/>
           </a:p>
         </p:txBody>
       </p:sp>
@@ -14596,65 +14979,36 @@
           <a:bodyPr/>
           <a:lstStyle/>
           <a:p>
+            <a:pPr marL="0" indent="0">
+              <a:buNone/>
+            </a:pPr>
             <a:r>
               <a:rPr lang="en-US" dirty="0" smtClean="0"/>
-              <a:t>Link to </a:t>
-            </a:r>
-            <a:r>
-              <a:rPr lang="en-US" dirty="0" err="1" smtClean="0"/>
-              <a:t>Adafruit</a:t>
-            </a:r>
-            <a:endParaRPr lang="en-US" dirty="0" smtClean="0"/>
-          </a:p>
-          <a:p>
+              <a:t>Thank you for taking part in our first collaboration with Read Alliance. </a:t>
+            </a:r>
+          </a:p>
+          <a:p>
+            <a:pPr marL="0" indent="0">
+              <a:buNone/>
+            </a:pPr>
+            <a:endParaRPr lang="en-US" dirty="0"/>
+          </a:p>
+          <a:p>
+            <a:pPr marL="0" indent="0">
+              <a:buNone/>
+            </a:pPr>
             <a:r>
               <a:rPr lang="en-US" dirty="0" smtClean="0"/>
-              <a:t>Alien Invasion</a:t>
-            </a:r>
-          </a:p>
-          <a:p>
-            <a:r>
-              <a:rPr lang="en-US" dirty="0" smtClean="0"/>
-              <a:t>Other ideas?</a:t>
-            </a:r>
-          </a:p>
-          <a:p>
-            <a:pPr lvl="1"/>
-            <a:r>
-              <a:rPr lang="en-US" dirty="0" err="1" smtClean="0"/>
-              <a:t>Rpi</a:t>
-            </a:r>
-            <a:r>
-              <a:rPr lang="en-US" dirty="0" smtClean="0"/>
-              <a:t> Media Center</a:t>
-            </a:r>
-          </a:p>
-          <a:p>
-            <a:pPr lvl="1"/>
-            <a:r>
-              <a:rPr lang="en-US" dirty="0" err="1" smtClean="0"/>
-              <a:t>Rpi</a:t>
-            </a:r>
-            <a:r>
-              <a:rPr lang="en-US" dirty="0" smtClean="0"/>
-              <a:t> </a:t>
-            </a:r>
-            <a:r>
-              <a:rPr lang="en-US" dirty="0" err="1" smtClean="0"/>
-              <a:t>Wifi</a:t>
-            </a:r>
-            <a:r>
-              <a:rPr lang="en-US" dirty="0" smtClean="0"/>
-              <a:t> Booster</a:t>
-            </a:r>
-            <a:endParaRPr lang="en-US" dirty="0"/>
+              <a:t>Please provide any feedback on the forms provided.</a:t>
+            </a:r>
+            <a:endParaRPr lang="en-GB" dirty="0"/>
           </a:p>
         </p:txBody>
       </p:sp>
     </p:spTree>
     <p:extLst>
       <p:ext uri="{BB962C8B-B14F-4D97-AF65-F5344CB8AC3E}">
-        <p14:creationId xmlns:p14="http://schemas.microsoft.com/office/powerpoint/2010/main" val="4038175424"/>
+        <p14:creationId xmlns:p14="http://schemas.microsoft.com/office/powerpoint/2010/main" val="1845689352"/>
       </p:ext>
     </p:extLst>
   </p:cSld>
@@ -14716,24 +15070,59 @@
         </p:nvSpPr>
         <p:spPr/>
         <p:txBody>
-          <a:bodyPr/>
+          <a:bodyPr>
+            <a:normAutofit/>
+          </a:bodyPr>
           <a:lstStyle/>
           <a:p>
             <a:r>
               <a:rPr lang="en-US" dirty="0" smtClean="0"/>
-              <a:t>What will we be doing</a:t>
+              <a:t>What will we be doing?</a:t>
             </a:r>
           </a:p>
           <a:p>
             <a:r>
               <a:rPr lang="en-US" dirty="0" smtClean="0"/>
-              <a:t>What will you get out of it</a:t>
-            </a:r>
-          </a:p>
-          <a:p>
+              <a:t>What will you learn about?</a:t>
+            </a:r>
+          </a:p>
+          <a:p>
+            <a:pPr lvl="1"/>
             <a:r>
               <a:rPr lang="en-US" dirty="0" smtClean="0"/>
-              <a:t>What do you want out of it???</a:t>
+              <a:t>Raspberry </a:t>
+            </a:r>
+            <a:r>
+              <a:rPr lang="en-US" dirty="0" err="1" smtClean="0"/>
+              <a:t>Pis</a:t>
+            </a:r>
+            <a:endParaRPr lang="en-US" dirty="0" smtClean="0"/>
+          </a:p>
+          <a:p>
+            <a:pPr lvl="1"/>
+            <a:r>
+              <a:rPr lang="en-US" dirty="0" smtClean="0"/>
+              <a:t>Programming in Python</a:t>
+            </a:r>
+          </a:p>
+          <a:p>
+            <a:pPr lvl="1"/>
+            <a:r>
+              <a:rPr lang="en-US" dirty="0" smtClean="0"/>
+              <a:t>Project Management</a:t>
+            </a:r>
+          </a:p>
+          <a:p>
+            <a:pPr lvl="1"/>
+            <a:r>
+              <a:rPr lang="en-US" dirty="0" smtClean="0"/>
+              <a:t>Service Management</a:t>
+            </a:r>
+          </a:p>
+          <a:p>
+            <a:r>
+              <a:rPr lang="en-US" dirty="0" smtClean="0"/>
+              <a:t>What do you want out these workshops?</a:t>
             </a:r>
             <a:endParaRPr lang="en-US" dirty="0"/>
           </a:p>
@@ -14786,7 +15175,7 @@
           <a:p>
             <a:r>
               <a:rPr lang="en-US" dirty="0" smtClean="0"/>
-              <a:t>Case Study / Scenario / Background</a:t>
+              <a:t>Business Background</a:t>
             </a:r>
             <a:endParaRPr lang="en-US" dirty="0"/>
           </a:p>
@@ -14809,13 +15198,13 @@
           <a:p>
             <a:r>
               <a:rPr lang="en-US" dirty="0" smtClean="0"/>
-              <a:t>Here’s the situation</a:t>
+              <a:t>Why do we need an alerting system?</a:t>
             </a:r>
           </a:p>
           <a:p>
             <a:r>
               <a:rPr lang="en-US" dirty="0" smtClean="0"/>
-              <a:t>Let’s have Thom act it out</a:t>
+              <a:t>What is the use case for this? - Thom</a:t>
             </a:r>
           </a:p>
           <a:p>
@@ -14870,9 +15259,9 @@
           <a:p>
             <a:r>
               <a:rPr lang="en-US" dirty="0" smtClean="0"/>
-              <a:t>Technology Overview</a:t>
-            </a:r>
-            <a:endParaRPr lang="en-US" dirty="0"/>
+              <a:t>Project management</a:t>
+            </a:r>
+            <a:endParaRPr lang="en-GB" dirty="0"/>
           </a:p>
         </p:txBody>
       </p:sp>
@@ -14891,14 +15280,30 @@
           <a:bodyPr/>
           <a:lstStyle/>
           <a:p>
-            <a:endParaRPr lang="en-US"/>
+            <a:r>
+              <a:rPr lang="en-US" dirty="0" smtClean="0"/>
+              <a:t>You have your project brief. Where do you start?</a:t>
+            </a:r>
+          </a:p>
+          <a:p>
+            <a:r>
+              <a:rPr lang="en-US" dirty="0" smtClean="0"/>
+              <a:t>How will you keep track of progress?</a:t>
+            </a:r>
+          </a:p>
+          <a:p>
+            <a:r>
+              <a:rPr lang="en-US" dirty="0" smtClean="0"/>
+              <a:t>If you were running the project as a team, how would you split up the work?</a:t>
+            </a:r>
+            <a:endParaRPr lang="en-GB" dirty="0"/>
           </a:p>
         </p:txBody>
       </p:sp>
     </p:spTree>
     <p:extLst>
       <p:ext uri="{BB962C8B-B14F-4D97-AF65-F5344CB8AC3E}">
-        <p14:creationId xmlns:p14="http://schemas.microsoft.com/office/powerpoint/2010/main" val="3794471099"/>
+        <p14:creationId xmlns:p14="http://schemas.microsoft.com/office/powerpoint/2010/main" val="3115507988"/>
       </p:ext>
     </p:extLst>
   </p:cSld>
@@ -14942,7 +15347,7 @@
           <a:p>
             <a:r>
               <a:rPr lang="en-US" dirty="0" smtClean="0"/>
-              <a:t>Raspberry pi Intro</a:t>
+              <a:t>Technology Overview</a:t>
             </a:r>
             <a:endParaRPr lang="en-US" dirty="0"/>
           </a:p>
@@ -14965,49 +15370,105 @@
           <a:p>
             <a:r>
               <a:rPr lang="en-US" dirty="0" smtClean="0"/>
-              <a:t>Plug in</a:t>
-            </a:r>
-          </a:p>
-          <a:p>
-            <a:r>
-              <a:rPr lang="en-US" dirty="0" smtClean="0"/>
-              <a:t>Console</a:t>
-            </a:r>
-          </a:p>
-          <a:p>
-            <a:r>
-              <a:rPr lang="en-US" dirty="0" smtClean="0"/>
-              <a:t>Blah </a:t>
-            </a:r>
-            <a:r>
-              <a:rPr lang="en-US" dirty="0" err="1" smtClean="0"/>
-              <a:t>blah</a:t>
-            </a:r>
-            <a:r>
-              <a:rPr lang="en-US" dirty="0" smtClean="0"/>
-              <a:t> </a:t>
-            </a:r>
-            <a:r>
-              <a:rPr lang="en-US" dirty="0" err="1" smtClean="0"/>
-              <a:t>blah</a:t>
-            </a:r>
-            <a:endParaRPr lang="en-US" dirty="0" smtClean="0"/>
-          </a:p>
-          <a:p>
-            <a:r>
-              <a:rPr lang="en-US" dirty="0" smtClean="0"/>
-              <a:t>Clone the repo</a:t>
-            </a:r>
-          </a:p>
-          <a:p>
+              <a:t>What will we need to build a simple alerting system?</a:t>
+            </a:r>
             <a:endParaRPr lang="en-US" dirty="0"/>
           </a:p>
         </p:txBody>
       </p:sp>
+      <p:pic>
+        <p:nvPicPr>
+          <p:cNvPr id="1032" name="Picture 8" descr="Image result for raspberry pi logo"/>
+          <p:cNvPicPr>
+            <a:picLocks noChangeAspect="1" noChangeArrowheads="1"/>
+          </p:cNvPicPr>
+          <p:nvPr/>
+        </p:nvPicPr>
+        <p:blipFill>
+          <a:blip r:embed="rId2">
+            <a:extLst>
+              <a:ext uri="{28A0092B-C50C-407E-A947-70E740481C1C}">
+                <a14:useLocalDpi xmlns:a14="http://schemas.microsoft.com/office/drawing/2010/main" val="0"/>
+              </a:ext>
+            </a:extLst>
+          </a:blip>
+          <a:srcRect/>
+          <a:stretch>
+            <a:fillRect/>
+          </a:stretch>
+        </p:blipFill>
+        <p:spPr bwMode="auto">
+          <a:xfrm>
+            <a:off x="1548881" y="3384140"/>
+            <a:ext cx="1651000" cy="2076309"/>
+          </a:xfrm>
+          <a:prstGeom prst="rect">
+            <a:avLst/>
+          </a:prstGeom>
+          <a:noFill/>
+          <a:extLst>
+            <a:ext uri="{909E8E84-426E-40DD-AFC4-6F175D3DCCD1}">
+              <a14:hiddenFill xmlns:a14="http://schemas.microsoft.com/office/drawing/2010/main">
+                <a:solidFill>
+                  <a:srgbClr val="FFFFFF"/>
+                </a:solidFill>
+              </a14:hiddenFill>
+            </a:ext>
+          </a:extLst>
+        </p:spPr>
+      </p:pic>
+      <p:pic>
+        <p:nvPicPr>
+          <p:cNvPr id="17" name="Picture 16"/>
+          <p:cNvPicPr>
+            <a:picLocks noChangeAspect="1"/>
+          </p:cNvPicPr>
+          <p:nvPr/>
+        </p:nvPicPr>
+        <p:blipFill>
+          <a:blip r:embed="rId3"/>
+          <a:stretch>
+            <a:fillRect/>
+          </a:stretch>
+        </p:blipFill>
+        <p:spPr>
+          <a:xfrm>
+            <a:off x="4214035" y="4023923"/>
+            <a:ext cx="2765681" cy="930632"/>
+          </a:xfrm>
+          <a:prstGeom prst="rect">
+            <a:avLst/>
+          </a:prstGeom>
+        </p:spPr>
+      </p:pic>
+      <p:pic>
+        <p:nvPicPr>
+          <p:cNvPr id="23" name="Picture 22"/>
+          <p:cNvPicPr>
+            <a:picLocks noChangeAspect="1"/>
+          </p:cNvPicPr>
+          <p:nvPr/>
+        </p:nvPicPr>
+        <p:blipFill>
+          <a:blip r:embed="rId4"/>
+          <a:stretch>
+            <a:fillRect/>
+          </a:stretch>
+        </p:blipFill>
+        <p:spPr>
+          <a:xfrm>
+            <a:off x="7993870" y="3384140"/>
+            <a:ext cx="2279588" cy="1936989"/>
+          </a:xfrm>
+          <a:prstGeom prst="rect">
+            <a:avLst/>
+          </a:prstGeom>
+        </p:spPr>
+      </p:pic>
     </p:spTree>
     <p:extLst>
       <p:ext uri="{BB962C8B-B14F-4D97-AF65-F5344CB8AC3E}">
-        <p14:creationId xmlns:p14="http://schemas.microsoft.com/office/powerpoint/2010/main" val="2044859461"/>
+        <p14:creationId xmlns:p14="http://schemas.microsoft.com/office/powerpoint/2010/main" val="3794471099"/>
       </p:ext>
     </p:extLst>
   </p:cSld>
@@ -15051,7 +15512,7 @@
           <a:p>
             <a:r>
               <a:rPr lang="en-US" dirty="0" smtClean="0"/>
-              <a:t>Break</a:t>
+              <a:t>Intro to Raspberry pi</a:t>
             </a:r>
             <a:endParaRPr lang="en-US" dirty="0"/>
           </a:p>
@@ -15072,14 +15533,63 @@
           <a:bodyPr/>
           <a:lstStyle/>
           <a:p>
-            <a:endParaRPr lang="en-US"/>
+            <a:pPr marL="0" indent="0">
+              <a:buNone/>
+            </a:pPr>
+            <a:r>
+              <a:rPr lang="en-US" dirty="0" smtClean="0"/>
+              <a:t>1) Plug in</a:t>
+            </a:r>
+          </a:p>
+          <a:p>
+            <a:pPr marL="0" indent="0">
+              <a:buNone/>
+            </a:pPr>
+            <a:r>
+              <a:rPr lang="en-US" dirty="0" smtClean="0"/>
+              <a:t>2) Console</a:t>
+            </a:r>
+          </a:p>
+          <a:p>
+            <a:pPr marL="0" indent="0">
+              <a:buNone/>
+            </a:pPr>
+            <a:r>
+              <a:rPr lang="en-US" dirty="0" smtClean="0"/>
+              <a:t>3) Blah </a:t>
+            </a:r>
+            <a:r>
+              <a:rPr lang="en-US" dirty="0" err="1" smtClean="0"/>
+              <a:t>blah</a:t>
+            </a:r>
+            <a:r>
+              <a:rPr lang="en-US" dirty="0" smtClean="0"/>
+              <a:t> </a:t>
+            </a:r>
+            <a:r>
+              <a:rPr lang="en-US" dirty="0" err="1" smtClean="0"/>
+              <a:t>blah</a:t>
+            </a:r>
+            <a:endParaRPr lang="en-US" dirty="0" smtClean="0"/>
+          </a:p>
+          <a:p>
+            <a:pPr marL="0" indent="0">
+              <a:buNone/>
+            </a:pPr>
+            <a:r>
+              <a:rPr lang="en-US" dirty="0" smtClean="0"/>
+              <a:t>4) Clone the repo</a:t>
+            </a:r>
+          </a:p>
+          <a:p>
+            <a:endParaRPr lang="en-US" dirty="0"/>
           </a:p>
         </p:txBody>
       </p:sp>
     </p:spTree>
     <p:extLst>
       <p:ext uri="{BB962C8B-B14F-4D97-AF65-F5344CB8AC3E}">
-        <p14:creationId xmlns:p14="http://schemas.microsoft.com/office/powerpoint/2010/main" val="446194975"/>
+        <p14:creationId xmlns:p14="http://schemas.microsoft.com/office/powerpoint/2010/main" val="2044859461"/>
       </p:ext>
     </p:extLst>
   </p:cSld>
@@ -15146,8 +15656,13 @@
           <a:p>
             <a:r>
               <a:rPr lang="en-US" dirty="0" smtClean="0"/>
-              <a:t>What is Python</a:t>
-            </a:r>
+              <a:t>What is </a:t>
+            </a:r>
+            <a:r>
+              <a:rPr lang="en-US" dirty="0" smtClean="0"/>
+              <a:t>Python?</a:t>
+            </a:r>
+            <a:endParaRPr lang="en-US" dirty="0" smtClean="0"/>
           </a:p>
           <a:p>
             <a:r>
@@ -15158,8 +15673,9 @@
           <a:p>
             <a:r>
               <a:rPr lang="en-US" dirty="0" smtClean="0"/>
-              <a:t>Write hello world</a:t>
-            </a:r>
+              <a:t>The first program: Hello World!</a:t>
+            </a:r>
+            <a:endParaRPr lang="en-US" dirty="0" smtClean="0"/>
           </a:p>
           <a:p>
             <a:pPr lvl="1"/>
@@ -15171,8 +15687,9 @@
           <a:p>
             <a:r>
               <a:rPr lang="en-US" dirty="0" smtClean="0"/>
-              <a:t>Run it</a:t>
-            </a:r>
+              <a:t>Running programs</a:t>
+            </a:r>
+            <a:endParaRPr lang="en-US" dirty="0" smtClean="0"/>
           </a:p>
           <a:p>
             <a:pPr marL="0" indent="0">

</xml_diff>

<commit_message>
Added recap sessions for each day
And missing pratical
</commit_message>
<xml_diff>
--- a/docs/SMAP Materials Unbranded.pptx
+++ b/docs/SMAP Materials Unbranded.pptx
@@ -12,13 +12,13 @@
     <p:sldId id="263" r:id="rId6"/>
     <p:sldId id="287" r:id="rId7"/>
     <p:sldId id="264" r:id="rId8"/>
-    <p:sldId id="265" r:id="rId9"/>
-    <p:sldId id="266" r:id="rId10"/>
-    <p:sldId id="267" r:id="rId11"/>
-    <p:sldId id="286" r:id="rId12"/>
-    <p:sldId id="268" r:id="rId13"/>
-    <p:sldId id="258" r:id="rId14"/>
-    <p:sldId id="270" r:id="rId15"/>
+    <p:sldId id="267" r:id="rId9"/>
+    <p:sldId id="286" r:id="rId10"/>
+    <p:sldId id="265" r:id="rId11"/>
+    <p:sldId id="268" r:id="rId12"/>
+    <p:sldId id="258" r:id="rId13"/>
+    <p:sldId id="270" r:id="rId14"/>
+    <p:sldId id="266" r:id="rId15"/>
     <p:sldId id="271" r:id="rId16"/>
     <p:sldId id="272" r:id="rId17"/>
     <p:sldId id="274" r:id="rId18"/>
@@ -27,14 +27,17 @@
     <p:sldId id="276" r:id="rId21"/>
     <p:sldId id="277" r:id="rId22"/>
     <p:sldId id="259" r:id="rId23"/>
-    <p:sldId id="281" r:id="rId24"/>
-    <p:sldId id="282" r:id="rId25"/>
-    <p:sldId id="283" r:id="rId26"/>
-    <p:sldId id="260" r:id="rId27"/>
-    <p:sldId id="284" r:id="rId28"/>
-    <p:sldId id="288" r:id="rId29"/>
-    <p:sldId id="285" r:id="rId30"/>
-    <p:sldId id="289" r:id="rId31"/>
+    <p:sldId id="290" r:id="rId24"/>
+    <p:sldId id="281" r:id="rId25"/>
+    <p:sldId id="282" r:id="rId26"/>
+    <p:sldId id="291" r:id="rId27"/>
+    <p:sldId id="283" r:id="rId28"/>
+    <p:sldId id="260" r:id="rId29"/>
+    <p:sldId id="292" r:id="rId30"/>
+    <p:sldId id="284" r:id="rId31"/>
+    <p:sldId id="288" r:id="rId32"/>
+    <p:sldId id="285" r:id="rId33"/>
+    <p:sldId id="289" r:id="rId34"/>
   </p:sldIdLst>
   <p:sldSz cx="12192000" cy="6858000"/>
   <p:notesSz cx="6858000" cy="9144000"/>
@@ -191,7 +194,7 @@
           <a:noFill/>
           <a:extLst>
             <a:ext uri="{909E8E84-426E-40dd-AFC4-6F175D3DCCD1}">
-              <a14:hiddenFill xmlns="" xmlns:a14="http://schemas.microsoft.com/office/drawing/2010/main">
+              <a14:hiddenFill xmlns:a14="http://schemas.microsoft.com/office/drawing/2010/main" xmlns="">
                 <a:solidFill>
                   <a:srgbClr val="FFFFFF"/>
                 </a:solidFill>
@@ -251,7 +254,7 @@
             </a:ln>
             <a:extLst>
               <a:ext uri="{91240B29-F687-4f45-9708-019B960494DF}">
-                <a14:hiddenLine xmlns="" xmlns:a14="http://schemas.microsoft.com/office/drawing/2010/main" w="9525">
+                <a14:hiddenLine xmlns:a14="http://schemas.microsoft.com/office/drawing/2010/main" xmlns="" w="9525">
                   <a:solidFill>
                     <a:srgbClr val="000000"/>
                   </a:solidFill>
@@ -341,7 +344,7 @@
             </a:ln>
             <a:extLst>
               <a:ext uri="{91240B29-F687-4f45-9708-019B960494DF}">
-                <a14:hiddenLine xmlns="" xmlns:a14="http://schemas.microsoft.com/office/drawing/2010/main" w="9525">
+                <a14:hiddenLine xmlns:a14="http://schemas.microsoft.com/office/drawing/2010/main" xmlns="" w="9525">
                   <a:solidFill>
                     <a:srgbClr val="000000"/>
                   </a:solidFill>
@@ -431,7 +434,7 @@
             </a:ln>
             <a:extLst>
               <a:ext uri="{91240B29-F687-4f45-9708-019B960494DF}">
-                <a14:hiddenLine xmlns="" xmlns:a14="http://schemas.microsoft.com/office/drawing/2010/main" w="9525">
+                <a14:hiddenLine xmlns:a14="http://schemas.microsoft.com/office/drawing/2010/main" xmlns="" w="9525">
                   <a:solidFill>
                     <a:srgbClr val="000000"/>
                   </a:solidFill>
@@ -465,7 +468,7 @@
             </a:ln>
             <a:extLst>
               <a:ext uri="{91240B29-F687-4f45-9708-019B960494DF}">
-                <a14:hiddenLine xmlns="" xmlns:a14="http://schemas.microsoft.com/office/drawing/2010/main" w="9525">
+                <a14:hiddenLine xmlns:a14="http://schemas.microsoft.com/office/drawing/2010/main" xmlns="" w="9525">
                   <a:solidFill>
                     <a:srgbClr val="000000"/>
                   </a:solidFill>
@@ -555,7 +558,7 @@
             </a:ln>
             <a:extLst>
               <a:ext uri="{91240B29-F687-4f45-9708-019B960494DF}">
-                <a14:hiddenLine xmlns="" xmlns:a14="http://schemas.microsoft.com/office/drawing/2010/main" w="9525">
+                <a14:hiddenLine xmlns:a14="http://schemas.microsoft.com/office/drawing/2010/main" xmlns="" w="9525">
                   <a:solidFill>
                     <a:srgbClr val="000000"/>
                   </a:solidFill>
@@ -617,7 +620,7 @@
             </a:ln>
             <a:extLst>
               <a:ext uri="{91240B29-F687-4f45-9708-019B960494DF}">
-                <a14:hiddenLine xmlns="" xmlns:a14="http://schemas.microsoft.com/office/drawing/2010/main" w="9525">
+                <a14:hiddenLine xmlns:a14="http://schemas.microsoft.com/office/drawing/2010/main" xmlns="" w="9525">
                   <a:solidFill>
                     <a:srgbClr val="000000"/>
                   </a:solidFill>
@@ -679,7 +682,7 @@
             </a:ln>
             <a:extLst>
               <a:ext uri="{91240B29-F687-4f45-9708-019B960494DF}">
-                <a14:hiddenLine xmlns="" xmlns:a14="http://schemas.microsoft.com/office/drawing/2010/main" w="9525">
+                <a14:hiddenLine xmlns:a14="http://schemas.microsoft.com/office/drawing/2010/main" xmlns="" w="9525">
                   <a:solidFill>
                     <a:srgbClr val="000000"/>
                   </a:solidFill>
@@ -769,7 +772,7 @@
             </a:ln>
             <a:extLst>
               <a:ext uri="{91240B29-F687-4f45-9708-019B960494DF}">
-                <a14:hiddenLine xmlns="" xmlns:a14="http://schemas.microsoft.com/office/drawing/2010/main" w="9525">
+                <a14:hiddenLine xmlns:a14="http://schemas.microsoft.com/office/drawing/2010/main" xmlns="" w="9525">
                   <a:solidFill>
                     <a:srgbClr val="000000"/>
                   </a:solidFill>
@@ -831,7 +834,7 @@
             </a:ln>
             <a:extLst>
               <a:ext uri="{91240B29-F687-4f45-9708-019B960494DF}">
-                <a14:hiddenLine xmlns="" xmlns:a14="http://schemas.microsoft.com/office/drawing/2010/main" w="9525">
+                <a14:hiddenLine xmlns:a14="http://schemas.microsoft.com/office/drawing/2010/main" xmlns="" w="9525">
                   <a:solidFill>
                     <a:srgbClr val="000000"/>
                   </a:solidFill>
@@ -893,7 +896,7 @@
             </a:ln>
             <a:extLst>
               <a:ext uri="{91240B29-F687-4f45-9708-019B960494DF}">
-                <a14:hiddenLine xmlns="" xmlns:a14="http://schemas.microsoft.com/office/drawing/2010/main" w="9525">
+                <a14:hiddenLine xmlns:a14="http://schemas.microsoft.com/office/drawing/2010/main" xmlns="" w="9525">
                   <a:solidFill>
                     <a:srgbClr val="000000"/>
                   </a:solidFill>
@@ -983,7 +986,7 @@
             </a:ln>
             <a:extLst>
               <a:ext uri="{91240B29-F687-4f45-9708-019B960494DF}">
-                <a14:hiddenLine xmlns="" xmlns:a14="http://schemas.microsoft.com/office/drawing/2010/main" w="9525">
+                <a14:hiddenLine xmlns:a14="http://schemas.microsoft.com/office/drawing/2010/main" xmlns="" w="9525">
                   <a:solidFill>
                     <a:srgbClr val="000000"/>
                   </a:solidFill>
@@ -1073,7 +1076,7 @@
             </a:ln>
             <a:extLst>
               <a:ext uri="{91240B29-F687-4f45-9708-019B960494DF}">
-                <a14:hiddenLine xmlns="" xmlns:a14="http://schemas.microsoft.com/office/drawing/2010/main" w="9525">
+                <a14:hiddenLine xmlns:a14="http://schemas.microsoft.com/office/drawing/2010/main" xmlns="" w="9525">
                   <a:solidFill>
                     <a:srgbClr val="000000"/>
                   </a:solidFill>
@@ -1135,7 +1138,7 @@
             </a:ln>
             <a:extLst>
               <a:ext uri="{91240B29-F687-4f45-9708-019B960494DF}">
-                <a14:hiddenLine xmlns="" xmlns:a14="http://schemas.microsoft.com/office/drawing/2010/main" w="9525">
+                <a14:hiddenLine xmlns:a14="http://schemas.microsoft.com/office/drawing/2010/main" xmlns="" w="9525">
                   <a:solidFill>
                     <a:srgbClr val="000000"/>
                   </a:solidFill>
@@ -1245,7 +1248,7 @@
             </a:ln>
             <a:extLst>
               <a:ext uri="{91240B29-F687-4f45-9708-019B960494DF}">
-                <a14:hiddenLine xmlns="" xmlns:a14="http://schemas.microsoft.com/office/drawing/2010/main" w="9525">
+                <a14:hiddenLine xmlns:a14="http://schemas.microsoft.com/office/drawing/2010/main" xmlns="" w="9525">
                   <a:solidFill>
                     <a:srgbClr val="000000"/>
                   </a:solidFill>
@@ -1307,7 +1310,7 @@
             </a:ln>
             <a:extLst>
               <a:ext uri="{91240B29-F687-4f45-9708-019B960494DF}">
-                <a14:hiddenLine xmlns="" xmlns:a14="http://schemas.microsoft.com/office/drawing/2010/main" w="9525">
+                <a14:hiddenLine xmlns:a14="http://schemas.microsoft.com/office/drawing/2010/main" xmlns="" w="9525">
                   <a:solidFill>
                     <a:srgbClr val="000000"/>
                   </a:solidFill>
@@ -1397,7 +1400,7 @@
             </a:ln>
             <a:extLst>
               <a:ext uri="{91240B29-F687-4f45-9708-019B960494DF}">
-                <a14:hiddenLine xmlns="" xmlns:a14="http://schemas.microsoft.com/office/drawing/2010/main" w="9525">
+                <a14:hiddenLine xmlns:a14="http://schemas.microsoft.com/office/drawing/2010/main" xmlns="" w="9525">
                   <a:solidFill>
                     <a:srgbClr val="000000"/>
                   </a:solidFill>
@@ -1487,7 +1490,7 @@
             </a:ln>
             <a:extLst>
               <a:ext uri="{91240B29-F687-4f45-9708-019B960494DF}">
-                <a14:hiddenLine xmlns="" xmlns:a14="http://schemas.microsoft.com/office/drawing/2010/main" w="9525">
+                <a14:hiddenLine xmlns:a14="http://schemas.microsoft.com/office/drawing/2010/main" xmlns="" w="9525">
                   <a:solidFill>
                     <a:srgbClr val="000000"/>
                   </a:solidFill>
@@ -1549,7 +1552,7 @@
             </a:ln>
             <a:extLst>
               <a:ext uri="{91240B29-F687-4f45-9708-019B960494DF}">
-                <a14:hiddenLine xmlns="" xmlns:a14="http://schemas.microsoft.com/office/drawing/2010/main" w="9525">
+                <a14:hiddenLine xmlns:a14="http://schemas.microsoft.com/office/drawing/2010/main" xmlns="" w="9525">
                   <a:solidFill>
                     <a:srgbClr val="000000"/>
                   </a:solidFill>
@@ -1639,7 +1642,7 @@
             </a:ln>
             <a:extLst>
               <a:ext uri="{91240B29-F687-4f45-9708-019B960494DF}">
-                <a14:hiddenLine xmlns="" xmlns:a14="http://schemas.microsoft.com/office/drawing/2010/main" w="9525">
+                <a14:hiddenLine xmlns:a14="http://schemas.microsoft.com/office/drawing/2010/main" xmlns="" w="9525">
                   <a:solidFill>
                     <a:srgbClr val="000000"/>
                   </a:solidFill>
@@ -1729,7 +1732,7 @@
             </a:ln>
             <a:extLst>
               <a:ext uri="{91240B29-F687-4f45-9708-019B960494DF}">
-                <a14:hiddenLine xmlns="" xmlns:a14="http://schemas.microsoft.com/office/drawing/2010/main" w="9525">
+                <a14:hiddenLine xmlns:a14="http://schemas.microsoft.com/office/drawing/2010/main" xmlns="" w="9525">
                   <a:solidFill>
                     <a:srgbClr val="000000"/>
                   </a:solidFill>
@@ -1785,7 +1788,7 @@
             </a:ln>
             <a:extLst>
               <a:ext uri="{91240B29-F687-4f45-9708-019B960494DF}">
-                <a14:hiddenLine xmlns="" xmlns:a14="http://schemas.microsoft.com/office/drawing/2010/main" w="9525">
+                <a14:hiddenLine xmlns:a14="http://schemas.microsoft.com/office/drawing/2010/main" xmlns="" w="9525">
                   <a:solidFill>
                     <a:srgbClr val="000000"/>
                   </a:solidFill>
@@ -1875,7 +1878,7 @@
             </a:ln>
             <a:extLst>
               <a:ext uri="{91240B29-F687-4f45-9708-019B960494DF}">
-                <a14:hiddenLine xmlns="" xmlns:a14="http://schemas.microsoft.com/office/drawing/2010/main" w="9525">
+                <a14:hiddenLine xmlns:a14="http://schemas.microsoft.com/office/drawing/2010/main" xmlns="" w="9525">
                   <a:solidFill>
                     <a:srgbClr val="000000"/>
                   </a:solidFill>
@@ -1931,7 +1934,7 @@
             </a:ln>
             <a:extLst>
               <a:ext uri="{91240B29-F687-4f45-9708-019B960494DF}">
-                <a14:hiddenLine xmlns="" xmlns:a14="http://schemas.microsoft.com/office/drawing/2010/main" w="9525">
+                <a14:hiddenLine xmlns:a14="http://schemas.microsoft.com/office/drawing/2010/main" xmlns="" w="9525">
                   <a:solidFill>
                     <a:srgbClr val="000000"/>
                   </a:solidFill>
@@ -2021,7 +2024,7 @@
             </a:ln>
             <a:extLst>
               <a:ext uri="{91240B29-F687-4f45-9708-019B960494DF}">
-                <a14:hiddenLine xmlns="" xmlns:a14="http://schemas.microsoft.com/office/drawing/2010/main" w="9525">
+                <a14:hiddenLine xmlns:a14="http://schemas.microsoft.com/office/drawing/2010/main" xmlns="" w="9525">
                   <a:solidFill>
                     <a:srgbClr val="000000"/>
                   </a:solidFill>
@@ -2089,7 +2092,7 @@
             </a:ln>
             <a:extLst>
               <a:ext uri="{91240B29-F687-4f45-9708-019B960494DF}">
-                <a14:hiddenLine xmlns="" xmlns:a14="http://schemas.microsoft.com/office/drawing/2010/main" w="9525">
+                <a14:hiddenLine xmlns:a14="http://schemas.microsoft.com/office/drawing/2010/main" xmlns="" w="9525">
                   <a:solidFill>
                     <a:srgbClr val="000000"/>
                   </a:solidFill>
@@ -2179,7 +2182,7 @@
             </a:ln>
             <a:extLst>
               <a:ext uri="{91240B29-F687-4f45-9708-019B960494DF}">
-                <a14:hiddenLine xmlns="" xmlns:a14="http://schemas.microsoft.com/office/drawing/2010/main" w="9525">
+                <a14:hiddenLine xmlns:a14="http://schemas.microsoft.com/office/drawing/2010/main" xmlns="" w="9525">
                   <a:solidFill>
                     <a:srgbClr val="000000"/>
                   </a:solidFill>
@@ -2247,7 +2250,7 @@
             </a:ln>
             <a:extLst>
               <a:ext uri="{91240B29-F687-4f45-9708-019B960494DF}">
-                <a14:hiddenLine xmlns="" xmlns:a14="http://schemas.microsoft.com/office/drawing/2010/main" w="9525">
+                <a14:hiddenLine xmlns:a14="http://schemas.microsoft.com/office/drawing/2010/main" xmlns="" w="9525">
                   <a:solidFill>
                     <a:srgbClr val="000000"/>
                   </a:solidFill>
@@ -2337,7 +2340,7 @@
             </a:ln>
             <a:extLst>
               <a:ext uri="{91240B29-F687-4f45-9708-019B960494DF}">
-                <a14:hiddenLine xmlns="" xmlns:a14="http://schemas.microsoft.com/office/drawing/2010/main" w="9525">
+                <a14:hiddenLine xmlns:a14="http://schemas.microsoft.com/office/drawing/2010/main" xmlns="" w="9525">
                   <a:solidFill>
                     <a:srgbClr val="000000"/>
                   </a:solidFill>
@@ -2371,7 +2374,7 @@
             </a:ln>
             <a:extLst>
               <a:ext uri="{91240B29-F687-4f45-9708-019B960494DF}">
-                <a14:hiddenLine xmlns="" xmlns:a14="http://schemas.microsoft.com/office/drawing/2010/main" w="9525">
+                <a14:hiddenLine xmlns:a14="http://schemas.microsoft.com/office/drawing/2010/main" xmlns="" w="9525">
                   <a:solidFill>
                     <a:srgbClr val="000000"/>
                   </a:solidFill>
@@ -2461,7 +2464,7 @@
             </a:ln>
             <a:extLst>
               <a:ext uri="{91240B29-F687-4f45-9708-019B960494DF}">
-                <a14:hiddenLine xmlns="" xmlns:a14="http://schemas.microsoft.com/office/drawing/2010/main" w="9525">
+                <a14:hiddenLine xmlns:a14="http://schemas.microsoft.com/office/drawing/2010/main" xmlns="" w="9525">
                   <a:solidFill>
                     <a:srgbClr val="000000"/>
                   </a:solidFill>
@@ -2523,7 +2526,7 @@
             </a:ln>
             <a:extLst>
               <a:ext uri="{91240B29-F687-4f45-9708-019B960494DF}">
-                <a14:hiddenLine xmlns="" xmlns:a14="http://schemas.microsoft.com/office/drawing/2010/main" w="9525">
+                <a14:hiddenLine xmlns:a14="http://schemas.microsoft.com/office/drawing/2010/main" xmlns="" w="9525">
                   <a:solidFill>
                     <a:srgbClr val="000000"/>
                   </a:solidFill>
@@ -2585,7 +2588,7 @@
             </a:ln>
             <a:extLst>
               <a:ext uri="{91240B29-F687-4f45-9708-019B960494DF}">
-                <a14:hiddenLine xmlns="" xmlns:a14="http://schemas.microsoft.com/office/drawing/2010/main" w="9525">
+                <a14:hiddenLine xmlns:a14="http://schemas.microsoft.com/office/drawing/2010/main" xmlns="" w="9525">
                   <a:solidFill>
                     <a:srgbClr val="000000"/>
                   </a:solidFill>
@@ -2675,7 +2678,7 @@
             </a:ln>
             <a:extLst>
               <a:ext uri="{91240B29-F687-4f45-9708-019B960494DF}">
-                <a14:hiddenLine xmlns="" xmlns:a14="http://schemas.microsoft.com/office/drawing/2010/main" w="9525">
+                <a14:hiddenLine xmlns:a14="http://schemas.microsoft.com/office/drawing/2010/main" xmlns="" w="9525">
                   <a:solidFill>
                     <a:srgbClr val="000000"/>
                   </a:solidFill>
@@ -2743,7 +2746,7 @@
             </a:ln>
             <a:extLst>
               <a:ext uri="{91240B29-F687-4f45-9708-019B960494DF}">
-                <a14:hiddenLine xmlns="" xmlns:a14="http://schemas.microsoft.com/office/drawing/2010/main" w="9525">
+                <a14:hiddenLine xmlns:a14="http://schemas.microsoft.com/office/drawing/2010/main" xmlns="" w="9525">
                   <a:solidFill>
                     <a:srgbClr val="000000"/>
                   </a:solidFill>
@@ -2805,7 +2808,7 @@
             </a:ln>
             <a:extLst>
               <a:ext uri="{91240B29-F687-4f45-9708-019B960494DF}">
-                <a14:hiddenLine xmlns="" xmlns:a14="http://schemas.microsoft.com/office/drawing/2010/main" w="9525">
+                <a14:hiddenLine xmlns:a14="http://schemas.microsoft.com/office/drawing/2010/main" xmlns="" w="9525">
                   <a:solidFill>
                     <a:srgbClr val="000000"/>
                   </a:solidFill>
@@ -2895,7 +2898,7 @@
             </a:ln>
             <a:extLst>
               <a:ext uri="{91240B29-F687-4f45-9708-019B960494DF}">
-                <a14:hiddenLine xmlns="" xmlns:a14="http://schemas.microsoft.com/office/drawing/2010/main" w="9525">
+                <a14:hiddenLine xmlns:a14="http://schemas.microsoft.com/office/drawing/2010/main" xmlns="" w="9525">
                   <a:solidFill>
                     <a:srgbClr val="000000"/>
                   </a:solidFill>
@@ -2957,7 +2960,7 @@
             </a:ln>
             <a:extLst>
               <a:ext uri="{91240B29-F687-4f45-9708-019B960494DF}">
-                <a14:hiddenLine xmlns="" xmlns:a14="http://schemas.microsoft.com/office/drawing/2010/main" w="9525">
+                <a14:hiddenLine xmlns:a14="http://schemas.microsoft.com/office/drawing/2010/main" xmlns="" w="9525">
                   <a:solidFill>
                     <a:srgbClr val="000000"/>
                   </a:solidFill>
@@ -3047,7 +3050,7 @@
             </a:ln>
             <a:extLst>
               <a:ext uri="{91240B29-F687-4f45-9708-019B960494DF}">
-                <a14:hiddenLine xmlns="" xmlns:a14="http://schemas.microsoft.com/office/drawing/2010/main" w="9525">
+                <a14:hiddenLine xmlns:a14="http://schemas.microsoft.com/office/drawing/2010/main" xmlns="" w="9525">
                   <a:solidFill>
                     <a:srgbClr val="000000"/>
                   </a:solidFill>
@@ -3109,7 +3112,7 @@
             </a:ln>
             <a:extLst>
               <a:ext uri="{91240B29-F687-4f45-9708-019B960494DF}">
-                <a14:hiddenLine xmlns="" xmlns:a14="http://schemas.microsoft.com/office/drawing/2010/main" w="9525">
+                <a14:hiddenLine xmlns:a14="http://schemas.microsoft.com/office/drawing/2010/main" xmlns="" w="9525">
                   <a:solidFill>
                     <a:srgbClr val="000000"/>
                   </a:solidFill>
@@ -3199,7 +3202,7 @@
             </a:ln>
             <a:extLst>
               <a:ext uri="{91240B29-F687-4f45-9708-019B960494DF}">
-                <a14:hiddenLine xmlns="" xmlns:a14="http://schemas.microsoft.com/office/drawing/2010/main" w="9525">
+                <a14:hiddenLine xmlns:a14="http://schemas.microsoft.com/office/drawing/2010/main" xmlns="" w="9525">
                   <a:solidFill>
                     <a:srgbClr val="000000"/>
                   </a:solidFill>
@@ -3233,7 +3236,7 @@
             </a:ln>
             <a:extLst>
               <a:ext uri="{91240B29-F687-4f45-9708-019B960494DF}">
-                <a14:hiddenLine xmlns="" xmlns:a14="http://schemas.microsoft.com/office/drawing/2010/main" w="9525">
+                <a14:hiddenLine xmlns:a14="http://schemas.microsoft.com/office/drawing/2010/main" xmlns="" w="9525">
                   <a:solidFill>
                     <a:srgbClr val="000000"/>
                   </a:solidFill>
@@ -3298,7 +3301,7 @@
             </a:ln>
             <a:extLst>
               <a:ext uri="{91240B29-F687-4f45-9708-019B960494DF}">
-                <a14:hiddenLine xmlns="" xmlns:a14="http://schemas.microsoft.com/office/drawing/2010/main" w="9525">
+                <a14:hiddenLine xmlns:a14="http://schemas.microsoft.com/office/drawing/2010/main" xmlns="" w="9525">
                   <a:solidFill>
                     <a:srgbClr val="000000"/>
                   </a:solidFill>
@@ -3388,7 +3391,7 @@
             </a:ln>
             <a:extLst>
               <a:ext uri="{91240B29-F687-4f45-9708-019B960494DF}">
-                <a14:hiddenLine xmlns="" xmlns:a14="http://schemas.microsoft.com/office/drawing/2010/main" w="9525">
+                <a14:hiddenLine xmlns:a14="http://schemas.microsoft.com/office/drawing/2010/main" xmlns="" w="9525">
                   <a:solidFill>
                     <a:srgbClr val="000000"/>
                   </a:solidFill>
@@ -3450,7 +3453,7 @@
             </a:ln>
             <a:extLst>
               <a:ext uri="{91240B29-F687-4f45-9708-019B960494DF}">
-                <a14:hiddenLine xmlns="" xmlns:a14="http://schemas.microsoft.com/office/drawing/2010/main" w="9525">
+                <a14:hiddenLine xmlns:a14="http://schemas.microsoft.com/office/drawing/2010/main" xmlns="" w="9525">
                   <a:solidFill>
                     <a:srgbClr val="000000"/>
                   </a:solidFill>
@@ -3540,7 +3543,7 @@
             </a:ln>
             <a:extLst>
               <a:ext uri="{91240B29-F687-4f45-9708-019B960494DF}">
-                <a14:hiddenLine xmlns="" xmlns:a14="http://schemas.microsoft.com/office/drawing/2010/main" w="9525">
+                <a14:hiddenLine xmlns:a14="http://schemas.microsoft.com/office/drawing/2010/main" xmlns="" w="9525">
                   <a:solidFill>
                     <a:srgbClr val="000000"/>
                   </a:solidFill>
@@ -3630,7 +3633,7 @@
             </a:ln>
             <a:extLst>
               <a:ext uri="{91240B29-F687-4f45-9708-019B960494DF}">
-                <a14:hiddenLine xmlns="" xmlns:a14="http://schemas.microsoft.com/office/drawing/2010/main" w="9525">
+                <a14:hiddenLine xmlns:a14="http://schemas.microsoft.com/office/drawing/2010/main" xmlns="" w="9525">
                   <a:solidFill>
                     <a:srgbClr val="000000"/>
                   </a:solidFill>
@@ -3695,7 +3698,7 @@
             </a:ln>
             <a:extLst>
               <a:ext uri="{91240B29-F687-4f45-9708-019B960494DF}">
-                <a14:hiddenLine xmlns="" xmlns:a14="http://schemas.microsoft.com/office/drawing/2010/main" w="9525">
+                <a14:hiddenLine xmlns:a14="http://schemas.microsoft.com/office/drawing/2010/main" xmlns="" w="9525">
                   <a:solidFill>
                     <a:srgbClr val="000000"/>
                   </a:solidFill>
@@ -3757,7 +3760,7 @@
             </a:ln>
             <a:extLst>
               <a:ext uri="{91240B29-F687-4f45-9708-019B960494DF}">
-                <a14:hiddenLine xmlns="" xmlns:a14="http://schemas.microsoft.com/office/drawing/2010/main" w="9525">
+                <a14:hiddenLine xmlns:a14="http://schemas.microsoft.com/office/drawing/2010/main" xmlns="" w="9525">
                   <a:solidFill>
                     <a:srgbClr val="000000"/>
                   </a:solidFill>
@@ -3847,7 +3850,7 @@
             </a:ln>
             <a:extLst>
               <a:ext uri="{91240B29-F687-4f45-9708-019B960494DF}">
-                <a14:hiddenLine xmlns="" xmlns:a14="http://schemas.microsoft.com/office/drawing/2010/main" w="9525">
+                <a14:hiddenLine xmlns:a14="http://schemas.microsoft.com/office/drawing/2010/main" xmlns="" w="9525">
                   <a:solidFill>
                     <a:srgbClr val="000000"/>
                   </a:solidFill>
@@ -3937,7 +3940,7 @@
             </a:ln>
             <a:extLst>
               <a:ext uri="{91240B29-F687-4f45-9708-019B960494DF}">
-                <a14:hiddenLine xmlns="" xmlns:a14="http://schemas.microsoft.com/office/drawing/2010/main" w="9525">
+                <a14:hiddenLine xmlns:a14="http://schemas.microsoft.com/office/drawing/2010/main" xmlns="" w="9525">
                   <a:solidFill>
                     <a:srgbClr val="000000"/>
                   </a:solidFill>
@@ -3999,7 +4002,7 @@
             </a:ln>
             <a:extLst>
               <a:ext uri="{91240B29-F687-4f45-9708-019B960494DF}">
-                <a14:hiddenLine xmlns="" xmlns:a14="http://schemas.microsoft.com/office/drawing/2010/main" w="9525">
+                <a14:hiddenLine xmlns:a14="http://schemas.microsoft.com/office/drawing/2010/main" xmlns="" w="9525">
                   <a:solidFill>
                     <a:srgbClr val="000000"/>
                   </a:solidFill>
@@ -4119,7 +4122,7 @@
             </a:ln>
             <a:extLst>
               <a:ext uri="{91240B29-F687-4f45-9708-019B960494DF}">
-                <a14:hiddenLine xmlns="" xmlns:a14="http://schemas.microsoft.com/office/drawing/2010/main" w="9525">
+                <a14:hiddenLine xmlns:a14="http://schemas.microsoft.com/office/drawing/2010/main" xmlns="" w="9525">
                   <a:solidFill>
                     <a:srgbClr val="000000"/>
                   </a:solidFill>
@@ -4187,7 +4190,7 @@
             </a:ln>
             <a:extLst>
               <a:ext uri="{91240B29-F687-4f45-9708-019B960494DF}">
-                <a14:hiddenLine xmlns="" xmlns:a14="http://schemas.microsoft.com/office/drawing/2010/main" w="9525">
+                <a14:hiddenLine xmlns:a14="http://schemas.microsoft.com/office/drawing/2010/main" xmlns="" w="9525">
                   <a:solidFill>
                     <a:srgbClr val="000000"/>
                   </a:solidFill>
@@ -4277,7 +4280,7 @@
             </a:ln>
             <a:extLst>
               <a:ext uri="{91240B29-F687-4f45-9708-019B960494DF}">
-                <a14:hiddenLine xmlns="" xmlns:a14="http://schemas.microsoft.com/office/drawing/2010/main" w="9525">
+                <a14:hiddenLine xmlns:a14="http://schemas.microsoft.com/office/drawing/2010/main" xmlns="" w="9525">
                   <a:solidFill>
                     <a:srgbClr val="000000"/>
                   </a:solidFill>
@@ -4417,7 +4420,7 @@
           <a:p>
             <a:fld id="{48A87A34-81AB-432B-8DAE-1953F412C126}" type="datetimeFigureOut">
               <a:rPr lang="en-US" dirty="0"/>
-              <a:t>7/19/2019</a:t>
+              <a:t>7/29/2019</a:t>
             </a:fld>
             <a:endParaRPr lang="en-US" dirty="0"/>
           </a:p>
@@ -4679,7 +4682,7 @@
           <a:p>
             <a:fld id="{48A87A34-81AB-432B-8DAE-1953F412C126}" type="datetimeFigureOut">
               <a:rPr lang="en-US" dirty="0"/>
-              <a:t>7/19/2019</a:t>
+              <a:t>7/29/2019</a:t>
             </a:fld>
             <a:endParaRPr lang="en-US" dirty="0"/>
           </a:p>
@@ -4870,7 +4873,7 @@
           <a:p>
             <a:fld id="{48A87A34-81AB-432B-8DAE-1953F412C126}" type="datetimeFigureOut">
               <a:rPr lang="en-US" dirty="0"/>
-              <a:t>7/19/2019</a:t>
+              <a:t>7/29/2019</a:t>
             </a:fld>
             <a:endParaRPr lang="en-US" dirty="0"/>
           </a:p>
@@ -5128,7 +5131,7 @@
           <a:p>
             <a:fld id="{48A87A34-81AB-432B-8DAE-1953F412C126}" type="datetimeFigureOut">
               <a:rPr lang="en-US" dirty="0"/>
-              <a:t>7/19/2019</a:t>
+              <a:t>7/29/2019</a:t>
             </a:fld>
             <a:endParaRPr lang="en-US" dirty="0"/>
           </a:p>
@@ -5557,7 +5560,7 @@
           <a:p>
             <a:fld id="{48A87A34-81AB-432B-8DAE-1953F412C126}" type="datetimeFigureOut">
               <a:rPr lang="en-US" dirty="0"/>
-              <a:t>7/19/2019</a:t>
+              <a:t>7/29/2019</a:t>
             </a:fld>
             <a:endParaRPr lang="en-US" dirty="0"/>
           </a:p>
@@ -6098,7 +6101,7 @@
           <a:p>
             <a:fld id="{48A87A34-81AB-432B-8DAE-1953F412C126}" type="datetimeFigureOut">
               <a:rPr lang="en-US" dirty="0"/>
-              <a:t>7/19/2019</a:t>
+              <a:t>7/29/2019</a:t>
             </a:fld>
             <a:endParaRPr lang="en-US" dirty="0"/>
           </a:p>
@@ -6813,7 +6816,7 @@
           <a:p>
             <a:fld id="{48A87A34-81AB-432B-8DAE-1953F412C126}" type="datetimeFigureOut">
               <a:rPr lang="en-US" dirty="0"/>
-              <a:t>7/19/2019</a:t>
+              <a:t>7/29/2019</a:t>
             </a:fld>
             <a:endParaRPr lang="en-US" dirty="0"/>
           </a:p>
@@ -6978,7 +6981,7 @@
           <a:p>
             <a:fld id="{48A87A34-81AB-432B-8DAE-1953F412C126}" type="datetimeFigureOut">
               <a:rPr lang="en-US" dirty="0"/>
-              <a:t>7/19/2019</a:t>
+              <a:t>7/29/2019</a:t>
             </a:fld>
             <a:endParaRPr lang="en-US" dirty="0"/>
           </a:p>
@@ -7153,7 +7156,7 @@
           <a:p>
             <a:fld id="{48A87A34-81AB-432B-8DAE-1953F412C126}" type="datetimeFigureOut">
               <a:rPr lang="en-US" dirty="0"/>
-              <a:t>7/19/2019</a:t>
+              <a:t>7/29/2019</a:t>
             </a:fld>
             <a:endParaRPr lang="en-US" dirty="0"/>
           </a:p>
@@ -7318,7 +7321,7 @@
           <a:p>
             <a:fld id="{48A87A34-81AB-432B-8DAE-1953F412C126}" type="datetimeFigureOut">
               <a:rPr lang="en-US" dirty="0"/>
-              <a:t>7/19/2019</a:t>
+              <a:t>7/29/2019</a:t>
             </a:fld>
             <a:endParaRPr lang="en-US" dirty="0"/>
           </a:p>
@@ -7563,7 +7566,7 @@
           <a:p>
             <a:fld id="{48A87A34-81AB-432B-8DAE-1953F412C126}" type="datetimeFigureOut">
               <a:rPr lang="en-US" dirty="0"/>
-              <a:t>7/19/2019</a:t>
+              <a:t>7/29/2019</a:t>
             </a:fld>
             <a:endParaRPr lang="en-US" dirty="0"/>
           </a:p>
@@ -7790,7 +7793,7 @@
           <a:p>
             <a:fld id="{48A87A34-81AB-432B-8DAE-1953F412C126}" type="datetimeFigureOut">
               <a:rPr lang="en-US" dirty="0"/>
-              <a:t>7/19/2019</a:t>
+              <a:t>7/29/2019</a:t>
             </a:fld>
             <a:endParaRPr lang="en-US" dirty="0"/>
           </a:p>
@@ -8166,7 +8169,7 @@
           <a:p>
             <a:fld id="{48A87A34-81AB-432B-8DAE-1953F412C126}" type="datetimeFigureOut">
               <a:rPr lang="en-US" dirty="0"/>
-              <a:t>7/19/2019</a:t>
+              <a:t>7/29/2019</a:t>
             </a:fld>
             <a:endParaRPr lang="en-US" dirty="0"/>
           </a:p>
@@ -8279,7 +8282,7 @@
           <a:p>
             <a:fld id="{48A87A34-81AB-432B-8DAE-1953F412C126}" type="datetimeFigureOut">
               <a:rPr lang="en-US" dirty="0"/>
-              <a:t>7/19/2019</a:t>
+              <a:t>7/29/2019</a:t>
             </a:fld>
             <a:endParaRPr lang="en-US" dirty="0"/>
           </a:p>
@@ -8369,7 +8372,7 @@
           <a:p>
             <a:fld id="{48A87A34-81AB-432B-8DAE-1953F412C126}" type="datetimeFigureOut">
               <a:rPr lang="en-US" dirty="0"/>
-              <a:t>7/19/2019</a:t>
+              <a:t>7/29/2019</a:t>
             </a:fld>
             <a:endParaRPr lang="en-US" dirty="0"/>
           </a:p>
@@ -8613,7 +8616,7 @@
           <a:p>
             <a:fld id="{48A87A34-81AB-432B-8DAE-1953F412C126}" type="datetimeFigureOut">
               <a:rPr lang="en-US" dirty="0"/>
-              <a:t>7/19/2019</a:t>
+              <a:t>7/29/2019</a:t>
             </a:fld>
             <a:endParaRPr lang="en-US" dirty="0"/>
           </a:p>
@@ -8888,7 +8891,7 @@
           <a:p>
             <a:fld id="{48A87A34-81AB-432B-8DAE-1953F412C126}" type="datetimeFigureOut">
               <a:rPr lang="en-US" dirty="0"/>
-              <a:t>7/19/2019</a:t>
+              <a:t>7/29/2019</a:t>
             </a:fld>
             <a:endParaRPr lang="en-US" dirty="0"/>
           </a:p>
@@ -8999,7 +9002,7 @@
           <a:noFill/>
           <a:extLst>
             <a:ext uri="{909E8E84-426E-40dd-AFC4-6F175D3DCCD1}">
-              <a14:hiddenFill xmlns="" xmlns:a14="http://schemas.microsoft.com/office/drawing/2010/main">
+              <a14:hiddenFill xmlns:a14="http://schemas.microsoft.com/office/drawing/2010/main" xmlns="">
                 <a:solidFill>
                   <a:srgbClr val="FFFFFF"/>
                 </a:solidFill>
@@ -9073,7 +9076,7 @@
               </a:ln>
               <a:extLst>
                 <a:ext uri="{91240B29-F687-4f45-9708-019B960494DF}">
-                  <a14:hiddenLine xmlns="" xmlns:a14="http://schemas.microsoft.com/office/drawing/2010/main" w="9525">
+                  <a14:hiddenLine xmlns:a14="http://schemas.microsoft.com/office/drawing/2010/main" xmlns="" w="9525">
                     <a:solidFill>
                       <a:srgbClr val="000000"/>
                     </a:solidFill>
@@ -9163,7 +9166,7 @@
               </a:ln>
               <a:extLst>
                 <a:ext uri="{91240B29-F687-4f45-9708-019B960494DF}">
-                  <a14:hiddenLine xmlns="" xmlns:a14="http://schemas.microsoft.com/office/drawing/2010/main" w="9525">
+                  <a14:hiddenLine xmlns:a14="http://schemas.microsoft.com/office/drawing/2010/main" xmlns="" w="9525">
                     <a:solidFill>
                       <a:srgbClr val="000000"/>
                     </a:solidFill>
@@ -9253,7 +9256,7 @@
               </a:ln>
               <a:extLst>
                 <a:ext uri="{91240B29-F687-4f45-9708-019B960494DF}">
-                  <a14:hiddenLine xmlns="" xmlns:a14="http://schemas.microsoft.com/office/drawing/2010/main" w="9525">
+                  <a14:hiddenLine xmlns:a14="http://schemas.microsoft.com/office/drawing/2010/main" xmlns="" w="9525">
                     <a:solidFill>
                       <a:srgbClr val="000000"/>
                     </a:solidFill>
@@ -9315,7 +9318,7 @@
               </a:ln>
               <a:extLst>
                 <a:ext uri="{91240B29-F687-4f45-9708-019B960494DF}">
-                  <a14:hiddenLine xmlns="" xmlns:a14="http://schemas.microsoft.com/office/drawing/2010/main" w="9525">
+                  <a14:hiddenLine xmlns:a14="http://schemas.microsoft.com/office/drawing/2010/main" xmlns="" w="9525">
                     <a:solidFill>
                       <a:srgbClr val="000000"/>
                     </a:solidFill>
@@ -9405,7 +9408,7 @@
               </a:ln>
               <a:extLst>
                 <a:ext uri="{91240B29-F687-4f45-9708-019B960494DF}">
-                  <a14:hiddenLine xmlns="" xmlns:a14="http://schemas.microsoft.com/office/drawing/2010/main" w="9525">
+                  <a14:hiddenLine xmlns:a14="http://schemas.microsoft.com/office/drawing/2010/main" xmlns="" w="9525">
                     <a:solidFill>
                       <a:srgbClr val="000000"/>
                     </a:solidFill>
@@ -9467,7 +9470,7 @@
               </a:ln>
               <a:extLst>
                 <a:ext uri="{91240B29-F687-4f45-9708-019B960494DF}">
-                  <a14:hiddenLine xmlns="" xmlns:a14="http://schemas.microsoft.com/office/drawing/2010/main" w="9525">
+                  <a14:hiddenLine xmlns:a14="http://schemas.microsoft.com/office/drawing/2010/main" xmlns="" w="9525">
                     <a:solidFill>
                       <a:srgbClr val="000000"/>
                     </a:solidFill>
@@ -9529,7 +9532,7 @@
               </a:ln>
               <a:extLst>
                 <a:ext uri="{91240B29-F687-4f45-9708-019B960494DF}">
-                  <a14:hiddenLine xmlns="" xmlns:a14="http://schemas.microsoft.com/office/drawing/2010/main" w="9525">
+                  <a14:hiddenLine xmlns:a14="http://schemas.microsoft.com/office/drawing/2010/main" xmlns="" w="9525">
                     <a:solidFill>
                       <a:srgbClr val="000000"/>
                     </a:solidFill>
@@ -9619,7 +9622,7 @@
               </a:ln>
               <a:extLst>
                 <a:ext uri="{91240B29-F687-4f45-9708-019B960494DF}">
-                  <a14:hiddenLine xmlns="" xmlns:a14="http://schemas.microsoft.com/office/drawing/2010/main" w="9525">
+                  <a14:hiddenLine xmlns:a14="http://schemas.microsoft.com/office/drawing/2010/main" xmlns="" w="9525">
                     <a:solidFill>
                       <a:srgbClr val="000000"/>
                     </a:solidFill>
@@ -9709,7 +9712,7 @@
               </a:ln>
               <a:extLst>
                 <a:ext uri="{91240B29-F687-4f45-9708-019B960494DF}">
-                  <a14:hiddenLine xmlns="" xmlns:a14="http://schemas.microsoft.com/office/drawing/2010/main" w="9525">
+                  <a14:hiddenLine xmlns:a14="http://schemas.microsoft.com/office/drawing/2010/main" xmlns="" w="9525">
                     <a:solidFill>
                       <a:srgbClr val="000000"/>
                     </a:solidFill>
@@ -9771,7 +9774,7 @@
               </a:ln>
               <a:extLst>
                 <a:ext uri="{91240B29-F687-4f45-9708-019B960494DF}">
-                  <a14:hiddenLine xmlns="" xmlns:a14="http://schemas.microsoft.com/office/drawing/2010/main" w="9525">
+                  <a14:hiddenLine xmlns:a14="http://schemas.microsoft.com/office/drawing/2010/main" xmlns="" w="9525">
                     <a:solidFill>
                       <a:srgbClr val="000000"/>
                     </a:solidFill>
@@ -9881,7 +9884,7 @@
               </a:ln>
               <a:extLst>
                 <a:ext uri="{91240B29-F687-4f45-9708-019B960494DF}">
-                  <a14:hiddenLine xmlns="" xmlns:a14="http://schemas.microsoft.com/office/drawing/2010/main" w="9525">
+                  <a14:hiddenLine xmlns:a14="http://schemas.microsoft.com/office/drawing/2010/main" xmlns="" w="9525">
                     <a:solidFill>
                       <a:srgbClr val="000000"/>
                     </a:solidFill>
@@ -9965,7 +9968,7 @@
               </a:ln>
               <a:extLst>
                 <a:ext uri="{91240B29-F687-4f45-9708-019B960494DF}">
-                  <a14:hiddenLine xmlns="" xmlns:a14="http://schemas.microsoft.com/office/drawing/2010/main" w="9525">
+                  <a14:hiddenLine xmlns:a14="http://schemas.microsoft.com/office/drawing/2010/main" xmlns="" w="9525">
                     <a:solidFill>
                       <a:srgbClr val="000000"/>
                     </a:solidFill>
@@ -10027,7 +10030,7 @@
               </a:ln>
               <a:extLst>
                 <a:ext uri="{91240B29-F687-4f45-9708-019B960494DF}">
-                  <a14:hiddenLine xmlns="" xmlns:a14="http://schemas.microsoft.com/office/drawing/2010/main" w="9525">
+                  <a14:hiddenLine xmlns:a14="http://schemas.microsoft.com/office/drawing/2010/main" xmlns="" w="9525">
                     <a:solidFill>
                       <a:srgbClr val="000000"/>
                     </a:solidFill>
@@ -10089,7 +10092,7 @@
               </a:ln>
               <a:extLst>
                 <a:ext uri="{91240B29-F687-4f45-9708-019B960494DF}">
-                  <a14:hiddenLine xmlns="" xmlns:a14="http://schemas.microsoft.com/office/drawing/2010/main" w="9525">
+                  <a14:hiddenLine xmlns:a14="http://schemas.microsoft.com/office/drawing/2010/main" xmlns="" w="9525">
                     <a:solidFill>
                       <a:srgbClr val="000000"/>
                     </a:solidFill>
@@ -10179,7 +10182,7 @@
               </a:ln>
               <a:extLst>
                 <a:ext uri="{91240B29-F687-4f45-9708-019B960494DF}">
-                  <a14:hiddenLine xmlns="" xmlns:a14="http://schemas.microsoft.com/office/drawing/2010/main" w="9525">
+                  <a14:hiddenLine xmlns:a14="http://schemas.microsoft.com/office/drawing/2010/main" xmlns="" w="9525">
                     <a:solidFill>
                       <a:srgbClr val="000000"/>
                     </a:solidFill>
@@ -10213,7 +10216,7 @@
               </a:ln>
               <a:extLst>
                 <a:ext uri="{91240B29-F687-4f45-9708-019B960494DF}">
-                  <a14:hiddenLine xmlns="" xmlns:a14="http://schemas.microsoft.com/office/drawing/2010/main" w="9525">
+                  <a14:hiddenLine xmlns:a14="http://schemas.microsoft.com/office/drawing/2010/main" xmlns="" w="9525">
                     <a:solidFill>
                       <a:srgbClr val="000000"/>
                     </a:solidFill>
@@ -10278,7 +10281,7 @@
               </a:ln>
               <a:extLst>
                 <a:ext uri="{91240B29-F687-4f45-9708-019B960494DF}">
-                  <a14:hiddenLine xmlns="" xmlns:a14="http://schemas.microsoft.com/office/drawing/2010/main" w="9525">
+                  <a14:hiddenLine xmlns:a14="http://schemas.microsoft.com/office/drawing/2010/main" xmlns="" w="9525">
                     <a:solidFill>
                       <a:srgbClr val="000000"/>
                     </a:solidFill>
@@ -10368,7 +10371,7 @@
               </a:ln>
               <a:extLst>
                 <a:ext uri="{91240B29-F687-4f45-9708-019B960494DF}">
-                  <a14:hiddenLine xmlns="" xmlns:a14="http://schemas.microsoft.com/office/drawing/2010/main" w="9525">
+                  <a14:hiddenLine xmlns:a14="http://schemas.microsoft.com/office/drawing/2010/main" xmlns="" w="9525">
                     <a:solidFill>
                       <a:srgbClr val="000000"/>
                     </a:solidFill>
@@ -10430,7 +10433,7 @@
               </a:ln>
               <a:extLst>
                 <a:ext uri="{91240B29-F687-4f45-9708-019B960494DF}">
-                  <a14:hiddenLine xmlns="" xmlns:a14="http://schemas.microsoft.com/office/drawing/2010/main" w="9525">
+                  <a14:hiddenLine xmlns:a14="http://schemas.microsoft.com/office/drawing/2010/main" xmlns="" w="9525">
                     <a:solidFill>
                       <a:srgbClr val="000000"/>
                     </a:solidFill>
@@ -10520,7 +10523,7 @@
               </a:ln>
               <a:extLst>
                 <a:ext uri="{91240B29-F687-4f45-9708-019B960494DF}">
-                  <a14:hiddenLine xmlns="" xmlns:a14="http://schemas.microsoft.com/office/drawing/2010/main" w="9525">
+                  <a14:hiddenLine xmlns:a14="http://schemas.microsoft.com/office/drawing/2010/main" xmlns="" w="9525">
                     <a:solidFill>
                       <a:srgbClr val="000000"/>
                     </a:solidFill>
@@ -10585,7 +10588,7 @@
               </a:ln>
               <a:extLst>
                 <a:ext uri="{91240B29-F687-4f45-9708-019B960494DF}">
-                  <a14:hiddenLine xmlns="" xmlns:a14="http://schemas.microsoft.com/office/drawing/2010/main" w="9525">
+                  <a14:hiddenLine xmlns:a14="http://schemas.microsoft.com/office/drawing/2010/main" xmlns="" w="9525">
                     <a:solidFill>
                       <a:srgbClr val="000000"/>
                     </a:solidFill>
@@ -10647,7 +10650,7 @@
               </a:ln>
               <a:extLst>
                 <a:ext uri="{91240B29-F687-4f45-9708-019B960494DF}">
-                  <a14:hiddenLine xmlns="" xmlns:a14="http://schemas.microsoft.com/office/drawing/2010/main" w="9525">
+                  <a14:hiddenLine xmlns:a14="http://schemas.microsoft.com/office/drawing/2010/main" xmlns="" w="9525">
                     <a:solidFill>
                       <a:srgbClr val="000000"/>
                     </a:solidFill>
@@ -10737,7 +10740,7 @@
               </a:ln>
               <a:extLst>
                 <a:ext uri="{91240B29-F687-4f45-9708-019B960494DF}">
-                  <a14:hiddenLine xmlns="" xmlns:a14="http://schemas.microsoft.com/office/drawing/2010/main" w="9525">
+                  <a14:hiddenLine xmlns:a14="http://schemas.microsoft.com/office/drawing/2010/main" xmlns="" w="9525">
                     <a:solidFill>
                       <a:srgbClr val="000000"/>
                     </a:solidFill>
@@ -10827,7 +10830,7 @@
               </a:ln>
               <a:extLst>
                 <a:ext uri="{91240B29-F687-4f45-9708-019B960494DF}">
-                  <a14:hiddenLine xmlns="" xmlns:a14="http://schemas.microsoft.com/office/drawing/2010/main" w="9525">
+                  <a14:hiddenLine xmlns:a14="http://schemas.microsoft.com/office/drawing/2010/main" xmlns="" w="9525">
                     <a:solidFill>
                       <a:srgbClr val="000000"/>
                     </a:solidFill>
@@ -10892,7 +10895,7 @@
               </a:ln>
               <a:extLst>
                 <a:ext uri="{91240B29-F687-4f45-9708-019B960494DF}">
-                  <a14:hiddenLine xmlns="" xmlns:a14="http://schemas.microsoft.com/office/drawing/2010/main" w="9525">
+                  <a14:hiddenLine xmlns:a14="http://schemas.microsoft.com/office/drawing/2010/main" xmlns="" w="9525">
                     <a:solidFill>
                       <a:srgbClr val="000000"/>
                     </a:solidFill>
@@ -11012,7 +11015,7 @@
               </a:ln>
               <a:extLst>
                 <a:ext uri="{91240B29-F687-4f45-9708-019B960494DF}">
-                  <a14:hiddenLine xmlns="" xmlns:a14="http://schemas.microsoft.com/office/drawing/2010/main" w="9525">
+                  <a14:hiddenLine xmlns:a14="http://schemas.microsoft.com/office/drawing/2010/main" xmlns="" w="9525">
                     <a:solidFill>
                       <a:srgbClr val="000000"/>
                     </a:solidFill>
@@ -11110,7 +11113,7 @@
               </a:ln>
               <a:extLst>
                 <a:ext uri="{91240B29-F687-4f45-9708-019B960494DF}">
-                  <a14:hiddenLine xmlns="" xmlns:a14="http://schemas.microsoft.com/office/drawing/2010/main" w="9525">
+                  <a14:hiddenLine xmlns:a14="http://schemas.microsoft.com/office/drawing/2010/main" xmlns="" w="9525">
                     <a:solidFill>
                       <a:srgbClr val="000000"/>
                     </a:solidFill>
@@ -11225,7 +11228,7 @@
               </a:ln>
               <a:extLst>
                 <a:ext uri="{91240B29-F687-4f45-9708-019B960494DF}">
-                  <a14:hiddenLine xmlns="" xmlns:a14="http://schemas.microsoft.com/office/drawing/2010/main" w="9525">
+                  <a14:hiddenLine xmlns:a14="http://schemas.microsoft.com/office/drawing/2010/main" xmlns="" w="9525">
                     <a:solidFill>
                       <a:srgbClr val="000000"/>
                     </a:solidFill>
@@ -11315,7 +11318,7 @@
               </a:ln>
               <a:extLst>
                 <a:ext uri="{91240B29-F687-4f45-9708-019B960494DF}">
-                  <a14:hiddenLine xmlns="" xmlns:a14="http://schemas.microsoft.com/office/drawing/2010/main" w="9525">
+                  <a14:hiddenLine xmlns:a14="http://schemas.microsoft.com/office/drawing/2010/main" xmlns="" w="9525">
                     <a:solidFill>
                       <a:srgbClr val="000000"/>
                     </a:solidFill>
@@ -11380,7 +11383,7 @@
               </a:ln>
               <a:extLst>
                 <a:ext uri="{91240B29-F687-4f45-9708-019B960494DF}">
-                  <a14:hiddenLine xmlns="" xmlns:a14="http://schemas.microsoft.com/office/drawing/2010/main" w="9525">
+                  <a14:hiddenLine xmlns:a14="http://schemas.microsoft.com/office/drawing/2010/main" xmlns="" w="9525">
                     <a:solidFill>
                       <a:srgbClr val="000000"/>
                     </a:solidFill>
@@ -11470,7 +11473,7 @@
               </a:ln>
               <a:extLst>
                 <a:ext uri="{91240B29-F687-4f45-9708-019B960494DF}">
-                  <a14:hiddenLine xmlns="" xmlns:a14="http://schemas.microsoft.com/office/drawing/2010/main" w="9525">
+                  <a14:hiddenLine xmlns:a14="http://schemas.microsoft.com/office/drawing/2010/main" xmlns="" w="9525">
                     <a:solidFill>
                       <a:srgbClr val="000000"/>
                     </a:solidFill>
@@ -11538,7 +11541,7 @@
               </a:ln>
               <a:extLst>
                 <a:ext uri="{91240B29-F687-4f45-9708-019B960494DF}">
-                  <a14:hiddenLine xmlns="" xmlns:a14="http://schemas.microsoft.com/office/drawing/2010/main" w="9525">
+                  <a14:hiddenLine xmlns:a14="http://schemas.microsoft.com/office/drawing/2010/main" xmlns="" w="9525">
                     <a:solidFill>
                       <a:srgbClr val="000000"/>
                     </a:solidFill>
@@ -11628,7 +11631,7 @@
               </a:ln>
               <a:extLst>
                 <a:ext uri="{91240B29-F687-4f45-9708-019B960494DF}">
-                  <a14:hiddenLine xmlns="" xmlns:a14="http://schemas.microsoft.com/office/drawing/2010/main" w="9525">
+                  <a14:hiddenLine xmlns:a14="http://schemas.microsoft.com/office/drawing/2010/main" xmlns="" w="9525">
                     <a:solidFill>
                       <a:srgbClr val="000000"/>
                     </a:solidFill>
@@ -11696,7 +11699,7 @@
               </a:ln>
               <a:extLst>
                 <a:ext uri="{91240B29-F687-4f45-9708-019B960494DF}">
-                  <a14:hiddenLine xmlns="" xmlns:a14="http://schemas.microsoft.com/office/drawing/2010/main" w="9525">
+                  <a14:hiddenLine xmlns:a14="http://schemas.microsoft.com/office/drawing/2010/main" xmlns="" w="9525">
                     <a:solidFill>
                       <a:srgbClr val="000000"/>
                     </a:solidFill>
@@ -11786,7 +11789,7 @@
               </a:ln>
               <a:extLst>
                 <a:ext uri="{91240B29-F687-4f45-9708-019B960494DF}">
-                  <a14:hiddenLine xmlns="" xmlns:a14="http://schemas.microsoft.com/office/drawing/2010/main" w="9525">
+                  <a14:hiddenLine xmlns:a14="http://schemas.microsoft.com/office/drawing/2010/main" xmlns="" w="9525">
                     <a:solidFill>
                       <a:srgbClr val="000000"/>
                     </a:solidFill>
@@ -11820,7 +11823,7 @@
               </a:ln>
               <a:extLst>
                 <a:ext uri="{91240B29-F687-4f45-9708-019B960494DF}">
-                  <a14:hiddenLine xmlns="" xmlns:a14="http://schemas.microsoft.com/office/drawing/2010/main" w="9525">
+                  <a14:hiddenLine xmlns:a14="http://schemas.microsoft.com/office/drawing/2010/main" xmlns="" w="9525">
                     <a:solidFill>
                       <a:srgbClr val="000000"/>
                     </a:solidFill>
@@ -11961,7 +11964,7 @@
             <a:fld id="{48A87A34-81AB-432B-8DAE-1953F412C126}" type="datetimeFigureOut">
               <a:rPr lang="en-US" dirty="0"/>
               <a:pPr/>
-              <a:t>7/19/2019</a:t>
+              <a:t>7/29/2019</a:t>
             </a:fld>
             <a:endParaRPr lang="en-US" dirty="0"/>
           </a:p>
@@ -12487,12 +12490,8 @@
           <a:lstStyle/>
           <a:p>
             <a:r>
-              <a:rPr lang="en-US" dirty="0" err="1" smtClean="0"/>
-              <a:t>cIRCUIT</a:t>
-            </a:r>
-            <a:r>
               <a:rPr lang="en-US" dirty="0" smtClean="0"/>
-              <a:t> symbols</a:t>
+              <a:t>Intro to Raspberry pi</a:t>
             </a:r>
             <a:endParaRPr lang="en-US" dirty="0"/>
           </a:p>
@@ -12516,41 +12515,60 @@
             <a:pPr marL="0" indent="0">
               <a:buNone/>
             </a:pPr>
+            <a:r>
+              <a:rPr lang="en-US" dirty="0" smtClean="0"/>
+              <a:t>1) Plug in</a:t>
+            </a:r>
+          </a:p>
+          <a:p>
+            <a:pPr marL="0" indent="0">
+              <a:buNone/>
+            </a:pPr>
+            <a:r>
+              <a:rPr lang="en-US" dirty="0" smtClean="0"/>
+              <a:t>2) Console</a:t>
+            </a:r>
+          </a:p>
+          <a:p>
+            <a:pPr marL="0" indent="0">
+              <a:buNone/>
+            </a:pPr>
+            <a:r>
+              <a:rPr lang="en-US" dirty="0" smtClean="0"/>
+              <a:t>3) Blah </a:t>
+            </a:r>
+            <a:r>
+              <a:rPr lang="en-US" dirty="0" err="1" smtClean="0"/>
+              <a:t>blah</a:t>
+            </a:r>
+            <a:r>
+              <a:rPr lang="en-US" dirty="0" smtClean="0"/>
+              <a:t> </a:t>
+            </a:r>
+            <a:r>
+              <a:rPr lang="en-US" dirty="0" err="1" smtClean="0"/>
+              <a:t>blah</a:t>
+            </a:r>
             <a:endParaRPr lang="en-US" dirty="0" smtClean="0"/>
           </a:p>
           <a:p>
+            <a:pPr marL="0" indent="0">
+              <a:buNone/>
+            </a:pPr>
+            <a:r>
+              <a:rPr lang="en-US" dirty="0" smtClean="0"/>
+              <a:t>4) Clone the repo</a:t>
+            </a:r>
+          </a:p>
+          <a:p>
             <a:endParaRPr lang="en-US" dirty="0"/>
           </a:p>
         </p:txBody>
       </p:sp>
-      <p:pic>
-        <p:nvPicPr>
-          <p:cNvPr id="11" name="Picture 10"/>
-          <p:cNvPicPr>
-            <a:picLocks noChangeAspect="1"/>
-          </p:cNvPicPr>
-          <p:nvPr/>
-        </p:nvPicPr>
-        <p:blipFill>
-          <a:blip r:embed="rId2"/>
-          <a:stretch>
-            <a:fillRect/>
-          </a:stretch>
-        </p:blipFill>
-        <p:spPr>
-          <a:xfrm>
-            <a:off x="2758860" y="1698652"/>
-            <a:ext cx="6671101" cy="4643383"/>
-          </a:xfrm>
-          <a:prstGeom prst="rect">
-            <a:avLst/>
-          </a:prstGeom>
-        </p:spPr>
-      </p:pic>
     </p:spTree>
     <p:extLst>
       <p:ext uri="{BB962C8B-B14F-4D97-AF65-F5344CB8AC3E}">
-        <p14:creationId xmlns:p14="http://schemas.microsoft.com/office/powerpoint/2010/main" val="4205968302"/>
+        <p14:creationId xmlns:p14="http://schemas.microsoft.com/office/powerpoint/2010/main" val="2044859461"/>
       </p:ext>
     </p:extLst>
   </p:cSld>
@@ -12593,16 +12611,8 @@
           <a:lstStyle/>
           <a:p>
             <a:r>
-              <a:rPr lang="en-US" dirty="0" err="1" smtClean="0"/>
-              <a:t>cIRCUIT</a:t>
-            </a:r>
-            <a:r>
               <a:rPr lang="en-US" dirty="0" smtClean="0"/>
-              <a:t> </a:t>
-            </a:r>
-            <a:r>
-              <a:rPr lang="en-US" dirty="0" err="1" smtClean="0"/>
-              <a:t>diagramS</a:t>
+              <a:t>Raspberry Pi circuit</a:t>
             </a:r>
             <a:endParaRPr lang="en-US" dirty="0"/>
           </a:p>
@@ -12610,7 +12620,7 @@
       </p:sp>
       <p:sp>
         <p:nvSpPr>
-          <p:cNvPr id="3" name="Content Placeholder 2"/>
+          <p:cNvPr id="8" name="Content Placeholder 2"/>
           <p:cNvSpPr>
             <a:spLocks noGrp="1"/>
           </p:cNvSpPr>
@@ -12618,97 +12628,33 @@
             <p:ph idx="1"/>
           </p:nvPr>
         </p:nvSpPr>
-        <p:spPr/>
+        <p:spPr>
+          <a:xfrm>
+            <a:off x="1141412" y="2249487"/>
+            <a:ext cx="9905999" cy="3541714"/>
+          </a:xfrm>
+        </p:spPr>
         <p:txBody>
           <a:bodyPr/>
           <a:lstStyle/>
           <a:p>
-            <a:pPr marL="0" indent="0">
-              <a:buNone/>
-            </a:pPr>
-            <a:endParaRPr lang="en-US" dirty="0" smtClean="0"/>
-          </a:p>
-          <a:p>
-            <a:endParaRPr lang="en-US" dirty="0"/>
-          </a:p>
-        </p:txBody>
-      </p:sp>
-      <p:pic>
-        <p:nvPicPr>
-          <p:cNvPr id="5" name="Picture 4"/>
-          <p:cNvPicPr>
-            <a:picLocks noChangeAspect="1"/>
-          </p:cNvPicPr>
-          <p:nvPr/>
-        </p:nvPicPr>
-        <p:blipFill>
-          <a:blip r:embed="rId2"/>
-          <a:stretch>
-            <a:fillRect/>
-          </a:stretch>
-        </p:blipFill>
-        <p:spPr>
-          <a:xfrm>
-            <a:off x="1141412" y="1861839"/>
-            <a:ext cx="3907200" cy="1977326"/>
-          </a:xfrm>
-          <a:prstGeom prst="rect">
-            <a:avLst/>
-          </a:prstGeom>
-        </p:spPr>
-      </p:pic>
-      <p:pic>
-        <p:nvPicPr>
-          <p:cNvPr id="6" name="Picture 5"/>
-          <p:cNvPicPr>
-            <a:picLocks noChangeAspect="1"/>
-          </p:cNvPicPr>
-          <p:nvPr/>
-        </p:nvPicPr>
-        <p:blipFill>
-          <a:blip r:embed="rId3"/>
-          <a:stretch>
-            <a:fillRect/>
-          </a:stretch>
-        </p:blipFill>
-        <p:spPr>
-          <a:xfrm>
-            <a:off x="5691282" y="1861839"/>
-            <a:ext cx="3907200" cy="1977326"/>
-          </a:xfrm>
-          <a:prstGeom prst="rect">
-            <a:avLst/>
-          </a:prstGeom>
-        </p:spPr>
-      </p:pic>
-      <p:pic>
-        <p:nvPicPr>
-          <p:cNvPr id="7" name="Picture 6"/>
-          <p:cNvPicPr>
-            <a:picLocks noChangeAspect="1"/>
-          </p:cNvPicPr>
-          <p:nvPr/>
-        </p:nvPicPr>
-        <p:blipFill>
-          <a:blip r:embed="rId4"/>
-          <a:stretch>
-            <a:fillRect/>
-          </a:stretch>
-        </p:blipFill>
-        <p:spPr>
-          <a:xfrm>
-            <a:off x="3554571" y="4328000"/>
-            <a:ext cx="3907200" cy="2232823"/>
-          </a:xfrm>
-          <a:prstGeom prst="rect">
-            <a:avLst/>
-          </a:prstGeom>
-        </p:spPr>
-      </p:pic>
+            <a:r>
+              <a:rPr lang="en-US" dirty="0" smtClean="0"/>
+              <a:t>What will this look like? Draw the circuit diagram</a:t>
+            </a:r>
+          </a:p>
+          <a:p>
+            <a:r>
+              <a:rPr lang="en-US" dirty="0" smtClean="0"/>
+              <a:t>Now build it!</a:t>
+            </a:r>
+          </a:p>
+        </p:txBody>
+      </p:sp>
     </p:spTree>
     <p:extLst>
       <p:ext uri="{BB962C8B-B14F-4D97-AF65-F5344CB8AC3E}">
-        <p14:creationId xmlns:p14="http://schemas.microsoft.com/office/powerpoint/2010/main" val="1384871489"/>
+        <p14:creationId xmlns:p14="http://schemas.microsoft.com/office/powerpoint/2010/main" val="3169014870"/>
       </p:ext>
     </p:extLst>
   </p:cSld>
@@ -12752,49 +12698,95 @@
           <a:p>
             <a:r>
               <a:rPr lang="en-US" dirty="0" smtClean="0"/>
-              <a:t>Raspberry Pi circuit</a:t>
+              <a:t>Day 2: let’s code!</a:t>
+            </a:r>
+            <a:endParaRPr lang="en-GB" dirty="0"/>
+          </a:p>
+        </p:txBody>
+      </p:sp>
+      <p:sp>
+        <p:nvSpPr>
+          <p:cNvPr id="3" name="Content Placeholder 2"/>
+          <p:cNvSpPr>
+            <a:spLocks noGrp="1"/>
+          </p:cNvSpPr>
+          <p:nvPr>
+            <p:ph idx="1"/>
+          </p:nvPr>
+        </p:nvSpPr>
+        <p:spPr/>
+        <p:txBody>
+          <a:bodyPr>
+            <a:normAutofit fontScale="92500" lnSpcReduction="10000"/>
+          </a:bodyPr>
+          <a:lstStyle/>
+          <a:p>
+            <a:r>
+              <a:rPr lang="en-US" dirty="0" smtClean="0"/>
+              <a:t>Recap</a:t>
+            </a:r>
+          </a:p>
+          <a:p>
+            <a:r>
+              <a:rPr lang="en-US" dirty="0" smtClean="0"/>
+              <a:t>Programming concepts</a:t>
             </a:r>
             <a:endParaRPr lang="en-US" dirty="0"/>
           </a:p>
-        </p:txBody>
-      </p:sp>
-      <p:sp>
-        <p:nvSpPr>
-          <p:cNvPr id="8" name="Content Placeholder 2"/>
-          <p:cNvSpPr>
-            <a:spLocks noGrp="1"/>
-          </p:cNvSpPr>
-          <p:nvPr>
-            <p:ph idx="1"/>
-          </p:nvPr>
-        </p:nvSpPr>
-        <p:spPr>
-          <a:xfrm>
-            <a:off x="1141412" y="2249487"/>
-            <a:ext cx="9905999" cy="3541714"/>
-          </a:xfrm>
-        </p:spPr>
-        <p:txBody>
-          <a:bodyPr/>
-          <a:lstStyle/>
-          <a:p>
+          <a:p>
+            <a:pPr lvl="1"/>
+            <a:r>
+              <a:rPr lang="en-US" dirty="0"/>
+              <a:t>Functions</a:t>
+            </a:r>
+          </a:p>
+          <a:p>
+            <a:pPr lvl="1"/>
+            <a:r>
+              <a:rPr lang="en-US" dirty="0"/>
+              <a:t>Comments</a:t>
+            </a:r>
+          </a:p>
+          <a:p>
+            <a:pPr lvl="1"/>
+            <a:r>
+              <a:rPr lang="en-US" dirty="0"/>
+              <a:t>Variables</a:t>
+            </a:r>
+          </a:p>
+          <a:p>
+            <a:pPr lvl="1"/>
             <a:r>
               <a:rPr lang="en-US" dirty="0" smtClean="0"/>
-              <a:t>What will this look like? Draw the circuit diagram</a:t>
-            </a:r>
+              <a:t>Error Handling </a:t>
+            </a:r>
+            <a:endParaRPr lang="en-US" dirty="0"/>
           </a:p>
           <a:p>
             <a:r>
               <a:rPr lang="en-US" dirty="0" smtClean="0"/>
-              <a:t>Now build it!</a:t>
-            </a:r>
+              <a:t>Create </a:t>
+            </a:r>
+            <a:r>
+              <a:rPr lang="en-US" dirty="0"/>
+              <a:t>Email To Thom functionality</a:t>
+            </a:r>
+          </a:p>
+          <a:p>
+            <a:r>
+              <a:rPr lang="en-US" dirty="0"/>
+              <a:t>Send Email by Raspberry Pi</a:t>
+            </a:r>
+          </a:p>
+          <a:p>
+            <a:endParaRPr lang="en-GB" dirty="0"/>
           </a:p>
         </p:txBody>
       </p:sp>
     </p:spTree>
     <p:extLst>
       <p:ext uri="{BB962C8B-B14F-4D97-AF65-F5344CB8AC3E}">
-        <p14:creationId xmlns:p14="http://schemas.microsoft.com/office/powerpoint/2010/main" val="3169014870"/>
+        <p14:creationId xmlns:p14="http://schemas.microsoft.com/office/powerpoint/2010/main" val="1097960428"/>
       </p:ext>
     </p:extLst>
   </p:cSld>
@@ -12838,9 +12830,9 @@
           <a:p>
             <a:r>
               <a:rPr lang="en-US" dirty="0" smtClean="0"/>
-              <a:t>Day 2: let’s code!</a:t>
-            </a:r>
-            <a:endParaRPr lang="en-GB" dirty="0"/>
+              <a:t>Recap</a:t>
+            </a:r>
+            <a:endParaRPr lang="en-US" dirty="0"/>
           </a:p>
         </p:txBody>
       </p:sp>
@@ -12856,77 +12848,24 @@
         </p:nvSpPr>
         <p:spPr/>
         <p:txBody>
-          <a:bodyPr>
-            <a:normAutofit fontScale="92500" lnSpcReduction="10000"/>
-          </a:bodyPr>
+          <a:bodyPr/>
           <a:lstStyle/>
           <a:p>
+            <a:pPr marL="0" indent="0">
+              <a:buNone/>
+            </a:pPr>
             <a:r>
               <a:rPr lang="en-US" dirty="0" smtClean="0"/>
-              <a:t>Recap</a:t>
-            </a:r>
-          </a:p>
-          <a:p>
-            <a:r>
-              <a:rPr lang="en-US" dirty="0" smtClean="0"/>
-              <a:t>Programming concepts</a:t>
+              <a:t>What did we cover yesterday?</a:t>
             </a:r>
             <a:endParaRPr lang="en-US" dirty="0"/>
-          </a:p>
-          <a:p>
-            <a:pPr lvl="1"/>
-            <a:r>
-              <a:rPr lang="en-US" dirty="0"/>
-              <a:t>Functions</a:t>
-            </a:r>
-          </a:p>
-          <a:p>
-            <a:pPr lvl="1"/>
-            <a:r>
-              <a:rPr lang="en-US" dirty="0"/>
-              <a:t>Comments</a:t>
-            </a:r>
-          </a:p>
-          <a:p>
-            <a:pPr lvl="1"/>
-            <a:r>
-              <a:rPr lang="en-US" dirty="0"/>
-              <a:t>Variables</a:t>
-            </a:r>
-          </a:p>
-          <a:p>
-            <a:pPr lvl="1"/>
-            <a:r>
-              <a:rPr lang="en-US" dirty="0" smtClean="0"/>
-              <a:t>Error Handling </a:t>
-            </a:r>
-            <a:endParaRPr lang="en-US" dirty="0"/>
-          </a:p>
-          <a:p>
-            <a:r>
-              <a:rPr lang="en-US" dirty="0" smtClean="0"/>
-              <a:t>Create </a:t>
-            </a:r>
-            <a:r>
-              <a:rPr lang="en-US" dirty="0"/>
-              <a:t>Email To Thom functionality</a:t>
-            </a:r>
-          </a:p>
-          <a:p>
-            <a:r>
-              <a:rPr lang="en-US" dirty="0"/>
-              <a:t>Send Email by Raspberry Pi</a:t>
-            </a:r>
-          </a:p>
-          <a:p>
-            <a:endParaRPr lang="en-GB" dirty="0"/>
           </a:p>
         </p:txBody>
       </p:sp>
     </p:spTree>
     <p:extLst>
       <p:ext uri="{BB962C8B-B14F-4D97-AF65-F5344CB8AC3E}">
-        <p14:creationId xmlns:p14="http://schemas.microsoft.com/office/powerpoint/2010/main" val="1097960428"/>
+        <p14:creationId xmlns:p14="http://schemas.microsoft.com/office/powerpoint/2010/main" val="2180251118"/>
       </p:ext>
     </p:extLst>
   </p:cSld>
@@ -12970,7 +12909,7 @@
           <a:p>
             <a:r>
               <a:rPr lang="en-US" dirty="0" smtClean="0"/>
-              <a:t>Recap</a:t>
+              <a:t>Python</a:t>
             </a:r>
             <a:endParaRPr lang="en-US" dirty="0"/>
           </a:p>
@@ -12991,13 +12930,40 @@
           <a:bodyPr/>
           <a:lstStyle/>
           <a:p>
+            <a:r>
+              <a:rPr lang="en-US" dirty="0" smtClean="0"/>
+              <a:t>What is Python?</a:t>
+            </a:r>
+          </a:p>
+          <a:p>
+            <a:r>
+              <a:rPr lang="en-US" dirty="0" smtClean="0"/>
+              <a:t>Opening the text editor</a:t>
+            </a:r>
+          </a:p>
+          <a:p>
+            <a:r>
+              <a:rPr lang="en-US" dirty="0" smtClean="0"/>
+              <a:t>The first program: Hello World!</a:t>
+            </a:r>
+          </a:p>
+          <a:p>
+            <a:pPr lvl="1"/>
+            <a:r>
+              <a:rPr lang="en-US" dirty="0" smtClean="0"/>
+              <a:t>Notice the different colors of the words. Why is that?</a:t>
+            </a:r>
+          </a:p>
+          <a:p>
+            <a:r>
+              <a:rPr lang="en-US" dirty="0" smtClean="0"/>
+              <a:t>Running programs</a:t>
+            </a:r>
+          </a:p>
+          <a:p>
             <a:pPr marL="0" indent="0">
               <a:buNone/>
             </a:pPr>
-            <a:r>
-              <a:rPr lang="en-US" dirty="0" smtClean="0"/>
-              <a:t>What did we cover yesterday?</a:t>
-            </a:r>
             <a:endParaRPr lang="en-US" dirty="0"/>
           </a:p>
         </p:txBody>
@@ -13005,7 +12971,7 @@
     </p:spTree>
     <p:extLst>
       <p:ext uri="{BB962C8B-B14F-4D97-AF65-F5344CB8AC3E}">
-        <p14:creationId xmlns:p14="http://schemas.microsoft.com/office/powerpoint/2010/main" val="2180251118"/>
+        <p14:creationId xmlns:p14="http://schemas.microsoft.com/office/powerpoint/2010/main" val="1824136748"/>
       </p:ext>
     </p:extLst>
   </p:cSld>
@@ -14028,7 +13994,7 @@
           <a:p>
             <a:r>
               <a:rPr lang="en-US" dirty="0" smtClean="0"/>
-              <a:t>Service Management</a:t>
+              <a:t>Recap</a:t>
             </a:r>
             <a:endParaRPr lang="en-US" dirty="0"/>
           </a:p>
@@ -14049,54 +14015,14 @@
           <a:bodyPr/>
           <a:lstStyle/>
           <a:p>
-            <a:r>
-              <a:rPr lang="en-US" dirty="0" smtClean="0"/>
-              <a:t>Why is this needed?</a:t>
-            </a:r>
-          </a:p>
-          <a:p>
-            <a:r>
-              <a:rPr lang="en-US" dirty="0" smtClean="0"/>
-              <a:t>What does </a:t>
-            </a:r>
-            <a:r>
-              <a:rPr lang="en-US" dirty="0" err="1" smtClean="0"/>
-              <a:t>ServiceNow</a:t>
-            </a:r>
-            <a:r>
-              <a:rPr lang="en-US" dirty="0" smtClean="0"/>
-              <a:t> do?</a:t>
-            </a:r>
-          </a:p>
-          <a:p>
-            <a:r>
-              <a:rPr lang="en-US" dirty="0" smtClean="0"/>
-              <a:t>What is the issue lifecycle?</a:t>
-            </a:r>
-          </a:p>
-          <a:p>
-            <a:r>
-              <a:rPr lang="en-US" dirty="0" smtClean="0"/>
-              <a:t>How do we send an alert to </a:t>
-            </a:r>
-            <a:r>
-              <a:rPr lang="en-US" dirty="0" err="1" smtClean="0"/>
-              <a:t>ServiceNow</a:t>
-            </a:r>
-            <a:r>
-              <a:rPr lang="en-US" dirty="0" smtClean="0"/>
-              <a:t>?</a:t>
-            </a:r>
-          </a:p>
-          <a:p>
-            <a:endParaRPr lang="en-US" dirty="0"/>
+            <a:endParaRPr lang="en-US"/>
           </a:p>
         </p:txBody>
       </p:sp>
     </p:spTree>
     <p:extLst>
       <p:ext uri="{BB962C8B-B14F-4D97-AF65-F5344CB8AC3E}">
-        <p14:creationId xmlns:p14="http://schemas.microsoft.com/office/powerpoint/2010/main" val="1158526004"/>
+        <p14:creationId xmlns:p14="http://schemas.microsoft.com/office/powerpoint/2010/main" val="1318318161"/>
       </p:ext>
     </p:extLst>
   </p:cSld>
@@ -14140,7 +14066,7 @@
           <a:p>
             <a:r>
               <a:rPr lang="en-US" dirty="0" smtClean="0"/>
-              <a:t>Identifying unique devices </a:t>
+              <a:t>Service Management</a:t>
             </a:r>
             <a:endParaRPr lang="en-US" dirty="0"/>
           </a:p>
@@ -14161,13 +14087,46 @@
           <a:bodyPr/>
           <a:lstStyle/>
           <a:p>
-            <a:pPr marL="0" indent="0">
-              <a:buNone/>
-            </a:pPr>
             <a:r>
               <a:rPr lang="en-US" dirty="0" smtClean="0"/>
-              <a:t>If we placed each device in a different location, how could we tell which button was pressed to trigger an alert?</a:t>
-            </a:r>
+              <a:t>Why is this needed?</a:t>
+            </a:r>
+          </a:p>
+          <a:p>
+            <a:r>
+              <a:rPr lang="en-US" dirty="0" smtClean="0"/>
+              <a:t>What does </a:t>
+            </a:r>
+            <a:r>
+              <a:rPr lang="en-US" dirty="0" err="1" smtClean="0"/>
+              <a:t>ServiceNow</a:t>
+            </a:r>
+            <a:r>
+              <a:rPr lang="en-US" dirty="0" smtClean="0"/>
+              <a:t> do?</a:t>
+            </a:r>
+          </a:p>
+          <a:p>
+            <a:r>
+              <a:rPr lang="en-US" dirty="0" smtClean="0"/>
+              <a:t>What is the issue lifecycle?</a:t>
+            </a:r>
+          </a:p>
+          <a:p>
+            <a:r>
+              <a:rPr lang="en-US" dirty="0" smtClean="0"/>
+              <a:t>How do we send an alert to </a:t>
+            </a:r>
+            <a:r>
+              <a:rPr lang="en-US" dirty="0" err="1" smtClean="0"/>
+              <a:t>ServiceNow</a:t>
+            </a:r>
+            <a:r>
+              <a:rPr lang="en-US" dirty="0" smtClean="0"/>
+              <a:t>?</a:t>
+            </a:r>
+          </a:p>
+          <a:p>
             <a:endParaRPr lang="en-US" dirty="0"/>
           </a:p>
         </p:txBody>
@@ -14175,7 +14134,7 @@
     </p:spTree>
     <p:extLst>
       <p:ext uri="{BB962C8B-B14F-4D97-AF65-F5344CB8AC3E}">
-        <p14:creationId xmlns:p14="http://schemas.microsoft.com/office/powerpoint/2010/main" val="2115797855"/>
+        <p14:creationId xmlns:p14="http://schemas.microsoft.com/office/powerpoint/2010/main" val="1158526004"/>
       </p:ext>
     </p:extLst>
   </p:cSld>
@@ -14219,7 +14178,7 @@
           <a:p>
             <a:r>
               <a:rPr lang="en-US" dirty="0" smtClean="0"/>
-              <a:t>Repeated tickets</a:t>
+              <a:t>Identifying unique devices </a:t>
             </a:r>
             <a:endParaRPr lang="en-US" dirty="0"/>
           </a:p>
@@ -14245,32 +14204,8 @@
             </a:pPr>
             <a:r>
               <a:rPr lang="en-US" dirty="0" smtClean="0"/>
-              <a:t>Scenario 1: One person notices the coffee machine is broken and presses the button. A second person does the same, and a third person. All within five minutes. Three tickets are raised for one incident. </a:t>
-            </a:r>
-          </a:p>
-          <a:p>
-            <a:pPr marL="0" indent="0">
-              <a:buNone/>
-            </a:pPr>
-            <a:r>
-              <a:rPr lang="en-US" dirty="0" smtClean="0"/>
-              <a:t>Scenario 2: One person notices the coffee machine is broken. They really want coffee. They press the button repeatedly twenty times. Twenty tickets are raised for one incident.</a:t>
-            </a:r>
-          </a:p>
-          <a:p>
-            <a:pPr marL="0" indent="0">
-              <a:buNone/>
-            </a:pPr>
-            <a:r>
-              <a:rPr lang="en-US" dirty="0" smtClean="0"/>
-              <a:t>Q: How would we avoid these scenarios?</a:t>
-            </a:r>
-            <a:endParaRPr lang="en-US" dirty="0"/>
-          </a:p>
-          <a:p>
-            <a:pPr marL="0" indent="0">
-              <a:buNone/>
-            </a:pPr>
+              <a:t>If we placed each device in a different location, how could we tell which button was pressed to trigger an alert?</a:t>
+            </a:r>
             <a:endParaRPr lang="en-US" dirty="0"/>
           </a:p>
         </p:txBody>
@@ -14278,7 +14213,7 @@
     </p:spTree>
     <p:extLst>
       <p:ext uri="{BB962C8B-B14F-4D97-AF65-F5344CB8AC3E}">
-        <p14:creationId xmlns:p14="http://schemas.microsoft.com/office/powerpoint/2010/main" val="3955968203"/>
+        <p14:creationId xmlns:p14="http://schemas.microsoft.com/office/powerpoint/2010/main" val="2115797855"/>
       </p:ext>
     </p:extLst>
   </p:cSld>
@@ -14322,9 +14257,13 @@
           <a:p>
             <a:r>
               <a:rPr lang="en-US" dirty="0" smtClean="0"/>
-              <a:t>Day 4: maturing the model</a:t>
-            </a:r>
-            <a:endParaRPr lang="en-GB" dirty="0"/>
+              <a:t>Send emails to </a:t>
+            </a:r>
+            <a:r>
+              <a:rPr lang="en-US" dirty="0" err="1" smtClean="0"/>
+              <a:t>servicenow</a:t>
+            </a:r>
+            <a:endParaRPr lang="en-US" dirty="0"/>
           </a:p>
         </p:txBody>
       </p:sp>
@@ -14340,62 +14279,17 @@
         </p:nvSpPr>
         <p:spPr/>
         <p:txBody>
-          <a:bodyPr>
-            <a:normAutofit/>
-          </a:bodyPr>
+          <a:bodyPr/>
           <a:lstStyle/>
           <a:p>
-            <a:r>
-              <a:rPr lang="en-US" dirty="0"/>
-              <a:t>Using the Cloud to create </a:t>
-            </a:r>
-            <a:r>
-              <a:rPr lang="en-US" dirty="0" err="1"/>
-              <a:t>ServiceNow</a:t>
-            </a:r>
-            <a:r>
-              <a:rPr lang="en-US" dirty="0"/>
-              <a:t> </a:t>
-            </a:r>
-            <a:r>
-              <a:rPr lang="en-US" dirty="0" smtClean="0"/>
-              <a:t>tickets</a:t>
-            </a:r>
-          </a:p>
-          <a:p>
-            <a:r>
-              <a:rPr lang="en-US" dirty="0" smtClean="0"/>
-              <a:t>Reporting</a:t>
-            </a:r>
-            <a:endParaRPr lang="en-US" dirty="0"/>
-          </a:p>
-          <a:p>
-            <a:r>
-              <a:rPr lang="en-US" dirty="0"/>
-              <a:t>Wrapping up</a:t>
-            </a:r>
-          </a:p>
-          <a:p>
-            <a:r>
-              <a:rPr lang="en-US" dirty="0"/>
-              <a:t>Other things you can do with a Raspberry Pi</a:t>
-            </a:r>
-          </a:p>
-          <a:p>
-            <a:r>
-              <a:rPr lang="en-US" dirty="0"/>
-              <a:t>Participant Feedback</a:t>
-            </a:r>
-          </a:p>
-          <a:p>
-            <a:endParaRPr lang="en-GB" dirty="0"/>
+            <a:endParaRPr lang="en-US"/>
           </a:p>
         </p:txBody>
       </p:sp>
     </p:spTree>
     <p:extLst>
       <p:ext uri="{BB962C8B-B14F-4D97-AF65-F5344CB8AC3E}">
-        <p14:creationId xmlns:p14="http://schemas.microsoft.com/office/powerpoint/2010/main" val="1778859132"/>
+        <p14:creationId xmlns:p14="http://schemas.microsoft.com/office/powerpoint/2010/main" val="2870552506"/>
       </p:ext>
     </p:extLst>
   </p:cSld>
@@ -14439,7 +14333,7 @@
           <a:p>
             <a:r>
               <a:rPr lang="en-US" dirty="0" smtClean="0"/>
-              <a:t>Azure stuff</a:t>
+              <a:t>Repeated tickets</a:t>
             </a:r>
             <a:endParaRPr lang="en-US" dirty="0"/>
           </a:p>
@@ -14460,48 +14354,51 @@
           <a:bodyPr/>
           <a:lstStyle/>
           <a:p>
+            <a:pPr marL="0" indent="0">
+              <a:buNone/>
+            </a:pPr>
             <a:r>
               <a:rPr lang="en-US" dirty="0" smtClean="0"/>
-              <a:t>Why use back end system instead of emailing directly?</a:t>
-            </a:r>
-          </a:p>
-          <a:p>
+              <a:t>Scenario 1: One person notices the coffee machine is broken and presses the button. A second person does the same, and a third person. All within five minutes. Three tickets are raised for one incident. </a:t>
+            </a:r>
+          </a:p>
+          <a:p>
+            <a:pPr marL="0" indent="0">
+              <a:buNone/>
+            </a:pPr>
             <a:r>
               <a:rPr lang="en-US" dirty="0" smtClean="0"/>
-              <a:t>How do we talk to the back end system?</a:t>
-            </a:r>
-          </a:p>
-          <a:p>
+              <a:t>Scenario 2: One person notices the coffee machine is broken. They really want coffee. They press the button repeatedly twenty times. Twenty tickets are raised for one incident.</a:t>
+            </a:r>
+          </a:p>
+          <a:p>
+            <a:pPr marL="0" indent="0">
+              <a:buNone/>
+            </a:pPr>
             <a:r>
               <a:rPr lang="en-US" dirty="0" smtClean="0"/>
-              <a:t>What is the cloud?</a:t>
-            </a:r>
-          </a:p>
-          <a:p>
-            <a:r>
-              <a:rPr lang="en-US" dirty="0" smtClean="0"/>
-              <a:t>Update the Raspberry Pi to talk to the API to raise a ticket in ServiceNow</a:t>
-            </a:r>
+              <a:t>Q: How would we avoid these scenarios?</a:t>
+            </a:r>
+            <a:endParaRPr lang="en-US" dirty="0"/>
+          </a:p>
+          <a:p>
+            <a:pPr marL="0" indent="0">
+              <a:buNone/>
+            </a:pPr>
+            <a:endParaRPr lang="en-US" dirty="0"/>
           </a:p>
         </p:txBody>
       </p:sp>
     </p:spTree>
     <p:extLst>
       <p:ext uri="{BB962C8B-B14F-4D97-AF65-F5344CB8AC3E}">
-        <p14:creationId xmlns:p14="http://schemas.microsoft.com/office/powerpoint/2010/main" val="3358359096"/>
+        <p14:creationId xmlns:p14="http://schemas.microsoft.com/office/powerpoint/2010/main" val="3955968203"/>
       </p:ext>
     </p:extLst>
   </p:cSld>
   <p:clrMapOvr>
     <a:masterClrMapping/>
   </p:clrMapOvr>
-  <p:timing>
-    <p:tnLst>
-      <p:par>
-        <p:cTn id="1" dur="indefinite" restart="never" nodeType="tmRoot"/>
-      </p:par>
-    </p:tnLst>
-  </p:timing>
 </p:sld>
 </file>
 
@@ -14539,72 +14436,72 @@
           <a:p>
             <a:r>
               <a:rPr lang="en-US" dirty="0" smtClean="0"/>
+              <a:t>Day 4: maturing the model</a:t>
+            </a:r>
+            <a:endParaRPr lang="en-GB" dirty="0"/>
+          </a:p>
+        </p:txBody>
+      </p:sp>
+      <p:sp>
+        <p:nvSpPr>
+          <p:cNvPr id="3" name="Content Placeholder 2"/>
+          <p:cNvSpPr>
+            <a:spLocks noGrp="1"/>
+          </p:cNvSpPr>
+          <p:nvPr>
+            <p:ph idx="1"/>
+          </p:nvPr>
+        </p:nvSpPr>
+        <p:spPr/>
+        <p:txBody>
+          <a:bodyPr>
+            <a:normAutofit/>
+          </a:bodyPr>
+          <a:lstStyle/>
+          <a:p>
+            <a:r>
+              <a:rPr lang="en-US" dirty="0"/>
+              <a:t>Using the Cloud to create </a:t>
+            </a:r>
+            <a:r>
+              <a:rPr lang="en-US" dirty="0" err="1"/>
+              <a:t>ServiceNow</a:t>
+            </a:r>
+            <a:r>
+              <a:rPr lang="en-US" dirty="0"/>
+              <a:t> </a:t>
+            </a:r>
+            <a:r>
+              <a:rPr lang="en-US" dirty="0" smtClean="0"/>
+              <a:t>tickets</a:t>
+            </a:r>
+          </a:p>
+          <a:p>
+            <a:r>
+              <a:rPr lang="en-US" dirty="0" smtClean="0"/>
               <a:t>Reporting</a:t>
             </a:r>
-            <a:endParaRPr lang="en-GB" dirty="0"/>
-          </a:p>
-        </p:txBody>
-      </p:sp>
-      <p:sp>
-        <p:nvSpPr>
-          <p:cNvPr id="3" name="Content Placeholder 2"/>
-          <p:cNvSpPr>
-            <a:spLocks noGrp="1"/>
-          </p:cNvSpPr>
-          <p:nvPr>
-            <p:ph idx="1"/>
-          </p:nvPr>
-        </p:nvSpPr>
-        <p:spPr/>
-        <p:txBody>
-          <a:bodyPr/>
-          <a:lstStyle/>
-          <a:p>
-            <a:r>
-              <a:rPr lang="en-GB" dirty="0" smtClean="0"/>
-              <a:t>Where do you see reporting in your everyday life?</a:t>
-            </a:r>
-          </a:p>
-          <a:p>
-            <a:r>
-              <a:rPr lang="en-GB" dirty="0" smtClean="0"/>
-              <a:t>Why is it important?</a:t>
-            </a:r>
-          </a:p>
-          <a:p>
-            <a:r>
-              <a:rPr lang="en-GB" dirty="0" smtClean="0"/>
-              <a:t>What </a:t>
-            </a:r>
-            <a:r>
-              <a:rPr lang="en-GB" smtClean="0"/>
-              <a:t>does bad/good </a:t>
-            </a:r>
-            <a:r>
-              <a:rPr lang="en-GB" dirty="0" smtClean="0"/>
-              <a:t>reporting look like?</a:t>
-            </a:r>
-          </a:p>
-          <a:p>
-            <a:r>
-              <a:rPr lang="en-GB" dirty="0" smtClean="0"/>
-              <a:t>What do we want to </a:t>
-            </a:r>
-            <a:r>
-              <a:rPr lang="en-GB" dirty="0"/>
-              <a:t>learn from ServiceNow </a:t>
-            </a:r>
-            <a:r>
-              <a:rPr lang="en-GB" dirty="0" smtClean="0"/>
-              <a:t>data</a:t>
-            </a:r>
-            <a:endParaRPr lang="en-GB" dirty="0" smtClean="0"/>
-          </a:p>
-          <a:p>
-            <a:r>
-              <a:rPr lang="en-GB" dirty="0" smtClean="0"/>
-              <a:t>Create your own data visualizations</a:t>
-            </a:r>
+            <a:endParaRPr lang="en-US" dirty="0"/>
+          </a:p>
+          <a:p>
+            <a:r>
+              <a:rPr lang="en-US" dirty="0"/>
+              <a:t>Wrapping up</a:t>
+            </a:r>
+          </a:p>
+          <a:p>
+            <a:r>
+              <a:rPr lang="en-US" dirty="0"/>
+              <a:t>Other things you can do with a Raspberry Pi</a:t>
+            </a:r>
+          </a:p>
+          <a:p>
+            <a:r>
+              <a:rPr lang="en-US" dirty="0"/>
+              <a:t>Participant Feedback</a:t>
+            </a:r>
+          </a:p>
+          <a:p>
             <a:endParaRPr lang="en-GB" dirty="0"/>
           </a:p>
         </p:txBody>
@@ -14612,7 +14509,7 @@
     </p:spTree>
     <p:extLst>
       <p:ext uri="{BB962C8B-B14F-4D97-AF65-F5344CB8AC3E}">
-        <p14:creationId xmlns:p14="http://schemas.microsoft.com/office/powerpoint/2010/main" val="3197062606"/>
+        <p14:creationId xmlns:p14="http://schemas.microsoft.com/office/powerpoint/2010/main" val="1778859132"/>
       </p:ext>
     </p:extLst>
   </p:cSld>
@@ -14656,7 +14553,7 @@
           <a:p>
             <a:r>
               <a:rPr lang="en-US" dirty="0" smtClean="0"/>
-              <a:t>Other projects</a:t>
+              <a:t>Recap</a:t>
             </a:r>
             <a:endParaRPr lang="en-US" dirty="0"/>
           </a:p>
@@ -14677,52 +14574,6 @@
           <a:bodyPr/>
           <a:lstStyle/>
           <a:p>
-            <a:r>
-              <a:rPr lang="en-US" dirty="0" smtClean="0"/>
-              <a:t>Alien Invasion</a:t>
-            </a:r>
-          </a:p>
-          <a:p>
-            <a:r>
-              <a:rPr lang="en-US" dirty="0" err="1" smtClean="0"/>
-              <a:t>Kodi</a:t>
-            </a:r>
-            <a:r>
-              <a:rPr lang="en-US" dirty="0" smtClean="0"/>
-              <a:t> Media Center</a:t>
-            </a:r>
-          </a:p>
-          <a:p>
-            <a:r>
-              <a:rPr lang="en-US" dirty="0" smtClean="0"/>
-              <a:t>Steam link – stream your PC games to your TV</a:t>
-            </a:r>
-          </a:p>
-          <a:p>
-            <a:r>
-              <a:rPr lang="en-US" dirty="0" smtClean="0"/>
-              <a:t>Alexa: Build your own Amazon Echo/ Google assistant</a:t>
-            </a:r>
-          </a:p>
-          <a:p>
-            <a:r>
-              <a:rPr lang="en-US" dirty="0" smtClean="0"/>
-              <a:t>Pi-hole – network wide ad-blocker</a:t>
-            </a:r>
-          </a:p>
-          <a:p>
-            <a:r>
-              <a:rPr lang="en-US" dirty="0" err="1"/>
-              <a:t>Adafruit</a:t>
-            </a:r>
-            <a:r>
-              <a:rPr lang="en-US"/>
-              <a:t> for more </a:t>
-            </a:r>
-            <a:r>
-              <a:rPr lang="en-US" smtClean="0"/>
-              <a:t>accessories</a:t>
-            </a:r>
             <a:endParaRPr lang="en-US"/>
           </a:p>
         </p:txBody>
@@ -14730,7 +14581,7 @@
     </p:spTree>
     <p:extLst>
       <p:ext uri="{BB962C8B-B14F-4D97-AF65-F5344CB8AC3E}">
-        <p14:creationId xmlns:p14="http://schemas.microsoft.com/office/powerpoint/2010/main" val="4038175424"/>
+        <p14:creationId xmlns:p14="http://schemas.microsoft.com/office/powerpoint/2010/main" val="3901088632"/>
       </p:ext>
     </p:extLst>
   </p:cSld>
@@ -14831,6 +14682,340 @@
 </file>
 
 <file path=ppt/slides/slide30.xml><?xml version="1.0" encoding="utf-8"?>
+<p:sld xmlns:a="http://schemas.openxmlformats.org/drawingml/2006/main" xmlns:r="http://schemas.openxmlformats.org/officeDocument/2006/relationships" xmlns:p="http://schemas.openxmlformats.org/presentationml/2006/main">
+  <p:cSld>
+    <p:spTree>
+      <p:nvGrpSpPr>
+        <p:cNvPr id="1" name=""/>
+        <p:cNvGrpSpPr/>
+        <p:nvPr/>
+      </p:nvGrpSpPr>
+      <p:grpSpPr>
+        <a:xfrm>
+          <a:off x="0" y="0"/>
+          <a:ext cx="0" cy="0"/>
+          <a:chOff x="0" y="0"/>
+          <a:chExt cx="0" cy="0"/>
+        </a:xfrm>
+      </p:grpSpPr>
+      <p:sp>
+        <p:nvSpPr>
+          <p:cNvPr id="2" name="Title 1"/>
+          <p:cNvSpPr>
+            <a:spLocks noGrp="1"/>
+          </p:cNvSpPr>
+          <p:nvPr>
+            <p:ph type="title"/>
+          </p:nvPr>
+        </p:nvSpPr>
+        <p:spPr/>
+        <p:txBody>
+          <a:bodyPr/>
+          <a:lstStyle/>
+          <a:p>
+            <a:r>
+              <a:rPr lang="en-US" dirty="0" smtClean="0"/>
+              <a:t>Azure</a:t>
+            </a:r>
+            <a:endParaRPr lang="en-US" dirty="0"/>
+          </a:p>
+        </p:txBody>
+      </p:sp>
+      <p:sp>
+        <p:nvSpPr>
+          <p:cNvPr id="3" name="Content Placeholder 2"/>
+          <p:cNvSpPr>
+            <a:spLocks noGrp="1"/>
+          </p:cNvSpPr>
+          <p:nvPr>
+            <p:ph idx="1"/>
+          </p:nvPr>
+        </p:nvSpPr>
+        <p:spPr/>
+        <p:txBody>
+          <a:bodyPr/>
+          <a:lstStyle/>
+          <a:p>
+            <a:r>
+              <a:rPr lang="en-US" dirty="0" smtClean="0"/>
+              <a:t>Why use back end system instead of emailing directly?</a:t>
+            </a:r>
+          </a:p>
+          <a:p>
+            <a:r>
+              <a:rPr lang="en-US" dirty="0" smtClean="0"/>
+              <a:t>How do we talk to the back end system?</a:t>
+            </a:r>
+          </a:p>
+          <a:p>
+            <a:r>
+              <a:rPr lang="en-US" dirty="0" smtClean="0"/>
+              <a:t>What is the cloud?</a:t>
+            </a:r>
+          </a:p>
+          <a:p>
+            <a:r>
+              <a:rPr lang="en-US" dirty="0" smtClean="0"/>
+              <a:t>Update the Raspberry Pi to talk to the API to raise a ticket in ServiceNow</a:t>
+            </a:r>
+          </a:p>
+        </p:txBody>
+      </p:sp>
+    </p:spTree>
+    <p:extLst>
+      <p:ext uri="{BB962C8B-B14F-4D97-AF65-F5344CB8AC3E}">
+        <p14:creationId xmlns:p14="http://schemas.microsoft.com/office/powerpoint/2010/main" val="3358359096"/>
+      </p:ext>
+    </p:extLst>
+  </p:cSld>
+  <p:clrMapOvr>
+    <a:masterClrMapping/>
+  </p:clrMapOvr>
+  <p:timing>
+    <p:tnLst>
+      <p:par>
+        <p:cTn id="1" dur="indefinite" restart="never" nodeType="tmRoot"/>
+      </p:par>
+    </p:tnLst>
+  </p:timing>
+</p:sld>
+</file>
+
+<file path=ppt/slides/slide31.xml><?xml version="1.0" encoding="utf-8"?>
+<p:sld xmlns:a="http://schemas.openxmlformats.org/drawingml/2006/main" xmlns:r="http://schemas.openxmlformats.org/officeDocument/2006/relationships" xmlns:p="http://schemas.openxmlformats.org/presentationml/2006/main">
+  <p:cSld>
+    <p:spTree>
+      <p:nvGrpSpPr>
+        <p:cNvPr id="1" name=""/>
+        <p:cNvGrpSpPr/>
+        <p:nvPr/>
+      </p:nvGrpSpPr>
+      <p:grpSpPr>
+        <a:xfrm>
+          <a:off x="0" y="0"/>
+          <a:ext cx="0" cy="0"/>
+          <a:chOff x="0" y="0"/>
+          <a:chExt cx="0" cy="0"/>
+        </a:xfrm>
+      </p:grpSpPr>
+      <p:sp>
+        <p:nvSpPr>
+          <p:cNvPr id="2" name="Title 1"/>
+          <p:cNvSpPr>
+            <a:spLocks noGrp="1"/>
+          </p:cNvSpPr>
+          <p:nvPr>
+            <p:ph type="title"/>
+          </p:nvPr>
+        </p:nvSpPr>
+        <p:spPr/>
+        <p:txBody>
+          <a:bodyPr/>
+          <a:lstStyle/>
+          <a:p>
+            <a:r>
+              <a:rPr lang="en-US" dirty="0" smtClean="0"/>
+              <a:t>Reporting</a:t>
+            </a:r>
+            <a:endParaRPr lang="en-GB" dirty="0"/>
+          </a:p>
+        </p:txBody>
+      </p:sp>
+      <p:sp>
+        <p:nvSpPr>
+          <p:cNvPr id="3" name="Content Placeholder 2"/>
+          <p:cNvSpPr>
+            <a:spLocks noGrp="1"/>
+          </p:cNvSpPr>
+          <p:nvPr>
+            <p:ph idx="1"/>
+          </p:nvPr>
+        </p:nvSpPr>
+        <p:spPr/>
+        <p:txBody>
+          <a:bodyPr/>
+          <a:lstStyle/>
+          <a:p>
+            <a:r>
+              <a:rPr lang="en-GB" dirty="0" smtClean="0"/>
+              <a:t>Where do you see reporting in your everyday life?</a:t>
+            </a:r>
+          </a:p>
+          <a:p>
+            <a:r>
+              <a:rPr lang="en-GB" dirty="0" smtClean="0"/>
+              <a:t>Why is it important?</a:t>
+            </a:r>
+          </a:p>
+          <a:p>
+            <a:r>
+              <a:rPr lang="en-GB" dirty="0" smtClean="0"/>
+              <a:t>What </a:t>
+            </a:r>
+            <a:r>
+              <a:rPr lang="en-GB" smtClean="0"/>
+              <a:t>does bad/good </a:t>
+            </a:r>
+            <a:r>
+              <a:rPr lang="en-GB" dirty="0" smtClean="0"/>
+              <a:t>reporting look like?</a:t>
+            </a:r>
+          </a:p>
+          <a:p>
+            <a:r>
+              <a:rPr lang="en-GB" dirty="0" smtClean="0"/>
+              <a:t>What do we want to </a:t>
+            </a:r>
+            <a:r>
+              <a:rPr lang="en-GB" dirty="0"/>
+              <a:t>learn from ServiceNow </a:t>
+            </a:r>
+            <a:r>
+              <a:rPr lang="en-GB" dirty="0" smtClean="0"/>
+              <a:t>data</a:t>
+            </a:r>
+          </a:p>
+          <a:p>
+            <a:r>
+              <a:rPr lang="en-GB" dirty="0" smtClean="0"/>
+              <a:t>Create your own data visualizations</a:t>
+            </a:r>
+            <a:endParaRPr lang="en-GB" dirty="0"/>
+          </a:p>
+        </p:txBody>
+      </p:sp>
+    </p:spTree>
+    <p:extLst>
+      <p:ext uri="{BB962C8B-B14F-4D97-AF65-F5344CB8AC3E}">
+        <p14:creationId xmlns:p14="http://schemas.microsoft.com/office/powerpoint/2010/main" val="3197062606"/>
+      </p:ext>
+    </p:extLst>
+  </p:cSld>
+  <p:clrMapOvr>
+    <a:masterClrMapping/>
+  </p:clrMapOvr>
+</p:sld>
+</file>
+
+<file path=ppt/slides/slide32.xml><?xml version="1.0" encoding="utf-8"?>
+<p:sld xmlns:a="http://schemas.openxmlformats.org/drawingml/2006/main" xmlns:r="http://schemas.openxmlformats.org/officeDocument/2006/relationships" xmlns:p="http://schemas.openxmlformats.org/presentationml/2006/main">
+  <p:cSld>
+    <p:spTree>
+      <p:nvGrpSpPr>
+        <p:cNvPr id="1" name=""/>
+        <p:cNvGrpSpPr/>
+        <p:nvPr/>
+      </p:nvGrpSpPr>
+      <p:grpSpPr>
+        <a:xfrm>
+          <a:off x="0" y="0"/>
+          <a:ext cx="0" cy="0"/>
+          <a:chOff x="0" y="0"/>
+          <a:chExt cx="0" cy="0"/>
+        </a:xfrm>
+      </p:grpSpPr>
+      <p:sp>
+        <p:nvSpPr>
+          <p:cNvPr id="2" name="Title 1"/>
+          <p:cNvSpPr>
+            <a:spLocks noGrp="1"/>
+          </p:cNvSpPr>
+          <p:nvPr>
+            <p:ph type="title"/>
+          </p:nvPr>
+        </p:nvSpPr>
+        <p:spPr/>
+        <p:txBody>
+          <a:bodyPr/>
+          <a:lstStyle/>
+          <a:p>
+            <a:r>
+              <a:rPr lang="en-US" dirty="0" smtClean="0"/>
+              <a:t>Other projects</a:t>
+            </a:r>
+            <a:endParaRPr lang="en-US" dirty="0"/>
+          </a:p>
+        </p:txBody>
+      </p:sp>
+      <p:sp>
+        <p:nvSpPr>
+          <p:cNvPr id="3" name="Content Placeholder 2"/>
+          <p:cNvSpPr>
+            <a:spLocks noGrp="1"/>
+          </p:cNvSpPr>
+          <p:nvPr>
+            <p:ph idx="1"/>
+          </p:nvPr>
+        </p:nvSpPr>
+        <p:spPr/>
+        <p:txBody>
+          <a:bodyPr/>
+          <a:lstStyle/>
+          <a:p>
+            <a:r>
+              <a:rPr lang="en-US" dirty="0" smtClean="0"/>
+              <a:t>Alien Invasion</a:t>
+            </a:r>
+          </a:p>
+          <a:p>
+            <a:r>
+              <a:rPr lang="en-US" dirty="0" err="1" smtClean="0"/>
+              <a:t>Kodi</a:t>
+            </a:r>
+            <a:r>
+              <a:rPr lang="en-US" dirty="0" smtClean="0"/>
+              <a:t> Media Center</a:t>
+            </a:r>
+          </a:p>
+          <a:p>
+            <a:r>
+              <a:rPr lang="en-US" dirty="0" smtClean="0"/>
+              <a:t>Steam link – stream your PC games to your TV</a:t>
+            </a:r>
+          </a:p>
+          <a:p>
+            <a:r>
+              <a:rPr lang="en-US" dirty="0" smtClean="0"/>
+              <a:t>Alexa: Build your own Amazon Echo/ Google assistant</a:t>
+            </a:r>
+          </a:p>
+          <a:p>
+            <a:r>
+              <a:rPr lang="en-US" dirty="0" smtClean="0"/>
+              <a:t>Pi-hole – network wide ad-blocker</a:t>
+            </a:r>
+          </a:p>
+          <a:p>
+            <a:r>
+              <a:rPr lang="en-US" dirty="0" err="1"/>
+              <a:t>Adafruit</a:t>
+            </a:r>
+            <a:r>
+              <a:rPr lang="en-US"/>
+              <a:t> for more </a:t>
+            </a:r>
+            <a:r>
+              <a:rPr lang="en-US" smtClean="0"/>
+              <a:t>accessories</a:t>
+            </a:r>
+            <a:endParaRPr lang="en-US"/>
+          </a:p>
+        </p:txBody>
+      </p:sp>
+    </p:spTree>
+    <p:extLst>
+      <p:ext uri="{BB962C8B-B14F-4D97-AF65-F5344CB8AC3E}">
+        <p14:creationId xmlns:p14="http://schemas.microsoft.com/office/powerpoint/2010/main" val="4038175424"/>
+      </p:ext>
+    </p:extLst>
+  </p:cSld>
+  <p:clrMapOvr>
+    <a:masterClrMapping/>
+  </p:clrMapOvr>
+</p:sld>
+</file>
+
+<file path=ppt/slides/slide33.xml><?xml version="1.0" encoding="utf-8"?>
 <p:sld xmlns:a="http://schemas.openxmlformats.org/drawingml/2006/main" xmlns:r="http://schemas.openxmlformats.org/officeDocument/2006/relationships" xmlns:p="http://schemas.openxmlformats.org/presentationml/2006/main">
   <p:cSld>
     <p:spTree>
@@ -15417,8 +15602,12 @@
           <a:lstStyle/>
           <a:p>
             <a:r>
+              <a:rPr lang="en-US" dirty="0" err="1" smtClean="0"/>
+              <a:t>cIRCUIT</a:t>
+            </a:r>
+            <a:r>
               <a:rPr lang="en-US" dirty="0" smtClean="0"/>
-              <a:t>Intro to Raspberry pi</a:t>
+              <a:t> symbols</a:t>
             </a:r>
             <a:endParaRPr lang="en-US" dirty="0"/>
           </a:p>
@@ -15442,60 +15631,41 @@
             <a:pPr marL="0" indent="0">
               <a:buNone/>
             </a:pPr>
-            <a:r>
-              <a:rPr lang="en-US" dirty="0" smtClean="0"/>
-              <a:t>1) Plug in</a:t>
-            </a:r>
-          </a:p>
-          <a:p>
-            <a:pPr marL="0" indent="0">
-              <a:buNone/>
-            </a:pPr>
-            <a:r>
-              <a:rPr lang="en-US" dirty="0" smtClean="0"/>
-              <a:t>2) Console</a:t>
-            </a:r>
-          </a:p>
-          <a:p>
-            <a:pPr marL="0" indent="0">
-              <a:buNone/>
-            </a:pPr>
-            <a:r>
-              <a:rPr lang="en-US" dirty="0" smtClean="0"/>
-              <a:t>3) Blah </a:t>
-            </a:r>
-            <a:r>
-              <a:rPr lang="en-US" dirty="0" err="1" smtClean="0"/>
-              <a:t>blah</a:t>
-            </a:r>
-            <a:r>
-              <a:rPr lang="en-US" dirty="0" smtClean="0"/>
-              <a:t> </a:t>
-            </a:r>
-            <a:r>
-              <a:rPr lang="en-US" dirty="0" err="1" smtClean="0"/>
-              <a:t>blah</a:t>
-            </a:r>
             <a:endParaRPr lang="en-US" dirty="0" smtClean="0"/>
           </a:p>
           <a:p>
-            <a:pPr marL="0" indent="0">
-              <a:buNone/>
-            </a:pPr>
-            <a:r>
-              <a:rPr lang="en-US" dirty="0" smtClean="0"/>
-              <a:t>4) Clone the repo</a:t>
-            </a:r>
-          </a:p>
-          <a:p>
             <a:endParaRPr lang="en-US" dirty="0"/>
           </a:p>
         </p:txBody>
       </p:sp>
+      <p:pic>
+        <p:nvPicPr>
+          <p:cNvPr id="11" name="Picture 10"/>
+          <p:cNvPicPr>
+            <a:picLocks noChangeAspect="1"/>
+          </p:cNvPicPr>
+          <p:nvPr/>
+        </p:nvPicPr>
+        <p:blipFill>
+          <a:blip r:embed="rId2"/>
+          <a:stretch>
+            <a:fillRect/>
+          </a:stretch>
+        </p:blipFill>
+        <p:spPr>
+          <a:xfrm>
+            <a:off x="2758860" y="1698652"/>
+            <a:ext cx="6671101" cy="4643383"/>
+          </a:xfrm>
+          <a:prstGeom prst="rect">
+            <a:avLst/>
+          </a:prstGeom>
+        </p:spPr>
+      </p:pic>
     </p:spTree>
     <p:extLst>
       <p:ext uri="{BB962C8B-B14F-4D97-AF65-F5344CB8AC3E}">
-        <p14:creationId xmlns:p14="http://schemas.microsoft.com/office/powerpoint/2010/main" val="2044859461"/>
+        <p14:creationId xmlns:p14="http://schemas.microsoft.com/office/powerpoint/2010/main" val="4205968302"/>
       </p:ext>
     </p:extLst>
   </p:cSld>
@@ -15538,8 +15708,16 @@
           <a:lstStyle/>
           <a:p>
             <a:r>
+              <a:rPr lang="en-US" dirty="0" err="1" smtClean="0"/>
+              <a:t>cIRCUIT</a:t>
+            </a:r>
+            <a:r>
               <a:rPr lang="en-US" dirty="0" smtClean="0"/>
-              <a:t>Python</a:t>
+              <a:t> </a:t>
+            </a:r>
+            <a:r>
+              <a:rPr lang="en-US" dirty="0" err="1" smtClean="0"/>
+              <a:t>diagramS</a:t>
             </a:r>
             <a:endParaRPr lang="en-US" dirty="0"/>
           </a:p>
@@ -15560,48 +15738,92 @@
           <a:bodyPr/>
           <a:lstStyle/>
           <a:p>
-            <a:r>
-              <a:rPr lang="en-US" dirty="0" smtClean="0"/>
-              <a:t>What is Python?</a:t>
-            </a:r>
-          </a:p>
-          <a:p>
-            <a:r>
-              <a:rPr lang="en-US" dirty="0" smtClean="0"/>
-              <a:t>Opening the text editor</a:t>
-            </a:r>
-          </a:p>
-          <a:p>
-            <a:r>
-              <a:rPr lang="en-US" dirty="0" smtClean="0"/>
-              <a:t>The first program: Hello World!</a:t>
-            </a:r>
-          </a:p>
-          <a:p>
-            <a:pPr lvl="1"/>
-            <a:r>
-              <a:rPr lang="en-US" dirty="0" smtClean="0"/>
-              <a:t>Notice the different colors of the words. Why is that?</a:t>
-            </a:r>
-          </a:p>
-          <a:p>
-            <a:r>
-              <a:rPr lang="en-US" dirty="0" smtClean="0"/>
-              <a:t>Running programs</a:t>
-            </a:r>
-          </a:p>
-          <a:p>
             <a:pPr marL="0" indent="0">
               <a:buNone/>
             </a:pPr>
+            <a:endParaRPr lang="en-US" dirty="0" smtClean="0"/>
+          </a:p>
+          <a:p>
             <a:endParaRPr lang="en-US" dirty="0"/>
           </a:p>
         </p:txBody>
       </p:sp>
+      <p:pic>
+        <p:nvPicPr>
+          <p:cNvPr id="5" name="Picture 4"/>
+          <p:cNvPicPr>
+            <a:picLocks noChangeAspect="1"/>
+          </p:cNvPicPr>
+          <p:nvPr/>
+        </p:nvPicPr>
+        <p:blipFill>
+          <a:blip r:embed="rId2"/>
+          <a:stretch>
+            <a:fillRect/>
+          </a:stretch>
+        </p:blipFill>
+        <p:spPr>
+          <a:xfrm>
+            <a:off x="1141412" y="1861839"/>
+            <a:ext cx="3907200" cy="1977326"/>
+          </a:xfrm>
+          <a:prstGeom prst="rect">
+            <a:avLst/>
+          </a:prstGeom>
+        </p:spPr>
+      </p:pic>
+      <p:pic>
+        <p:nvPicPr>
+          <p:cNvPr id="6" name="Picture 5"/>
+          <p:cNvPicPr>
+            <a:picLocks noChangeAspect="1"/>
+          </p:cNvPicPr>
+          <p:nvPr/>
+        </p:nvPicPr>
+        <p:blipFill>
+          <a:blip r:embed="rId3"/>
+          <a:stretch>
+            <a:fillRect/>
+          </a:stretch>
+        </p:blipFill>
+        <p:spPr>
+          <a:xfrm>
+            <a:off x="5691282" y="1861839"/>
+            <a:ext cx="3907200" cy="1977326"/>
+          </a:xfrm>
+          <a:prstGeom prst="rect">
+            <a:avLst/>
+          </a:prstGeom>
+        </p:spPr>
+      </p:pic>
+      <p:pic>
+        <p:nvPicPr>
+          <p:cNvPr id="7" name="Picture 6"/>
+          <p:cNvPicPr>
+            <a:picLocks noChangeAspect="1"/>
+          </p:cNvPicPr>
+          <p:nvPr/>
+        </p:nvPicPr>
+        <p:blipFill>
+          <a:blip r:embed="rId4"/>
+          <a:stretch>
+            <a:fillRect/>
+          </a:stretch>
+        </p:blipFill>
+        <p:spPr>
+          <a:xfrm>
+            <a:off x="3554571" y="4328000"/>
+            <a:ext cx="3907200" cy="2232823"/>
+          </a:xfrm>
+          <a:prstGeom prst="rect">
+            <a:avLst/>
+          </a:prstGeom>
+        </p:spPr>
+      </p:pic>
     </p:spTree>
     <p:extLst>
       <p:ext uri="{BB962C8B-B14F-4D97-AF65-F5344CB8AC3E}">
-        <p14:creationId xmlns:p14="http://schemas.microsoft.com/office/powerpoint/2010/main" val="1824136748"/>
+        <p14:creationId xmlns:p14="http://schemas.microsoft.com/office/powerpoint/2010/main" val="1384871489"/>
       </p:ext>
     </p:extLst>
   </p:cSld>

</xml_diff>

<commit_message>
Added links to Project Management
</commit_message>
<xml_diff>
--- a/docs/SMAP Materials Unbranded.pptx
+++ b/docs/SMAP Materials Unbranded.pptx
@@ -194,7 +194,7 @@
           <a:noFill/>
           <a:extLst>
             <a:ext uri="{909E8E84-426E-40dd-AFC4-6F175D3DCCD1}">
-              <a14:hiddenFill xmlns:a14="http://schemas.microsoft.com/office/drawing/2010/main" xmlns="">
+              <a14:hiddenFill xmlns="" xmlns:a14="http://schemas.microsoft.com/office/drawing/2010/main">
                 <a:solidFill>
                   <a:srgbClr val="FFFFFF"/>
                 </a:solidFill>
@@ -254,7 +254,7 @@
             </a:ln>
             <a:extLst>
               <a:ext uri="{91240B29-F687-4f45-9708-019B960494DF}">
-                <a14:hiddenLine xmlns:a14="http://schemas.microsoft.com/office/drawing/2010/main" xmlns="" w="9525">
+                <a14:hiddenLine xmlns="" xmlns:a14="http://schemas.microsoft.com/office/drawing/2010/main" w="9525">
                   <a:solidFill>
                     <a:srgbClr val="000000"/>
                   </a:solidFill>
@@ -344,7 +344,7 @@
             </a:ln>
             <a:extLst>
               <a:ext uri="{91240B29-F687-4f45-9708-019B960494DF}">
-                <a14:hiddenLine xmlns:a14="http://schemas.microsoft.com/office/drawing/2010/main" xmlns="" w="9525">
+                <a14:hiddenLine xmlns="" xmlns:a14="http://schemas.microsoft.com/office/drawing/2010/main" w="9525">
                   <a:solidFill>
                     <a:srgbClr val="000000"/>
                   </a:solidFill>
@@ -434,7 +434,7 @@
             </a:ln>
             <a:extLst>
               <a:ext uri="{91240B29-F687-4f45-9708-019B960494DF}">
-                <a14:hiddenLine xmlns:a14="http://schemas.microsoft.com/office/drawing/2010/main" xmlns="" w="9525">
+                <a14:hiddenLine xmlns="" xmlns:a14="http://schemas.microsoft.com/office/drawing/2010/main" w="9525">
                   <a:solidFill>
                     <a:srgbClr val="000000"/>
                   </a:solidFill>
@@ -468,7 +468,7 @@
             </a:ln>
             <a:extLst>
               <a:ext uri="{91240B29-F687-4f45-9708-019B960494DF}">
-                <a14:hiddenLine xmlns:a14="http://schemas.microsoft.com/office/drawing/2010/main" xmlns="" w="9525">
+                <a14:hiddenLine xmlns="" xmlns:a14="http://schemas.microsoft.com/office/drawing/2010/main" w="9525">
                   <a:solidFill>
                     <a:srgbClr val="000000"/>
                   </a:solidFill>
@@ -558,7 +558,7 @@
             </a:ln>
             <a:extLst>
               <a:ext uri="{91240B29-F687-4f45-9708-019B960494DF}">
-                <a14:hiddenLine xmlns:a14="http://schemas.microsoft.com/office/drawing/2010/main" xmlns="" w="9525">
+                <a14:hiddenLine xmlns="" xmlns:a14="http://schemas.microsoft.com/office/drawing/2010/main" w="9525">
                   <a:solidFill>
                     <a:srgbClr val="000000"/>
                   </a:solidFill>
@@ -620,7 +620,7 @@
             </a:ln>
             <a:extLst>
               <a:ext uri="{91240B29-F687-4f45-9708-019B960494DF}">
-                <a14:hiddenLine xmlns:a14="http://schemas.microsoft.com/office/drawing/2010/main" xmlns="" w="9525">
+                <a14:hiddenLine xmlns="" xmlns:a14="http://schemas.microsoft.com/office/drawing/2010/main" w="9525">
                   <a:solidFill>
                     <a:srgbClr val="000000"/>
                   </a:solidFill>
@@ -682,7 +682,7 @@
             </a:ln>
             <a:extLst>
               <a:ext uri="{91240B29-F687-4f45-9708-019B960494DF}">
-                <a14:hiddenLine xmlns:a14="http://schemas.microsoft.com/office/drawing/2010/main" xmlns="" w="9525">
+                <a14:hiddenLine xmlns="" xmlns:a14="http://schemas.microsoft.com/office/drawing/2010/main" w="9525">
                   <a:solidFill>
                     <a:srgbClr val="000000"/>
                   </a:solidFill>
@@ -772,7 +772,7 @@
             </a:ln>
             <a:extLst>
               <a:ext uri="{91240B29-F687-4f45-9708-019B960494DF}">
-                <a14:hiddenLine xmlns:a14="http://schemas.microsoft.com/office/drawing/2010/main" xmlns="" w="9525">
+                <a14:hiddenLine xmlns="" xmlns:a14="http://schemas.microsoft.com/office/drawing/2010/main" w="9525">
                   <a:solidFill>
                     <a:srgbClr val="000000"/>
                   </a:solidFill>
@@ -834,7 +834,7 @@
             </a:ln>
             <a:extLst>
               <a:ext uri="{91240B29-F687-4f45-9708-019B960494DF}">
-                <a14:hiddenLine xmlns:a14="http://schemas.microsoft.com/office/drawing/2010/main" xmlns="" w="9525">
+                <a14:hiddenLine xmlns="" xmlns:a14="http://schemas.microsoft.com/office/drawing/2010/main" w="9525">
                   <a:solidFill>
                     <a:srgbClr val="000000"/>
                   </a:solidFill>
@@ -896,7 +896,7 @@
             </a:ln>
             <a:extLst>
               <a:ext uri="{91240B29-F687-4f45-9708-019B960494DF}">
-                <a14:hiddenLine xmlns:a14="http://schemas.microsoft.com/office/drawing/2010/main" xmlns="" w="9525">
+                <a14:hiddenLine xmlns="" xmlns:a14="http://schemas.microsoft.com/office/drawing/2010/main" w="9525">
                   <a:solidFill>
                     <a:srgbClr val="000000"/>
                   </a:solidFill>
@@ -986,7 +986,7 @@
             </a:ln>
             <a:extLst>
               <a:ext uri="{91240B29-F687-4f45-9708-019B960494DF}">
-                <a14:hiddenLine xmlns:a14="http://schemas.microsoft.com/office/drawing/2010/main" xmlns="" w="9525">
+                <a14:hiddenLine xmlns="" xmlns:a14="http://schemas.microsoft.com/office/drawing/2010/main" w="9525">
                   <a:solidFill>
                     <a:srgbClr val="000000"/>
                   </a:solidFill>
@@ -1076,7 +1076,7 @@
             </a:ln>
             <a:extLst>
               <a:ext uri="{91240B29-F687-4f45-9708-019B960494DF}">
-                <a14:hiddenLine xmlns:a14="http://schemas.microsoft.com/office/drawing/2010/main" xmlns="" w="9525">
+                <a14:hiddenLine xmlns="" xmlns:a14="http://schemas.microsoft.com/office/drawing/2010/main" w="9525">
                   <a:solidFill>
                     <a:srgbClr val="000000"/>
                   </a:solidFill>
@@ -1138,7 +1138,7 @@
             </a:ln>
             <a:extLst>
               <a:ext uri="{91240B29-F687-4f45-9708-019B960494DF}">
-                <a14:hiddenLine xmlns:a14="http://schemas.microsoft.com/office/drawing/2010/main" xmlns="" w="9525">
+                <a14:hiddenLine xmlns="" xmlns:a14="http://schemas.microsoft.com/office/drawing/2010/main" w="9525">
                   <a:solidFill>
                     <a:srgbClr val="000000"/>
                   </a:solidFill>
@@ -1248,7 +1248,7 @@
             </a:ln>
             <a:extLst>
               <a:ext uri="{91240B29-F687-4f45-9708-019B960494DF}">
-                <a14:hiddenLine xmlns:a14="http://schemas.microsoft.com/office/drawing/2010/main" xmlns="" w="9525">
+                <a14:hiddenLine xmlns="" xmlns:a14="http://schemas.microsoft.com/office/drawing/2010/main" w="9525">
                   <a:solidFill>
                     <a:srgbClr val="000000"/>
                   </a:solidFill>
@@ -1310,7 +1310,7 @@
             </a:ln>
             <a:extLst>
               <a:ext uri="{91240B29-F687-4f45-9708-019B960494DF}">
-                <a14:hiddenLine xmlns:a14="http://schemas.microsoft.com/office/drawing/2010/main" xmlns="" w="9525">
+                <a14:hiddenLine xmlns="" xmlns:a14="http://schemas.microsoft.com/office/drawing/2010/main" w="9525">
                   <a:solidFill>
                     <a:srgbClr val="000000"/>
                   </a:solidFill>
@@ -1400,7 +1400,7 @@
             </a:ln>
             <a:extLst>
               <a:ext uri="{91240B29-F687-4f45-9708-019B960494DF}">
-                <a14:hiddenLine xmlns:a14="http://schemas.microsoft.com/office/drawing/2010/main" xmlns="" w="9525">
+                <a14:hiddenLine xmlns="" xmlns:a14="http://schemas.microsoft.com/office/drawing/2010/main" w="9525">
                   <a:solidFill>
                     <a:srgbClr val="000000"/>
                   </a:solidFill>
@@ -1490,7 +1490,7 @@
             </a:ln>
             <a:extLst>
               <a:ext uri="{91240B29-F687-4f45-9708-019B960494DF}">
-                <a14:hiddenLine xmlns:a14="http://schemas.microsoft.com/office/drawing/2010/main" xmlns="" w="9525">
+                <a14:hiddenLine xmlns="" xmlns:a14="http://schemas.microsoft.com/office/drawing/2010/main" w="9525">
                   <a:solidFill>
                     <a:srgbClr val="000000"/>
                   </a:solidFill>
@@ -1552,7 +1552,7 @@
             </a:ln>
             <a:extLst>
               <a:ext uri="{91240B29-F687-4f45-9708-019B960494DF}">
-                <a14:hiddenLine xmlns:a14="http://schemas.microsoft.com/office/drawing/2010/main" xmlns="" w="9525">
+                <a14:hiddenLine xmlns="" xmlns:a14="http://schemas.microsoft.com/office/drawing/2010/main" w="9525">
                   <a:solidFill>
                     <a:srgbClr val="000000"/>
                   </a:solidFill>
@@ -1642,7 +1642,7 @@
             </a:ln>
             <a:extLst>
               <a:ext uri="{91240B29-F687-4f45-9708-019B960494DF}">
-                <a14:hiddenLine xmlns:a14="http://schemas.microsoft.com/office/drawing/2010/main" xmlns="" w="9525">
+                <a14:hiddenLine xmlns="" xmlns:a14="http://schemas.microsoft.com/office/drawing/2010/main" w="9525">
                   <a:solidFill>
                     <a:srgbClr val="000000"/>
                   </a:solidFill>
@@ -1732,7 +1732,7 @@
             </a:ln>
             <a:extLst>
               <a:ext uri="{91240B29-F687-4f45-9708-019B960494DF}">
-                <a14:hiddenLine xmlns:a14="http://schemas.microsoft.com/office/drawing/2010/main" xmlns="" w="9525">
+                <a14:hiddenLine xmlns="" xmlns:a14="http://schemas.microsoft.com/office/drawing/2010/main" w="9525">
                   <a:solidFill>
                     <a:srgbClr val="000000"/>
                   </a:solidFill>
@@ -1788,7 +1788,7 @@
             </a:ln>
             <a:extLst>
               <a:ext uri="{91240B29-F687-4f45-9708-019B960494DF}">
-                <a14:hiddenLine xmlns:a14="http://schemas.microsoft.com/office/drawing/2010/main" xmlns="" w="9525">
+                <a14:hiddenLine xmlns="" xmlns:a14="http://schemas.microsoft.com/office/drawing/2010/main" w="9525">
                   <a:solidFill>
                     <a:srgbClr val="000000"/>
                   </a:solidFill>
@@ -1878,7 +1878,7 @@
             </a:ln>
             <a:extLst>
               <a:ext uri="{91240B29-F687-4f45-9708-019B960494DF}">
-                <a14:hiddenLine xmlns:a14="http://schemas.microsoft.com/office/drawing/2010/main" xmlns="" w="9525">
+                <a14:hiddenLine xmlns="" xmlns:a14="http://schemas.microsoft.com/office/drawing/2010/main" w="9525">
                   <a:solidFill>
                     <a:srgbClr val="000000"/>
                   </a:solidFill>
@@ -1934,7 +1934,7 @@
             </a:ln>
             <a:extLst>
               <a:ext uri="{91240B29-F687-4f45-9708-019B960494DF}">
-                <a14:hiddenLine xmlns:a14="http://schemas.microsoft.com/office/drawing/2010/main" xmlns="" w="9525">
+                <a14:hiddenLine xmlns="" xmlns:a14="http://schemas.microsoft.com/office/drawing/2010/main" w="9525">
                   <a:solidFill>
                     <a:srgbClr val="000000"/>
                   </a:solidFill>
@@ -2024,7 +2024,7 @@
             </a:ln>
             <a:extLst>
               <a:ext uri="{91240B29-F687-4f45-9708-019B960494DF}">
-                <a14:hiddenLine xmlns:a14="http://schemas.microsoft.com/office/drawing/2010/main" xmlns="" w="9525">
+                <a14:hiddenLine xmlns="" xmlns:a14="http://schemas.microsoft.com/office/drawing/2010/main" w="9525">
                   <a:solidFill>
                     <a:srgbClr val="000000"/>
                   </a:solidFill>
@@ -2092,7 +2092,7 @@
             </a:ln>
             <a:extLst>
               <a:ext uri="{91240B29-F687-4f45-9708-019B960494DF}">
-                <a14:hiddenLine xmlns:a14="http://schemas.microsoft.com/office/drawing/2010/main" xmlns="" w="9525">
+                <a14:hiddenLine xmlns="" xmlns:a14="http://schemas.microsoft.com/office/drawing/2010/main" w="9525">
                   <a:solidFill>
                     <a:srgbClr val="000000"/>
                   </a:solidFill>
@@ -2182,7 +2182,7 @@
             </a:ln>
             <a:extLst>
               <a:ext uri="{91240B29-F687-4f45-9708-019B960494DF}">
-                <a14:hiddenLine xmlns:a14="http://schemas.microsoft.com/office/drawing/2010/main" xmlns="" w="9525">
+                <a14:hiddenLine xmlns="" xmlns:a14="http://schemas.microsoft.com/office/drawing/2010/main" w="9525">
                   <a:solidFill>
                     <a:srgbClr val="000000"/>
                   </a:solidFill>
@@ -2250,7 +2250,7 @@
             </a:ln>
             <a:extLst>
               <a:ext uri="{91240B29-F687-4f45-9708-019B960494DF}">
-                <a14:hiddenLine xmlns:a14="http://schemas.microsoft.com/office/drawing/2010/main" xmlns="" w="9525">
+                <a14:hiddenLine xmlns="" xmlns:a14="http://schemas.microsoft.com/office/drawing/2010/main" w="9525">
                   <a:solidFill>
                     <a:srgbClr val="000000"/>
                   </a:solidFill>
@@ -2340,7 +2340,7 @@
             </a:ln>
             <a:extLst>
               <a:ext uri="{91240B29-F687-4f45-9708-019B960494DF}">
-                <a14:hiddenLine xmlns:a14="http://schemas.microsoft.com/office/drawing/2010/main" xmlns="" w="9525">
+                <a14:hiddenLine xmlns="" xmlns:a14="http://schemas.microsoft.com/office/drawing/2010/main" w="9525">
                   <a:solidFill>
                     <a:srgbClr val="000000"/>
                   </a:solidFill>
@@ -2374,7 +2374,7 @@
             </a:ln>
             <a:extLst>
               <a:ext uri="{91240B29-F687-4f45-9708-019B960494DF}">
-                <a14:hiddenLine xmlns:a14="http://schemas.microsoft.com/office/drawing/2010/main" xmlns="" w="9525">
+                <a14:hiddenLine xmlns="" xmlns:a14="http://schemas.microsoft.com/office/drawing/2010/main" w="9525">
                   <a:solidFill>
                     <a:srgbClr val="000000"/>
                   </a:solidFill>
@@ -2464,7 +2464,7 @@
             </a:ln>
             <a:extLst>
               <a:ext uri="{91240B29-F687-4f45-9708-019B960494DF}">
-                <a14:hiddenLine xmlns:a14="http://schemas.microsoft.com/office/drawing/2010/main" xmlns="" w="9525">
+                <a14:hiddenLine xmlns="" xmlns:a14="http://schemas.microsoft.com/office/drawing/2010/main" w="9525">
                   <a:solidFill>
                     <a:srgbClr val="000000"/>
                   </a:solidFill>
@@ -2526,7 +2526,7 @@
             </a:ln>
             <a:extLst>
               <a:ext uri="{91240B29-F687-4f45-9708-019B960494DF}">
-                <a14:hiddenLine xmlns:a14="http://schemas.microsoft.com/office/drawing/2010/main" xmlns="" w="9525">
+                <a14:hiddenLine xmlns="" xmlns:a14="http://schemas.microsoft.com/office/drawing/2010/main" w="9525">
                   <a:solidFill>
                     <a:srgbClr val="000000"/>
                   </a:solidFill>
@@ -2588,7 +2588,7 @@
             </a:ln>
             <a:extLst>
               <a:ext uri="{91240B29-F687-4f45-9708-019B960494DF}">
-                <a14:hiddenLine xmlns:a14="http://schemas.microsoft.com/office/drawing/2010/main" xmlns="" w="9525">
+                <a14:hiddenLine xmlns="" xmlns:a14="http://schemas.microsoft.com/office/drawing/2010/main" w="9525">
                   <a:solidFill>
                     <a:srgbClr val="000000"/>
                   </a:solidFill>
@@ -2678,7 +2678,7 @@
             </a:ln>
             <a:extLst>
               <a:ext uri="{91240B29-F687-4f45-9708-019B960494DF}">
-                <a14:hiddenLine xmlns:a14="http://schemas.microsoft.com/office/drawing/2010/main" xmlns="" w="9525">
+                <a14:hiddenLine xmlns="" xmlns:a14="http://schemas.microsoft.com/office/drawing/2010/main" w="9525">
                   <a:solidFill>
                     <a:srgbClr val="000000"/>
                   </a:solidFill>
@@ -2746,7 +2746,7 @@
             </a:ln>
             <a:extLst>
               <a:ext uri="{91240B29-F687-4f45-9708-019B960494DF}">
-                <a14:hiddenLine xmlns:a14="http://schemas.microsoft.com/office/drawing/2010/main" xmlns="" w="9525">
+                <a14:hiddenLine xmlns="" xmlns:a14="http://schemas.microsoft.com/office/drawing/2010/main" w="9525">
                   <a:solidFill>
                     <a:srgbClr val="000000"/>
                   </a:solidFill>
@@ -2808,7 +2808,7 @@
             </a:ln>
             <a:extLst>
               <a:ext uri="{91240B29-F687-4f45-9708-019B960494DF}">
-                <a14:hiddenLine xmlns:a14="http://schemas.microsoft.com/office/drawing/2010/main" xmlns="" w="9525">
+                <a14:hiddenLine xmlns="" xmlns:a14="http://schemas.microsoft.com/office/drawing/2010/main" w="9525">
                   <a:solidFill>
                     <a:srgbClr val="000000"/>
                   </a:solidFill>
@@ -2898,7 +2898,7 @@
             </a:ln>
             <a:extLst>
               <a:ext uri="{91240B29-F687-4f45-9708-019B960494DF}">
-                <a14:hiddenLine xmlns:a14="http://schemas.microsoft.com/office/drawing/2010/main" xmlns="" w="9525">
+                <a14:hiddenLine xmlns="" xmlns:a14="http://schemas.microsoft.com/office/drawing/2010/main" w="9525">
                   <a:solidFill>
                     <a:srgbClr val="000000"/>
                   </a:solidFill>
@@ -2960,7 +2960,7 @@
             </a:ln>
             <a:extLst>
               <a:ext uri="{91240B29-F687-4f45-9708-019B960494DF}">
-                <a14:hiddenLine xmlns:a14="http://schemas.microsoft.com/office/drawing/2010/main" xmlns="" w="9525">
+                <a14:hiddenLine xmlns="" xmlns:a14="http://schemas.microsoft.com/office/drawing/2010/main" w="9525">
                   <a:solidFill>
                     <a:srgbClr val="000000"/>
                   </a:solidFill>
@@ -3050,7 +3050,7 @@
             </a:ln>
             <a:extLst>
               <a:ext uri="{91240B29-F687-4f45-9708-019B960494DF}">
-                <a14:hiddenLine xmlns:a14="http://schemas.microsoft.com/office/drawing/2010/main" xmlns="" w="9525">
+                <a14:hiddenLine xmlns="" xmlns:a14="http://schemas.microsoft.com/office/drawing/2010/main" w="9525">
                   <a:solidFill>
                     <a:srgbClr val="000000"/>
                   </a:solidFill>
@@ -3112,7 +3112,7 @@
             </a:ln>
             <a:extLst>
               <a:ext uri="{91240B29-F687-4f45-9708-019B960494DF}">
-                <a14:hiddenLine xmlns:a14="http://schemas.microsoft.com/office/drawing/2010/main" xmlns="" w="9525">
+                <a14:hiddenLine xmlns="" xmlns:a14="http://schemas.microsoft.com/office/drawing/2010/main" w="9525">
                   <a:solidFill>
                     <a:srgbClr val="000000"/>
                   </a:solidFill>
@@ -3202,7 +3202,7 @@
             </a:ln>
             <a:extLst>
               <a:ext uri="{91240B29-F687-4f45-9708-019B960494DF}">
-                <a14:hiddenLine xmlns:a14="http://schemas.microsoft.com/office/drawing/2010/main" xmlns="" w="9525">
+                <a14:hiddenLine xmlns="" xmlns:a14="http://schemas.microsoft.com/office/drawing/2010/main" w="9525">
                   <a:solidFill>
                     <a:srgbClr val="000000"/>
                   </a:solidFill>
@@ -3236,7 +3236,7 @@
             </a:ln>
             <a:extLst>
               <a:ext uri="{91240B29-F687-4f45-9708-019B960494DF}">
-                <a14:hiddenLine xmlns:a14="http://schemas.microsoft.com/office/drawing/2010/main" xmlns="" w="9525">
+                <a14:hiddenLine xmlns="" xmlns:a14="http://schemas.microsoft.com/office/drawing/2010/main" w="9525">
                   <a:solidFill>
                     <a:srgbClr val="000000"/>
                   </a:solidFill>
@@ -3301,7 +3301,7 @@
             </a:ln>
             <a:extLst>
               <a:ext uri="{91240B29-F687-4f45-9708-019B960494DF}">
-                <a14:hiddenLine xmlns:a14="http://schemas.microsoft.com/office/drawing/2010/main" xmlns="" w="9525">
+                <a14:hiddenLine xmlns="" xmlns:a14="http://schemas.microsoft.com/office/drawing/2010/main" w="9525">
                   <a:solidFill>
                     <a:srgbClr val="000000"/>
                   </a:solidFill>
@@ -3391,7 +3391,7 @@
             </a:ln>
             <a:extLst>
               <a:ext uri="{91240B29-F687-4f45-9708-019B960494DF}">
-                <a14:hiddenLine xmlns:a14="http://schemas.microsoft.com/office/drawing/2010/main" xmlns="" w="9525">
+                <a14:hiddenLine xmlns="" xmlns:a14="http://schemas.microsoft.com/office/drawing/2010/main" w="9525">
                   <a:solidFill>
                     <a:srgbClr val="000000"/>
                   </a:solidFill>
@@ -3453,7 +3453,7 @@
             </a:ln>
             <a:extLst>
               <a:ext uri="{91240B29-F687-4f45-9708-019B960494DF}">
-                <a14:hiddenLine xmlns:a14="http://schemas.microsoft.com/office/drawing/2010/main" xmlns="" w="9525">
+                <a14:hiddenLine xmlns="" xmlns:a14="http://schemas.microsoft.com/office/drawing/2010/main" w="9525">
                   <a:solidFill>
                     <a:srgbClr val="000000"/>
                   </a:solidFill>
@@ -3543,7 +3543,7 @@
             </a:ln>
             <a:extLst>
               <a:ext uri="{91240B29-F687-4f45-9708-019B960494DF}">
-                <a14:hiddenLine xmlns:a14="http://schemas.microsoft.com/office/drawing/2010/main" xmlns="" w="9525">
+                <a14:hiddenLine xmlns="" xmlns:a14="http://schemas.microsoft.com/office/drawing/2010/main" w="9525">
                   <a:solidFill>
                     <a:srgbClr val="000000"/>
                   </a:solidFill>
@@ -3633,7 +3633,7 @@
             </a:ln>
             <a:extLst>
               <a:ext uri="{91240B29-F687-4f45-9708-019B960494DF}">
-                <a14:hiddenLine xmlns:a14="http://schemas.microsoft.com/office/drawing/2010/main" xmlns="" w="9525">
+                <a14:hiddenLine xmlns="" xmlns:a14="http://schemas.microsoft.com/office/drawing/2010/main" w="9525">
                   <a:solidFill>
                     <a:srgbClr val="000000"/>
                   </a:solidFill>
@@ -3698,7 +3698,7 @@
             </a:ln>
             <a:extLst>
               <a:ext uri="{91240B29-F687-4f45-9708-019B960494DF}">
-                <a14:hiddenLine xmlns:a14="http://schemas.microsoft.com/office/drawing/2010/main" xmlns="" w="9525">
+                <a14:hiddenLine xmlns="" xmlns:a14="http://schemas.microsoft.com/office/drawing/2010/main" w="9525">
                   <a:solidFill>
                     <a:srgbClr val="000000"/>
                   </a:solidFill>
@@ -3760,7 +3760,7 @@
             </a:ln>
             <a:extLst>
               <a:ext uri="{91240B29-F687-4f45-9708-019B960494DF}">
-                <a14:hiddenLine xmlns:a14="http://schemas.microsoft.com/office/drawing/2010/main" xmlns="" w="9525">
+                <a14:hiddenLine xmlns="" xmlns:a14="http://schemas.microsoft.com/office/drawing/2010/main" w="9525">
                   <a:solidFill>
                     <a:srgbClr val="000000"/>
                   </a:solidFill>
@@ -3850,7 +3850,7 @@
             </a:ln>
             <a:extLst>
               <a:ext uri="{91240B29-F687-4f45-9708-019B960494DF}">
-                <a14:hiddenLine xmlns:a14="http://schemas.microsoft.com/office/drawing/2010/main" xmlns="" w="9525">
+                <a14:hiddenLine xmlns="" xmlns:a14="http://schemas.microsoft.com/office/drawing/2010/main" w="9525">
                   <a:solidFill>
                     <a:srgbClr val="000000"/>
                   </a:solidFill>
@@ -3940,7 +3940,7 @@
             </a:ln>
             <a:extLst>
               <a:ext uri="{91240B29-F687-4f45-9708-019B960494DF}">
-                <a14:hiddenLine xmlns:a14="http://schemas.microsoft.com/office/drawing/2010/main" xmlns="" w="9525">
+                <a14:hiddenLine xmlns="" xmlns:a14="http://schemas.microsoft.com/office/drawing/2010/main" w="9525">
                   <a:solidFill>
                     <a:srgbClr val="000000"/>
                   </a:solidFill>
@@ -4002,7 +4002,7 @@
             </a:ln>
             <a:extLst>
               <a:ext uri="{91240B29-F687-4f45-9708-019B960494DF}">
-                <a14:hiddenLine xmlns:a14="http://schemas.microsoft.com/office/drawing/2010/main" xmlns="" w="9525">
+                <a14:hiddenLine xmlns="" xmlns:a14="http://schemas.microsoft.com/office/drawing/2010/main" w="9525">
                   <a:solidFill>
                     <a:srgbClr val="000000"/>
                   </a:solidFill>
@@ -4122,7 +4122,7 @@
             </a:ln>
             <a:extLst>
               <a:ext uri="{91240B29-F687-4f45-9708-019B960494DF}">
-                <a14:hiddenLine xmlns:a14="http://schemas.microsoft.com/office/drawing/2010/main" xmlns="" w="9525">
+                <a14:hiddenLine xmlns="" xmlns:a14="http://schemas.microsoft.com/office/drawing/2010/main" w="9525">
                   <a:solidFill>
                     <a:srgbClr val="000000"/>
                   </a:solidFill>
@@ -4190,7 +4190,7 @@
             </a:ln>
             <a:extLst>
               <a:ext uri="{91240B29-F687-4f45-9708-019B960494DF}">
-                <a14:hiddenLine xmlns:a14="http://schemas.microsoft.com/office/drawing/2010/main" xmlns="" w="9525">
+                <a14:hiddenLine xmlns="" xmlns:a14="http://schemas.microsoft.com/office/drawing/2010/main" w="9525">
                   <a:solidFill>
                     <a:srgbClr val="000000"/>
                   </a:solidFill>
@@ -4280,7 +4280,7 @@
             </a:ln>
             <a:extLst>
               <a:ext uri="{91240B29-F687-4f45-9708-019B960494DF}">
-                <a14:hiddenLine xmlns:a14="http://schemas.microsoft.com/office/drawing/2010/main" xmlns="" w="9525">
+                <a14:hiddenLine xmlns="" xmlns:a14="http://schemas.microsoft.com/office/drawing/2010/main" w="9525">
                   <a:solidFill>
                     <a:srgbClr val="000000"/>
                   </a:solidFill>
@@ -4420,7 +4420,7 @@
           <a:p>
             <a:fld id="{48A87A34-81AB-432B-8DAE-1953F412C126}" type="datetimeFigureOut">
               <a:rPr lang="en-US" dirty="0"/>
-              <a:t>7/29/2019</a:t>
+              <a:t>8/2/2019</a:t>
             </a:fld>
             <a:endParaRPr lang="en-US" dirty="0"/>
           </a:p>
@@ -4682,7 +4682,7 @@
           <a:p>
             <a:fld id="{48A87A34-81AB-432B-8DAE-1953F412C126}" type="datetimeFigureOut">
               <a:rPr lang="en-US" dirty="0"/>
-              <a:t>7/29/2019</a:t>
+              <a:t>8/2/2019</a:t>
             </a:fld>
             <a:endParaRPr lang="en-US" dirty="0"/>
           </a:p>
@@ -4873,7 +4873,7 @@
           <a:p>
             <a:fld id="{48A87A34-81AB-432B-8DAE-1953F412C126}" type="datetimeFigureOut">
               <a:rPr lang="en-US" dirty="0"/>
-              <a:t>7/29/2019</a:t>
+              <a:t>8/2/2019</a:t>
             </a:fld>
             <a:endParaRPr lang="en-US" dirty="0"/>
           </a:p>
@@ -5131,7 +5131,7 @@
           <a:p>
             <a:fld id="{48A87A34-81AB-432B-8DAE-1953F412C126}" type="datetimeFigureOut">
               <a:rPr lang="en-US" dirty="0"/>
-              <a:t>7/29/2019</a:t>
+              <a:t>8/2/2019</a:t>
             </a:fld>
             <a:endParaRPr lang="en-US" dirty="0"/>
           </a:p>
@@ -5560,7 +5560,7 @@
           <a:p>
             <a:fld id="{48A87A34-81AB-432B-8DAE-1953F412C126}" type="datetimeFigureOut">
               <a:rPr lang="en-US" dirty="0"/>
-              <a:t>7/29/2019</a:t>
+              <a:t>8/2/2019</a:t>
             </a:fld>
             <a:endParaRPr lang="en-US" dirty="0"/>
           </a:p>
@@ -6101,7 +6101,7 @@
           <a:p>
             <a:fld id="{48A87A34-81AB-432B-8DAE-1953F412C126}" type="datetimeFigureOut">
               <a:rPr lang="en-US" dirty="0"/>
-              <a:t>7/29/2019</a:t>
+              <a:t>8/2/2019</a:t>
             </a:fld>
             <a:endParaRPr lang="en-US" dirty="0"/>
           </a:p>
@@ -6816,7 +6816,7 @@
           <a:p>
             <a:fld id="{48A87A34-81AB-432B-8DAE-1953F412C126}" type="datetimeFigureOut">
               <a:rPr lang="en-US" dirty="0"/>
-              <a:t>7/29/2019</a:t>
+              <a:t>8/2/2019</a:t>
             </a:fld>
             <a:endParaRPr lang="en-US" dirty="0"/>
           </a:p>
@@ -6981,7 +6981,7 @@
           <a:p>
             <a:fld id="{48A87A34-81AB-432B-8DAE-1953F412C126}" type="datetimeFigureOut">
               <a:rPr lang="en-US" dirty="0"/>
-              <a:t>7/29/2019</a:t>
+              <a:t>8/2/2019</a:t>
             </a:fld>
             <a:endParaRPr lang="en-US" dirty="0"/>
           </a:p>
@@ -7156,7 +7156,7 @@
           <a:p>
             <a:fld id="{48A87A34-81AB-432B-8DAE-1953F412C126}" type="datetimeFigureOut">
               <a:rPr lang="en-US" dirty="0"/>
-              <a:t>7/29/2019</a:t>
+              <a:t>8/2/2019</a:t>
             </a:fld>
             <a:endParaRPr lang="en-US" dirty="0"/>
           </a:p>
@@ -7321,7 +7321,7 @@
           <a:p>
             <a:fld id="{48A87A34-81AB-432B-8DAE-1953F412C126}" type="datetimeFigureOut">
               <a:rPr lang="en-US" dirty="0"/>
-              <a:t>7/29/2019</a:t>
+              <a:t>8/2/2019</a:t>
             </a:fld>
             <a:endParaRPr lang="en-US" dirty="0"/>
           </a:p>
@@ -7566,7 +7566,7 @@
           <a:p>
             <a:fld id="{48A87A34-81AB-432B-8DAE-1953F412C126}" type="datetimeFigureOut">
               <a:rPr lang="en-US" dirty="0"/>
-              <a:t>7/29/2019</a:t>
+              <a:t>8/2/2019</a:t>
             </a:fld>
             <a:endParaRPr lang="en-US" dirty="0"/>
           </a:p>
@@ -7793,7 +7793,7 @@
           <a:p>
             <a:fld id="{48A87A34-81AB-432B-8DAE-1953F412C126}" type="datetimeFigureOut">
               <a:rPr lang="en-US" dirty="0"/>
-              <a:t>7/29/2019</a:t>
+              <a:t>8/2/2019</a:t>
             </a:fld>
             <a:endParaRPr lang="en-US" dirty="0"/>
           </a:p>
@@ -8169,7 +8169,7 @@
           <a:p>
             <a:fld id="{48A87A34-81AB-432B-8DAE-1953F412C126}" type="datetimeFigureOut">
               <a:rPr lang="en-US" dirty="0"/>
-              <a:t>7/29/2019</a:t>
+              <a:t>8/2/2019</a:t>
             </a:fld>
             <a:endParaRPr lang="en-US" dirty="0"/>
           </a:p>
@@ -8282,7 +8282,7 @@
           <a:p>
             <a:fld id="{48A87A34-81AB-432B-8DAE-1953F412C126}" type="datetimeFigureOut">
               <a:rPr lang="en-US" dirty="0"/>
-              <a:t>7/29/2019</a:t>
+              <a:t>8/2/2019</a:t>
             </a:fld>
             <a:endParaRPr lang="en-US" dirty="0"/>
           </a:p>
@@ -8372,7 +8372,7 @@
           <a:p>
             <a:fld id="{48A87A34-81AB-432B-8DAE-1953F412C126}" type="datetimeFigureOut">
               <a:rPr lang="en-US" dirty="0"/>
-              <a:t>7/29/2019</a:t>
+              <a:t>8/2/2019</a:t>
             </a:fld>
             <a:endParaRPr lang="en-US" dirty="0"/>
           </a:p>
@@ -8616,7 +8616,7 @@
           <a:p>
             <a:fld id="{48A87A34-81AB-432B-8DAE-1953F412C126}" type="datetimeFigureOut">
               <a:rPr lang="en-US" dirty="0"/>
-              <a:t>7/29/2019</a:t>
+              <a:t>8/2/2019</a:t>
             </a:fld>
             <a:endParaRPr lang="en-US" dirty="0"/>
           </a:p>
@@ -8891,7 +8891,7 @@
           <a:p>
             <a:fld id="{48A87A34-81AB-432B-8DAE-1953F412C126}" type="datetimeFigureOut">
               <a:rPr lang="en-US" dirty="0"/>
-              <a:t>7/29/2019</a:t>
+              <a:t>8/2/2019</a:t>
             </a:fld>
             <a:endParaRPr lang="en-US" dirty="0"/>
           </a:p>
@@ -9002,7 +9002,7 @@
           <a:noFill/>
           <a:extLst>
             <a:ext uri="{909E8E84-426E-40dd-AFC4-6F175D3DCCD1}">
-              <a14:hiddenFill xmlns:a14="http://schemas.microsoft.com/office/drawing/2010/main" xmlns="">
+              <a14:hiddenFill xmlns="" xmlns:a14="http://schemas.microsoft.com/office/drawing/2010/main">
                 <a:solidFill>
                   <a:srgbClr val="FFFFFF"/>
                 </a:solidFill>
@@ -9076,7 +9076,7 @@
               </a:ln>
               <a:extLst>
                 <a:ext uri="{91240B29-F687-4f45-9708-019B960494DF}">
-                  <a14:hiddenLine xmlns:a14="http://schemas.microsoft.com/office/drawing/2010/main" xmlns="" w="9525">
+                  <a14:hiddenLine xmlns="" xmlns:a14="http://schemas.microsoft.com/office/drawing/2010/main" w="9525">
                     <a:solidFill>
                       <a:srgbClr val="000000"/>
                     </a:solidFill>
@@ -9166,7 +9166,7 @@
               </a:ln>
               <a:extLst>
                 <a:ext uri="{91240B29-F687-4f45-9708-019B960494DF}">
-                  <a14:hiddenLine xmlns:a14="http://schemas.microsoft.com/office/drawing/2010/main" xmlns="" w="9525">
+                  <a14:hiddenLine xmlns="" xmlns:a14="http://schemas.microsoft.com/office/drawing/2010/main" w="9525">
                     <a:solidFill>
                       <a:srgbClr val="000000"/>
                     </a:solidFill>
@@ -9256,7 +9256,7 @@
               </a:ln>
               <a:extLst>
                 <a:ext uri="{91240B29-F687-4f45-9708-019B960494DF}">
-                  <a14:hiddenLine xmlns:a14="http://schemas.microsoft.com/office/drawing/2010/main" xmlns="" w="9525">
+                  <a14:hiddenLine xmlns="" xmlns:a14="http://schemas.microsoft.com/office/drawing/2010/main" w="9525">
                     <a:solidFill>
                       <a:srgbClr val="000000"/>
                     </a:solidFill>
@@ -9318,7 +9318,7 @@
               </a:ln>
               <a:extLst>
                 <a:ext uri="{91240B29-F687-4f45-9708-019B960494DF}">
-                  <a14:hiddenLine xmlns:a14="http://schemas.microsoft.com/office/drawing/2010/main" xmlns="" w="9525">
+                  <a14:hiddenLine xmlns="" xmlns:a14="http://schemas.microsoft.com/office/drawing/2010/main" w="9525">
                     <a:solidFill>
                       <a:srgbClr val="000000"/>
                     </a:solidFill>
@@ -9408,7 +9408,7 @@
               </a:ln>
               <a:extLst>
                 <a:ext uri="{91240B29-F687-4f45-9708-019B960494DF}">
-                  <a14:hiddenLine xmlns:a14="http://schemas.microsoft.com/office/drawing/2010/main" xmlns="" w="9525">
+                  <a14:hiddenLine xmlns="" xmlns:a14="http://schemas.microsoft.com/office/drawing/2010/main" w="9525">
                     <a:solidFill>
                       <a:srgbClr val="000000"/>
                     </a:solidFill>
@@ -9470,7 +9470,7 @@
               </a:ln>
               <a:extLst>
                 <a:ext uri="{91240B29-F687-4f45-9708-019B960494DF}">
-                  <a14:hiddenLine xmlns:a14="http://schemas.microsoft.com/office/drawing/2010/main" xmlns="" w="9525">
+                  <a14:hiddenLine xmlns="" xmlns:a14="http://schemas.microsoft.com/office/drawing/2010/main" w="9525">
                     <a:solidFill>
                       <a:srgbClr val="000000"/>
                     </a:solidFill>
@@ -9532,7 +9532,7 @@
               </a:ln>
               <a:extLst>
                 <a:ext uri="{91240B29-F687-4f45-9708-019B960494DF}">
-                  <a14:hiddenLine xmlns:a14="http://schemas.microsoft.com/office/drawing/2010/main" xmlns="" w="9525">
+                  <a14:hiddenLine xmlns="" xmlns:a14="http://schemas.microsoft.com/office/drawing/2010/main" w="9525">
                     <a:solidFill>
                       <a:srgbClr val="000000"/>
                     </a:solidFill>
@@ -9622,7 +9622,7 @@
               </a:ln>
               <a:extLst>
                 <a:ext uri="{91240B29-F687-4f45-9708-019B960494DF}">
-                  <a14:hiddenLine xmlns:a14="http://schemas.microsoft.com/office/drawing/2010/main" xmlns="" w="9525">
+                  <a14:hiddenLine xmlns="" xmlns:a14="http://schemas.microsoft.com/office/drawing/2010/main" w="9525">
                     <a:solidFill>
                       <a:srgbClr val="000000"/>
                     </a:solidFill>
@@ -9712,7 +9712,7 @@
               </a:ln>
               <a:extLst>
                 <a:ext uri="{91240B29-F687-4f45-9708-019B960494DF}">
-                  <a14:hiddenLine xmlns:a14="http://schemas.microsoft.com/office/drawing/2010/main" xmlns="" w="9525">
+                  <a14:hiddenLine xmlns="" xmlns:a14="http://schemas.microsoft.com/office/drawing/2010/main" w="9525">
                     <a:solidFill>
                       <a:srgbClr val="000000"/>
                     </a:solidFill>
@@ -9774,7 +9774,7 @@
               </a:ln>
               <a:extLst>
                 <a:ext uri="{91240B29-F687-4f45-9708-019B960494DF}">
-                  <a14:hiddenLine xmlns:a14="http://schemas.microsoft.com/office/drawing/2010/main" xmlns="" w="9525">
+                  <a14:hiddenLine xmlns="" xmlns:a14="http://schemas.microsoft.com/office/drawing/2010/main" w="9525">
                     <a:solidFill>
                       <a:srgbClr val="000000"/>
                     </a:solidFill>
@@ -9884,7 +9884,7 @@
               </a:ln>
               <a:extLst>
                 <a:ext uri="{91240B29-F687-4f45-9708-019B960494DF}">
-                  <a14:hiddenLine xmlns:a14="http://schemas.microsoft.com/office/drawing/2010/main" xmlns="" w="9525">
+                  <a14:hiddenLine xmlns="" xmlns:a14="http://schemas.microsoft.com/office/drawing/2010/main" w="9525">
                     <a:solidFill>
                       <a:srgbClr val="000000"/>
                     </a:solidFill>
@@ -9968,7 +9968,7 @@
               </a:ln>
               <a:extLst>
                 <a:ext uri="{91240B29-F687-4f45-9708-019B960494DF}">
-                  <a14:hiddenLine xmlns:a14="http://schemas.microsoft.com/office/drawing/2010/main" xmlns="" w="9525">
+                  <a14:hiddenLine xmlns="" xmlns:a14="http://schemas.microsoft.com/office/drawing/2010/main" w="9525">
                     <a:solidFill>
                       <a:srgbClr val="000000"/>
                     </a:solidFill>
@@ -10030,7 +10030,7 @@
               </a:ln>
               <a:extLst>
                 <a:ext uri="{91240B29-F687-4f45-9708-019B960494DF}">
-                  <a14:hiddenLine xmlns:a14="http://schemas.microsoft.com/office/drawing/2010/main" xmlns="" w="9525">
+                  <a14:hiddenLine xmlns="" xmlns:a14="http://schemas.microsoft.com/office/drawing/2010/main" w="9525">
                     <a:solidFill>
                       <a:srgbClr val="000000"/>
                     </a:solidFill>
@@ -10092,7 +10092,7 @@
               </a:ln>
               <a:extLst>
                 <a:ext uri="{91240B29-F687-4f45-9708-019B960494DF}">
-                  <a14:hiddenLine xmlns:a14="http://schemas.microsoft.com/office/drawing/2010/main" xmlns="" w="9525">
+                  <a14:hiddenLine xmlns="" xmlns:a14="http://schemas.microsoft.com/office/drawing/2010/main" w="9525">
                     <a:solidFill>
                       <a:srgbClr val="000000"/>
                     </a:solidFill>
@@ -10182,7 +10182,7 @@
               </a:ln>
               <a:extLst>
                 <a:ext uri="{91240B29-F687-4f45-9708-019B960494DF}">
-                  <a14:hiddenLine xmlns:a14="http://schemas.microsoft.com/office/drawing/2010/main" xmlns="" w="9525">
+                  <a14:hiddenLine xmlns="" xmlns:a14="http://schemas.microsoft.com/office/drawing/2010/main" w="9525">
                     <a:solidFill>
                       <a:srgbClr val="000000"/>
                     </a:solidFill>
@@ -10216,7 +10216,7 @@
               </a:ln>
               <a:extLst>
                 <a:ext uri="{91240B29-F687-4f45-9708-019B960494DF}">
-                  <a14:hiddenLine xmlns:a14="http://schemas.microsoft.com/office/drawing/2010/main" xmlns="" w="9525">
+                  <a14:hiddenLine xmlns="" xmlns:a14="http://schemas.microsoft.com/office/drawing/2010/main" w="9525">
                     <a:solidFill>
                       <a:srgbClr val="000000"/>
                     </a:solidFill>
@@ -10281,7 +10281,7 @@
               </a:ln>
               <a:extLst>
                 <a:ext uri="{91240B29-F687-4f45-9708-019B960494DF}">
-                  <a14:hiddenLine xmlns:a14="http://schemas.microsoft.com/office/drawing/2010/main" xmlns="" w="9525">
+                  <a14:hiddenLine xmlns="" xmlns:a14="http://schemas.microsoft.com/office/drawing/2010/main" w="9525">
                     <a:solidFill>
                       <a:srgbClr val="000000"/>
                     </a:solidFill>
@@ -10371,7 +10371,7 @@
               </a:ln>
               <a:extLst>
                 <a:ext uri="{91240B29-F687-4f45-9708-019B960494DF}">
-                  <a14:hiddenLine xmlns:a14="http://schemas.microsoft.com/office/drawing/2010/main" xmlns="" w="9525">
+                  <a14:hiddenLine xmlns="" xmlns:a14="http://schemas.microsoft.com/office/drawing/2010/main" w="9525">
                     <a:solidFill>
                       <a:srgbClr val="000000"/>
                     </a:solidFill>
@@ -10433,7 +10433,7 @@
               </a:ln>
               <a:extLst>
                 <a:ext uri="{91240B29-F687-4f45-9708-019B960494DF}">
-                  <a14:hiddenLine xmlns:a14="http://schemas.microsoft.com/office/drawing/2010/main" xmlns="" w="9525">
+                  <a14:hiddenLine xmlns="" xmlns:a14="http://schemas.microsoft.com/office/drawing/2010/main" w="9525">
                     <a:solidFill>
                       <a:srgbClr val="000000"/>
                     </a:solidFill>
@@ -10523,7 +10523,7 @@
               </a:ln>
               <a:extLst>
                 <a:ext uri="{91240B29-F687-4f45-9708-019B960494DF}">
-                  <a14:hiddenLine xmlns:a14="http://schemas.microsoft.com/office/drawing/2010/main" xmlns="" w="9525">
+                  <a14:hiddenLine xmlns="" xmlns:a14="http://schemas.microsoft.com/office/drawing/2010/main" w="9525">
                     <a:solidFill>
                       <a:srgbClr val="000000"/>
                     </a:solidFill>
@@ -10588,7 +10588,7 @@
               </a:ln>
               <a:extLst>
                 <a:ext uri="{91240B29-F687-4f45-9708-019B960494DF}">
-                  <a14:hiddenLine xmlns:a14="http://schemas.microsoft.com/office/drawing/2010/main" xmlns="" w="9525">
+                  <a14:hiddenLine xmlns="" xmlns:a14="http://schemas.microsoft.com/office/drawing/2010/main" w="9525">
                     <a:solidFill>
                       <a:srgbClr val="000000"/>
                     </a:solidFill>
@@ -10650,7 +10650,7 @@
               </a:ln>
               <a:extLst>
                 <a:ext uri="{91240B29-F687-4f45-9708-019B960494DF}">
-                  <a14:hiddenLine xmlns:a14="http://schemas.microsoft.com/office/drawing/2010/main" xmlns="" w="9525">
+                  <a14:hiddenLine xmlns="" xmlns:a14="http://schemas.microsoft.com/office/drawing/2010/main" w="9525">
                     <a:solidFill>
                       <a:srgbClr val="000000"/>
                     </a:solidFill>
@@ -10740,7 +10740,7 @@
               </a:ln>
               <a:extLst>
                 <a:ext uri="{91240B29-F687-4f45-9708-019B960494DF}">
-                  <a14:hiddenLine xmlns:a14="http://schemas.microsoft.com/office/drawing/2010/main" xmlns="" w="9525">
+                  <a14:hiddenLine xmlns="" xmlns:a14="http://schemas.microsoft.com/office/drawing/2010/main" w="9525">
                     <a:solidFill>
                       <a:srgbClr val="000000"/>
                     </a:solidFill>
@@ -10830,7 +10830,7 @@
               </a:ln>
               <a:extLst>
                 <a:ext uri="{91240B29-F687-4f45-9708-019B960494DF}">
-                  <a14:hiddenLine xmlns:a14="http://schemas.microsoft.com/office/drawing/2010/main" xmlns="" w="9525">
+                  <a14:hiddenLine xmlns="" xmlns:a14="http://schemas.microsoft.com/office/drawing/2010/main" w="9525">
                     <a:solidFill>
                       <a:srgbClr val="000000"/>
                     </a:solidFill>
@@ -10895,7 +10895,7 @@
               </a:ln>
               <a:extLst>
                 <a:ext uri="{91240B29-F687-4f45-9708-019B960494DF}">
-                  <a14:hiddenLine xmlns:a14="http://schemas.microsoft.com/office/drawing/2010/main" xmlns="" w="9525">
+                  <a14:hiddenLine xmlns="" xmlns:a14="http://schemas.microsoft.com/office/drawing/2010/main" w="9525">
                     <a:solidFill>
                       <a:srgbClr val="000000"/>
                     </a:solidFill>
@@ -11015,7 +11015,7 @@
               </a:ln>
               <a:extLst>
                 <a:ext uri="{91240B29-F687-4f45-9708-019B960494DF}">
-                  <a14:hiddenLine xmlns:a14="http://schemas.microsoft.com/office/drawing/2010/main" xmlns="" w="9525">
+                  <a14:hiddenLine xmlns="" xmlns:a14="http://schemas.microsoft.com/office/drawing/2010/main" w="9525">
                     <a:solidFill>
                       <a:srgbClr val="000000"/>
                     </a:solidFill>
@@ -11113,7 +11113,7 @@
               </a:ln>
               <a:extLst>
                 <a:ext uri="{91240B29-F687-4f45-9708-019B960494DF}">
-                  <a14:hiddenLine xmlns:a14="http://schemas.microsoft.com/office/drawing/2010/main" xmlns="" w="9525">
+                  <a14:hiddenLine xmlns="" xmlns:a14="http://schemas.microsoft.com/office/drawing/2010/main" w="9525">
                     <a:solidFill>
                       <a:srgbClr val="000000"/>
                     </a:solidFill>
@@ -11228,7 +11228,7 @@
               </a:ln>
               <a:extLst>
                 <a:ext uri="{91240B29-F687-4f45-9708-019B960494DF}">
-                  <a14:hiddenLine xmlns:a14="http://schemas.microsoft.com/office/drawing/2010/main" xmlns="" w="9525">
+                  <a14:hiddenLine xmlns="" xmlns:a14="http://schemas.microsoft.com/office/drawing/2010/main" w="9525">
                     <a:solidFill>
                       <a:srgbClr val="000000"/>
                     </a:solidFill>
@@ -11318,7 +11318,7 @@
               </a:ln>
               <a:extLst>
                 <a:ext uri="{91240B29-F687-4f45-9708-019B960494DF}">
-                  <a14:hiddenLine xmlns:a14="http://schemas.microsoft.com/office/drawing/2010/main" xmlns="" w="9525">
+                  <a14:hiddenLine xmlns="" xmlns:a14="http://schemas.microsoft.com/office/drawing/2010/main" w="9525">
                     <a:solidFill>
                       <a:srgbClr val="000000"/>
                     </a:solidFill>
@@ -11383,7 +11383,7 @@
               </a:ln>
               <a:extLst>
                 <a:ext uri="{91240B29-F687-4f45-9708-019B960494DF}">
-                  <a14:hiddenLine xmlns:a14="http://schemas.microsoft.com/office/drawing/2010/main" xmlns="" w="9525">
+                  <a14:hiddenLine xmlns="" xmlns:a14="http://schemas.microsoft.com/office/drawing/2010/main" w="9525">
                     <a:solidFill>
                       <a:srgbClr val="000000"/>
                     </a:solidFill>
@@ -11473,7 +11473,7 @@
               </a:ln>
               <a:extLst>
                 <a:ext uri="{91240B29-F687-4f45-9708-019B960494DF}">
-                  <a14:hiddenLine xmlns:a14="http://schemas.microsoft.com/office/drawing/2010/main" xmlns="" w="9525">
+                  <a14:hiddenLine xmlns="" xmlns:a14="http://schemas.microsoft.com/office/drawing/2010/main" w="9525">
                     <a:solidFill>
                       <a:srgbClr val="000000"/>
                     </a:solidFill>
@@ -11541,7 +11541,7 @@
               </a:ln>
               <a:extLst>
                 <a:ext uri="{91240B29-F687-4f45-9708-019B960494DF}">
-                  <a14:hiddenLine xmlns:a14="http://schemas.microsoft.com/office/drawing/2010/main" xmlns="" w="9525">
+                  <a14:hiddenLine xmlns="" xmlns:a14="http://schemas.microsoft.com/office/drawing/2010/main" w="9525">
                     <a:solidFill>
                       <a:srgbClr val="000000"/>
                     </a:solidFill>
@@ -11631,7 +11631,7 @@
               </a:ln>
               <a:extLst>
                 <a:ext uri="{91240B29-F687-4f45-9708-019B960494DF}">
-                  <a14:hiddenLine xmlns:a14="http://schemas.microsoft.com/office/drawing/2010/main" xmlns="" w="9525">
+                  <a14:hiddenLine xmlns="" xmlns:a14="http://schemas.microsoft.com/office/drawing/2010/main" w="9525">
                     <a:solidFill>
                       <a:srgbClr val="000000"/>
                     </a:solidFill>
@@ -11699,7 +11699,7 @@
               </a:ln>
               <a:extLst>
                 <a:ext uri="{91240B29-F687-4f45-9708-019B960494DF}">
-                  <a14:hiddenLine xmlns:a14="http://schemas.microsoft.com/office/drawing/2010/main" xmlns="" w="9525">
+                  <a14:hiddenLine xmlns="" xmlns:a14="http://schemas.microsoft.com/office/drawing/2010/main" w="9525">
                     <a:solidFill>
                       <a:srgbClr val="000000"/>
                     </a:solidFill>
@@ -11789,7 +11789,7 @@
               </a:ln>
               <a:extLst>
                 <a:ext uri="{91240B29-F687-4f45-9708-019B960494DF}">
-                  <a14:hiddenLine xmlns:a14="http://schemas.microsoft.com/office/drawing/2010/main" xmlns="" w="9525">
+                  <a14:hiddenLine xmlns="" xmlns:a14="http://schemas.microsoft.com/office/drawing/2010/main" w="9525">
                     <a:solidFill>
                       <a:srgbClr val="000000"/>
                     </a:solidFill>
@@ -11823,7 +11823,7 @@
               </a:ln>
               <a:extLst>
                 <a:ext uri="{91240B29-F687-4f45-9708-019B960494DF}">
-                  <a14:hiddenLine xmlns:a14="http://schemas.microsoft.com/office/drawing/2010/main" xmlns="" w="9525">
+                  <a14:hiddenLine xmlns="" xmlns:a14="http://schemas.microsoft.com/office/drawing/2010/main" w="9525">
                     <a:solidFill>
                       <a:srgbClr val="000000"/>
                     </a:solidFill>
@@ -11964,7 +11964,7 @@
             <a:fld id="{48A87A34-81AB-432B-8DAE-1953F412C126}" type="datetimeFigureOut">
               <a:rPr lang="en-US" dirty="0"/>
               <a:pPr/>
-              <a:t>7/29/2019</a:t>
+              <a:t>8/2/2019</a:t>
             </a:fld>
             <a:endParaRPr lang="en-US" dirty="0"/>
           </a:p>
@@ -15379,13 +15379,34 @@
           <a:p>
             <a:r>
               <a:rPr lang="en-US" dirty="0" smtClean="0"/>
-              <a:t>How will you keep track of progress?</a:t>
-            </a:r>
-          </a:p>
-          <a:p>
+              <a:t>How will you keep track of progress</a:t>
+            </a:r>
             <a:r>
               <a:rPr lang="en-US" dirty="0" smtClean="0"/>
-              <a:t>If you were running the project as a team, how would you split up the work?</a:t>
+              <a:t>? </a:t>
+            </a:r>
+            <a:r>
+              <a:rPr lang="en-US" dirty="0" smtClean="0">
+                <a:hlinkClick r:id="rId2"/>
+              </a:rPr>
+              <a:t>Azure DevOps</a:t>
+            </a:r>
+            <a:endParaRPr lang="en-US" dirty="0" smtClean="0"/>
+          </a:p>
+          <a:p>
+            <a:r>
+              <a:rPr lang="en-US" dirty="0" smtClean="0"/>
+              <a:t>If you were running the project as a team, how would you split up the work</a:t>
+            </a:r>
+            <a:r>
+              <a:rPr lang="en-US" dirty="0" smtClean="0"/>
+              <a:t>? </a:t>
+            </a:r>
+            <a:r>
+              <a:rPr lang="en-US" dirty="0" smtClean="0">
+                <a:hlinkClick r:id="rId3"/>
+              </a:rPr>
+              <a:t>Trello</a:t>
             </a:r>
             <a:endParaRPr lang="en-GB" dirty="0"/>
           </a:p>

</xml_diff>

<commit_message>
Updated Day 1 agenda to include project mgmt
</commit_message>
<xml_diff>
--- a/docs/SMAP Materials Unbranded.pptx
+++ b/docs/SMAP Materials Unbranded.pptx
@@ -287,8 +287,11 @@
     </a:lvl9pPr>
   </p:defaultTextStyle>
   <p:extLst>
+    <p:ext uri="{EFAFB233-063F-42B5-8137-9DF3F51BA10A}">
+      <p15:sldGuideLst xmlns:p15="http://schemas.microsoft.com/office/powerpoint/2012/main"/>
+    </p:ext>
     <p:ext uri="http://customooxmlschemas.google.com/">
-      <go:slidesCustomData xmlns:go="http://customooxmlschemas.google.com/" xmlns:p15="http://schemas.microsoft.com/office/powerpoint/2012/main" xmlns:p14="http://schemas.microsoft.com/office/powerpoint/2010/main" xmlns:com="http://schemas.openxmlformats.org/drawingml/2006/compatibility" xmlns:pvml="urn:schemas-microsoft-com:office:powerpoint" xmlns:v="urn:schemas-microsoft-com:vml" xmlns:o="urn:schemas-microsoft-com:office:office" xmlns:dgm="http://schemas.openxmlformats.org/drawingml/2006/diagram" xmlns:c="http://schemas.openxmlformats.org/drawingml/2006/chart" xmlns:mv="urn:schemas-microsoft-com:mac:vml" xmlns:mc="http://schemas.openxmlformats.org/markup-compatibility/2006" xmlns="" r:id="rId49" roundtripDataSignature="AMtx7mgmvVC4a0x0NLXhxJWwW2VCjrmSOg=="/>
+      <go:slidesCustomData xmlns="" xmlns:mc="http://schemas.openxmlformats.org/markup-compatibility/2006" xmlns:mv="urn:schemas-microsoft-com:mac:vml" xmlns:c="http://schemas.openxmlformats.org/drawingml/2006/chart" xmlns:dgm="http://schemas.openxmlformats.org/drawingml/2006/diagram" xmlns:o="urn:schemas-microsoft-com:office:office" xmlns:v="urn:schemas-microsoft-com:vml" xmlns:pvml="urn:schemas-microsoft-com:office:powerpoint" xmlns:com="http://schemas.openxmlformats.org/drawingml/2006/compatibility" xmlns:p14="http://schemas.microsoft.com/office/powerpoint/2010/main" xmlns:p15="http://schemas.microsoft.com/office/powerpoint/2012/main" xmlns:go="http://customooxmlschemas.google.com/" r:id="rId49" roundtripDataSignature="AMtx7mgmvVC4a0x0NLXhxJWwW2VCjrmSOg=="/>
     </p:ext>
   </p:extLst>
 </p:presentation>
@@ -3794,7 +3797,12 @@
             <p:ph type="sldImg"/>
           </p:nvPr>
         </p:nvSpPr>
-        <p:spPr/>
+        <p:spPr>
+          <a:xfrm>
+            <a:off x="381000" y="685800"/>
+            <a:ext cx="6096000" cy="3429000"/>
+          </a:xfrm>
+        </p:spPr>
       </p:sp>
       <p:sp>
         <p:nvSpPr>
@@ -3964,7 +3972,12 @@
             <p:ph type="sldImg"/>
           </p:nvPr>
         </p:nvSpPr>
-        <p:spPr/>
+        <p:spPr>
+          <a:xfrm>
+            <a:off x="381000" y="685800"/>
+            <a:ext cx="6096000" cy="3429000"/>
+          </a:xfrm>
+        </p:spPr>
       </p:sp>
       <p:sp>
         <p:nvSpPr>
@@ -33183,7 +33196,7 @@
         </p:spPr>
         <p:txBody>
           <a:bodyPr spcFirstLastPara="1" wrap="square" lIns="91425" tIns="45700" rIns="91425" bIns="45700" anchor="t" anchorCtr="0">
-            <a:normAutofit/>
+            <a:normAutofit fontScale="92500" lnSpcReduction="10000"/>
           </a:bodyPr>
           <a:lstStyle/>
           <a:p>
@@ -33204,10 +33217,9 @@
               <a:buChar char="•"/>
             </a:pPr>
             <a:r>
-              <a:rPr lang="en-US" sz="2220"/>
+              <a:rPr lang="en-US" sz="2220" dirty="0" smtClean="0"/>
               <a:t>Recap</a:t>
             </a:r>
-            <a:endParaRPr/>
           </a:p>
           <a:p>
             <a:pPr marL="228600" lvl="0" indent="-228600" algn="l" rtl="0">
@@ -33215,7 +33227,7 @@
                 <a:spcPct val="110000"/>
               </a:lnSpc>
               <a:spcBef>
-                <a:spcPts val="1000"/>
+                <a:spcPts val="0"/>
               </a:spcBef>
               <a:spcAft>
                 <a:spcPts val="0"/>
@@ -33227,10 +33239,33 @@
               <a:buChar char="•"/>
             </a:pPr>
             <a:r>
-              <a:rPr lang="en-US" sz="2220"/>
+              <a:rPr lang="en-US" sz="2220" dirty="0" smtClean="0"/>
+              <a:t>Intro to Python</a:t>
+            </a:r>
+            <a:endParaRPr dirty="0"/>
+          </a:p>
+          <a:p>
+            <a:pPr marL="228600" lvl="0" indent="-228600" algn="l" rtl="0">
+              <a:lnSpc>
+                <a:spcPct val="110000"/>
+              </a:lnSpc>
+              <a:spcBef>
+                <a:spcPts val="1000"/>
+              </a:spcBef>
+              <a:spcAft>
+                <a:spcPts val="0"/>
+              </a:spcAft>
+              <a:buClr>
+                <a:schemeClr val="lt1"/>
+              </a:buClr>
+              <a:buSzPts val="2775"/>
+              <a:buChar char="•"/>
+            </a:pPr>
+            <a:r>
+              <a:rPr lang="en-US" sz="2220" dirty="0"/>
               <a:t>Programming concepts</a:t>
             </a:r>
-            <a:endParaRPr sz="2220"/>
+            <a:endParaRPr sz="2220" dirty="0"/>
           </a:p>
           <a:p>
             <a:pPr marL="685800" lvl="1" indent="-228600" algn="l" rtl="0">
@@ -33250,10 +33285,10 @@
               <a:buChar char="•"/>
             </a:pPr>
             <a:r>
-              <a:rPr lang="en-US" sz="1850"/>
+              <a:rPr lang="en-US" sz="1850" dirty="0"/>
               <a:t>Functions</a:t>
             </a:r>
-            <a:endParaRPr/>
+            <a:endParaRPr dirty="0"/>
           </a:p>
           <a:p>
             <a:pPr marL="685800" lvl="1" indent="-228600" algn="l" rtl="0">
@@ -33273,10 +33308,10 @@
               <a:buChar char="•"/>
             </a:pPr>
             <a:r>
-              <a:rPr lang="en-US" sz="1850"/>
+              <a:rPr lang="en-US" sz="1850" dirty="0"/>
               <a:t>Comments</a:t>
             </a:r>
-            <a:endParaRPr/>
+            <a:endParaRPr dirty="0"/>
           </a:p>
           <a:p>
             <a:pPr marL="685800" lvl="1" indent="-228600" algn="l" rtl="0">
@@ -33296,10 +33331,10 @@
               <a:buChar char="•"/>
             </a:pPr>
             <a:r>
-              <a:rPr lang="en-US" sz="1850"/>
+              <a:rPr lang="en-US" sz="1850" dirty="0"/>
               <a:t>Variables</a:t>
             </a:r>
-            <a:endParaRPr/>
+            <a:endParaRPr dirty="0"/>
           </a:p>
           <a:p>
             <a:pPr marL="685800" lvl="1" indent="-228600" algn="l" rtl="0">
@@ -33319,10 +33354,10 @@
               <a:buChar char="•"/>
             </a:pPr>
             <a:r>
-              <a:rPr lang="en-US" sz="1850"/>
+              <a:rPr lang="en-US" sz="1850" dirty="0"/>
               <a:t>Error Handling </a:t>
             </a:r>
-            <a:endParaRPr sz="1850"/>
+            <a:endParaRPr sz="1850" dirty="0"/>
           </a:p>
           <a:p>
             <a:pPr marL="228600" lvl="0" indent="-228600" algn="l" rtl="0">
@@ -33342,10 +33377,10 @@
               <a:buChar char="•"/>
             </a:pPr>
             <a:r>
-              <a:rPr lang="en-US" sz="2220"/>
+              <a:rPr lang="en-US" sz="2220" dirty="0"/>
               <a:t>Create Email To Thom functionality</a:t>
             </a:r>
-            <a:endParaRPr/>
+            <a:endParaRPr dirty="0"/>
           </a:p>
           <a:p>
             <a:pPr marL="228600" lvl="0" indent="-228600" algn="l" rtl="0">
@@ -33365,10 +33400,10 @@
               <a:buChar char="•"/>
             </a:pPr>
             <a:r>
-              <a:rPr lang="en-US" sz="2220"/>
+              <a:rPr lang="en-US" sz="2220" dirty="0"/>
               <a:t>Send Email by Raspberry Pi</a:t>
             </a:r>
-            <a:endParaRPr/>
+            <a:endParaRPr dirty="0"/>
           </a:p>
           <a:p>
             <a:pPr marL="228600" lvl="0" indent="-52387" algn="l" rtl="0">
@@ -33387,7 +33422,7 @@
               <a:buSzPts val="2775"/>
               <a:buNone/>
             </a:pPr>
-            <a:endParaRPr sz="2220"/>
+            <a:endParaRPr sz="2220" dirty="0"/>
           </a:p>
         </p:txBody>
       </p:sp>
@@ -33891,10 +33926,10 @@
               <a:buChar char="•"/>
             </a:pPr>
             <a:r>
-              <a:rPr lang="en-US" sz="2040"/>
+              <a:rPr lang="en-US" sz="2040" dirty="0"/>
               <a:t>Introductions</a:t>
             </a:r>
-            <a:endParaRPr sz="2040"/>
+            <a:endParaRPr sz="2040" dirty="0"/>
           </a:p>
           <a:p>
             <a:pPr marL="228600" lvl="0" indent="-228600" algn="l" rtl="0">
@@ -33914,10 +33949,14 @@
               <a:buChar char="•"/>
             </a:pPr>
             <a:r>
-              <a:rPr lang="en-US" sz="2040"/>
-              <a:t>Project outline</a:t>
+              <a:rPr lang="en-US" sz="2040" dirty="0" smtClean="0"/>
+              <a:t>Workshop </a:t>
             </a:r>
-            <a:endParaRPr sz="2040"/>
+            <a:r>
+              <a:rPr lang="en-US" sz="2040" dirty="0"/>
+              <a:t>outline</a:t>
+            </a:r>
+            <a:endParaRPr sz="2040" dirty="0"/>
           </a:p>
           <a:p>
             <a:pPr marL="228600" lvl="0" indent="-228600" algn="l" rtl="0">
@@ -33937,10 +33976,13 @@
               <a:buChar char="•"/>
             </a:pPr>
             <a:r>
-              <a:rPr lang="en-US" sz="2040"/>
-              <a:t>Business background</a:t>
+              <a:rPr lang="en-US" sz="2040" dirty="0"/>
+              <a:t>Business </a:t>
             </a:r>
-            <a:endParaRPr sz="2040"/>
+            <a:r>
+              <a:rPr lang="en-US" sz="2040" dirty="0" smtClean="0"/>
+              <a:t>background</a:t>
+            </a:r>
           </a:p>
           <a:p>
             <a:pPr marL="228600" lvl="0" indent="-228600" algn="l" rtl="0">
@@ -33960,10 +34002,10 @@
               <a:buChar char="•"/>
             </a:pPr>
             <a:r>
-              <a:rPr lang="en-US" sz="2040"/>
-              <a:t>Technology overview</a:t>
+              <a:rPr lang="en-US" sz="2040" dirty="0" smtClean="0"/>
+              <a:t>Project management</a:t>
             </a:r>
-            <a:endParaRPr sz="2040"/>
+            <a:endParaRPr sz="2040" dirty="0"/>
           </a:p>
           <a:p>
             <a:pPr marL="228600" lvl="0" indent="-228600" algn="l" rtl="0">
@@ -33983,10 +34025,10 @@
               <a:buChar char="•"/>
             </a:pPr>
             <a:r>
-              <a:rPr lang="en-US" sz="2040"/>
-              <a:t>Intro to Raspberry Pi</a:t>
+              <a:rPr lang="en-US" sz="2040" dirty="0"/>
+              <a:t>Technology overview</a:t>
             </a:r>
-            <a:endParaRPr sz="2040"/>
+            <a:endParaRPr sz="2040" dirty="0"/>
           </a:p>
           <a:p>
             <a:pPr marL="228600" lvl="0" indent="-228600" algn="l" rtl="0">
@@ -34006,10 +34048,10 @@
               <a:buChar char="•"/>
             </a:pPr>
             <a:r>
-              <a:rPr lang="en-US" sz="2040"/>
-              <a:t>Python</a:t>
+              <a:rPr lang="en-US" sz="2040" dirty="0"/>
+              <a:t>Intro to Raspberry Pi</a:t>
             </a:r>
-            <a:endParaRPr/>
+            <a:endParaRPr sz="2040" dirty="0"/>
           </a:p>
           <a:p>
             <a:pPr marL="228600" lvl="0" indent="-228600" algn="l" rtl="0">
@@ -34029,10 +34071,10 @@
               <a:buChar char="•"/>
             </a:pPr>
             <a:r>
-              <a:rPr lang="en-US" sz="2040"/>
+              <a:rPr lang="en-US" sz="2040" dirty="0" smtClean="0"/>
               <a:t>Circuits</a:t>
             </a:r>
-            <a:endParaRPr/>
+            <a:endParaRPr dirty="0"/>
           </a:p>
           <a:p>
             <a:pPr marL="228600" lvl="0" indent="-228600" algn="l" rtl="0">
@@ -34052,10 +34094,10 @@
               <a:buChar char="•"/>
             </a:pPr>
             <a:r>
-              <a:rPr lang="en-US" sz="2040"/>
+              <a:rPr lang="en-US" sz="2040" dirty="0"/>
               <a:t>Raspberry Pi circuit</a:t>
             </a:r>
-            <a:endParaRPr/>
+            <a:endParaRPr dirty="0"/>
           </a:p>
           <a:p>
             <a:pPr marL="0" lvl="0" indent="0" algn="l" rtl="0">
@@ -34074,7 +34116,7 @@
               <a:buSzPts val="2550"/>
               <a:buNone/>
             </a:pPr>
-            <a:endParaRPr sz="2040"/>
+            <a:endParaRPr sz="2040" dirty="0"/>
           </a:p>
         </p:txBody>
       </p:sp>

</xml_diff>